<commit_message>
almost finshed chapter 1
</commit_message>
<xml_diff>
--- a/Graphic & Tables.pptx
+++ b/Graphic & Tables.pptx
@@ -6,6 +6,8 @@
   </p:sldMasterIdLst>
   <p:sldIdLst>
     <p:sldId id="256" r:id="rId2"/>
+    <p:sldId id="257" r:id="rId3"/>
+    <p:sldId id="259" r:id="rId4"/>
   </p:sldIdLst>
   <p:sldSz cx="9144000" cy="6858000" type="screen4x3"/>
   <p:notesSz cx="6858000" cy="9144000"/>
@@ -104,6 +106,23 @@
       </a:defRPr>
     </a:lvl9pPr>
   </p:defaultTextStyle>
+  <p:extLst>
+    <p:ext uri="{521415D9-36F7-43E2-AB2F-B90AF26B5E84}">
+      <p14:sectionLst xmlns:p14="http://schemas.microsoft.com/office/powerpoint/2010/main">
+        <p14:section name="第一章-表" id="{5DDE9ECE-E1D4-44EE-8734-BEAC235B8DA3}">
+          <p14:sldIdLst>
+            <p14:sldId id="256"/>
+          </p14:sldIdLst>
+        </p14:section>
+        <p14:section name="第一章-图" id="{A59240F9-DC6E-4C1B-AD6C-982BA58D889D}">
+          <p14:sldIdLst>
+            <p14:sldId id="257"/>
+            <p14:sldId id="259"/>
+          </p14:sldIdLst>
+        </p14:section>
+      </p14:sectionLst>
+    </p:ext>
+  </p:extLst>
 </p:presentation>
 </file>
 
@@ -3095,1259 +3114,17 @@
           <a:chExt cx="0" cy="0"/>
         </a:xfrm>
       </p:grpSpPr>
-      <p:graphicFrame>
-        <p:nvGraphicFramePr>
-          <p:cNvPr id="9" name="表格 8"/>
-          <p:cNvGraphicFramePr>
-            <a:graphicFrameLocks noGrp="1"/>
-          </p:cNvGraphicFramePr>
+      <p:sp>
+        <p:nvSpPr>
+          <p:cNvPr id="10" name="Rectangle 3"/>
+          <p:cNvSpPr>
+            <a:spLocks noChangeArrowheads="1"/>
+          </p:cNvSpPr>
           <p:nvPr/>
-        </p:nvGraphicFramePr>
-        <p:xfrm>
-          <a:off x="1784350" y="2816701"/>
-          <a:ext cx="5575300" cy="2092960"/>
-        </p:xfrm>
-        <a:graphic>
-          <a:graphicData uri="http://schemas.openxmlformats.org/drawingml/2006/table">
-            <a:tbl>
-              <a:tblPr/>
-              <a:tblGrid>
-                <a:gridCol w="1016000"/>
-                <a:gridCol w="2641600"/>
-                <a:gridCol w="1917700"/>
-              </a:tblGrid>
-              <a:tr h="220980">
-                <a:tc>
-                  <a:txBody>
-                    <a:bodyPr/>
-                    <a:lstStyle/>
-                    <a:p>
-                      <a:endParaRPr lang="zh-CN" sz="1000">
-                        <a:effectLst/>
-                        <a:latin typeface="Times New Roman"/>
-                      </a:endParaRPr>
-                    </a:p>
-                  </a:txBody>
-                  <a:tcPr marL="9525" marR="9525" marT="9525" marB="0" anchor="b">
-                    <a:lnL>
-                      <a:noFill/>
-                    </a:lnL>
-                    <a:lnR>
-                      <a:noFill/>
-                    </a:lnR>
-                    <a:lnT w="12700" cap="flat" cmpd="sng" algn="ctr">
-                      <a:solidFill>
-                        <a:srgbClr val="000000"/>
-                      </a:solidFill>
-                      <a:prstDash val="solid"/>
-                      <a:round/>
-                      <a:headEnd type="none" w="med" len="med"/>
-                      <a:tailEnd type="none" w="med" len="med"/>
-                    </a:lnT>
-                    <a:lnB w="12700" cap="flat" cmpd="sng" algn="ctr">
-                      <a:solidFill>
-                        <a:srgbClr val="000000"/>
-                      </a:solidFill>
-                      <a:prstDash val="solid"/>
-                      <a:round/>
-                      <a:headEnd type="none" w="med" len="med"/>
-                      <a:tailEnd type="none" w="med" len="med"/>
-                    </a:lnB>
-                    <a:solidFill>
-                      <a:srgbClr val="FFFFFF"/>
-                    </a:solidFill>
-                  </a:tcPr>
-                </a:tc>
-                <a:tc>
-                  <a:txBody>
-                    <a:bodyPr/>
-                    <a:lstStyle/>
-                    <a:p>
-                      <a:pPr algn="ctr">
-                        <a:spcBef>
-                          <a:spcPts val="300"/>
-                        </a:spcBef>
-                        <a:spcAft>
-                          <a:spcPts val="300"/>
-                        </a:spcAft>
-                      </a:pPr>
-                      <a:r>
-                        <a:rPr lang="zh-CN" sz="1050" kern="100">
-                          <a:effectLst/>
-                          <a:latin typeface="宋体"/>
-                          <a:cs typeface="Times New Roman"/>
-                        </a:rPr>
-                        <a:t>三坐标测量机</a:t>
-                      </a:r>
-                    </a:p>
-                  </a:txBody>
-                  <a:tcPr marL="9525" marR="9525" marT="9525" marB="0" anchor="b">
-                    <a:lnL>
-                      <a:noFill/>
-                    </a:lnL>
-                    <a:lnR>
-                      <a:noFill/>
-                    </a:lnR>
-                    <a:lnT w="12700" cap="flat" cmpd="sng" algn="ctr">
-                      <a:solidFill>
-                        <a:srgbClr val="000000"/>
-                      </a:solidFill>
-                      <a:prstDash val="solid"/>
-                      <a:round/>
-                      <a:headEnd type="none" w="med" len="med"/>
-                      <a:tailEnd type="none" w="med" len="med"/>
-                    </a:lnT>
-                    <a:lnB w="12700" cap="flat" cmpd="sng" algn="ctr">
-                      <a:solidFill>
-                        <a:srgbClr val="000000"/>
-                      </a:solidFill>
-                      <a:prstDash val="solid"/>
-                      <a:round/>
-                      <a:headEnd type="none" w="med" len="med"/>
-                      <a:tailEnd type="none" w="med" len="med"/>
-                    </a:lnB>
-                    <a:solidFill>
-                      <a:srgbClr val="FFFFFF"/>
-                    </a:solidFill>
-                  </a:tcPr>
-                </a:tc>
-                <a:tc>
-                  <a:txBody>
-                    <a:bodyPr/>
-                    <a:lstStyle/>
-                    <a:p>
-                      <a:pPr algn="ctr">
-                        <a:spcBef>
-                          <a:spcPts val="300"/>
-                        </a:spcBef>
-                        <a:spcAft>
-                          <a:spcPts val="300"/>
-                        </a:spcAft>
-                      </a:pPr>
-                      <a:r>
-                        <a:rPr lang="zh-CN" sz="1050" kern="100">
-                          <a:effectLst/>
-                          <a:latin typeface="宋体"/>
-                          <a:cs typeface="Times New Roman"/>
-                        </a:rPr>
-                        <a:t>结构光</a:t>
-                      </a:r>
-                    </a:p>
-                  </a:txBody>
-                  <a:tcPr marL="9525" marR="9525" marT="9525" marB="0" anchor="b">
-                    <a:lnL>
-                      <a:noFill/>
-                    </a:lnL>
-                    <a:lnR>
-                      <a:noFill/>
-                    </a:lnR>
-                    <a:lnT w="12700" cap="flat" cmpd="sng" algn="ctr">
-                      <a:solidFill>
-                        <a:srgbClr val="000000"/>
-                      </a:solidFill>
-                      <a:prstDash val="solid"/>
-                      <a:round/>
-                      <a:headEnd type="none" w="med" len="med"/>
-                      <a:tailEnd type="none" w="med" len="med"/>
-                    </a:lnT>
-                    <a:lnB w="12700" cap="flat" cmpd="sng" algn="ctr">
-                      <a:solidFill>
-                        <a:srgbClr val="000000"/>
-                      </a:solidFill>
-                      <a:prstDash val="solid"/>
-                      <a:round/>
-                      <a:headEnd type="none" w="med" len="med"/>
-                      <a:tailEnd type="none" w="med" len="med"/>
-                    </a:lnB>
-                    <a:solidFill>
-                      <a:srgbClr val="FFFFFF"/>
-                    </a:solidFill>
-                  </a:tcPr>
-                </a:tc>
-              </a:tr>
-              <a:tr h="171450">
-                <a:tc>
-                  <a:txBody>
-                    <a:bodyPr/>
-                    <a:lstStyle/>
-                    <a:p>
-                      <a:pPr algn="ctr">
-                        <a:spcBef>
-                          <a:spcPts val="300"/>
-                        </a:spcBef>
-                        <a:spcAft>
-                          <a:spcPts val="300"/>
-                        </a:spcAft>
-                      </a:pPr>
-                      <a:r>
-                        <a:rPr lang="zh-CN" sz="1050" kern="100">
-                          <a:effectLst/>
-                          <a:latin typeface="宋体"/>
-                          <a:cs typeface="Times New Roman"/>
-                        </a:rPr>
-                        <a:t>安装校准</a:t>
-                      </a:r>
-                    </a:p>
-                  </a:txBody>
-                  <a:tcPr marL="9525" marR="9525" marT="9525" marB="0" anchor="b">
-                    <a:lnL>
-                      <a:noFill/>
-                    </a:lnL>
-                    <a:lnR>
-                      <a:noFill/>
-                    </a:lnR>
-                    <a:lnT w="12700" cap="flat" cmpd="sng" algn="ctr">
-                      <a:solidFill>
-                        <a:srgbClr val="000000"/>
-                      </a:solidFill>
-                      <a:prstDash val="solid"/>
-                      <a:round/>
-                      <a:headEnd type="none" w="med" len="med"/>
-                      <a:tailEnd type="none" w="med" len="med"/>
-                    </a:lnT>
-                    <a:lnB>
-                      <a:noFill/>
-                    </a:lnB>
-                    <a:solidFill>
-                      <a:srgbClr val="FFFFFF"/>
-                    </a:solidFill>
-                  </a:tcPr>
-                </a:tc>
-                <a:tc>
-                  <a:txBody>
-                    <a:bodyPr/>
-                    <a:lstStyle/>
-                    <a:p>
-                      <a:pPr algn="ctr">
-                        <a:spcBef>
-                          <a:spcPts val="300"/>
-                        </a:spcBef>
-                        <a:spcAft>
-                          <a:spcPts val="300"/>
-                        </a:spcAft>
-                      </a:pPr>
-                      <a:r>
-                        <a:rPr lang="zh-CN" sz="1050" kern="100">
-                          <a:effectLst/>
-                          <a:latin typeface="宋体"/>
-                          <a:cs typeface="Times New Roman"/>
-                        </a:rPr>
-                        <a:t>一次性安装校准，但费用贵</a:t>
-                      </a:r>
-                    </a:p>
-                  </a:txBody>
-                  <a:tcPr marL="9525" marR="9525" marT="9525" marB="0" anchor="b">
-                    <a:lnL>
-                      <a:noFill/>
-                    </a:lnL>
-                    <a:lnR>
-                      <a:noFill/>
-                    </a:lnR>
-                    <a:lnT w="12700" cap="flat" cmpd="sng" algn="ctr">
-                      <a:solidFill>
-                        <a:srgbClr val="000000"/>
-                      </a:solidFill>
-                      <a:prstDash val="solid"/>
-                      <a:round/>
-                      <a:headEnd type="none" w="med" len="med"/>
-                      <a:tailEnd type="none" w="med" len="med"/>
-                    </a:lnT>
-                    <a:lnB>
-                      <a:noFill/>
-                    </a:lnB>
-                    <a:solidFill>
-                      <a:srgbClr val="FFFFFF"/>
-                    </a:solidFill>
-                  </a:tcPr>
-                </a:tc>
-                <a:tc>
-                  <a:txBody>
-                    <a:bodyPr/>
-                    <a:lstStyle/>
-                    <a:p>
-                      <a:pPr algn="ctr">
-                        <a:spcBef>
-                          <a:spcPts val="300"/>
-                        </a:spcBef>
-                        <a:spcAft>
-                          <a:spcPts val="300"/>
-                        </a:spcAft>
-                      </a:pPr>
-                      <a:r>
-                        <a:rPr lang="zh-CN" sz="1050" kern="100">
-                          <a:effectLst/>
-                          <a:latin typeface="宋体"/>
-                          <a:cs typeface="Times New Roman"/>
-                        </a:rPr>
-                        <a:t>无需安装，移动设备需校准</a:t>
-                      </a:r>
-                    </a:p>
-                  </a:txBody>
-                  <a:tcPr marL="9525" marR="9525" marT="9525" marB="0" anchor="b">
-                    <a:lnL>
-                      <a:noFill/>
-                    </a:lnL>
-                    <a:lnR>
-                      <a:noFill/>
-                    </a:lnR>
-                    <a:lnT w="12700" cap="flat" cmpd="sng" algn="ctr">
-                      <a:solidFill>
-                        <a:srgbClr val="000000"/>
-                      </a:solidFill>
-                      <a:prstDash val="solid"/>
-                      <a:round/>
-                      <a:headEnd type="none" w="med" len="med"/>
-                      <a:tailEnd type="none" w="med" len="med"/>
-                    </a:lnT>
-                    <a:lnB>
-                      <a:noFill/>
-                    </a:lnB>
-                    <a:solidFill>
-                      <a:srgbClr val="FFFFFF"/>
-                    </a:solidFill>
-                  </a:tcPr>
-                </a:tc>
-              </a:tr>
-              <a:tr h="171450">
-                <a:tc>
-                  <a:txBody>
-                    <a:bodyPr/>
-                    <a:lstStyle/>
-                    <a:p>
-                      <a:pPr algn="ctr">
-                        <a:spcBef>
-                          <a:spcPts val="300"/>
-                        </a:spcBef>
-                        <a:spcAft>
-                          <a:spcPts val="300"/>
-                        </a:spcAft>
-                      </a:pPr>
-                      <a:r>
-                        <a:rPr lang="zh-CN" sz="1050" kern="100">
-                          <a:effectLst/>
-                          <a:latin typeface="宋体"/>
-                          <a:cs typeface="Times New Roman"/>
-                        </a:rPr>
-                        <a:t>适用表面</a:t>
-                      </a:r>
-                    </a:p>
-                  </a:txBody>
-                  <a:tcPr marL="9525" marR="9525" marT="9525" marB="0" anchor="b">
-                    <a:lnL>
-                      <a:noFill/>
-                    </a:lnL>
-                    <a:lnR>
-                      <a:noFill/>
-                    </a:lnR>
-                    <a:lnT>
-                      <a:noFill/>
-                    </a:lnT>
-                    <a:lnB>
-                      <a:noFill/>
-                    </a:lnB>
-                    <a:solidFill>
-                      <a:srgbClr val="FFFFFF"/>
-                    </a:solidFill>
-                  </a:tcPr>
-                </a:tc>
-                <a:tc>
-                  <a:txBody>
-                    <a:bodyPr/>
-                    <a:lstStyle/>
-                    <a:p>
-                      <a:pPr algn="ctr">
-                        <a:spcBef>
-                          <a:spcPts val="300"/>
-                        </a:spcBef>
-                        <a:spcAft>
-                          <a:spcPts val="300"/>
-                        </a:spcAft>
-                      </a:pPr>
-                      <a:r>
-                        <a:rPr lang="zh-CN" sz="1050" kern="100">
-                          <a:effectLst/>
-                          <a:latin typeface="宋体"/>
-                          <a:cs typeface="Times New Roman"/>
-                        </a:rPr>
-                        <a:t>坚硬，粗糙细腻都可</a:t>
-                      </a:r>
-                    </a:p>
-                  </a:txBody>
-                  <a:tcPr marL="9525" marR="9525" marT="9525" marB="0" anchor="b">
-                    <a:lnL>
-                      <a:noFill/>
-                    </a:lnL>
-                    <a:lnR>
-                      <a:noFill/>
-                    </a:lnR>
-                    <a:lnT>
-                      <a:noFill/>
-                    </a:lnT>
-                    <a:lnB>
-                      <a:noFill/>
-                    </a:lnB>
-                    <a:solidFill>
-                      <a:srgbClr val="FFFFFF"/>
-                    </a:solidFill>
-                  </a:tcPr>
-                </a:tc>
-                <a:tc>
-                  <a:txBody>
-                    <a:bodyPr/>
-                    <a:lstStyle/>
-                    <a:p>
-                      <a:pPr algn="ctr">
-                        <a:spcBef>
-                          <a:spcPts val="300"/>
-                        </a:spcBef>
-                        <a:spcAft>
-                          <a:spcPts val="300"/>
-                        </a:spcAft>
-                      </a:pPr>
-                      <a:r>
-                        <a:rPr lang="zh-CN" sz="1050" kern="100">
-                          <a:effectLst/>
-                          <a:latin typeface="宋体"/>
-                          <a:cs typeface="Times New Roman"/>
-                        </a:rPr>
-                        <a:t>坚硬柔软都可，不反光，突变不多</a:t>
-                      </a:r>
-                    </a:p>
-                  </a:txBody>
-                  <a:tcPr marL="9525" marR="9525" marT="9525" marB="0" anchor="b">
-                    <a:lnL>
-                      <a:noFill/>
-                    </a:lnL>
-                    <a:lnR>
-                      <a:noFill/>
-                    </a:lnR>
-                    <a:lnT>
-                      <a:noFill/>
-                    </a:lnT>
-                    <a:lnB>
-                      <a:noFill/>
-                    </a:lnB>
-                    <a:solidFill>
-                      <a:srgbClr val="FFFFFF"/>
-                    </a:solidFill>
-                  </a:tcPr>
-                </a:tc>
-              </a:tr>
-              <a:tr h="171450">
-                <a:tc>
-                  <a:txBody>
-                    <a:bodyPr/>
-                    <a:lstStyle/>
-                    <a:p>
-                      <a:pPr algn="ctr">
-                        <a:spcBef>
-                          <a:spcPts val="300"/>
-                        </a:spcBef>
-                        <a:spcAft>
-                          <a:spcPts val="300"/>
-                        </a:spcAft>
-                      </a:pPr>
-                      <a:r>
-                        <a:rPr lang="zh-CN" sz="1050" kern="100">
-                          <a:effectLst/>
-                          <a:latin typeface="宋体"/>
-                          <a:cs typeface="Times New Roman"/>
-                        </a:rPr>
-                        <a:t>量程</a:t>
-                      </a:r>
-                    </a:p>
-                  </a:txBody>
-                  <a:tcPr marL="9525" marR="9525" marT="9525" marB="0" anchor="b">
-                    <a:lnL>
-                      <a:noFill/>
-                    </a:lnL>
-                    <a:lnR>
-                      <a:noFill/>
-                    </a:lnR>
-                    <a:lnT>
-                      <a:noFill/>
-                    </a:lnT>
-                    <a:lnB>
-                      <a:noFill/>
-                    </a:lnB>
-                    <a:solidFill>
-                      <a:srgbClr val="FFFFFF"/>
-                    </a:solidFill>
-                  </a:tcPr>
-                </a:tc>
-                <a:tc>
-                  <a:txBody>
-                    <a:bodyPr/>
-                    <a:lstStyle/>
-                    <a:p>
-                      <a:pPr algn="ctr">
-                        <a:spcBef>
-                          <a:spcPts val="300"/>
-                        </a:spcBef>
-                        <a:spcAft>
-                          <a:spcPts val="300"/>
-                        </a:spcAft>
-                      </a:pPr>
-                      <a:r>
-                        <a:rPr lang="zh-CN" sz="1050" kern="100">
-                          <a:effectLst/>
-                          <a:latin typeface="宋体"/>
-                          <a:cs typeface="Times New Roman"/>
-                        </a:rPr>
-                        <a:t>固定，有设备尺寸决定</a:t>
-                      </a:r>
-                    </a:p>
-                  </a:txBody>
-                  <a:tcPr marL="9525" marR="9525" marT="9525" marB="0" anchor="b">
-                    <a:lnL>
-                      <a:noFill/>
-                    </a:lnL>
-                    <a:lnR>
-                      <a:noFill/>
-                    </a:lnR>
-                    <a:lnT>
-                      <a:noFill/>
-                    </a:lnT>
-                    <a:lnB>
-                      <a:noFill/>
-                    </a:lnB>
-                    <a:solidFill>
-                      <a:srgbClr val="FFFFFF"/>
-                    </a:solidFill>
-                  </a:tcPr>
-                </a:tc>
-                <a:tc>
-                  <a:txBody>
-                    <a:bodyPr/>
-                    <a:lstStyle/>
-                    <a:p>
-                      <a:pPr algn="ctr">
-                        <a:spcBef>
-                          <a:spcPts val="300"/>
-                        </a:spcBef>
-                        <a:spcAft>
-                          <a:spcPts val="300"/>
-                        </a:spcAft>
-                      </a:pPr>
-                      <a:r>
-                        <a:rPr lang="zh-CN" sz="1050" kern="100">
-                          <a:effectLst/>
-                          <a:latin typeface="宋体"/>
-                          <a:cs typeface="Times New Roman"/>
-                        </a:rPr>
-                        <a:t>较大，有投影图样和设备分辨率决定</a:t>
-                      </a:r>
-                    </a:p>
-                  </a:txBody>
-                  <a:tcPr marL="9525" marR="9525" marT="9525" marB="0" anchor="b">
-                    <a:lnL>
-                      <a:noFill/>
-                    </a:lnL>
-                    <a:lnR>
-                      <a:noFill/>
-                    </a:lnR>
-                    <a:lnT>
-                      <a:noFill/>
-                    </a:lnT>
-                    <a:lnB>
-                      <a:noFill/>
-                    </a:lnB>
-                    <a:solidFill>
-                      <a:srgbClr val="FFFFFF"/>
-                    </a:solidFill>
-                  </a:tcPr>
-                </a:tc>
-              </a:tr>
-              <a:tr h="171450">
-                <a:tc>
-                  <a:txBody>
-                    <a:bodyPr/>
-                    <a:lstStyle/>
-                    <a:p>
-                      <a:pPr algn="ctr">
-                        <a:spcBef>
-                          <a:spcPts val="300"/>
-                        </a:spcBef>
-                        <a:spcAft>
-                          <a:spcPts val="300"/>
-                        </a:spcAft>
-                      </a:pPr>
-                      <a:r>
-                        <a:rPr lang="zh-CN" sz="1050" kern="100">
-                          <a:effectLst/>
-                          <a:latin typeface="宋体"/>
-                          <a:cs typeface="Times New Roman"/>
-                        </a:rPr>
-                        <a:t>算法难度</a:t>
-                      </a:r>
-                    </a:p>
-                  </a:txBody>
-                  <a:tcPr marL="9525" marR="9525" marT="9525" marB="0" anchor="b">
-                    <a:lnL>
-                      <a:noFill/>
-                    </a:lnL>
-                    <a:lnR>
-                      <a:noFill/>
-                    </a:lnR>
-                    <a:lnT>
-                      <a:noFill/>
-                    </a:lnT>
-                    <a:lnB>
-                      <a:noFill/>
-                    </a:lnB>
-                    <a:solidFill>
-                      <a:srgbClr val="FFFFFF"/>
-                    </a:solidFill>
-                  </a:tcPr>
-                </a:tc>
-                <a:tc>
-                  <a:txBody>
-                    <a:bodyPr/>
-                    <a:lstStyle/>
-                    <a:p>
-                      <a:pPr algn="ctr">
-                        <a:spcBef>
-                          <a:spcPts val="300"/>
-                        </a:spcBef>
-                        <a:spcAft>
-                          <a:spcPts val="300"/>
-                        </a:spcAft>
-                      </a:pPr>
-                      <a:r>
-                        <a:rPr lang="zh-CN" sz="1050" kern="100">
-                          <a:effectLst/>
-                          <a:latin typeface="宋体"/>
-                          <a:cs typeface="Times New Roman"/>
-                        </a:rPr>
-                        <a:t>前期路径规划，</a:t>
-                      </a:r>
-                      <a:r>
-                        <a:rPr lang="en-US" sz="1050" kern="100">
-                          <a:effectLst/>
-                          <a:latin typeface="宋体"/>
-                          <a:cs typeface="Times New Roman"/>
-                        </a:rPr>
-                        <a:t>NP</a:t>
-                      </a:r>
-                      <a:r>
-                        <a:rPr lang="zh-CN" sz="1050" kern="100">
-                          <a:effectLst/>
-                          <a:latin typeface="宋体"/>
-                          <a:cs typeface="Times New Roman"/>
-                        </a:rPr>
-                        <a:t>问题</a:t>
-                      </a:r>
-                    </a:p>
-                  </a:txBody>
-                  <a:tcPr marL="9525" marR="9525" marT="9525" marB="0" anchor="b">
-                    <a:lnL>
-                      <a:noFill/>
-                    </a:lnL>
-                    <a:lnR>
-                      <a:noFill/>
-                    </a:lnR>
-                    <a:lnT>
-                      <a:noFill/>
-                    </a:lnT>
-                    <a:lnB>
-                      <a:noFill/>
-                    </a:lnB>
-                    <a:solidFill>
-                      <a:srgbClr val="FFFFFF"/>
-                    </a:solidFill>
-                  </a:tcPr>
-                </a:tc>
-                <a:tc>
-                  <a:txBody>
-                    <a:bodyPr/>
-                    <a:lstStyle/>
-                    <a:p>
-                      <a:pPr algn="ctr">
-                        <a:spcBef>
-                          <a:spcPts val="300"/>
-                        </a:spcBef>
-                        <a:spcAft>
-                          <a:spcPts val="300"/>
-                        </a:spcAft>
-                      </a:pPr>
-                      <a:r>
-                        <a:rPr lang="zh-CN" sz="1050" kern="100">
-                          <a:effectLst/>
-                          <a:latin typeface="宋体"/>
-                          <a:cs typeface="Times New Roman"/>
-                        </a:rPr>
-                        <a:t>后期图像处理，可借助</a:t>
-                      </a:r>
-                      <a:r>
-                        <a:rPr lang="en-US" sz="1050" kern="100">
-                          <a:effectLst/>
-                          <a:latin typeface="宋体"/>
-                          <a:cs typeface="Times New Roman"/>
-                        </a:rPr>
-                        <a:t>GPU</a:t>
-                      </a:r>
-                      <a:r>
-                        <a:rPr lang="zh-CN" sz="1050" kern="100">
-                          <a:effectLst/>
-                          <a:latin typeface="宋体"/>
-                          <a:cs typeface="Times New Roman"/>
-                        </a:rPr>
-                        <a:t>并行处理</a:t>
-                      </a:r>
-                    </a:p>
-                  </a:txBody>
-                  <a:tcPr marL="9525" marR="9525" marT="9525" marB="0" anchor="b">
-                    <a:lnL>
-                      <a:noFill/>
-                    </a:lnL>
-                    <a:lnR>
-                      <a:noFill/>
-                    </a:lnR>
-                    <a:lnT>
-                      <a:noFill/>
-                    </a:lnT>
-                    <a:lnB>
-                      <a:noFill/>
-                    </a:lnB>
-                    <a:solidFill>
-                      <a:srgbClr val="FFFFFF"/>
-                    </a:solidFill>
-                  </a:tcPr>
-                </a:tc>
-              </a:tr>
-              <a:tr h="199390">
-                <a:tc>
-                  <a:txBody>
-                    <a:bodyPr/>
-                    <a:lstStyle/>
-                    <a:p>
-                      <a:pPr algn="ctr">
-                        <a:spcBef>
-                          <a:spcPts val="300"/>
-                        </a:spcBef>
-                        <a:spcAft>
-                          <a:spcPts val="300"/>
-                        </a:spcAft>
-                      </a:pPr>
-                      <a:r>
-                        <a:rPr lang="zh-CN" sz="1050" kern="100">
-                          <a:effectLst/>
-                          <a:latin typeface="宋体"/>
-                          <a:cs typeface="Times New Roman"/>
-                        </a:rPr>
-                        <a:t>成本</a:t>
-                      </a:r>
-                    </a:p>
-                  </a:txBody>
-                  <a:tcPr marL="9525" marR="9525" marT="9525" marB="0" anchor="b">
-                    <a:lnL>
-                      <a:noFill/>
-                    </a:lnL>
-                    <a:lnR>
-                      <a:noFill/>
-                    </a:lnR>
-                    <a:lnT>
-                      <a:noFill/>
-                    </a:lnT>
-                    <a:lnB>
-                      <a:noFill/>
-                    </a:lnB>
-                    <a:solidFill>
-                      <a:srgbClr val="FFFFFF"/>
-                    </a:solidFill>
-                  </a:tcPr>
-                </a:tc>
-                <a:tc>
-                  <a:txBody>
-                    <a:bodyPr/>
-                    <a:lstStyle/>
-                    <a:p>
-                      <a:pPr algn="ctr">
-                        <a:spcBef>
-                          <a:spcPts val="300"/>
-                        </a:spcBef>
-                        <a:spcAft>
-                          <a:spcPts val="300"/>
-                        </a:spcAft>
-                      </a:pPr>
-                      <a:r>
-                        <a:rPr lang="zh-CN" sz="1050" kern="100">
-                          <a:effectLst/>
-                          <a:latin typeface="宋体"/>
-                          <a:cs typeface="Times New Roman"/>
-                        </a:rPr>
-                        <a:t>非常昂贵，维护成本高</a:t>
-                      </a:r>
-                    </a:p>
-                  </a:txBody>
-                  <a:tcPr marL="9525" marR="9525" marT="9525" marB="0" anchor="b">
-                    <a:lnL>
-                      <a:noFill/>
-                    </a:lnL>
-                    <a:lnR>
-                      <a:noFill/>
-                    </a:lnR>
-                    <a:lnT>
-                      <a:noFill/>
-                    </a:lnT>
-                    <a:lnB>
-                      <a:noFill/>
-                    </a:lnB>
-                    <a:solidFill>
-                      <a:srgbClr val="FFFFFF"/>
-                    </a:solidFill>
-                  </a:tcPr>
-                </a:tc>
-                <a:tc>
-                  <a:txBody>
-                    <a:bodyPr/>
-                    <a:lstStyle/>
-                    <a:p>
-                      <a:pPr algn="ctr">
-                        <a:spcBef>
-                          <a:spcPts val="300"/>
-                        </a:spcBef>
-                        <a:spcAft>
-                          <a:spcPts val="300"/>
-                        </a:spcAft>
-                      </a:pPr>
-                      <a:r>
-                        <a:rPr lang="zh-CN" sz="1050" kern="100">
-                          <a:effectLst/>
-                          <a:latin typeface="宋体"/>
-                          <a:cs typeface="Times New Roman"/>
-                        </a:rPr>
-                        <a:t>较昂贵，但设备普及</a:t>
-                      </a:r>
-                    </a:p>
-                  </a:txBody>
-                  <a:tcPr marL="9525" marR="9525" marT="9525" marB="0" anchor="b">
-                    <a:lnL>
-                      <a:noFill/>
-                    </a:lnL>
-                    <a:lnR>
-                      <a:noFill/>
-                    </a:lnR>
-                    <a:lnT>
-                      <a:noFill/>
-                    </a:lnT>
-                    <a:lnB>
-                      <a:noFill/>
-                    </a:lnB>
-                    <a:solidFill>
-                      <a:srgbClr val="FFFFFF"/>
-                    </a:solidFill>
-                  </a:tcPr>
-                </a:tc>
-              </a:tr>
-              <a:tr h="171450">
-                <a:tc>
-                  <a:txBody>
-                    <a:bodyPr/>
-                    <a:lstStyle/>
-                    <a:p>
-                      <a:pPr algn="ctr">
-                        <a:spcBef>
-                          <a:spcPts val="300"/>
-                        </a:spcBef>
-                        <a:spcAft>
-                          <a:spcPts val="300"/>
-                        </a:spcAft>
-                      </a:pPr>
-                      <a:r>
-                        <a:rPr lang="zh-CN" sz="1050" kern="100">
-                          <a:effectLst/>
-                          <a:latin typeface="宋体"/>
-                          <a:cs typeface="Times New Roman"/>
-                        </a:rPr>
-                        <a:t>便携</a:t>
-                      </a:r>
-                    </a:p>
-                  </a:txBody>
-                  <a:tcPr marL="9525" marR="9525" marT="9525" marB="0" anchor="b">
-                    <a:lnL>
-                      <a:noFill/>
-                    </a:lnL>
-                    <a:lnR>
-                      <a:noFill/>
-                    </a:lnR>
-                    <a:lnT>
-                      <a:noFill/>
-                    </a:lnT>
-                    <a:lnB>
-                      <a:noFill/>
-                    </a:lnB>
-                    <a:solidFill>
-                      <a:srgbClr val="FFFFFF"/>
-                    </a:solidFill>
-                  </a:tcPr>
-                </a:tc>
-                <a:tc>
-                  <a:txBody>
-                    <a:bodyPr/>
-                    <a:lstStyle/>
-                    <a:p>
-                      <a:pPr algn="ctr">
-                        <a:spcBef>
-                          <a:spcPts val="300"/>
-                        </a:spcBef>
-                        <a:spcAft>
-                          <a:spcPts val="300"/>
-                        </a:spcAft>
-                      </a:pPr>
-                      <a:r>
-                        <a:rPr lang="zh-CN" sz="1050" kern="100">
-                          <a:effectLst/>
-                          <a:latin typeface="宋体"/>
-                          <a:cs typeface="Times New Roman"/>
-                        </a:rPr>
-                        <a:t>由于测量精度要求，无法随意移动</a:t>
-                      </a:r>
-                    </a:p>
-                  </a:txBody>
-                  <a:tcPr marL="9525" marR="9525" marT="9525" marB="0" anchor="b">
-                    <a:lnL>
-                      <a:noFill/>
-                    </a:lnL>
-                    <a:lnR>
-                      <a:noFill/>
-                    </a:lnR>
-                    <a:lnT>
-                      <a:noFill/>
-                    </a:lnT>
-                    <a:lnB>
-                      <a:noFill/>
-                    </a:lnB>
-                    <a:solidFill>
-                      <a:srgbClr val="FFFFFF"/>
-                    </a:solidFill>
-                  </a:tcPr>
-                </a:tc>
-                <a:tc>
-                  <a:txBody>
-                    <a:bodyPr/>
-                    <a:lstStyle/>
-                    <a:p>
-                      <a:pPr algn="ctr">
-                        <a:spcBef>
-                          <a:spcPts val="300"/>
-                        </a:spcBef>
-                        <a:spcAft>
-                          <a:spcPts val="300"/>
-                        </a:spcAft>
-                      </a:pPr>
-                      <a:r>
-                        <a:rPr lang="zh-CN" sz="1050" kern="100">
-                          <a:effectLst/>
-                          <a:latin typeface="宋体"/>
-                          <a:cs typeface="Times New Roman"/>
-                        </a:rPr>
-                        <a:t>部分方案，可随意移动</a:t>
-                      </a:r>
-                    </a:p>
-                  </a:txBody>
-                  <a:tcPr marL="9525" marR="9525" marT="9525" marB="0" anchor="b">
-                    <a:lnL>
-                      <a:noFill/>
-                    </a:lnL>
-                    <a:lnR>
-                      <a:noFill/>
-                    </a:lnR>
-                    <a:lnT>
-                      <a:noFill/>
-                    </a:lnT>
-                    <a:lnB>
-                      <a:noFill/>
-                    </a:lnB>
-                    <a:solidFill>
-                      <a:srgbClr val="FFFFFF"/>
-                    </a:solidFill>
-                  </a:tcPr>
-                </a:tc>
-              </a:tr>
-              <a:tr h="67310">
-                <a:tc>
-                  <a:txBody>
-                    <a:bodyPr/>
-                    <a:lstStyle/>
-                    <a:p>
-                      <a:pPr algn="ctr">
-                        <a:spcBef>
-                          <a:spcPts val="300"/>
-                        </a:spcBef>
-                        <a:spcAft>
-                          <a:spcPts val="300"/>
-                        </a:spcAft>
-                      </a:pPr>
-                      <a:r>
-                        <a:rPr lang="zh-CN" sz="1050" kern="100">
-                          <a:effectLst/>
-                          <a:latin typeface="宋体"/>
-                          <a:cs typeface="Times New Roman"/>
-                        </a:rPr>
-                        <a:t>精度</a:t>
-                      </a:r>
-                    </a:p>
-                  </a:txBody>
-                  <a:tcPr marL="9525" marR="9525" marT="9525" marB="0" anchor="b">
-                    <a:lnL>
-                      <a:noFill/>
-                    </a:lnL>
-                    <a:lnR>
-                      <a:noFill/>
-                    </a:lnR>
-                    <a:lnT>
-                      <a:noFill/>
-                    </a:lnT>
-                    <a:lnB>
-                      <a:noFill/>
-                    </a:lnB>
-                    <a:solidFill>
-                      <a:srgbClr val="FFFFFF"/>
-                    </a:solidFill>
-                  </a:tcPr>
-                </a:tc>
-                <a:tc>
-                  <a:txBody>
-                    <a:bodyPr/>
-                    <a:lstStyle/>
-                    <a:p>
-                      <a:pPr algn="ctr">
-                        <a:spcBef>
-                          <a:spcPts val="300"/>
-                        </a:spcBef>
-                        <a:spcAft>
-                          <a:spcPts val="300"/>
-                        </a:spcAft>
-                      </a:pPr>
-                      <a:r>
-                        <a:rPr lang="zh-CN" sz="1050" kern="100">
-                          <a:effectLst/>
-                          <a:latin typeface="宋体"/>
-                          <a:cs typeface="Times New Roman"/>
-                        </a:rPr>
-                        <a:t>非常高</a:t>
-                      </a:r>
-                    </a:p>
-                  </a:txBody>
-                  <a:tcPr marL="9525" marR="9525" marT="9525" marB="0" anchor="b">
-                    <a:lnL>
-                      <a:noFill/>
-                    </a:lnL>
-                    <a:lnR>
-                      <a:noFill/>
-                    </a:lnR>
-                    <a:lnT>
-                      <a:noFill/>
-                    </a:lnT>
-                    <a:lnB>
-                      <a:noFill/>
-                    </a:lnB>
-                    <a:solidFill>
-                      <a:srgbClr val="FFFFFF"/>
-                    </a:solidFill>
-                  </a:tcPr>
-                </a:tc>
-                <a:tc>
-                  <a:txBody>
-                    <a:bodyPr/>
-                    <a:lstStyle/>
-                    <a:p>
-                      <a:pPr algn="ctr">
-                        <a:spcBef>
-                          <a:spcPts val="300"/>
-                        </a:spcBef>
-                        <a:spcAft>
-                          <a:spcPts val="300"/>
-                        </a:spcAft>
-                      </a:pPr>
-                      <a:r>
-                        <a:rPr lang="zh-CN" sz="1050" kern="100">
-                          <a:effectLst/>
-                          <a:latin typeface="宋体"/>
-                          <a:cs typeface="Times New Roman"/>
-                        </a:rPr>
-                        <a:t>还原三维模型，精度差</a:t>
-                      </a:r>
-                    </a:p>
-                  </a:txBody>
-                  <a:tcPr marL="9525" marR="9525" marT="9525" marB="0" anchor="b">
-                    <a:lnL>
-                      <a:noFill/>
-                    </a:lnL>
-                    <a:lnR>
-                      <a:noFill/>
-                    </a:lnR>
-                    <a:lnT>
-                      <a:noFill/>
-                    </a:lnT>
-                    <a:lnB>
-                      <a:noFill/>
-                    </a:lnB>
-                    <a:solidFill>
-                      <a:srgbClr val="FFFFFF"/>
-                    </a:solidFill>
-                  </a:tcPr>
-                </a:tc>
-              </a:tr>
-              <a:tr h="171450">
-                <a:tc>
-                  <a:txBody>
-                    <a:bodyPr/>
-                    <a:lstStyle/>
-                    <a:p>
-                      <a:pPr algn="ctr">
-                        <a:spcBef>
-                          <a:spcPts val="300"/>
-                        </a:spcBef>
-                        <a:spcAft>
-                          <a:spcPts val="300"/>
-                        </a:spcAft>
-                      </a:pPr>
-                      <a:r>
-                        <a:rPr lang="zh-CN" sz="1050" kern="100">
-                          <a:effectLst/>
-                          <a:latin typeface="宋体"/>
-                          <a:cs typeface="Times New Roman"/>
-                        </a:rPr>
-                        <a:t>时间</a:t>
-                      </a:r>
-                    </a:p>
-                  </a:txBody>
-                  <a:tcPr marL="9525" marR="9525" marT="9525" marB="0" anchor="b">
-                    <a:lnL>
-                      <a:noFill/>
-                    </a:lnL>
-                    <a:lnR>
-                      <a:noFill/>
-                    </a:lnR>
-                    <a:lnT>
-                      <a:noFill/>
-                    </a:lnT>
-                    <a:lnB w="12700" cap="flat" cmpd="sng" algn="ctr">
-                      <a:solidFill>
-                        <a:srgbClr val="000000"/>
-                      </a:solidFill>
-                      <a:prstDash val="solid"/>
-                      <a:round/>
-                      <a:headEnd type="none" w="med" len="med"/>
-                      <a:tailEnd type="none" w="med" len="med"/>
-                    </a:lnB>
-                    <a:solidFill>
-                      <a:srgbClr val="FFFFFF"/>
-                    </a:solidFill>
-                  </a:tcPr>
-                </a:tc>
-                <a:tc>
-                  <a:txBody>
-                    <a:bodyPr/>
-                    <a:lstStyle/>
-                    <a:p>
-                      <a:pPr algn="ctr">
-                        <a:spcBef>
-                          <a:spcPts val="300"/>
-                        </a:spcBef>
-                        <a:spcAft>
-                          <a:spcPts val="300"/>
-                        </a:spcAft>
-                      </a:pPr>
-                      <a:r>
-                        <a:rPr lang="zh-CN" sz="1050" kern="100">
-                          <a:effectLst/>
-                          <a:latin typeface="宋体"/>
-                          <a:cs typeface="Times New Roman"/>
-                        </a:rPr>
-                        <a:t>前期路径规划时间长，测量时间长</a:t>
-                      </a:r>
-                    </a:p>
-                  </a:txBody>
-                  <a:tcPr marL="9525" marR="9525" marT="9525" marB="0" anchor="b">
-                    <a:lnL>
-                      <a:noFill/>
-                    </a:lnL>
-                    <a:lnR>
-                      <a:noFill/>
-                    </a:lnR>
-                    <a:lnT>
-                      <a:noFill/>
-                    </a:lnT>
-                    <a:lnB w="12700" cap="flat" cmpd="sng" algn="ctr">
-                      <a:solidFill>
-                        <a:srgbClr val="000000"/>
-                      </a:solidFill>
-                      <a:prstDash val="solid"/>
-                      <a:round/>
-                      <a:headEnd type="none" w="med" len="med"/>
-                      <a:tailEnd type="none" w="med" len="med"/>
-                    </a:lnB>
-                    <a:solidFill>
-                      <a:srgbClr val="FFFFFF"/>
-                    </a:solidFill>
-                  </a:tcPr>
-                </a:tc>
-                <a:tc>
-                  <a:txBody>
-                    <a:bodyPr/>
-                    <a:lstStyle/>
-                    <a:p>
-                      <a:pPr algn="ctr">
-                        <a:spcBef>
-                          <a:spcPts val="300"/>
-                        </a:spcBef>
-                        <a:spcAft>
-                          <a:spcPts val="300"/>
-                        </a:spcAft>
-                      </a:pPr>
-                      <a:r>
-                        <a:rPr lang="zh-CN" sz="1050" kern="100" dirty="0">
-                          <a:effectLst/>
-                          <a:latin typeface="宋体"/>
-                          <a:cs typeface="Times New Roman"/>
-                        </a:rPr>
-                        <a:t>测量时间短，处理时间较长</a:t>
-                      </a:r>
-                    </a:p>
-                  </a:txBody>
-                  <a:tcPr marL="9525" marR="9525" marT="9525" marB="0" anchor="b">
-                    <a:lnL>
-                      <a:noFill/>
-                    </a:lnL>
-                    <a:lnR>
-                      <a:noFill/>
-                    </a:lnR>
-                    <a:lnT>
-                      <a:noFill/>
-                    </a:lnT>
-                    <a:lnB w="12700" cap="flat" cmpd="sng" algn="ctr">
-                      <a:solidFill>
-                        <a:srgbClr val="000000"/>
-                      </a:solidFill>
-                      <a:prstDash val="solid"/>
-                      <a:round/>
-                      <a:headEnd type="none" w="med" len="med"/>
-                      <a:tailEnd type="none" w="med" len="med"/>
-                    </a:lnB>
-                    <a:solidFill>
-                      <a:srgbClr val="FFFFFF"/>
-                    </a:solidFill>
-                  </a:tcPr>
-                </a:tc>
-              </a:tr>
-            </a:tbl>
-          </a:graphicData>
-        </a:graphic>
-      </p:graphicFrame>
-      <p:sp>
-        <p:nvSpPr>
-          <p:cNvPr id="10" name="Rectangle 3"/>
-          <p:cNvSpPr>
-            <a:spLocks noChangeArrowheads="1"/>
-          </p:cNvSpPr>
-          <p:nvPr/>
         </p:nvSpPr>
         <p:spPr bwMode="auto">
           <a:xfrm>
-            <a:off x="1784350" y="2816225"/>
+            <a:off x="107504" y="548680"/>
             <a:ext cx="9144000" cy="457200"/>
           </a:xfrm>
           <a:prstGeom prst="rect">
@@ -4413,7 +3190,7 @@
               <a:tabLst/>
             </a:pPr>
             <a:r>
-              <a:rPr kumimoji="0" lang="zh-CN" altLang="zh-CN" sz="1000" b="0" i="0" u="none" strike="noStrike" cap="none" normalizeH="0" baseline="0" smtClean="0">
+              <a:rPr kumimoji="0" lang="zh-CN" altLang="zh-CN" sz="1000" b="0" i="0" u="none" strike="noStrike" cap="none" normalizeH="0" baseline="0" dirty="0" smtClean="0">
                 <a:ln>
                   <a:noFill/>
                 </a:ln>
@@ -4428,7 +3205,7 @@
               <a:t>表 </a:t>
             </a:r>
             <a:r>
-              <a:rPr kumimoji="0" lang="en-US" altLang="zh-CN" sz="1000" b="0" i="0" u="none" strike="noStrike" cap="none" normalizeH="0" baseline="0" smtClean="0">
+              <a:rPr kumimoji="0" lang="en-US" altLang="zh-CN" sz="1000" b="0" i="0" u="none" strike="noStrike" cap="none" normalizeH="0" baseline="0" dirty="0" smtClean="0">
                 <a:ln>
                   <a:noFill/>
                 </a:ln>
@@ -4443,7 +3220,7 @@
               <a:t>1</a:t>
             </a:r>
             <a:r>
-              <a:rPr kumimoji="0" lang="zh-CN" altLang="en-US" sz="1000" b="0" i="0" u="none" strike="noStrike" cap="none" normalizeH="0" baseline="0" smtClean="0">
+              <a:rPr kumimoji="0" lang="zh-CN" altLang="en-US" sz="1000" b="0" i="0" u="none" strike="noStrike" cap="none" normalizeH="0" baseline="0" dirty="0" smtClean="0">
                 <a:ln>
                   <a:noFill/>
                 </a:ln>
@@ -4457,7 +3234,7 @@
               </a:rPr>
               <a:t>三维测量方法对比</a:t>
             </a:r>
-            <a:endParaRPr kumimoji="0" lang="zh-CN" altLang="en-US" sz="1800" b="0" i="0" u="none" strike="noStrike" cap="none" normalizeH="0" baseline="0" smtClean="0">
+            <a:endParaRPr kumimoji="0" lang="zh-CN" altLang="en-US" sz="1800" b="0" i="0" u="none" strike="noStrike" cap="none" normalizeH="0" baseline="0" dirty="0" smtClean="0">
               <a:ln>
                 <a:noFill/>
               </a:ln>
@@ -4472,10 +3249,1483 @@
           </a:p>
         </p:txBody>
       </p:sp>
+      <p:graphicFrame>
+        <p:nvGraphicFramePr>
+          <p:cNvPr id="3" name="对象 2"/>
+          <p:cNvGraphicFramePr>
+            <a:graphicFrameLocks noChangeAspect="1"/>
+          </p:cNvGraphicFramePr>
+          <p:nvPr>
+            <p:extLst>
+              <p:ext uri="{D42A27DB-BD31-4B8C-83A1-F6EECF244321}">
+                <p14:modId xmlns:p14="http://schemas.microsoft.com/office/powerpoint/2010/main" val="2013690901"/>
+              </p:ext>
+            </p:extLst>
+          </p:nvPr>
+        </p:nvGraphicFramePr>
+        <p:xfrm>
+          <a:off x="1882329" y="1018565"/>
+          <a:ext cx="5594350" cy="3640137"/>
+        </p:xfrm>
+        <a:graphic>
+          <a:graphicData uri="http://schemas.openxmlformats.org/presentationml/2006/ole">
+            <mc:AlternateContent xmlns:mc="http://schemas.openxmlformats.org/markup-compatibility/2006">
+              <mc:Choice xmlns:v="urn:schemas-microsoft-com:vml" Requires="v">
+                <p:oleObj spid="_x0000_s1029" name="文档" r:id="rId3" imgW="5594453" imgH="3640410" progId="Word.Document.12">
+                  <p:embed/>
+                </p:oleObj>
+              </mc:Choice>
+              <mc:Fallback>
+                <p:oleObj name="文档" r:id="rId3" imgW="5594453" imgH="3640410" progId="Word.Document.12">
+                  <p:embed/>
+                  <p:pic>
+                    <p:nvPicPr>
+                      <p:cNvPr id="0" name=""/>
+                      <p:cNvPicPr/>
+                      <p:nvPr/>
+                    </p:nvPicPr>
+                    <p:blipFill>
+                      <a:blip r:embed="rId4"/>
+                      <a:stretch>
+                        <a:fillRect/>
+                      </a:stretch>
+                    </p:blipFill>
+                    <p:spPr>
+                      <a:xfrm>
+                        <a:off x="1882329" y="1018565"/>
+                        <a:ext cx="5594350" cy="3640137"/>
+                      </a:xfrm>
+                      <a:prstGeom prst="rect">
+                        <a:avLst/>
+                      </a:prstGeom>
+                    </p:spPr>
+                  </p:pic>
+                </p:oleObj>
+              </mc:Fallback>
+            </mc:AlternateContent>
+          </a:graphicData>
+        </a:graphic>
+      </p:graphicFrame>
     </p:spTree>
     <p:extLst>
       <p:ext uri="{BB962C8B-B14F-4D97-AF65-F5344CB8AC3E}">
         <p14:creationId xmlns:p14="http://schemas.microsoft.com/office/powerpoint/2010/main" val="4180933587"/>
+      </p:ext>
+    </p:extLst>
+  </p:cSld>
+  <p:clrMapOvr>
+    <a:masterClrMapping/>
+  </p:clrMapOvr>
+</p:sld>
+</file>
+
+<file path=ppt/slides/slide2.xml><?xml version="1.0" encoding="utf-8"?>
+<p:sld xmlns:a="http://schemas.openxmlformats.org/drawingml/2006/main" xmlns:r="http://schemas.openxmlformats.org/officeDocument/2006/relationships" xmlns:p="http://schemas.openxmlformats.org/presentationml/2006/main">
+  <p:cSld>
+    <p:spTree>
+      <p:nvGrpSpPr>
+        <p:cNvPr id="1" name=""/>
+        <p:cNvGrpSpPr/>
+        <p:nvPr/>
+      </p:nvGrpSpPr>
+      <p:grpSpPr>
+        <a:xfrm>
+          <a:off x="0" y="0"/>
+          <a:ext cx="0" cy="0"/>
+          <a:chOff x="0" y="0"/>
+          <a:chExt cx="0" cy="0"/>
+        </a:xfrm>
+      </p:grpSpPr>
+      <p:sp>
+        <p:nvSpPr>
+          <p:cNvPr id="33" name="任意多边形 32"/>
+          <p:cNvSpPr/>
+          <p:nvPr/>
+        </p:nvSpPr>
+        <p:spPr>
+          <a:xfrm>
+            <a:off x="3917511" y="3579293"/>
+            <a:ext cx="349286" cy="704374"/>
+          </a:xfrm>
+          <a:custGeom>
+            <a:avLst/>
+            <a:gdLst>
+              <a:gd name="connsiteX0" fmla="*/ 0 w 1266092"/>
+              <a:gd name="connsiteY0" fmla="*/ 729762 h 1139568"/>
+              <a:gd name="connsiteX1" fmla="*/ 1028700 w 1266092"/>
+              <a:gd name="connsiteY1" fmla="*/ 1107831 h 1139568"/>
+              <a:gd name="connsiteX2" fmla="*/ 1266092 w 1266092"/>
+              <a:gd name="connsiteY2" fmla="*/ 0 h 1139568"/>
+            </a:gdLst>
+            <a:ahLst/>
+            <a:cxnLst>
+              <a:cxn ang="0">
+                <a:pos x="connsiteX0" y="connsiteY0"/>
+              </a:cxn>
+              <a:cxn ang="0">
+                <a:pos x="connsiteX1" y="connsiteY1"/>
+              </a:cxn>
+              <a:cxn ang="0">
+                <a:pos x="connsiteX2" y="connsiteY2"/>
+              </a:cxn>
+            </a:cxnLst>
+            <a:rect l="l" t="t" r="r" b="b"/>
+            <a:pathLst>
+              <a:path w="1266092" h="1139568">
+                <a:moveTo>
+                  <a:pt x="0" y="729762"/>
+                </a:moveTo>
+                <a:cubicBezTo>
+                  <a:pt x="408842" y="979610"/>
+                  <a:pt x="817685" y="1229458"/>
+                  <a:pt x="1028700" y="1107831"/>
+                </a:cubicBezTo>
+                <a:cubicBezTo>
+                  <a:pt x="1239715" y="986204"/>
+                  <a:pt x="1219200" y="118696"/>
+                  <a:pt x="1266092" y="0"/>
+                </a:cubicBezTo>
+              </a:path>
+            </a:pathLst>
+          </a:custGeom>
+          <a:noFill/>
+          <a:ln>
+            <a:solidFill>
+              <a:schemeClr val="tx1"/>
+            </a:solidFill>
+          </a:ln>
+        </p:spPr>
+        <p:style>
+          <a:lnRef idx="2">
+            <a:schemeClr val="accent1">
+              <a:shade val="50000"/>
+            </a:schemeClr>
+          </a:lnRef>
+          <a:fillRef idx="1">
+            <a:schemeClr val="accent1"/>
+          </a:fillRef>
+          <a:effectRef idx="0">
+            <a:schemeClr val="accent1"/>
+          </a:effectRef>
+          <a:fontRef idx="minor">
+            <a:schemeClr val="lt1"/>
+          </a:fontRef>
+        </p:style>
+        <p:txBody>
+          <a:bodyPr rtlCol="0" anchor="ctr"/>
+          <a:lstStyle/>
+          <a:p>
+            <a:pPr algn="ctr"/>
+            <a:endParaRPr lang="zh-CN" altLang="en-US"/>
+          </a:p>
+        </p:txBody>
+      </p:sp>
+      <p:pic>
+        <p:nvPicPr>
+          <p:cNvPr id="2051" name="Picture 3"/>
+          <p:cNvPicPr>
+            <a:picLocks noChangeAspect="1" noChangeArrowheads="1"/>
+          </p:cNvPicPr>
+          <p:nvPr/>
+        </p:nvPicPr>
+        <p:blipFill>
+          <a:blip r:embed="rId2" cstate="print">
+            <a:extLst>
+              <a:ext uri="{28A0092B-C50C-407E-A947-70E740481C1C}">
+                <a14:useLocalDpi xmlns:a14="http://schemas.microsoft.com/office/drawing/2010/main" val="0"/>
+              </a:ext>
+            </a:extLst>
+          </a:blip>
+          <a:srcRect/>
+          <a:stretch>
+            <a:fillRect/>
+          </a:stretch>
+        </p:blipFill>
+        <p:spPr bwMode="auto">
+          <a:xfrm>
+            <a:off x="4320438" y="3300781"/>
+            <a:ext cx="611126" cy="423477"/>
+          </a:xfrm>
+          <a:prstGeom prst="rect">
+            <a:avLst/>
+          </a:prstGeom>
+          <a:noFill/>
+          <a:ln>
+            <a:noFill/>
+          </a:ln>
+          <a:extLst>
+            <a:ext uri="{909E8E84-426E-40DD-AFC4-6F175D3DCCD1}">
+              <a14:hiddenFill xmlns:a14="http://schemas.microsoft.com/office/drawing/2010/main">
+                <a:solidFill>
+                  <a:schemeClr val="accent1"/>
+                </a:solidFill>
+              </a14:hiddenFill>
+            </a:ext>
+            <a:ext uri="{91240B29-F687-4F45-9708-019B960494DF}">
+              <a14:hiddenLine xmlns:a14="http://schemas.microsoft.com/office/drawing/2010/main" w="9525">
+                <a:solidFill>
+                  <a:schemeClr val="tx1"/>
+                </a:solidFill>
+                <a:miter lim="800000"/>
+                <a:headEnd/>
+                <a:tailEnd/>
+              </a14:hiddenLine>
+            </a:ext>
+          </a:extLst>
+        </p:spPr>
+      </p:pic>
+      <p:sp>
+        <p:nvSpPr>
+          <p:cNvPr id="25" name="任意多边形 24"/>
+          <p:cNvSpPr/>
+          <p:nvPr/>
+        </p:nvSpPr>
+        <p:spPr>
+          <a:xfrm>
+            <a:off x="4020079" y="3821261"/>
+            <a:ext cx="390734" cy="899478"/>
+          </a:xfrm>
+          <a:custGeom>
+            <a:avLst/>
+            <a:gdLst>
+              <a:gd name="connsiteX0" fmla="*/ 0 w 1266092"/>
+              <a:gd name="connsiteY0" fmla="*/ 729762 h 1139568"/>
+              <a:gd name="connsiteX1" fmla="*/ 1028700 w 1266092"/>
+              <a:gd name="connsiteY1" fmla="*/ 1107831 h 1139568"/>
+              <a:gd name="connsiteX2" fmla="*/ 1266092 w 1266092"/>
+              <a:gd name="connsiteY2" fmla="*/ 0 h 1139568"/>
+            </a:gdLst>
+            <a:ahLst/>
+            <a:cxnLst>
+              <a:cxn ang="0">
+                <a:pos x="connsiteX0" y="connsiteY0"/>
+              </a:cxn>
+              <a:cxn ang="0">
+                <a:pos x="connsiteX1" y="connsiteY1"/>
+              </a:cxn>
+              <a:cxn ang="0">
+                <a:pos x="connsiteX2" y="connsiteY2"/>
+              </a:cxn>
+            </a:cxnLst>
+            <a:rect l="l" t="t" r="r" b="b"/>
+            <a:pathLst>
+              <a:path w="1266092" h="1139568">
+                <a:moveTo>
+                  <a:pt x="0" y="729762"/>
+                </a:moveTo>
+                <a:cubicBezTo>
+                  <a:pt x="408842" y="979610"/>
+                  <a:pt x="817685" y="1229458"/>
+                  <a:pt x="1028700" y="1107831"/>
+                </a:cubicBezTo>
+                <a:cubicBezTo>
+                  <a:pt x="1239715" y="986204"/>
+                  <a:pt x="1219200" y="118696"/>
+                  <a:pt x="1266092" y="0"/>
+                </a:cubicBezTo>
+              </a:path>
+            </a:pathLst>
+          </a:custGeom>
+          <a:noFill/>
+          <a:ln>
+            <a:solidFill>
+              <a:schemeClr val="tx1"/>
+            </a:solidFill>
+          </a:ln>
+        </p:spPr>
+        <p:style>
+          <a:lnRef idx="2">
+            <a:schemeClr val="accent1">
+              <a:shade val="50000"/>
+            </a:schemeClr>
+          </a:lnRef>
+          <a:fillRef idx="1">
+            <a:schemeClr val="accent1"/>
+          </a:fillRef>
+          <a:effectRef idx="0">
+            <a:schemeClr val="accent1"/>
+          </a:effectRef>
+          <a:fontRef idx="minor">
+            <a:schemeClr val="lt1"/>
+          </a:fontRef>
+        </p:style>
+        <p:txBody>
+          <a:bodyPr rtlCol="0" anchor="ctr"/>
+          <a:lstStyle/>
+          <a:p>
+            <a:pPr algn="ctr"/>
+            <a:endParaRPr lang="zh-CN" altLang="en-US"/>
+          </a:p>
+        </p:txBody>
+      </p:sp>
+      <p:sp>
+        <p:nvSpPr>
+          <p:cNvPr id="22" name="圆角矩形 21"/>
+          <p:cNvSpPr/>
+          <p:nvPr/>
+        </p:nvSpPr>
+        <p:spPr>
+          <a:xfrm>
+            <a:off x="3555003" y="4393909"/>
+            <a:ext cx="561372" cy="225128"/>
+          </a:xfrm>
+          <a:prstGeom prst="roundRect">
+            <a:avLst/>
+          </a:prstGeom>
+          <a:solidFill>
+            <a:schemeClr val="bg1"/>
+          </a:solidFill>
+          <a:ln w="28575">
+            <a:solidFill>
+              <a:schemeClr val="tx1"/>
+            </a:solidFill>
+          </a:ln>
+        </p:spPr>
+        <p:style>
+          <a:lnRef idx="2">
+            <a:schemeClr val="accent1">
+              <a:shade val="50000"/>
+            </a:schemeClr>
+          </a:lnRef>
+          <a:fillRef idx="1">
+            <a:schemeClr val="accent1"/>
+          </a:fillRef>
+          <a:effectRef idx="0">
+            <a:schemeClr val="accent1"/>
+          </a:effectRef>
+          <a:fontRef idx="minor">
+            <a:schemeClr val="lt1"/>
+          </a:fontRef>
+        </p:style>
+        <p:txBody>
+          <a:bodyPr rtlCol="0" anchor="ctr"/>
+          <a:lstStyle/>
+          <a:p>
+            <a:pPr algn="ctr"/>
+            <a:endParaRPr lang="zh-CN" altLang="en-US"/>
+          </a:p>
+        </p:txBody>
+      </p:sp>
+      <p:sp>
+        <p:nvSpPr>
+          <p:cNvPr id="2" name="TextBox 1"/>
+          <p:cNvSpPr txBox="1"/>
+          <p:nvPr/>
+        </p:nvSpPr>
+        <p:spPr>
+          <a:xfrm>
+            <a:off x="467544" y="404664"/>
+            <a:ext cx="1656184" cy="1754326"/>
+          </a:xfrm>
+          <a:prstGeom prst="rect">
+            <a:avLst/>
+          </a:prstGeom>
+          <a:noFill/>
+        </p:spPr>
+        <p:txBody>
+          <a:bodyPr wrap="square" rtlCol="0">
+            <a:spAutoFit/>
+          </a:bodyPr>
+          <a:lstStyle/>
+          <a:p>
+            <a:r>
+              <a:rPr lang="zh-CN" altLang="en-US" dirty="0" smtClean="0"/>
+              <a:t>系统校准</a:t>
+            </a:r>
+            <a:endParaRPr lang="en-US" altLang="zh-CN" dirty="0" smtClean="0"/>
+          </a:p>
+          <a:p>
+            <a:r>
+              <a:rPr lang="zh-CN" altLang="en-US" dirty="0" smtClean="0"/>
+              <a:t>数字相移</a:t>
+            </a:r>
+            <a:endParaRPr lang="en-US" altLang="zh-CN" dirty="0" smtClean="0"/>
+          </a:p>
+          <a:p>
+            <a:r>
+              <a:rPr lang="zh-CN" altLang="en-US" dirty="0"/>
+              <a:t>条</a:t>
+            </a:r>
+            <a:r>
+              <a:rPr lang="zh-CN" altLang="en-US" dirty="0" smtClean="0"/>
+              <a:t>纹去除</a:t>
+            </a:r>
+            <a:endParaRPr lang="en-US" altLang="zh-CN" dirty="0" smtClean="0"/>
+          </a:p>
+          <a:p>
+            <a:r>
+              <a:rPr lang="zh-CN" altLang="en-US" dirty="0"/>
+              <a:t>相</a:t>
+            </a:r>
+            <a:r>
+              <a:rPr lang="zh-CN" altLang="en-US" dirty="0" smtClean="0"/>
+              <a:t>位提取</a:t>
+            </a:r>
+            <a:endParaRPr lang="en-US" altLang="zh-CN" dirty="0" smtClean="0"/>
+          </a:p>
+          <a:p>
+            <a:r>
+              <a:rPr lang="zh-CN" altLang="en-US" dirty="0"/>
+              <a:t>相</a:t>
+            </a:r>
+            <a:r>
+              <a:rPr lang="zh-CN" altLang="en-US" dirty="0" smtClean="0"/>
+              <a:t>位展开</a:t>
+            </a:r>
+            <a:endParaRPr lang="en-US" altLang="zh-CN" dirty="0" smtClean="0"/>
+          </a:p>
+          <a:p>
+            <a:r>
+              <a:rPr lang="zh-CN" altLang="en-US" dirty="0" smtClean="0"/>
+              <a:t>高度转换</a:t>
+            </a:r>
+            <a:endParaRPr lang="zh-CN" altLang="en-US" dirty="0"/>
+          </a:p>
+        </p:txBody>
+      </p:sp>
+      <p:sp>
+        <p:nvSpPr>
+          <p:cNvPr id="3" name="矩形 2"/>
+          <p:cNvSpPr/>
+          <p:nvPr/>
+        </p:nvSpPr>
+        <p:spPr>
+          <a:xfrm>
+            <a:off x="4266797" y="3124740"/>
+            <a:ext cx="1080120" cy="720080"/>
+          </a:xfrm>
+          <a:prstGeom prst="rect">
+            <a:avLst/>
+          </a:prstGeom>
+          <a:noFill/>
+          <a:ln w="76200">
+            <a:solidFill>
+              <a:schemeClr val="tx1"/>
+            </a:solidFill>
+          </a:ln>
+        </p:spPr>
+        <p:style>
+          <a:lnRef idx="2">
+            <a:schemeClr val="accent1">
+              <a:shade val="50000"/>
+            </a:schemeClr>
+          </a:lnRef>
+          <a:fillRef idx="1">
+            <a:schemeClr val="accent1"/>
+          </a:fillRef>
+          <a:effectRef idx="0">
+            <a:schemeClr val="accent1"/>
+          </a:effectRef>
+          <a:fontRef idx="minor">
+            <a:schemeClr val="lt1"/>
+          </a:fontRef>
+        </p:style>
+        <p:txBody>
+          <a:bodyPr rtlCol="0" anchor="ctr"/>
+          <a:lstStyle/>
+          <a:p>
+            <a:pPr algn="ctr"/>
+            <a:endParaRPr lang="zh-CN" altLang="en-US"/>
+          </a:p>
+        </p:txBody>
+      </p:sp>
+      <p:sp>
+        <p:nvSpPr>
+          <p:cNvPr id="4" name="梯形 3"/>
+          <p:cNvSpPr/>
+          <p:nvPr/>
+        </p:nvSpPr>
+        <p:spPr>
+          <a:xfrm>
+            <a:off x="4554829" y="3844820"/>
+            <a:ext cx="504056" cy="216024"/>
+          </a:xfrm>
+          <a:prstGeom prst="trapezoid">
+            <a:avLst/>
+          </a:prstGeom>
+          <a:solidFill>
+            <a:schemeClr val="bg1"/>
+          </a:solidFill>
+          <a:ln w="19050">
+            <a:solidFill>
+              <a:schemeClr val="tx1"/>
+            </a:solidFill>
+          </a:ln>
+        </p:spPr>
+        <p:style>
+          <a:lnRef idx="2">
+            <a:schemeClr val="accent1">
+              <a:shade val="50000"/>
+            </a:schemeClr>
+          </a:lnRef>
+          <a:fillRef idx="1">
+            <a:schemeClr val="accent1"/>
+          </a:fillRef>
+          <a:effectRef idx="0">
+            <a:schemeClr val="accent1"/>
+          </a:effectRef>
+          <a:fontRef idx="minor">
+            <a:schemeClr val="lt1"/>
+          </a:fontRef>
+        </p:style>
+        <p:txBody>
+          <a:bodyPr rtlCol="0" anchor="ctr"/>
+          <a:lstStyle/>
+          <a:p>
+            <a:pPr algn="ctr"/>
+            <a:endParaRPr lang="zh-CN" altLang="en-US"/>
+          </a:p>
+        </p:txBody>
+      </p:sp>
+      <p:cxnSp>
+        <p:nvCxnSpPr>
+          <p:cNvPr id="6" name="直接箭头连接符 5"/>
+          <p:cNvCxnSpPr/>
+          <p:nvPr/>
+        </p:nvCxnSpPr>
+        <p:spPr>
+          <a:xfrm>
+            <a:off x="2558469" y="2325597"/>
+            <a:ext cx="1440160" cy="1407352"/>
+          </a:xfrm>
+          <a:prstGeom prst="straightConnector1">
+            <a:avLst/>
+          </a:prstGeom>
+          <a:ln w="19050">
+            <a:solidFill>
+              <a:schemeClr val="tx1"/>
+            </a:solidFill>
+            <a:tailEnd type="arrow"/>
+          </a:ln>
+        </p:spPr>
+        <p:style>
+          <a:lnRef idx="1">
+            <a:schemeClr val="accent1"/>
+          </a:lnRef>
+          <a:fillRef idx="0">
+            <a:schemeClr val="accent1"/>
+          </a:fillRef>
+          <a:effectRef idx="0">
+            <a:schemeClr val="accent1"/>
+          </a:effectRef>
+          <a:fontRef idx="minor">
+            <a:schemeClr val="tx1"/>
+          </a:fontRef>
+        </p:style>
+      </p:cxnSp>
+      <p:cxnSp>
+        <p:nvCxnSpPr>
+          <p:cNvPr id="9" name="直接连接符 8"/>
+          <p:cNvCxnSpPr/>
+          <p:nvPr/>
+        </p:nvCxnSpPr>
+        <p:spPr>
+          <a:xfrm>
+            <a:off x="2646945" y="2278369"/>
+            <a:ext cx="0" cy="108012"/>
+          </a:xfrm>
+          <a:prstGeom prst="line">
+            <a:avLst/>
+          </a:prstGeom>
+          <a:ln w="19050">
+            <a:solidFill>
+              <a:schemeClr val="tx1"/>
+            </a:solidFill>
+          </a:ln>
+        </p:spPr>
+        <p:style>
+          <a:lnRef idx="1">
+            <a:schemeClr val="accent1"/>
+          </a:lnRef>
+          <a:fillRef idx="0">
+            <a:schemeClr val="accent1"/>
+          </a:fillRef>
+          <a:effectRef idx="0">
+            <a:schemeClr val="accent1"/>
+          </a:effectRef>
+          <a:fontRef idx="minor">
+            <a:schemeClr val="tx1"/>
+          </a:fontRef>
+        </p:style>
+      </p:cxnSp>
+      <p:cxnSp>
+        <p:nvCxnSpPr>
+          <p:cNvPr id="11" name="直接连接符 10"/>
+          <p:cNvCxnSpPr/>
+          <p:nvPr/>
+        </p:nvCxnSpPr>
+        <p:spPr>
+          <a:xfrm>
+            <a:off x="2799345" y="2430769"/>
+            <a:ext cx="0" cy="108012"/>
+          </a:xfrm>
+          <a:prstGeom prst="line">
+            <a:avLst/>
+          </a:prstGeom>
+          <a:ln w="19050">
+            <a:solidFill>
+              <a:schemeClr val="tx1"/>
+            </a:solidFill>
+          </a:ln>
+        </p:spPr>
+        <p:style>
+          <a:lnRef idx="1">
+            <a:schemeClr val="accent1"/>
+          </a:lnRef>
+          <a:fillRef idx="0">
+            <a:schemeClr val="accent1"/>
+          </a:fillRef>
+          <a:effectRef idx="0">
+            <a:schemeClr val="accent1"/>
+          </a:effectRef>
+          <a:fontRef idx="minor">
+            <a:schemeClr val="tx1"/>
+          </a:fontRef>
+        </p:style>
+      </p:cxnSp>
+      <p:cxnSp>
+        <p:nvCxnSpPr>
+          <p:cNvPr id="12" name="直接连接符 11"/>
+          <p:cNvCxnSpPr/>
+          <p:nvPr/>
+        </p:nvCxnSpPr>
+        <p:spPr>
+          <a:xfrm>
+            <a:off x="2951745" y="2583169"/>
+            <a:ext cx="0" cy="108012"/>
+          </a:xfrm>
+          <a:prstGeom prst="line">
+            <a:avLst/>
+          </a:prstGeom>
+          <a:ln w="19050">
+            <a:solidFill>
+              <a:schemeClr val="tx1"/>
+            </a:solidFill>
+          </a:ln>
+        </p:spPr>
+        <p:style>
+          <a:lnRef idx="1">
+            <a:schemeClr val="accent1"/>
+          </a:lnRef>
+          <a:fillRef idx="0">
+            <a:schemeClr val="accent1"/>
+          </a:fillRef>
+          <a:effectRef idx="0">
+            <a:schemeClr val="accent1"/>
+          </a:effectRef>
+          <a:fontRef idx="minor">
+            <a:schemeClr val="tx1"/>
+          </a:fontRef>
+        </p:style>
+      </p:cxnSp>
+      <p:cxnSp>
+        <p:nvCxnSpPr>
+          <p:cNvPr id="13" name="直接连接符 12"/>
+          <p:cNvCxnSpPr/>
+          <p:nvPr/>
+        </p:nvCxnSpPr>
+        <p:spPr>
+          <a:xfrm>
+            <a:off x="3104145" y="2735569"/>
+            <a:ext cx="0" cy="108012"/>
+          </a:xfrm>
+          <a:prstGeom prst="line">
+            <a:avLst/>
+          </a:prstGeom>
+          <a:ln w="19050">
+            <a:solidFill>
+              <a:schemeClr val="tx1"/>
+            </a:solidFill>
+          </a:ln>
+        </p:spPr>
+        <p:style>
+          <a:lnRef idx="1">
+            <a:schemeClr val="accent1"/>
+          </a:lnRef>
+          <a:fillRef idx="0">
+            <a:schemeClr val="accent1"/>
+          </a:fillRef>
+          <a:effectRef idx="0">
+            <a:schemeClr val="accent1"/>
+          </a:effectRef>
+          <a:fontRef idx="minor">
+            <a:schemeClr val="tx1"/>
+          </a:fontRef>
+        </p:style>
+      </p:cxnSp>
+      <p:cxnSp>
+        <p:nvCxnSpPr>
+          <p:cNvPr id="14" name="直接连接符 13"/>
+          <p:cNvCxnSpPr/>
+          <p:nvPr/>
+        </p:nvCxnSpPr>
+        <p:spPr>
+          <a:xfrm>
+            <a:off x="3256545" y="2887969"/>
+            <a:ext cx="0" cy="108012"/>
+          </a:xfrm>
+          <a:prstGeom prst="line">
+            <a:avLst/>
+          </a:prstGeom>
+          <a:ln w="19050">
+            <a:solidFill>
+              <a:schemeClr val="tx1"/>
+            </a:solidFill>
+          </a:ln>
+        </p:spPr>
+        <p:style>
+          <a:lnRef idx="1">
+            <a:schemeClr val="accent1"/>
+          </a:lnRef>
+          <a:fillRef idx="0">
+            <a:schemeClr val="accent1"/>
+          </a:fillRef>
+          <a:effectRef idx="0">
+            <a:schemeClr val="accent1"/>
+          </a:effectRef>
+          <a:fontRef idx="minor">
+            <a:schemeClr val="tx1"/>
+          </a:fontRef>
+        </p:style>
+      </p:cxnSp>
+      <p:cxnSp>
+        <p:nvCxnSpPr>
+          <p:cNvPr id="15" name="直接连接符 14"/>
+          <p:cNvCxnSpPr/>
+          <p:nvPr/>
+        </p:nvCxnSpPr>
+        <p:spPr>
+          <a:xfrm>
+            <a:off x="3408945" y="3040369"/>
+            <a:ext cx="0" cy="108012"/>
+          </a:xfrm>
+          <a:prstGeom prst="line">
+            <a:avLst/>
+          </a:prstGeom>
+          <a:ln w="19050">
+            <a:solidFill>
+              <a:schemeClr val="tx1"/>
+            </a:solidFill>
+          </a:ln>
+        </p:spPr>
+        <p:style>
+          <a:lnRef idx="1">
+            <a:schemeClr val="accent1"/>
+          </a:lnRef>
+          <a:fillRef idx="0">
+            <a:schemeClr val="accent1"/>
+          </a:fillRef>
+          <a:effectRef idx="0">
+            <a:schemeClr val="accent1"/>
+          </a:effectRef>
+          <a:fontRef idx="minor">
+            <a:schemeClr val="tx1"/>
+          </a:fontRef>
+        </p:style>
+      </p:cxnSp>
+      <p:cxnSp>
+        <p:nvCxnSpPr>
+          <p:cNvPr id="16" name="直接连接符 15"/>
+          <p:cNvCxnSpPr/>
+          <p:nvPr/>
+        </p:nvCxnSpPr>
+        <p:spPr>
+          <a:xfrm>
+            <a:off x="3561345" y="3192769"/>
+            <a:ext cx="0" cy="108012"/>
+          </a:xfrm>
+          <a:prstGeom prst="line">
+            <a:avLst/>
+          </a:prstGeom>
+          <a:ln w="19050">
+            <a:solidFill>
+              <a:schemeClr val="tx1"/>
+            </a:solidFill>
+          </a:ln>
+        </p:spPr>
+        <p:style>
+          <a:lnRef idx="1">
+            <a:schemeClr val="accent1"/>
+          </a:lnRef>
+          <a:fillRef idx="0">
+            <a:schemeClr val="accent1"/>
+          </a:fillRef>
+          <a:effectRef idx="0">
+            <a:schemeClr val="accent1"/>
+          </a:effectRef>
+          <a:fontRef idx="minor">
+            <a:schemeClr val="tx1"/>
+          </a:fontRef>
+        </p:style>
+      </p:cxnSp>
+      <p:cxnSp>
+        <p:nvCxnSpPr>
+          <p:cNvPr id="17" name="直接连接符 16"/>
+          <p:cNvCxnSpPr/>
+          <p:nvPr/>
+        </p:nvCxnSpPr>
+        <p:spPr>
+          <a:xfrm>
+            <a:off x="3713745" y="3345169"/>
+            <a:ext cx="0" cy="108012"/>
+          </a:xfrm>
+          <a:prstGeom prst="line">
+            <a:avLst/>
+          </a:prstGeom>
+          <a:ln w="19050">
+            <a:solidFill>
+              <a:schemeClr val="tx1"/>
+            </a:solidFill>
+          </a:ln>
+        </p:spPr>
+        <p:style>
+          <a:lnRef idx="1">
+            <a:schemeClr val="accent1"/>
+          </a:lnRef>
+          <a:fillRef idx="0">
+            <a:schemeClr val="accent1"/>
+          </a:fillRef>
+          <a:effectRef idx="0">
+            <a:schemeClr val="accent1"/>
+          </a:effectRef>
+          <a:fontRef idx="minor">
+            <a:schemeClr val="tx1"/>
+          </a:fontRef>
+        </p:style>
+      </p:cxnSp>
+      <p:cxnSp>
+        <p:nvCxnSpPr>
+          <p:cNvPr id="18" name="直接连接符 17"/>
+          <p:cNvCxnSpPr/>
+          <p:nvPr/>
+        </p:nvCxnSpPr>
+        <p:spPr>
+          <a:xfrm>
+            <a:off x="3888149" y="3490791"/>
+            <a:ext cx="0" cy="108012"/>
+          </a:xfrm>
+          <a:prstGeom prst="line">
+            <a:avLst/>
+          </a:prstGeom>
+          <a:ln w="19050">
+            <a:solidFill>
+              <a:schemeClr val="tx1"/>
+            </a:solidFill>
+          </a:ln>
+        </p:spPr>
+        <p:style>
+          <a:lnRef idx="1">
+            <a:schemeClr val="accent1"/>
+          </a:lnRef>
+          <a:fillRef idx="0">
+            <a:schemeClr val="accent1"/>
+          </a:fillRef>
+          <a:effectRef idx="0">
+            <a:schemeClr val="accent1"/>
+          </a:effectRef>
+          <a:fontRef idx="minor">
+            <a:schemeClr val="tx1"/>
+          </a:fontRef>
+        </p:style>
+      </p:cxnSp>
+      <p:sp>
+        <p:nvSpPr>
+          <p:cNvPr id="23" name="椭圆 22"/>
+          <p:cNvSpPr/>
+          <p:nvPr/>
+        </p:nvSpPr>
+        <p:spPr>
+          <a:xfrm>
+            <a:off x="3717021" y="4283667"/>
+            <a:ext cx="200490" cy="244387"/>
+          </a:xfrm>
+          <a:prstGeom prst="ellipse">
+            <a:avLst/>
+          </a:prstGeom>
+          <a:solidFill>
+            <a:schemeClr val="bg1"/>
+          </a:solidFill>
+          <a:ln w="38100">
+            <a:solidFill>
+              <a:schemeClr val="tx1"/>
+            </a:solidFill>
+          </a:ln>
+        </p:spPr>
+        <p:style>
+          <a:lnRef idx="2">
+            <a:schemeClr val="accent1">
+              <a:shade val="50000"/>
+            </a:schemeClr>
+          </a:lnRef>
+          <a:fillRef idx="1">
+            <a:schemeClr val="accent1"/>
+          </a:fillRef>
+          <a:effectRef idx="0">
+            <a:schemeClr val="accent1"/>
+          </a:effectRef>
+          <a:fontRef idx="minor">
+            <a:schemeClr val="lt1"/>
+          </a:fontRef>
+        </p:style>
+        <p:txBody>
+          <a:bodyPr rtlCol="0" anchor="ctr"/>
+          <a:lstStyle/>
+          <a:p>
+            <a:pPr algn="ctr"/>
+            <a:endParaRPr lang="zh-CN" altLang="en-US"/>
+          </a:p>
+        </p:txBody>
+      </p:sp>
+      <p:sp>
+        <p:nvSpPr>
+          <p:cNvPr id="26" name="TextBox 25"/>
+          <p:cNvSpPr txBox="1"/>
+          <p:nvPr/>
+        </p:nvSpPr>
+        <p:spPr>
+          <a:xfrm>
+            <a:off x="4936355" y="3232752"/>
+            <a:ext cx="338554" cy="617658"/>
+          </a:xfrm>
+          <a:prstGeom prst="rect">
+            <a:avLst/>
+          </a:prstGeom>
+          <a:noFill/>
+        </p:spPr>
+        <p:txBody>
+          <a:bodyPr vert="eaVert" wrap="square" rtlCol="0">
+            <a:spAutoFit/>
+          </a:bodyPr>
+          <a:lstStyle/>
+          <a:p>
+            <a:r>
+              <a:rPr lang="zh-CN" altLang="en-US" sz="1000" b="1" dirty="0" smtClean="0"/>
+              <a:t>系统校准</a:t>
+            </a:r>
+            <a:endParaRPr lang="zh-CN" altLang="en-US" sz="1000" b="1" dirty="0"/>
+          </a:p>
+        </p:txBody>
+      </p:sp>
+      <p:sp>
+        <p:nvSpPr>
+          <p:cNvPr id="27" name="圆角矩形 26"/>
+          <p:cNvSpPr/>
+          <p:nvPr/>
+        </p:nvSpPr>
+        <p:spPr>
+          <a:xfrm>
+            <a:off x="3588031" y="3893269"/>
+            <a:ext cx="432048" cy="271527"/>
+          </a:xfrm>
+          <a:prstGeom prst="roundRect">
+            <a:avLst/>
+          </a:prstGeom>
+          <a:solidFill>
+            <a:schemeClr val="bg1"/>
+          </a:solidFill>
+          <a:ln>
+            <a:solidFill>
+              <a:schemeClr val="tx1"/>
+            </a:solidFill>
+          </a:ln>
+        </p:spPr>
+        <p:style>
+          <a:lnRef idx="2">
+            <a:schemeClr val="accent1">
+              <a:shade val="50000"/>
+            </a:schemeClr>
+          </a:lnRef>
+          <a:fillRef idx="1">
+            <a:schemeClr val="accent1"/>
+          </a:fillRef>
+          <a:effectRef idx="0">
+            <a:schemeClr val="accent1"/>
+          </a:effectRef>
+          <a:fontRef idx="minor">
+            <a:schemeClr val="lt1"/>
+          </a:fontRef>
+        </p:style>
+        <p:txBody>
+          <a:bodyPr rtlCol="0" anchor="ctr"/>
+          <a:lstStyle/>
+          <a:p>
+            <a:pPr algn="ctr"/>
+            <a:endParaRPr lang="zh-CN" altLang="en-US"/>
+          </a:p>
+        </p:txBody>
+      </p:sp>
+      <p:sp>
+        <p:nvSpPr>
+          <p:cNvPr id="28" name="椭圆 27"/>
+          <p:cNvSpPr/>
+          <p:nvPr/>
+        </p:nvSpPr>
+        <p:spPr>
+          <a:xfrm>
+            <a:off x="3717021" y="3952832"/>
+            <a:ext cx="174068" cy="152400"/>
+          </a:xfrm>
+          <a:prstGeom prst="ellipse">
+            <a:avLst/>
+          </a:prstGeom>
+          <a:noFill/>
+          <a:ln>
+            <a:solidFill>
+              <a:schemeClr val="tx1"/>
+            </a:solidFill>
+          </a:ln>
+        </p:spPr>
+        <p:style>
+          <a:lnRef idx="2">
+            <a:schemeClr val="accent1">
+              <a:shade val="50000"/>
+            </a:schemeClr>
+          </a:lnRef>
+          <a:fillRef idx="1">
+            <a:schemeClr val="accent1"/>
+          </a:fillRef>
+          <a:effectRef idx="0">
+            <a:schemeClr val="accent1"/>
+          </a:effectRef>
+          <a:fontRef idx="minor">
+            <a:schemeClr val="lt1"/>
+          </a:fontRef>
+        </p:style>
+        <p:txBody>
+          <a:bodyPr rtlCol="0" anchor="ctr"/>
+          <a:lstStyle/>
+          <a:p>
+            <a:pPr algn="ctr"/>
+            <a:endParaRPr lang="zh-CN" altLang="en-US"/>
+          </a:p>
+        </p:txBody>
+      </p:sp>
+      <p:sp>
+        <p:nvSpPr>
+          <p:cNvPr id="29" name="矩形 28"/>
+          <p:cNvSpPr/>
+          <p:nvPr/>
+        </p:nvSpPr>
+        <p:spPr>
+          <a:xfrm>
+            <a:off x="3845369" y="3821261"/>
+            <a:ext cx="102702" cy="72008"/>
+          </a:xfrm>
+          <a:prstGeom prst="rect">
+            <a:avLst/>
+          </a:prstGeom>
+          <a:noFill/>
+          <a:ln>
+            <a:solidFill>
+              <a:schemeClr val="tx1"/>
+            </a:solidFill>
+          </a:ln>
+        </p:spPr>
+        <p:style>
+          <a:lnRef idx="2">
+            <a:schemeClr val="accent1">
+              <a:shade val="50000"/>
+            </a:schemeClr>
+          </a:lnRef>
+          <a:fillRef idx="1">
+            <a:schemeClr val="accent1"/>
+          </a:fillRef>
+          <a:effectRef idx="0">
+            <a:schemeClr val="accent1"/>
+          </a:effectRef>
+          <a:fontRef idx="minor">
+            <a:schemeClr val="lt1"/>
+          </a:fontRef>
+        </p:style>
+        <p:txBody>
+          <a:bodyPr rtlCol="0" anchor="ctr"/>
+          <a:lstStyle/>
+          <a:p>
+            <a:pPr algn="ctr"/>
+            <a:endParaRPr lang="zh-CN" altLang="en-US"/>
+          </a:p>
+        </p:txBody>
+      </p:sp>
+      <p:sp>
+        <p:nvSpPr>
+          <p:cNvPr id="31" name="流程图: 数据 30"/>
+          <p:cNvSpPr/>
+          <p:nvPr/>
+        </p:nvSpPr>
+        <p:spPr>
+          <a:xfrm rot="10800000">
+            <a:off x="2633625" y="2458307"/>
+            <a:ext cx="1080120" cy="541815"/>
+          </a:xfrm>
+          <a:prstGeom prst="flowChartInputOutput">
+            <a:avLst/>
+          </a:prstGeom>
+          <a:solidFill>
+            <a:schemeClr val="bg1"/>
+          </a:solidFill>
+          <a:ln>
+            <a:solidFill>
+              <a:schemeClr val="tx1"/>
+            </a:solidFill>
+          </a:ln>
+        </p:spPr>
+        <p:style>
+          <a:lnRef idx="2">
+            <a:schemeClr val="accent1">
+              <a:shade val="50000"/>
+            </a:schemeClr>
+          </a:lnRef>
+          <a:fillRef idx="1">
+            <a:schemeClr val="accent1"/>
+          </a:fillRef>
+          <a:effectRef idx="0">
+            <a:schemeClr val="accent1"/>
+          </a:effectRef>
+          <a:fontRef idx="minor">
+            <a:schemeClr val="lt1"/>
+          </a:fontRef>
+        </p:style>
+        <p:txBody>
+          <a:bodyPr rtlCol="0" anchor="ctr"/>
+          <a:lstStyle/>
+          <a:p>
+            <a:pPr algn="ctr"/>
+            <a:endParaRPr lang="zh-CN" altLang="en-US"/>
+          </a:p>
+        </p:txBody>
+      </p:sp>
+      <p:sp>
+        <p:nvSpPr>
+          <p:cNvPr id="52" name="矩形 51"/>
+          <p:cNvSpPr/>
+          <p:nvPr/>
+        </p:nvSpPr>
+        <p:spPr>
+          <a:xfrm>
+            <a:off x="2799345" y="2583169"/>
+            <a:ext cx="831538" cy="54006"/>
+          </a:xfrm>
+          <a:prstGeom prst="rect">
+            <a:avLst/>
+          </a:prstGeom>
+          <a:solidFill>
+            <a:schemeClr val="tx1"/>
+          </a:solidFill>
+          <a:ln>
+            <a:solidFill>
+              <a:schemeClr val="tx1"/>
+            </a:solidFill>
+          </a:ln>
+        </p:spPr>
+        <p:style>
+          <a:lnRef idx="2">
+            <a:schemeClr val="accent1">
+              <a:shade val="50000"/>
+            </a:schemeClr>
+          </a:lnRef>
+          <a:fillRef idx="1">
+            <a:schemeClr val="accent1"/>
+          </a:fillRef>
+          <a:effectRef idx="0">
+            <a:schemeClr val="accent1"/>
+          </a:effectRef>
+          <a:fontRef idx="minor">
+            <a:schemeClr val="lt1"/>
+          </a:fontRef>
+        </p:style>
+        <p:txBody>
+          <a:bodyPr rtlCol="0" anchor="ctr"/>
+          <a:lstStyle/>
+          <a:p>
+            <a:pPr algn="ctr"/>
+            <a:endParaRPr lang="zh-CN" altLang="en-US"/>
+          </a:p>
+        </p:txBody>
+      </p:sp>
+      <p:sp>
+        <p:nvSpPr>
+          <p:cNvPr id="53" name="矩形 52"/>
+          <p:cNvSpPr/>
+          <p:nvPr/>
+        </p:nvSpPr>
+        <p:spPr>
+          <a:xfrm>
+            <a:off x="2757915" y="2719772"/>
+            <a:ext cx="831538" cy="54006"/>
+          </a:xfrm>
+          <a:prstGeom prst="rect">
+            <a:avLst/>
+          </a:prstGeom>
+          <a:solidFill>
+            <a:schemeClr val="tx1"/>
+          </a:solidFill>
+          <a:ln>
+            <a:solidFill>
+              <a:schemeClr val="tx1"/>
+            </a:solidFill>
+          </a:ln>
+        </p:spPr>
+        <p:style>
+          <a:lnRef idx="2">
+            <a:schemeClr val="accent1">
+              <a:shade val="50000"/>
+            </a:schemeClr>
+          </a:lnRef>
+          <a:fillRef idx="1">
+            <a:schemeClr val="accent1"/>
+          </a:fillRef>
+          <a:effectRef idx="0">
+            <a:schemeClr val="accent1"/>
+          </a:effectRef>
+          <a:fontRef idx="minor">
+            <a:schemeClr val="lt1"/>
+          </a:fontRef>
+        </p:style>
+        <p:txBody>
+          <a:bodyPr rtlCol="0" anchor="ctr"/>
+          <a:lstStyle/>
+          <a:p>
+            <a:pPr algn="ctr"/>
+            <a:endParaRPr lang="zh-CN" altLang="en-US"/>
+          </a:p>
+        </p:txBody>
+      </p:sp>
+      <p:sp>
+        <p:nvSpPr>
+          <p:cNvPr id="54" name="矩形 53"/>
+          <p:cNvSpPr/>
+          <p:nvPr/>
+        </p:nvSpPr>
+        <p:spPr>
+          <a:xfrm>
+            <a:off x="2688376" y="2843581"/>
+            <a:ext cx="831538" cy="54006"/>
+          </a:xfrm>
+          <a:prstGeom prst="rect">
+            <a:avLst/>
+          </a:prstGeom>
+          <a:solidFill>
+            <a:schemeClr val="tx1"/>
+          </a:solidFill>
+          <a:ln>
+            <a:solidFill>
+              <a:schemeClr val="tx1"/>
+            </a:solidFill>
+          </a:ln>
+        </p:spPr>
+        <p:style>
+          <a:lnRef idx="2">
+            <a:schemeClr val="accent1">
+              <a:shade val="50000"/>
+            </a:schemeClr>
+          </a:lnRef>
+          <a:fillRef idx="1">
+            <a:schemeClr val="accent1"/>
+          </a:fillRef>
+          <a:effectRef idx="0">
+            <a:schemeClr val="accent1"/>
+          </a:effectRef>
+          <a:fontRef idx="minor">
+            <a:schemeClr val="lt1"/>
+          </a:fontRef>
+        </p:style>
+        <p:txBody>
+          <a:bodyPr rtlCol="0" anchor="ctr"/>
+          <a:lstStyle/>
+          <a:p>
+            <a:pPr algn="ctr"/>
+            <a:endParaRPr lang="zh-CN" altLang="en-US"/>
+          </a:p>
+        </p:txBody>
+      </p:sp>
+      <p:sp>
+        <p:nvSpPr>
+          <p:cNvPr id="2063" name="矩形 2062"/>
+          <p:cNvSpPr/>
+          <p:nvPr/>
+        </p:nvSpPr>
+        <p:spPr>
+          <a:xfrm>
+            <a:off x="2123728" y="1628800"/>
+            <a:ext cx="3744416" cy="3456384"/>
+          </a:xfrm>
+          <a:prstGeom prst="rect">
+            <a:avLst/>
+          </a:prstGeom>
+          <a:noFill/>
+          <a:ln>
+            <a:solidFill>
+              <a:schemeClr val="tx1"/>
+            </a:solidFill>
+            <a:prstDash val="sysDot"/>
+          </a:ln>
+        </p:spPr>
+        <p:style>
+          <a:lnRef idx="2">
+            <a:schemeClr val="accent1">
+              <a:shade val="50000"/>
+            </a:schemeClr>
+          </a:lnRef>
+          <a:fillRef idx="1">
+            <a:schemeClr val="accent1"/>
+          </a:fillRef>
+          <a:effectRef idx="0">
+            <a:schemeClr val="accent1"/>
+          </a:effectRef>
+          <a:fontRef idx="minor">
+            <a:schemeClr val="lt1"/>
+          </a:fontRef>
+        </p:style>
+        <p:txBody>
+          <a:bodyPr rtlCol="0" anchor="ctr"/>
+          <a:lstStyle/>
+          <a:p>
+            <a:pPr algn="ctr"/>
+            <a:endParaRPr lang="zh-CN" altLang="en-US"/>
+          </a:p>
+        </p:txBody>
+      </p:sp>
+    </p:spTree>
+    <p:extLst>
+      <p:ext uri="{BB962C8B-B14F-4D97-AF65-F5344CB8AC3E}">
+        <p14:creationId xmlns:p14="http://schemas.microsoft.com/office/powerpoint/2010/main" val="772118323"/>
+      </p:ext>
+    </p:extLst>
+  </p:cSld>
+  <p:clrMapOvr>
+    <a:masterClrMapping/>
+  </p:clrMapOvr>
+</p:sld>
+</file>
+
+<file path=ppt/slides/slide3.xml><?xml version="1.0" encoding="utf-8"?>
+<p:sld xmlns:a="http://schemas.openxmlformats.org/drawingml/2006/main" xmlns:r="http://schemas.openxmlformats.org/officeDocument/2006/relationships" xmlns:p="http://schemas.openxmlformats.org/presentationml/2006/main">
+  <p:cSld>
+    <p:spTree>
+      <p:nvGrpSpPr>
+        <p:cNvPr id="1" name=""/>
+        <p:cNvGrpSpPr/>
+        <p:nvPr/>
+      </p:nvGrpSpPr>
+      <p:grpSpPr>
+        <a:xfrm>
+          <a:off x="0" y="0"/>
+          <a:ext cx="0" cy="0"/>
+          <a:chOff x="0" y="0"/>
+          <a:chExt cx="0" cy="0"/>
+        </a:xfrm>
+      </p:grpSpPr>
+      <p:sp>
+        <p:nvSpPr>
+          <p:cNvPr id="2" name="TextBox 1"/>
+          <p:cNvSpPr txBox="1"/>
+          <p:nvPr/>
+        </p:nvSpPr>
+        <p:spPr>
+          <a:xfrm>
+            <a:off x="467544" y="404664"/>
+            <a:ext cx="1656184" cy="1754326"/>
+          </a:xfrm>
+          <a:prstGeom prst="rect">
+            <a:avLst/>
+          </a:prstGeom>
+          <a:noFill/>
+        </p:spPr>
+        <p:txBody>
+          <a:bodyPr wrap="square" rtlCol="0">
+            <a:spAutoFit/>
+          </a:bodyPr>
+          <a:lstStyle/>
+          <a:p>
+            <a:r>
+              <a:rPr lang="zh-CN" altLang="en-US" dirty="0" smtClean="0"/>
+              <a:t>系统校准</a:t>
+            </a:r>
+            <a:endParaRPr lang="en-US" altLang="zh-CN" dirty="0" smtClean="0"/>
+          </a:p>
+          <a:p>
+            <a:r>
+              <a:rPr lang="zh-CN" altLang="en-US" dirty="0" smtClean="0"/>
+              <a:t>数字相移</a:t>
+            </a:r>
+            <a:endParaRPr lang="en-US" altLang="zh-CN" dirty="0" smtClean="0"/>
+          </a:p>
+          <a:p>
+            <a:r>
+              <a:rPr lang="zh-CN" altLang="en-US" dirty="0"/>
+              <a:t>条</a:t>
+            </a:r>
+            <a:r>
+              <a:rPr lang="zh-CN" altLang="en-US" dirty="0" smtClean="0"/>
+              <a:t>纹去除</a:t>
+            </a:r>
+            <a:endParaRPr lang="en-US" altLang="zh-CN" dirty="0" smtClean="0"/>
+          </a:p>
+          <a:p>
+            <a:r>
+              <a:rPr lang="zh-CN" altLang="en-US" dirty="0"/>
+              <a:t>相</a:t>
+            </a:r>
+            <a:r>
+              <a:rPr lang="zh-CN" altLang="en-US" dirty="0" smtClean="0"/>
+              <a:t>位提取</a:t>
+            </a:r>
+            <a:endParaRPr lang="en-US" altLang="zh-CN" dirty="0" smtClean="0"/>
+          </a:p>
+          <a:p>
+            <a:r>
+              <a:rPr lang="zh-CN" altLang="en-US" dirty="0"/>
+              <a:t>相</a:t>
+            </a:r>
+            <a:r>
+              <a:rPr lang="zh-CN" altLang="en-US" dirty="0" smtClean="0"/>
+              <a:t>位展开</a:t>
+            </a:r>
+            <a:endParaRPr lang="en-US" altLang="zh-CN" dirty="0" smtClean="0"/>
+          </a:p>
+          <a:p>
+            <a:r>
+              <a:rPr lang="zh-CN" altLang="en-US" dirty="0" smtClean="0"/>
+              <a:t>高度转换</a:t>
+            </a:r>
+            <a:endParaRPr lang="zh-CN" altLang="en-US" dirty="0"/>
+          </a:p>
+        </p:txBody>
+      </p:sp>
+      <p:pic>
+        <p:nvPicPr>
+          <p:cNvPr id="5" name="图片 4"/>
+          <p:cNvPicPr>
+            <a:picLocks noChangeAspect="1"/>
+          </p:cNvPicPr>
+          <p:nvPr/>
+        </p:nvPicPr>
+        <p:blipFill>
+          <a:blip r:embed="rId2" cstate="print">
+            <a:extLst>
+              <a:ext uri="{28A0092B-C50C-407E-A947-70E740481C1C}">
+                <a14:useLocalDpi xmlns:a14="http://schemas.microsoft.com/office/drawing/2010/main" val="0"/>
+              </a:ext>
+            </a:extLst>
+          </a:blip>
+          <a:stretch>
+            <a:fillRect/>
+          </a:stretch>
+        </p:blipFill>
+        <p:spPr>
+          <a:xfrm>
+            <a:off x="2123728" y="1556792"/>
+            <a:ext cx="2304256" cy="2125574"/>
+          </a:xfrm>
+          <a:prstGeom prst="rect">
+            <a:avLst/>
+          </a:prstGeom>
+        </p:spPr>
+      </p:pic>
+    </p:spTree>
+    <p:extLst>
+      <p:ext uri="{BB962C8B-B14F-4D97-AF65-F5344CB8AC3E}">
+        <p14:creationId xmlns:p14="http://schemas.microsoft.com/office/powerpoint/2010/main" val="2341805650"/>
       </p:ext>
     </p:extLst>
   </p:cSld>

</xml_diff>

<commit_message>
finished the opening graphic
</commit_message>
<xml_diff>
--- a/Graphic & Tables.pptx
+++ b/Graphic & Tables.pptx
@@ -3626,7 +3626,7 @@
           <a:graphicData uri="http://schemas.openxmlformats.org/presentationml/2006/ole">
             <mc:AlternateContent xmlns:mc="http://schemas.openxmlformats.org/markup-compatibility/2006">
               <mc:Choice xmlns:v="urn:schemas-microsoft-com:vml" Requires="v">
-                <p:oleObj spid="_x0000_s1037" name="文档" r:id="rId3" imgW="5594453" imgH="3640410" progId="Word.Document.12">
+                <p:oleObj spid="_x0000_s1040" name="文档" r:id="rId3" imgW="5594453" imgH="3640410" progId="Word.Document.12">
                   <p:embed/>
                 </p:oleObj>
               </mc:Choice>
@@ -5111,27 +5111,56 @@
       </p:grpSpPr>
       <p:pic>
         <p:nvPicPr>
-          <p:cNvPr id="2050" name="Picture 2"/>
+          <p:cNvPr id="23" name="图片 22"/>
           <p:cNvPicPr>
-            <a:picLocks noChangeAspect="1" noChangeArrowheads="1"/>
+            <a:picLocks noChangeAspect="1"/>
           </p:cNvPicPr>
           <p:nvPr/>
         </p:nvPicPr>
         <p:blipFill rotWithShape="1">
-          <a:blip r:embed="rId2" cstate="print">
+          <a:blip r:embed="rId2">
             <a:extLst>
               <a:ext uri="{28A0092B-C50C-407E-A947-70E740481C1C}">
                 <a14:useLocalDpi xmlns:a14="http://schemas.microsoft.com/office/drawing/2010/main" val="0"/>
               </a:ext>
             </a:extLst>
           </a:blip>
-          <a:srcRect l="32338" t="35953" r="32338" b="31832"/>
+          <a:srcRect l="47309" t="53106" r="47788" b="39472"/>
+          <a:stretch/>
+        </p:blipFill>
+        <p:spPr>
+          <a:xfrm>
+            <a:off x="2962501" y="4242523"/>
+            <a:ext cx="634240" cy="720079"/>
+          </a:xfrm>
+          <a:prstGeom prst="rect">
+            <a:avLst/>
+          </a:prstGeom>
+        </p:spPr>
+      </p:pic>
+      <p:pic>
+        <p:nvPicPr>
+          <p:cNvPr id="22" name="Picture 5"/>
+          <p:cNvPicPr>
+            <a:picLocks noChangeAspect="1" noChangeArrowheads="1"/>
+          </p:cNvPicPr>
+          <p:nvPr/>
+        </p:nvPicPr>
+        <p:blipFill rotWithShape="1">
+          <a:blip r:embed="rId3">
+            <a:extLst>
+              <a:ext uri="{28A0092B-C50C-407E-A947-70E740481C1C}">
+                <a14:useLocalDpi xmlns:a14="http://schemas.microsoft.com/office/drawing/2010/main" val="0"/>
+              </a:ext>
+            </a:extLst>
+          </a:blip>
+          <a:srcRect l="28277" t="40887" r="24357" b="23448"/>
           <a:stretch/>
         </p:blipFill>
         <p:spPr bwMode="auto">
           <a:xfrm>
-            <a:off x="6628082" y="3686410"/>
-            <a:ext cx="588529" cy="678391"/>
+            <a:off x="4559835" y="4252752"/>
+            <a:ext cx="678859" cy="717819"/>
           </a:xfrm>
           <a:prstGeom prst="rect">
             <a:avLst/>
@@ -5163,27 +5192,27 @@
       </p:pic>
       <p:pic>
         <p:nvPicPr>
-          <p:cNvPr id="12" name="Picture 2"/>
+          <p:cNvPr id="21" name="Picture 4"/>
           <p:cNvPicPr>
             <a:picLocks noChangeAspect="1" noChangeArrowheads="1"/>
           </p:cNvPicPr>
           <p:nvPr/>
         </p:nvPicPr>
         <p:blipFill rotWithShape="1">
-          <a:blip r:embed="rId3" cstate="print">
+          <a:blip r:embed="rId4">
             <a:extLst>
               <a:ext uri="{28A0092B-C50C-407E-A947-70E740481C1C}">
                 <a14:useLocalDpi xmlns:a14="http://schemas.microsoft.com/office/drawing/2010/main" val="0"/>
               </a:ext>
             </a:extLst>
           </a:blip>
-          <a:srcRect l="32338" t="35953" r="32338" b="31832"/>
+          <a:srcRect l="30520" t="33012" r="28821" b="33305"/>
           <a:stretch/>
         </p:blipFill>
         <p:spPr bwMode="auto">
           <a:xfrm>
-            <a:off x="467545" y="4669548"/>
-            <a:ext cx="592390" cy="682842"/>
+            <a:off x="6071682" y="4293617"/>
+            <a:ext cx="596420" cy="676954"/>
           </a:xfrm>
           <a:prstGeom prst="rect">
             <a:avLst/>
@@ -5215,27 +5244,27 @@
       </p:pic>
       <p:pic>
         <p:nvPicPr>
-          <p:cNvPr id="2052" name="Picture 4"/>
+          <p:cNvPr id="20" name="Picture 2"/>
           <p:cNvPicPr>
             <a:picLocks noChangeAspect="1" noChangeArrowheads="1"/>
           </p:cNvPicPr>
           <p:nvPr/>
         </p:nvPicPr>
         <p:blipFill rotWithShape="1">
-          <a:blip r:embed="rId4">
+          <a:blip r:embed="rId5">
             <a:extLst>
               <a:ext uri="{28A0092B-C50C-407E-A947-70E740481C1C}">
                 <a14:useLocalDpi xmlns:a14="http://schemas.microsoft.com/office/drawing/2010/main" val="0"/>
               </a:ext>
             </a:extLst>
           </a:blip>
-          <a:srcRect r="20244" b="8892"/>
+          <a:srcRect l="19711" t="37051" r="22024" b="29162"/>
           <a:stretch/>
         </p:blipFill>
         <p:spPr bwMode="auto">
           <a:xfrm>
-            <a:off x="4302480" y="3121034"/>
-            <a:ext cx="633875" cy="700227"/>
+            <a:off x="7572354" y="4279649"/>
+            <a:ext cx="792087" cy="690922"/>
           </a:xfrm>
           <a:prstGeom prst="rect">
             <a:avLst/>
@@ -5265,375 +5294,29 @@
           </a:extLst>
         </p:spPr>
       </p:pic>
-      <p:sp>
-        <p:nvSpPr>
-          <p:cNvPr id="2" name="TextBox 1"/>
-          <p:cNvSpPr txBox="1"/>
-          <p:nvPr/>
-        </p:nvSpPr>
-        <p:spPr>
-          <a:xfrm>
-            <a:off x="467544" y="404664"/>
-            <a:ext cx="1656184" cy="2031325"/>
-          </a:xfrm>
-          <a:prstGeom prst="rect">
-            <a:avLst/>
-          </a:prstGeom>
-          <a:noFill/>
-        </p:spPr>
-        <p:txBody>
-          <a:bodyPr wrap="square" rtlCol="0">
-            <a:spAutoFit/>
-          </a:bodyPr>
-          <a:lstStyle/>
-          <a:p>
-            <a:r>
-              <a:rPr lang="zh-CN" altLang="en-US" dirty="0" smtClean="0"/>
-              <a:t>系统校准</a:t>
-            </a:r>
-            <a:endParaRPr lang="en-US" altLang="zh-CN" dirty="0" smtClean="0"/>
-          </a:p>
-          <a:p>
-            <a:r>
-              <a:rPr lang="zh-CN" altLang="en-US" dirty="0"/>
-              <a:t>投</a:t>
-            </a:r>
-            <a:r>
-              <a:rPr lang="zh-CN" altLang="en-US" dirty="0" smtClean="0"/>
-              <a:t>影成像</a:t>
-            </a:r>
-            <a:endParaRPr lang="en-US" altLang="zh-CN" dirty="0" smtClean="0"/>
-          </a:p>
-          <a:p>
-            <a:r>
-              <a:rPr lang="zh-CN" altLang="en-US" dirty="0" smtClean="0"/>
-              <a:t>数字相移</a:t>
-            </a:r>
-            <a:endParaRPr lang="en-US" altLang="zh-CN" dirty="0" smtClean="0"/>
-          </a:p>
-          <a:p>
-            <a:r>
-              <a:rPr lang="zh-CN" altLang="en-US" dirty="0"/>
-              <a:t>条</a:t>
-            </a:r>
-            <a:r>
-              <a:rPr lang="zh-CN" altLang="en-US" dirty="0" smtClean="0"/>
-              <a:t>纹去除</a:t>
-            </a:r>
-            <a:endParaRPr lang="en-US" altLang="zh-CN" dirty="0" smtClean="0"/>
-          </a:p>
-          <a:p>
-            <a:r>
-              <a:rPr lang="zh-CN" altLang="en-US" dirty="0"/>
-              <a:t>相</a:t>
-            </a:r>
-            <a:r>
-              <a:rPr lang="zh-CN" altLang="en-US" dirty="0" smtClean="0"/>
-              <a:t>位提取</a:t>
-            </a:r>
-            <a:endParaRPr lang="en-US" altLang="zh-CN" dirty="0" smtClean="0"/>
-          </a:p>
-          <a:p>
-            <a:r>
-              <a:rPr lang="zh-CN" altLang="en-US" dirty="0"/>
-              <a:t>相</a:t>
-            </a:r>
-            <a:r>
-              <a:rPr lang="zh-CN" altLang="en-US" dirty="0" smtClean="0"/>
-              <a:t>位展开</a:t>
-            </a:r>
-            <a:endParaRPr lang="en-US" altLang="zh-CN" dirty="0" smtClean="0"/>
-          </a:p>
-          <a:p>
-            <a:r>
-              <a:rPr lang="zh-CN" altLang="en-US" dirty="0" smtClean="0"/>
-              <a:t>高度转换</a:t>
-            </a:r>
-            <a:endParaRPr lang="zh-CN" altLang="en-US" dirty="0"/>
-          </a:p>
-        </p:txBody>
-      </p:sp>
-      <p:sp>
-        <p:nvSpPr>
-          <p:cNvPr id="6" name="矩形 5"/>
-          <p:cNvSpPr/>
-          <p:nvPr/>
-        </p:nvSpPr>
-        <p:spPr>
-          <a:xfrm>
-            <a:off x="6588224" y="3665566"/>
-            <a:ext cx="1080120" cy="720080"/>
-          </a:xfrm>
-          <a:prstGeom prst="rect">
-            <a:avLst/>
-          </a:prstGeom>
-          <a:noFill/>
-          <a:ln w="76200">
-            <a:solidFill>
-              <a:schemeClr val="tx1"/>
-            </a:solidFill>
-          </a:ln>
-        </p:spPr>
-        <p:style>
-          <a:lnRef idx="2">
-            <a:schemeClr val="accent1">
-              <a:shade val="50000"/>
-            </a:schemeClr>
-          </a:lnRef>
-          <a:fillRef idx="1">
-            <a:schemeClr val="accent1"/>
-          </a:fillRef>
-          <a:effectRef idx="0">
-            <a:schemeClr val="accent1"/>
-          </a:effectRef>
-          <a:fontRef idx="minor">
-            <a:schemeClr val="lt1"/>
-          </a:fontRef>
-        </p:style>
-        <p:txBody>
-          <a:bodyPr rtlCol="0" anchor="ctr"/>
-          <a:lstStyle/>
-          <a:p>
-            <a:pPr algn="ctr"/>
-            <a:endParaRPr lang="zh-CN" altLang="en-US"/>
-          </a:p>
-        </p:txBody>
-      </p:sp>
-      <p:sp>
-        <p:nvSpPr>
-          <p:cNvPr id="7" name="梯形 6"/>
-          <p:cNvSpPr/>
-          <p:nvPr/>
-        </p:nvSpPr>
-        <p:spPr>
-          <a:xfrm>
-            <a:off x="6876256" y="4385646"/>
-            <a:ext cx="504056" cy="216024"/>
-          </a:xfrm>
-          <a:prstGeom prst="trapezoid">
-            <a:avLst/>
-          </a:prstGeom>
-          <a:solidFill>
-            <a:schemeClr val="bg1"/>
-          </a:solidFill>
-          <a:ln w="19050">
-            <a:solidFill>
-              <a:schemeClr val="tx1"/>
-            </a:solidFill>
-          </a:ln>
-        </p:spPr>
-        <p:style>
-          <a:lnRef idx="2">
-            <a:schemeClr val="accent1">
-              <a:shade val="50000"/>
-            </a:schemeClr>
-          </a:lnRef>
-          <a:fillRef idx="1">
-            <a:schemeClr val="accent1"/>
-          </a:fillRef>
-          <a:effectRef idx="0">
-            <a:schemeClr val="accent1"/>
-          </a:effectRef>
-          <a:fontRef idx="minor">
-            <a:schemeClr val="lt1"/>
-          </a:fontRef>
-        </p:style>
-        <p:txBody>
-          <a:bodyPr rtlCol="0" anchor="ctr"/>
-          <a:lstStyle/>
-          <a:p>
-            <a:pPr algn="ctr"/>
-            <a:endParaRPr lang="zh-CN" altLang="en-US"/>
-          </a:p>
-        </p:txBody>
-      </p:sp>
-      <p:sp>
-        <p:nvSpPr>
-          <p:cNvPr id="8" name="TextBox 7"/>
-          <p:cNvSpPr txBox="1"/>
-          <p:nvPr/>
-        </p:nvSpPr>
-        <p:spPr>
-          <a:xfrm>
-            <a:off x="7273177" y="3773578"/>
-            <a:ext cx="323165" cy="617658"/>
-          </a:xfrm>
-          <a:prstGeom prst="rect">
-            <a:avLst/>
-          </a:prstGeom>
-          <a:noFill/>
-        </p:spPr>
-        <p:txBody>
-          <a:bodyPr vert="eaVert" wrap="square" rtlCol="0">
-            <a:spAutoFit/>
-          </a:bodyPr>
-          <a:lstStyle/>
-          <a:p>
-            <a:r>
-              <a:rPr lang="zh-CN" altLang="en-US" sz="900" dirty="0"/>
-              <a:t>数</a:t>
-            </a:r>
-            <a:r>
-              <a:rPr lang="zh-CN" altLang="en-US" sz="900" dirty="0" smtClean="0"/>
-              <a:t>字相移</a:t>
-            </a:r>
-            <a:endParaRPr lang="zh-CN" altLang="en-US" sz="900" dirty="0"/>
-          </a:p>
-        </p:txBody>
-      </p:sp>
-      <p:sp>
-        <p:nvSpPr>
-          <p:cNvPr id="9" name="矩形 8"/>
-          <p:cNvSpPr/>
-          <p:nvPr/>
-        </p:nvSpPr>
-        <p:spPr>
-          <a:xfrm>
-            <a:off x="467544" y="4632309"/>
-            <a:ext cx="1080120" cy="720080"/>
-          </a:xfrm>
-          <a:prstGeom prst="rect">
-            <a:avLst/>
-          </a:prstGeom>
-          <a:noFill/>
-          <a:ln w="76200">
-            <a:solidFill>
-              <a:schemeClr val="tx1"/>
-            </a:solidFill>
-          </a:ln>
-        </p:spPr>
-        <p:style>
-          <a:lnRef idx="2">
-            <a:schemeClr val="accent1">
-              <a:shade val="50000"/>
-            </a:schemeClr>
-          </a:lnRef>
-          <a:fillRef idx="1">
-            <a:schemeClr val="accent1"/>
-          </a:fillRef>
-          <a:effectRef idx="0">
-            <a:schemeClr val="accent1"/>
-          </a:effectRef>
-          <a:fontRef idx="minor">
-            <a:schemeClr val="lt1"/>
-          </a:fontRef>
-        </p:style>
-        <p:txBody>
-          <a:bodyPr rtlCol="0" anchor="ctr"/>
-          <a:lstStyle/>
-          <a:p>
-            <a:pPr algn="ctr"/>
-            <a:endParaRPr lang="zh-CN" altLang="en-US"/>
-          </a:p>
-        </p:txBody>
-      </p:sp>
-      <p:sp>
-        <p:nvSpPr>
-          <p:cNvPr id="10" name="梯形 9"/>
-          <p:cNvSpPr/>
-          <p:nvPr/>
-        </p:nvSpPr>
-        <p:spPr>
-          <a:xfrm>
-            <a:off x="755576" y="5352389"/>
-            <a:ext cx="504056" cy="216024"/>
-          </a:xfrm>
-          <a:prstGeom prst="trapezoid">
-            <a:avLst/>
-          </a:prstGeom>
-          <a:solidFill>
-            <a:schemeClr val="bg1"/>
-          </a:solidFill>
-          <a:ln w="19050">
-            <a:solidFill>
-              <a:schemeClr val="tx1"/>
-            </a:solidFill>
-          </a:ln>
-        </p:spPr>
-        <p:style>
-          <a:lnRef idx="2">
-            <a:schemeClr val="accent1">
-              <a:shade val="50000"/>
-            </a:schemeClr>
-          </a:lnRef>
-          <a:fillRef idx="1">
-            <a:schemeClr val="accent1"/>
-          </a:fillRef>
-          <a:effectRef idx="0">
-            <a:schemeClr val="accent1"/>
-          </a:effectRef>
-          <a:fontRef idx="minor">
-            <a:schemeClr val="lt1"/>
-          </a:fontRef>
-        </p:style>
-        <p:txBody>
-          <a:bodyPr rtlCol="0" anchor="ctr"/>
-          <a:lstStyle/>
-          <a:p>
-            <a:pPr algn="ctr"/>
-            <a:endParaRPr lang="zh-CN" altLang="en-US"/>
-          </a:p>
-        </p:txBody>
-      </p:sp>
-      <p:sp>
-        <p:nvSpPr>
-          <p:cNvPr id="11" name="TextBox 10"/>
-          <p:cNvSpPr txBox="1"/>
-          <p:nvPr/>
-        </p:nvSpPr>
-        <p:spPr>
-          <a:xfrm>
-            <a:off x="1152497" y="4740321"/>
-            <a:ext cx="323165" cy="617658"/>
-          </a:xfrm>
-          <a:prstGeom prst="rect">
-            <a:avLst/>
-          </a:prstGeom>
-          <a:noFill/>
-        </p:spPr>
-        <p:txBody>
-          <a:bodyPr vert="eaVert" wrap="square" rtlCol="0">
-            <a:spAutoFit/>
-          </a:bodyPr>
-          <a:lstStyle/>
-          <a:p>
-            <a:r>
-              <a:rPr lang="zh-CN" altLang="en-US" sz="900" dirty="0"/>
-              <a:t>条</a:t>
-            </a:r>
-            <a:r>
-              <a:rPr lang="zh-CN" altLang="en-US" sz="900" dirty="0" smtClean="0"/>
-              <a:t>纹去除</a:t>
-            </a:r>
-            <a:endParaRPr lang="zh-CN" altLang="en-US" sz="900" dirty="0"/>
-          </a:p>
-        </p:txBody>
-      </p:sp>
       <p:pic>
         <p:nvPicPr>
-          <p:cNvPr id="14" name="Picture 3"/>
+          <p:cNvPr id="2050" name="Picture 2"/>
           <p:cNvPicPr>
             <a:picLocks noChangeAspect="1" noChangeArrowheads="1"/>
           </p:cNvPicPr>
           <p:nvPr/>
         </p:nvPicPr>
-        <p:blipFill>
-          <a:blip r:embed="rId5" cstate="print">
+        <p:blipFill rotWithShape="1">
+          <a:blip r:embed="rId6" cstate="print">
             <a:extLst>
               <a:ext uri="{28A0092B-C50C-407E-A947-70E740481C1C}">
                 <a14:useLocalDpi xmlns:a14="http://schemas.microsoft.com/office/drawing/2010/main" val="0"/>
               </a:ext>
             </a:extLst>
           </a:blip>
-          <a:srcRect/>
-          <a:stretch>
-            <a:fillRect/>
-          </a:stretch>
+          <a:srcRect l="32338" t="35953" r="32338" b="31832"/>
+          <a:stretch/>
         </p:blipFill>
         <p:spPr bwMode="auto">
           <a:xfrm>
-            <a:off x="3170149" y="3989283"/>
-            <a:ext cx="611126" cy="423477"/>
+            <a:off x="7996840" y="2316586"/>
+            <a:ext cx="588529" cy="678391"/>
           </a:xfrm>
           <a:prstGeom prst="rect">
             <a:avLst/>
@@ -5663,6 +5346,368 @@
           </a:extLst>
         </p:spPr>
       </p:pic>
+      <p:pic>
+        <p:nvPicPr>
+          <p:cNvPr id="2052" name="Picture 4"/>
+          <p:cNvPicPr>
+            <a:picLocks noChangeAspect="1" noChangeArrowheads="1"/>
+          </p:cNvPicPr>
+          <p:nvPr/>
+        </p:nvPicPr>
+        <p:blipFill rotWithShape="1">
+          <a:blip r:embed="rId7">
+            <a:extLst>
+              <a:ext uri="{28A0092B-C50C-407E-A947-70E740481C1C}">
+                <a14:useLocalDpi xmlns:a14="http://schemas.microsoft.com/office/drawing/2010/main" val="0"/>
+              </a:ext>
+            </a:extLst>
+          </a:blip>
+          <a:srcRect r="20244" b="8892"/>
+          <a:stretch/>
+        </p:blipFill>
+        <p:spPr bwMode="auto">
+          <a:xfrm>
+            <a:off x="5623665" y="1337402"/>
+            <a:ext cx="633875" cy="700227"/>
+          </a:xfrm>
+          <a:prstGeom prst="rect">
+            <a:avLst/>
+          </a:prstGeom>
+          <a:noFill/>
+          <a:ln>
+            <a:noFill/>
+          </a:ln>
+          <a:extLst>
+            <a:ext uri="{909E8E84-426E-40DD-AFC4-6F175D3DCCD1}">
+              <a14:hiddenFill xmlns:a14="http://schemas.microsoft.com/office/drawing/2010/main">
+                <a:solidFill>
+                  <a:schemeClr val="accent1"/>
+                </a:solidFill>
+              </a14:hiddenFill>
+            </a:ext>
+            <a:ext uri="{91240B29-F687-4F45-9708-019B960494DF}">
+              <a14:hiddenLine xmlns:a14="http://schemas.microsoft.com/office/drawing/2010/main" w="9525">
+                <a:solidFill>
+                  <a:schemeClr val="tx1"/>
+                </a:solidFill>
+                <a:miter lim="800000"/>
+                <a:headEnd/>
+                <a:tailEnd/>
+              </a14:hiddenLine>
+            </a:ext>
+          </a:extLst>
+        </p:spPr>
+      </p:pic>
+      <p:sp>
+        <p:nvSpPr>
+          <p:cNvPr id="6" name="矩形 5"/>
+          <p:cNvSpPr/>
+          <p:nvPr/>
+        </p:nvSpPr>
+        <p:spPr>
+          <a:xfrm>
+            <a:off x="7956982" y="2295742"/>
+            <a:ext cx="1080120" cy="720080"/>
+          </a:xfrm>
+          <a:prstGeom prst="rect">
+            <a:avLst/>
+          </a:prstGeom>
+          <a:noFill/>
+          <a:ln w="76200">
+            <a:solidFill>
+              <a:schemeClr val="tx1"/>
+            </a:solidFill>
+          </a:ln>
+        </p:spPr>
+        <p:style>
+          <a:lnRef idx="2">
+            <a:schemeClr val="accent1">
+              <a:shade val="50000"/>
+            </a:schemeClr>
+          </a:lnRef>
+          <a:fillRef idx="1">
+            <a:schemeClr val="accent1"/>
+          </a:fillRef>
+          <a:effectRef idx="0">
+            <a:schemeClr val="accent1"/>
+          </a:effectRef>
+          <a:fontRef idx="minor">
+            <a:schemeClr val="lt1"/>
+          </a:fontRef>
+        </p:style>
+        <p:txBody>
+          <a:bodyPr rtlCol="0" anchor="ctr"/>
+          <a:lstStyle/>
+          <a:p>
+            <a:pPr algn="ctr"/>
+            <a:endParaRPr lang="zh-CN" altLang="en-US"/>
+          </a:p>
+        </p:txBody>
+      </p:sp>
+      <p:sp>
+        <p:nvSpPr>
+          <p:cNvPr id="7" name="梯形 6"/>
+          <p:cNvSpPr/>
+          <p:nvPr/>
+        </p:nvSpPr>
+        <p:spPr>
+          <a:xfrm>
+            <a:off x="8245014" y="3015822"/>
+            <a:ext cx="504056" cy="216024"/>
+          </a:xfrm>
+          <a:prstGeom prst="trapezoid">
+            <a:avLst/>
+          </a:prstGeom>
+          <a:solidFill>
+            <a:schemeClr val="bg1"/>
+          </a:solidFill>
+          <a:ln w="19050">
+            <a:solidFill>
+              <a:schemeClr val="tx1"/>
+            </a:solidFill>
+          </a:ln>
+        </p:spPr>
+        <p:style>
+          <a:lnRef idx="2">
+            <a:schemeClr val="accent1">
+              <a:shade val="50000"/>
+            </a:schemeClr>
+          </a:lnRef>
+          <a:fillRef idx="1">
+            <a:schemeClr val="accent1"/>
+          </a:fillRef>
+          <a:effectRef idx="0">
+            <a:schemeClr val="accent1"/>
+          </a:effectRef>
+          <a:fontRef idx="minor">
+            <a:schemeClr val="lt1"/>
+          </a:fontRef>
+        </p:style>
+        <p:txBody>
+          <a:bodyPr rtlCol="0" anchor="ctr"/>
+          <a:lstStyle/>
+          <a:p>
+            <a:pPr algn="ctr"/>
+            <a:endParaRPr lang="zh-CN" altLang="en-US"/>
+          </a:p>
+        </p:txBody>
+      </p:sp>
+      <p:sp>
+        <p:nvSpPr>
+          <p:cNvPr id="8" name="TextBox 7"/>
+          <p:cNvSpPr txBox="1"/>
+          <p:nvPr/>
+        </p:nvSpPr>
+        <p:spPr>
+          <a:xfrm>
+            <a:off x="8641935" y="2403754"/>
+            <a:ext cx="323165" cy="617658"/>
+          </a:xfrm>
+          <a:prstGeom prst="rect">
+            <a:avLst/>
+          </a:prstGeom>
+          <a:noFill/>
+        </p:spPr>
+        <p:txBody>
+          <a:bodyPr vert="eaVert" wrap="square" rtlCol="0">
+            <a:spAutoFit/>
+          </a:bodyPr>
+          <a:lstStyle/>
+          <a:p>
+            <a:r>
+              <a:rPr lang="zh-CN" altLang="en-US" sz="900" dirty="0"/>
+              <a:t>数</a:t>
+            </a:r>
+            <a:r>
+              <a:rPr lang="zh-CN" altLang="en-US" sz="900" dirty="0" smtClean="0"/>
+              <a:t>字相移</a:t>
+            </a:r>
+            <a:endParaRPr lang="zh-CN" altLang="en-US" sz="900" dirty="0"/>
+          </a:p>
+        </p:txBody>
+      </p:sp>
+      <p:sp>
+        <p:nvSpPr>
+          <p:cNvPr id="9" name="矩形 8"/>
+          <p:cNvSpPr/>
+          <p:nvPr/>
+        </p:nvSpPr>
+        <p:spPr>
+          <a:xfrm>
+            <a:off x="7572354" y="4265070"/>
+            <a:ext cx="1080120" cy="720080"/>
+          </a:xfrm>
+          <a:prstGeom prst="rect">
+            <a:avLst/>
+          </a:prstGeom>
+          <a:noFill/>
+          <a:ln w="76200">
+            <a:solidFill>
+              <a:schemeClr val="tx1"/>
+            </a:solidFill>
+          </a:ln>
+        </p:spPr>
+        <p:style>
+          <a:lnRef idx="2">
+            <a:schemeClr val="accent1">
+              <a:shade val="50000"/>
+            </a:schemeClr>
+          </a:lnRef>
+          <a:fillRef idx="1">
+            <a:schemeClr val="accent1"/>
+          </a:fillRef>
+          <a:effectRef idx="0">
+            <a:schemeClr val="accent1"/>
+          </a:effectRef>
+          <a:fontRef idx="minor">
+            <a:schemeClr val="lt1"/>
+          </a:fontRef>
+        </p:style>
+        <p:txBody>
+          <a:bodyPr rtlCol="0" anchor="ctr"/>
+          <a:lstStyle/>
+          <a:p>
+            <a:pPr algn="ctr"/>
+            <a:endParaRPr lang="zh-CN" altLang="en-US"/>
+          </a:p>
+        </p:txBody>
+      </p:sp>
+      <p:sp>
+        <p:nvSpPr>
+          <p:cNvPr id="10" name="梯形 9"/>
+          <p:cNvSpPr/>
+          <p:nvPr/>
+        </p:nvSpPr>
+        <p:spPr>
+          <a:xfrm>
+            <a:off x="7860386" y="4985150"/>
+            <a:ext cx="504056" cy="216024"/>
+          </a:xfrm>
+          <a:prstGeom prst="trapezoid">
+            <a:avLst/>
+          </a:prstGeom>
+          <a:solidFill>
+            <a:schemeClr val="bg1"/>
+          </a:solidFill>
+          <a:ln w="19050">
+            <a:solidFill>
+              <a:schemeClr val="tx1"/>
+            </a:solidFill>
+          </a:ln>
+        </p:spPr>
+        <p:style>
+          <a:lnRef idx="2">
+            <a:schemeClr val="accent1">
+              <a:shade val="50000"/>
+            </a:schemeClr>
+          </a:lnRef>
+          <a:fillRef idx="1">
+            <a:schemeClr val="accent1"/>
+          </a:fillRef>
+          <a:effectRef idx="0">
+            <a:schemeClr val="accent1"/>
+          </a:effectRef>
+          <a:fontRef idx="minor">
+            <a:schemeClr val="lt1"/>
+          </a:fontRef>
+        </p:style>
+        <p:txBody>
+          <a:bodyPr rtlCol="0" anchor="ctr"/>
+          <a:lstStyle/>
+          <a:p>
+            <a:pPr algn="ctr"/>
+            <a:endParaRPr lang="zh-CN" altLang="en-US"/>
+          </a:p>
+        </p:txBody>
+      </p:sp>
+      <p:sp>
+        <p:nvSpPr>
+          <p:cNvPr id="11" name="TextBox 10"/>
+          <p:cNvSpPr txBox="1"/>
+          <p:nvPr/>
+        </p:nvSpPr>
+        <p:spPr>
+          <a:xfrm>
+            <a:off x="8257307" y="4373082"/>
+            <a:ext cx="323165" cy="617658"/>
+          </a:xfrm>
+          <a:prstGeom prst="rect">
+            <a:avLst/>
+          </a:prstGeom>
+          <a:noFill/>
+        </p:spPr>
+        <p:txBody>
+          <a:bodyPr vert="eaVert" wrap="square" rtlCol="0">
+            <a:spAutoFit/>
+          </a:bodyPr>
+          <a:lstStyle/>
+          <a:p>
+            <a:r>
+              <a:rPr lang="zh-CN" altLang="en-US" sz="900" dirty="0"/>
+              <a:t>条</a:t>
+            </a:r>
+            <a:r>
+              <a:rPr lang="zh-CN" altLang="en-US" sz="900" dirty="0" smtClean="0"/>
+              <a:t>纹去除</a:t>
+            </a:r>
+            <a:endParaRPr lang="zh-CN" altLang="en-US" sz="900" dirty="0"/>
+          </a:p>
+        </p:txBody>
+      </p:sp>
+      <p:pic>
+        <p:nvPicPr>
+          <p:cNvPr id="14" name="Picture 3"/>
+          <p:cNvPicPr>
+            <a:picLocks noChangeAspect="1" noChangeArrowheads="1"/>
+          </p:cNvPicPr>
+          <p:nvPr/>
+        </p:nvPicPr>
+        <p:blipFill>
+          <a:blip r:embed="rId8" cstate="print">
+            <a:extLst>
+              <a:ext uri="{28A0092B-C50C-407E-A947-70E740481C1C}">
+                <a14:useLocalDpi xmlns:a14="http://schemas.microsoft.com/office/drawing/2010/main" val="0"/>
+              </a:ext>
+            </a:extLst>
+          </a:blip>
+          <a:srcRect/>
+          <a:stretch>
+            <a:fillRect/>
+          </a:stretch>
+        </p:blipFill>
+        <p:spPr bwMode="auto">
+          <a:xfrm>
+            <a:off x="4491334" y="2205651"/>
+            <a:ext cx="611126" cy="423477"/>
+          </a:xfrm>
+          <a:prstGeom prst="rect">
+            <a:avLst/>
+          </a:prstGeom>
+          <a:noFill/>
+          <a:ln>
+            <a:noFill/>
+          </a:ln>
+          <a:extLst>
+            <a:ext uri="{909E8E84-426E-40DD-AFC4-6F175D3DCCD1}">
+              <a14:hiddenFill xmlns:a14="http://schemas.microsoft.com/office/drawing/2010/main">
+                <a:solidFill>
+                  <a:schemeClr val="accent1"/>
+                </a:solidFill>
+              </a14:hiddenFill>
+            </a:ext>
+            <a:ext uri="{91240B29-F687-4F45-9708-019B960494DF}">
+              <a14:hiddenLine xmlns:a14="http://schemas.microsoft.com/office/drawing/2010/main" w="9525">
+                <a:solidFill>
+                  <a:schemeClr val="tx1"/>
+                </a:solidFill>
+                <a:miter lim="800000"/>
+                <a:headEnd/>
+                <a:tailEnd/>
+              </a14:hiddenLine>
+            </a:ext>
+          </a:extLst>
+        </p:spPr>
+      </p:pic>
       <p:sp>
         <p:nvSpPr>
           <p:cNvPr id="13" name="任意多边形 12"/>
@@ -5671,7 +5716,7 @@
         </p:nvSpPr>
         <p:spPr>
           <a:xfrm>
-            <a:off x="4215446" y="2760685"/>
+            <a:off x="5536631" y="977053"/>
             <a:ext cx="346006" cy="369522"/>
           </a:xfrm>
           <a:custGeom>
@@ -5775,7 +5820,7 @@
         </p:nvSpPr>
         <p:spPr>
           <a:xfrm>
-            <a:off x="4020079" y="3821261"/>
+            <a:off x="5341264" y="2037629"/>
             <a:ext cx="390734" cy="899478"/>
           </a:xfrm>
           <a:custGeom>
@@ -5859,7 +5904,7 @@
         </p:nvSpPr>
         <p:spPr>
           <a:xfrm>
-            <a:off x="3555003" y="4393909"/>
+            <a:off x="4876188" y="2610277"/>
             <a:ext cx="561372" cy="225128"/>
           </a:xfrm>
           <a:prstGeom prst="roundRect">
@@ -5907,7 +5952,7 @@
         </p:nvSpPr>
         <p:spPr>
           <a:xfrm>
-            <a:off x="4266797" y="3124740"/>
+            <a:off x="5587982" y="1341108"/>
             <a:ext cx="1080120" cy="720080"/>
           </a:xfrm>
           <a:prstGeom prst="rect">
@@ -5953,7 +5998,7 @@
         </p:nvSpPr>
         <p:spPr>
           <a:xfrm>
-            <a:off x="4554829" y="3844820"/>
+            <a:off x="5876014" y="2061188"/>
             <a:ext cx="504056" cy="216024"/>
           </a:xfrm>
           <a:prstGeom prst="trapezoid">
@@ -6001,7 +6046,7 @@
         </p:nvSpPr>
         <p:spPr>
           <a:xfrm>
-            <a:off x="3717021" y="4283667"/>
+            <a:off x="5038206" y="2500035"/>
             <a:ext cx="200490" cy="244387"/>
           </a:xfrm>
           <a:prstGeom prst="ellipse">
@@ -6049,7 +6094,7 @@
         </p:nvSpPr>
         <p:spPr>
           <a:xfrm>
-            <a:off x="4951748" y="3232752"/>
+            <a:off x="6272933" y="1449120"/>
             <a:ext cx="323165" cy="617658"/>
           </a:xfrm>
           <a:prstGeom prst="rect">
@@ -6079,7 +6124,7 @@
         </p:nvSpPr>
         <p:spPr>
           <a:xfrm>
-            <a:off x="3999422" y="2526527"/>
+            <a:off x="5371958" y="794893"/>
             <a:ext cx="432048" cy="271527"/>
           </a:xfrm>
           <a:prstGeom prst="roundRect">
@@ -6127,7 +6172,7 @@
         </p:nvSpPr>
         <p:spPr>
           <a:xfrm>
-            <a:off x="4128412" y="2586090"/>
+            <a:off x="5500948" y="854456"/>
             <a:ext cx="174068" cy="152400"/>
           </a:xfrm>
           <a:prstGeom prst="ellipse">
@@ -6173,7 +6218,7 @@
         </p:nvSpPr>
         <p:spPr>
           <a:xfrm>
-            <a:off x="4256760" y="2454519"/>
+            <a:off x="5629296" y="722885"/>
             <a:ext cx="102702" cy="72008"/>
           </a:xfrm>
           <a:prstGeom prst="rect">
@@ -6219,7 +6264,7 @@
         </p:nvSpPr>
         <p:spPr>
           <a:xfrm>
-            <a:off x="2213527" y="2208246"/>
+            <a:off x="3534711" y="424612"/>
             <a:ext cx="3407967" cy="2666674"/>
           </a:xfrm>
           <a:prstGeom prst="rect">
@@ -6266,7 +6311,7 @@
         </p:nvSpPr>
         <p:spPr>
           <a:xfrm>
-            <a:off x="3038601" y="4393909"/>
+            <a:off x="4359786" y="2610277"/>
             <a:ext cx="797088" cy="230832"/>
           </a:xfrm>
           <a:prstGeom prst="rect">
@@ -6296,7 +6341,7 @@
         </p:nvSpPr>
         <p:spPr>
           <a:xfrm>
-            <a:off x="3665721" y="2263670"/>
+            <a:off x="5341264" y="511973"/>
             <a:ext cx="797088" cy="230832"/>
           </a:xfrm>
           <a:prstGeom prst="rect">
@@ -6318,16 +6363,80 @@
           </a:p>
         </p:txBody>
       </p:sp>
+      <p:sp>
+        <p:nvSpPr>
+          <p:cNvPr id="3" name="TextBox 2"/>
+          <p:cNvSpPr txBox="1"/>
+          <p:nvPr/>
+        </p:nvSpPr>
+        <p:spPr>
+          <a:xfrm>
+            <a:off x="4115985" y="613276"/>
+            <a:ext cx="733826" cy="230832"/>
+          </a:xfrm>
+          <a:prstGeom prst="rect">
+            <a:avLst/>
+          </a:prstGeom>
+          <a:noFill/>
+        </p:spPr>
+        <p:txBody>
+          <a:bodyPr wrap="square" rtlCol="0">
+            <a:spAutoFit/>
+          </a:bodyPr>
+          <a:lstStyle/>
+          <a:p>
+            <a:r>
+              <a:rPr lang="zh-CN" altLang="en-US" sz="900" dirty="0"/>
+              <a:t>被</a:t>
+            </a:r>
+            <a:r>
+              <a:rPr lang="zh-CN" altLang="en-US" sz="900" dirty="0" smtClean="0"/>
+              <a:t>测物体</a:t>
+            </a:r>
+            <a:endParaRPr lang="zh-CN" altLang="en-US" sz="900" dirty="0"/>
+          </a:p>
+        </p:txBody>
+      </p:sp>
+      <p:sp>
+        <p:nvSpPr>
+          <p:cNvPr id="47" name="TextBox 46"/>
+          <p:cNvSpPr txBox="1"/>
+          <p:nvPr/>
+        </p:nvSpPr>
+        <p:spPr>
+          <a:xfrm>
+            <a:off x="4201003" y="1959430"/>
+            <a:ext cx="733826" cy="230832"/>
+          </a:xfrm>
+          <a:prstGeom prst="rect">
+            <a:avLst/>
+          </a:prstGeom>
+          <a:noFill/>
+        </p:spPr>
+        <p:txBody>
+          <a:bodyPr wrap="square" rtlCol="0">
+            <a:spAutoFit/>
+          </a:bodyPr>
+          <a:lstStyle/>
+          <a:p>
+            <a:r>
+              <a:rPr lang="zh-CN" altLang="en-US" sz="900" dirty="0" smtClean="0"/>
+              <a:t>投影条纹</a:t>
+            </a:r>
+            <a:endParaRPr lang="zh-CN" altLang="en-US" sz="900" dirty="0"/>
+          </a:p>
+        </p:txBody>
+      </p:sp>
       <p:pic>
         <p:nvPicPr>
-          <p:cNvPr id="2051" name="Picture 3"/>
-          <p:cNvPicPr preferRelativeResize="0">
-            <a:picLocks noChangeArrowheads="1"/>
+          <p:cNvPr id="48" name="Picture 3"/>
+          <p:cNvPicPr>
+            <a:picLocks noChangeAspect="1" noChangeArrowheads="1"/>
           </p:cNvPicPr>
           <p:nvPr/>
         </p:nvPicPr>
         <p:blipFill>
-          <a:blip r:embed="rId4">
+          <a:blip r:embed="rId8" cstate="print">
             <a:extLst>
               <a:ext uri="{28A0092B-C50C-407E-A947-70E740481C1C}">
                 <a14:useLocalDpi xmlns:a14="http://schemas.microsoft.com/office/drawing/2010/main" val="0"/>
@@ -6341,8 +6450,8 @@
         </p:blipFill>
         <p:spPr bwMode="auto">
           <a:xfrm>
-            <a:off x="2615132" y="2815340"/>
-            <a:ext cx="1110034" cy="611387"/>
+            <a:off x="7509801" y="1216491"/>
+            <a:ext cx="611126" cy="423477"/>
           </a:xfrm>
           <a:prstGeom prst="rect">
             <a:avLst/>
@@ -6372,95 +6481,29 @@
           </a:extLst>
         </p:spPr>
       </p:pic>
-      <p:sp>
-        <p:nvSpPr>
-          <p:cNvPr id="3" name="TextBox 2"/>
-          <p:cNvSpPr txBox="1"/>
-          <p:nvPr/>
-        </p:nvSpPr>
-        <p:spPr>
-          <a:xfrm>
-            <a:off x="2411761" y="2569119"/>
-            <a:ext cx="733826" cy="230832"/>
-          </a:xfrm>
-          <a:prstGeom prst="rect">
-            <a:avLst/>
-          </a:prstGeom>
-          <a:noFill/>
-        </p:spPr>
-        <p:txBody>
-          <a:bodyPr wrap="square" rtlCol="0">
-            <a:spAutoFit/>
-          </a:bodyPr>
-          <a:lstStyle/>
-          <a:p>
-            <a:r>
-              <a:rPr lang="zh-CN" altLang="en-US" sz="900" dirty="0"/>
-              <a:t>被</a:t>
-            </a:r>
-            <a:r>
-              <a:rPr lang="zh-CN" altLang="en-US" sz="900" dirty="0" smtClean="0"/>
-              <a:t>测物体</a:t>
-            </a:r>
-            <a:endParaRPr lang="zh-CN" altLang="en-US" sz="900" dirty="0"/>
-          </a:p>
-        </p:txBody>
-      </p:sp>
-      <p:sp>
-        <p:nvSpPr>
-          <p:cNvPr id="47" name="TextBox 46"/>
-          <p:cNvSpPr txBox="1"/>
-          <p:nvPr/>
-        </p:nvSpPr>
-        <p:spPr>
-          <a:xfrm>
-            <a:off x="2879818" y="3743062"/>
-            <a:ext cx="733826" cy="230832"/>
-          </a:xfrm>
-          <a:prstGeom prst="rect">
-            <a:avLst/>
-          </a:prstGeom>
-          <a:noFill/>
-        </p:spPr>
-        <p:txBody>
-          <a:bodyPr wrap="square" rtlCol="0">
-            <a:spAutoFit/>
-          </a:bodyPr>
-          <a:lstStyle/>
-          <a:p>
-            <a:r>
-              <a:rPr lang="zh-CN" altLang="en-US" sz="900" dirty="0" smtClean="0"/>
-              <a:t>投影条纹</a:t>
-            </a:r>
-            <a:endParaRPr lang="zh-CN" altLang="en-US" sz="900" dirty="0"/>
-          </a:p>
-        </p:txBody>
-      </p:sp>
       <p:pic>
         <p:nvPicPr>
-          <p:cNvPr id="48" name="Picture 3"/>
+          <p:cNvPr id="51" name="Picture 4"/>
           <p:cNvPicPr>
             <a:picLocks noChangeAspect="1" noChangeArrowheads="1"/>
           </p:cNvPicPr>
           <p:nvPr/>
         </p:nvPicPr>
-        <p:blipFill>
-          <a:blip r:embed="rId5" cstate="print">
+        <p:blipFill rotWithShape="1">
+          <a:blip r:embed="rId7">
             <a:extLst>
               <a:ext uri="{28A0092B-C50C-407E-A947-70E740481C1C}">
                 <a14:useLocalDpi xmlns:a14="http://schemas.microsoft.com/office/drawing/2010/main" val="0"/>
               </a:ext>
             </a:extLst>
           </a:blip>
-          <a:srcRect/>
-          <a:stretch>
-            <a:fillRect/>
-          </a:stretch>
+          <a:srcRect r="20244" b="8892"/>
+          <a:stretch/>
         </p:blipFill>
         <p:spPr bwMode="auto">
           <a:xfrm>
-            <a:off x="6141043" y="2586315"/>
-            <a:ext cx="611126" cy="423477"/>
+            <a:off x="8512701" y="1011762"/>
+            <a:ext cx="633875" cy="700227"/>
           </a:xfrm>
           <a:prstGeom prst="rect">
             <a:avLst/>
@@ -6490,29 +6533,679 @@
           </a:extLst>
         </p:spPr>
       </p:pic>
+      <p:sp>
+        <p:nvSpPr>
+          <p:cNvPr id="2053" name="右箭头 2052"/>
+          <p:cNvSpPr/>
+          <p:nvPr/>
+        </p:nvSpPr>
+        <p:spPr>
+          <a:xfrm rot="5400000">
+            <a:off x="8138684" y="1863228"/>
+            <a:ext cx="411374" cy="205687"/>
+          </a:xfrm>
+          <a:prstGeom prst="rightArrow">
+            <a:avLst/>
+          </a:prstGeom>
+          <a:solidFill>
+            <a:schemeClr val="bg1"/>
+          </a:solidFill>
+          <a:ln>
+            <a:solidFill>
+              <a:schemeClr val="tx1"/>
+            </a:solidFill>
+            <a:prstDash val="sysDot"/>
+          </a:ln>
+        </p:spPr>
+        <p:style>
+          <a:lnRef idx="2">
+            <a:schemeClr val="accent1">
+              <a:shade val="50000"/>
+            </a:schemeClr>
+          </a:lnRef>
+          <a:fillRef idx="1">
+            <a:schemeClr val="accent1"/>
+          </a:fillRef>
+          <a:effectRef idx="0">
+            <a:schemeClr val="accent1"/>
+          </a:effectRef>
+          <a:fontRef idx="minor">
+            <a:schemeClr val="lt1"/>
+          </a:fontRef>
+        </p:style>
+        <p:txBody>
+          <a:bodyPr rtlCol="0" anchor="ctr"/>
+          <a:lstStyle/>
+          <a:p>
+            <a:pPr algn="ctr"/>
+            <a:endParaRPr lang="zh-CN" altLang="en-US"/>
+          </a:p>
+        </p:txBody>
+      </p:sp>
+      <p:sp>
+        <p:nvSpPr>
+          <p:cNvPr id="2054" name="矩形 2053"/>
+          <p:cNvSpPr/>
+          <p:nvPr/>
+        </p:nvSpPr>
+        <p:spPr>
+          <a:xfrm>
+            <a:off x="7310366" y="422768"/>
+            <a:ext cx="2232248" cy="3384376"/>
+          </a:xfrm>
+          <a:prstGeom prst="rect">
+            <a:avLst/>
+          </a:prstGeom>
+          <a:noFill/>
+          <a:ln>
+            <a:solidFill>
+              <a:schemeClr val="tx1"/>
+            </a:solidFill>
+            <a:prstDash val="sysDot"/>
+          </a:ln>
+        </p:spPr>
+        <p:style>
+          <a:lnRef idx="2">
+            <a:schemeClr val="accent1">
+              <a:shade val="50000"/>
+            </a:schemeClr>
+          </a:lnRef>
+          <a:fillRef idx="1">
+            <a:schemeClr val="accent1"/>
+          </a:fillRef>
+          <a:effectRef idx="0">
+            <a:schemeClr val="accent1"/>
+          </a:effectRef>
+          <a:fontRef idx="minor">
+            <a:schemeClr val="lt1"/>
+          </a:fontRef>
+        </p:style>
+        <p:txBody>
+          <a:bodyPr rtlCol="0" anchor="ctr"/>
+          <a:lstStyle/>
+          <a:p>
+            <a:pPr algn="ctr"/>
+            <a:endParaRPr lang="zh-CN" altLang="en-US"/>
+          </a:p>
+        </p:txBody>
+      </p:sp>
+      <p:sp>
+        <p:nvSpPr>
+          <p:cNvPr id="57" name="矩形 56"/>
+          <p:cNvSpPr/>
+          <p:nvPr/>
+        </p:nvSpPr>
+        <p:spPr>
+          <a:xfrm>
+            <a:off x="6050586" y="4254074"/>
+            <a:ext cx="1080120" cy="720080"/>
+          </a:xfrm>
+          <a:prstGeom prst="rect">
+            <a:avLst/>
+          </a:prstGeom>
+          <a:noFill/>
+          <a:ln w="76200">
+            <a:solidFill>
+              <a:schemeClr val="tx1"/>
+            </a:solidFill>
+          </a:ln>
+        </p:spPr>
+        <p:style>
+          <a:lnRef idx="2">
+            <a:schemeClr val="accent1">
+              <a:shade val="50000"/>
+            </a:schemeClr>
+          </a:lnRef>
+          <a:fillRef idx="1">
+            <a:schemeClr val="accent1"/>
+          </a:fillRef>
+          <a:effectRef idx="0">
+            <a:schemeClr val="accent1"/>
+          </a:effectRef>
+          <a:fontRef idx="minor">
+            <a:schemeClr val="lt1"/>
+          </a:fontRef>
+        </p:style>
+        <p:txBody>
+          <a:bodyPr rtlCol="0" anchor="ctr"/>
+          <a:lstStyle/>
+          <a:p>
+            <a:pPr algn="ctr"/>
+            <a:endParaRPr lang="zh-CN" altLang="en-US"/>
+          </a:p>
+        </p:txBody>
+      </p:sp>
+      <p:sp>
+        <p:nvSpPr>
+          <p:cNvPr id="58" name="梯形 57"/>
+          <p:cNvSpPr/>
+          <p:nvPr/>
+        </p:nvSpPr>
+        <p:spPr>
+          <a:xfrm>
+            <a:off x="6338618" y="4974154"/>
+            <a:ext cx="504056" cy="216024"/>
+          </a:xfrm>
+          <a:prstGeom prst="trapezoid">
+            <a:avLst/>
+          </a:prstGeom>
+          <a:solidFill>
+            <a:schemeClr val="bg1"/>
+          </a:solidFill>
+          <a:ln w="19050">
+            <a:solidFill>
+              <a:schemeClr val="tx1"/>
+            </a:solidFill>
+          </a:ln>
+        </p:spPr>
+        <p:style>
+          <a:lnRef idx="2">
+            <a:schemeClr val="accent1">
+              <a:shade val="50000"/>
+            </a:schemeClr>
+          </a:lnRef>
+          <a:fillRef idx="1">
+            <a:schemeClr val="accent1"/>
+          </a:fillRef>
+          <a:effectRef idx="0">
+            <a:schemeClr val="accent1"/>
+          </a:effectRef>
+          <a:fontRef idx="minor">
+            <a:schemeClr val="lt1"/>
+          </a:fontRef>
+        </p:style>
+        <p:txBody>
+          <a:bodyPr rtlCol="0" anchor="ctr"/>
+          <a:lstStyle/>
+          <a:p>
+            <a:pPr algn="ctr"/>
+            <a:endParaRPr lang="zh-CN" altLang="en-US"/>
+          </a:p>
+        </p:txBody>
+      </p:sp>
+      <p:sp>
+        <p:nvSpPr>
+          <p:cNvPr id="59" name="TextBox 58"/>
+          <p:cNvSpPr txBox="1"/>
+          <p:nvPr/>
+        </p:nvSpPr>
+        <p:spPr>
+          <a:xfrm>
+            <a:off x="6735539" y="4362086"/>
+            <a:ext cx="323165" cy="617658"/>
+          </a:xfrm>
+          <a:prstGeom prst="rect">
+            <a:avLst/>
+          </a:prstGeom>
+          <a:noFill/>
+        </p:spPr>
+        <p:txBody>
+          <a:bodyPr vert="eaVert" wrap="square" rtlCol="0">
+            <a:spAutoFit/>
+          </a:bodyPr>
+          <a:lstStyle/>
+          <a:p>
+            <a:r>
+              <a:rPr lang="zh-CN" altLang="en-US" sz="900" dirty="0" smtClean="0"/>
+              <a:t>相位提取</a:t>
+            </a:r>
+            <a:endParaRPr lang="zh-CN" altLang="en-US" sz="900" dirty="0"/>
+          </a:p>
+        </p:txBody>
+      </p:sp>
+      <p:sp>
+        <p:nvSpPr>
+          <p:cNvPr id="61" name="矩形 60"/>
+          <p:cNvSpPr/>
+          <p:nvPr/>
+        </p:nvSpPr>
+        <p:spPr>
+          <a:xfrm>
+            <a:off x="4559835" y="4242523"/>
+            <a:ext cx="1080120" cy="720080"/>
+          </a:xfrm>
+          <a:prstGeom prst="rect">
+            <a:avLst/>
+          </a:prstGeom>
+          <a:noFill/>
+          <a:ln w="76200">
+            <a:solidFill>
+              <a:schemeClr val="tx1"/>
+            </a:solidFill>
+          </a:ln>
+        </p:spPr>
+        <p:style>
+          <a:lnRef idx="2">
+            <a:schemeClr val="accent1">
+              <a:shade val="50000"/>
+            </a:schemeClr>
+          </a:lnRef>
+          <a:fillRef idx="1">
+            <a:schemeClr val="accent1"/>
+          </a:fillRef>
+          <a:effectRef idx="0">
+            <a:schemeClr val="accent1"/>
+          </a:effectRef>
+          <a:fontRef idx="minor">
+            <a:schemeClr val="lt1"/>
+          </a:fontRef>
+        </p:style>
+        <p:txBody>
+          <a:bodyPr rtlCol="0" anchor="ctr"/>
+          <a:lstStyle/>
+          <a:p>
+            <a:pPr algn="ctr"/>
+            <a:endParaRPr lang="zh-CN" altLang="en-US"/>
+          </a:p>
+        </p:txBody>
+      </p:sp>
+      <p:sp>
+        <p:nvSpPr>
+          <p:cNvPr id="62" name="梯形 61"/>
+          <p:cNvSpPr/>
+          <p:nvPr/>
+        </p:nvSpPr>
+        <p:spPr>
+          <a:xfrm>
+            <a:off x="4847867" y="4962603"/>
+            <a:ext cx="504056" cy="216024"/>
+          </a:xfrm>
+          <a:prstGeom prst="trapezoid">
+            <a:avLst/>
+          </a:prstGeom>
+          <a:solidFill>
+            <a:schemeClr val="bg1"/>
+          </a:solidFill>
+          <a:ln w="19050">
+            <a:solidFill>
+              <a:schemeClr val="tx1"/>
+            </a:solidFill>
+          </a:ln>
+        </p:spPr>
+        <p:style>
+          <a:lnRef idx="2">
+            <a:schemeClr val="accent1">
+              <a:shade val="50000"/>
+            </a:schemeClr>
+          </a:lnRef>
+          <a:fillRef idx="1">
+            <a:schemeClr val="accent1"/>
+          </a:fillRef>
+          <a:effectRef idx="0">
+            <a:schemeClr val="accent1"/>
+          </a:effectRef>
+          <a:fontRef idx="minor">
+            <a:schemeClr val="lt1"/>
+          </a:fontRef>
+        </p:style>
+        <p:txBody>
+          <a:bodyPr rtlCol="0" anchor="ctr"/>
+          <a:lstStyle/>
+          <a:p>
+            <a:pPr algn="ctr"/>
+            <a:endParaRPr lang="zh-CN" altLang="en-US"/>
+          </a:p>
+        </p:txBody>
+      </p:sp>
+      <p:sp>
+        <p:nvSpPr>
+          <p:cNvPr id="63" name="TextBox 62"/>
+          <p:cNvSpPr txBox="1"/>
+          <p:nvPr/>
+        </p:nvSpPr>
+        <p:spPr>
+          <a:xfrm>
+            <a:off x="5244792" y="4350535"/>
+            <a:ext cx="323165" cy="617658"/>
+          </a:xfrm>
+          <a:prstGeom prst="rect">
+            <a:avLst/>
+          </a:prstGeom>
+          <a:noFill/>
+        </p:spPr>
+        <p:txBody>
+          <a:bodyPr vert="eaVert" wrap="square" rtlCol="0">
+            <a:spAutoFit/>
+          </a:bodyPr>
+          <a:lstStyle/>
+          <a:p>
+            <a:r>
+              <a:rPr lang="zh-CN" altLang="en-US" sz="900" dirty="0" smtClean="0"/>
+              <a:t>相位展开</a:t>
+            </a:r>
+            <a:endParaRPr lang="zh-CN" altLang="en-US" sz="900" dirty="0"/>
+          </a:p>
+        </p:txBody>
+      </p:sp>
+      <p:sp>
+        <p:nvSpPr>
+          <p:cNvPr id="65" name="矩形 64"/>
+          <p:cNvSpPr/>
+          <p:nvPr/>
+        </p:nvSpPr>
+        <p:spPr>
+          <a:xfrm>
+            <a:off x="2976036" y="4242523"/>
+            <a:ext cx="1080120" cy="720080"/>
+          </a:xfrm>
+          <a:prstGeom prst="rect">
+            <a:avLst/>
+          </a:prstGeom>
+          <a:noFill/>
+          <a:ln w="76200">
+            <a:solidFill>
+              <a:schemeClr val="tx1"/>
+            </a:solidFill>
+          </a:ln>
+        </p:spPr>
+        <p:style>
+          <a:lnRef idx="2">
+            <a:schemeClr val="accent1">
+              <a:shade val="50000"/>
+            </a:schemeClr>
+          </a:lnRef>
+          <a:fillRef idx="1">
+            <a:schemeClr val="accent1"/>
+          </a:fillRef>
+          <a:effectRef idx="0">
+            <a:schemeClr val="accent1"/>
+          </a:effectRef>
+          <a:fontRef idx="minor">
+            <a:schemeClr val="lt1"/>
+          </a:fontRef>
+        </p:style>
+        <p:txBody>
+          <a:bodyPr rtlCol="0" anchor="ctr"/>
+          <a:lstStyle/>
+          <a:p>
+            <a:pPr algn="ctr"/>
+            <a:endParaRPr lang="zh-CN" altLang="en-US"/>
+          </a:p>
+        </p:txBody>
+      </p:sp>
+      <p:sp>
+        <p:nvSpPr>
+          <p:cNvPr id="66" name="梯形 65"/>
+          <p:cNvSpPr/>
+          <p:nvPr/>
+        </p:nvSpPr>
+        <p:spPr>
+          <a:xfrm>
+            <a:off x="3264068" y="4962603"/>
+            <a:ext cx="504056" cy="216024"/>
+          </a:xfrm>
+          <a:prstGeom prst="trapezoid">
+            <a:avLst/>
+          </a:prstGeom>
+          <a:solidFill>
+            <a:schemeClr val="bg1"/>
+          </a:solidFill>
+          <a:ln w="19050">
+            <a:solidFill>
+              <a:schemeClr val="tx1"/>
+            </a:solidFill>
+          </a:ln>
+        </p:spPr>
+        <p:style>
+          <a:lnRef idx="2">
+            <a:schemeClr val="accent1">
+              <a:shade val="50000"/>
+            </a:schemeClr>
+          </a:lnRef>
+          <a:fillRef idx="1">
+            <a:schemeClr val="accent1"/>
+          </a:fillRef>
+          <a:effectRef idx="0">
+            <a:schemeClr val="accent1"/>
+          </a:effectRef>
+          <a:fontRef idx="minor">
+            <a:schemeClr val="lt1"/>
+          </a:fontRef>
+        </p:style>
+        <p:txBody>
+          <a:bodyPr rtlCol="0" anchor="ctr"/>
+          <a:lstStyle/>
+          <a:p>
+            <a:pPr algn="ctr"/>
+            <a:endParaRPr lang="zh-CN" altLang="en-US"/>
+          </a:p>
+        </p:txBody>
+      </p:sp>
+      <p:sp>
+        <p:nvSpPr>
+          <p:cNvPr id="67" name="TextBox 66"/>
+          <p:cNvSpPr txBox="1"/>
+          <p:nvPr/>
+        </p:nvSpPr>
+        <p:spPr>
+          <a:xfrm>
+            <a:off x="3661009" y="4312354"/>
+            <a:ext cx="323165" cy="617658"/>
+          </a:xfrm>
+          <a:prstGeom prst="rect">
+            <a:avLst/>
+          </a:prstGeom>
+          <a:noFill/>
+        </p:spPr>
+        <p:txBody>
+          <a:bodyPr vert="eaVert" wrap="square" rtlCol="0">
+            <a:spAutoFit/>
+          </a:bodyPr>
+          <a:lstStyle/>
+          <a:p>
+            <a:r>
+              <a:rPr lang="zh-CN" altLang="en-US" sz="900" dirty="0" smtClean="0"/>
+              <a:t>高度转换</a:t>
+            </a:r>
+            <a:endParaRPr lang="zh-CN" altLang="en-US" sz="900" dirty="0"/>
+          </a:p>
+        </p:txBody>
+      </p:sp>
+      <p:sp>
+        <p:nvSpPr>
+          <p:cNvPr id="4" name="加号 3"/>
+          <p:cNvSpPr/>
+          <p:nvPr/>
+        </p:nvSpPr>
+        <p:spPr>
+          <a:xfrm>
+            <a:off x="8125830" y="1262522"/>
+            <a:ext cx="342766" cy="212288"/>
+          </a:xfrm>
+          <a:prstGeom prst="mathPlus">
+            <a:avLst/>
+          </a:prstGeom>
+          <a:solidFill>
+            <a:schemeClr val="tx1"/>
+          </a:solidFill>
+          <a:ln w="12700">
+            <a:noFill/>
+            <a:prstDash val="sysDot"/>
+          </a:ln>
+        </p:spPr>
+        <p:style>
+          <a:lnRef idx="2">
+            <a:schemeClr val="accent1">
+              <a:shade val="50000"/>
+            </a:schemeClr>
+          </a:lnRef>
+          <a:fillRef idx="1">
+            <a:schemeClr val="accent1"/>
+          </a:fillRef>
+          <a:effectRef idx="0">
+            <a:schemeClr val="accent1"/>
+          </a:effectRef>
+          <a:fontRef idx="minor">
+            <a:schemeClr val="lt1"/>
+          </a:fontRef>
+        </p:style>
+        <p:txBody>
+          <a:bodyPr rtlCol="0" anchor="ctr"/>
+          <a:lstStyle/>
+          <a:p>
+            <a:pPr algn="ctr"/>
+            <a:endParaRPr lang="zh-CN" altLang="en-US"/>
+          </a:p>
+        </p:txBody>
+      </p:sp>
       <p:pic>
         <p:nvPicPr>
-          <p:cNvPr id="51" name="Picture 4"/>
+          <p:cNvPr id="19" name="图片 18"/>
           <p:cNvPicPr>
-            <a:picLocks noChangeAspect="1" noChangeArrowheads="1"/>
+            <a:picLocks noChangeAspect="1"/>
           </p:cNvPicPr>
           <p:nvPr/>
         </p:nvPicPr>
         <p:blipFill rotWithShape="1">
-          <a:blip r:embed="rId4">
+          <a:blip r:embed="rId9" cstate="print">
             <a:extLst>
               <a:ext uri="{28A0092B-C50C-407E-A947-70E740481C1C}">
                 <a14:useLocalDpi xmlns:a14="http://schemas.microsoft.com/office/drawing/2010/main" val="0"/>
               </a:ext>
             </a:extLst>
           </a:blip>
-          <a:srcRect r="20244" b="8892"/>
+          <a:srcRect l="37384" t="24437" r="29760" b="19977"/>
           <a:stretch/>
         </p:blipFill>
+        <p:spPr>
+          <a:xfrm>
+            <a:off x="4184239" y="878658"/>
+            <a:ext cx="636609" cy="807785"/>
+          </a:xfrm>
+          <a:prstGeom prst="rect">
+            <a:avLst/>
+          </a:prstGeom>
+        </p:spPr>
+      </p:pic>
+      <p:sp>
+        <p:nvSpPr>
+          <p:cNvPr id="52" name="任意多边形 51"/>
+          <p:cNvSpPr/>
+          <p:nvPr/>
+        </p:nvSpPr>
+        <p:spPr>
+          <a:xfrm>
+            <a:off x="1739608" y="893287"/>
+            <a:ext cx="346006" cy="369522"/>
+          </a:xfrm>
+          <a:custGeom>
+            <a:avLst/>
+            <a:gdLst>
+              <a:gd name="connsiteX0" fmla="*/ 0 w 376314"/>
+              <a:gd name="connsiteY0" fmla="*/ 0 h 307876"/>
+              <a:gd name="connsiteX1" fmla="*/ 114300 w 376314"/>
+              <a:gd name="connsiteY1" fmla="*/ 149469 h 307876"/>
+              <a:gd name="connsiteX2" fmla="*/ 360485 w 376314"/>
+              <a:gd name="connsiteY2" fmla="*/ 70338 h 307876"/>
+              <a:gd name="connsiteX3" fmla="*/ 351693 w 376314"/>
+              <a:gd name="connsiteY3" fmla="*/ 272561 h 307876"/>
+              <a:gd name="connsiteX4" fmla="*/ 351693 w 376314"/>
+              <a:gd name="connsiteY4" fmla="*/ 307731 h 307876"/>
+            </a:gdLst>
+            <a:ahLst/>
+            <a:cxnLst>
+              <a:cxn ang="0">
+                <a:pos x="connsiteX0" y="connsiteY0"/>
+              </a:cxn>
+              <a:cxn ang="0">
+                <a:pos x="connsiteX1" y="connsiteY1"/>
+              </a:cxn>
+              <a:cxn ang="0">
+                <a:pos x="connsiteX2" y="connsiteY2"/>
+              </a:cxn>
+              <a:cxn ang="0">
+                <a:pos x="connsiteX3" y="connsiteY3"/>
+              </a:cxn>
+              <a:cxn ang="0">
+                <a:pos x="connsiteX4" y="connsiteY4"/>
+              </a:cxn>
+            </a:cxnLst>
+            <a:rect l="l" t="t" r="r" b="b"/>
+            <a:pathLst>
+              <a:path w="376314" h="307876">
+                <a:moveTo>
+                  <a:pt x="0" y="0"/>
+                </a:moveTo>
+                <a:cubicBezTo>
+                  <a:pt x="27109" y="68873"/>
+                  <a:pt x="54219" y="137746"/>
+                  <a:pt x="114300" y="149469"/>
+                </a:cubicBezTo>
+                <a:cubicBezTo>
+                  <a:pt x="174381" y="161192"/>
+                  <a:pt x="320920" y="49823"/>
+                  <a:pt x="360485" y="70338"/>
+                </a:cubicBezTo>
+                <a:cubicBezTo>
+                  <a:pt x="400050" y="90853"/>
+                  <a:pt x="353158" y="232996"/>
+                  <a:pt x="351693" y="272561"/>
+                </a:cubicBezTo>
+                <a:cubicBezTo>
+                  <a:pt x="350228" y="312126"/>
+                  <a:pt x="351693" y="307731"/>
+                  <a:pt x="351693" y="307731"/>
+                </a:cubicBezTo>
+              </a:path>
+            </a:pathLst>
+          </a:custGeom>
+          <a:noFill/>
+          <a:ln>
+            <a:solidFill>
+              <a:schemeClr val="tx1"/>
+            </a:solidFill>
+          </a:ln>
+        </p:spPr>
+        <p:style>
+          <a:lnRef idx="2">
+            <a:schemeClr val="accent1">
+              <a:shade val="50000"/>
+            </a:schemeClr>
+          </a:lnRef>
+          <a:fillRef idx="1">
+            <a:schemeClr val="accent1"/>
+          </a:fillRef>
+          <a:effectRef idx="0">
+            <a:schemeClr val="accent1"/>
+          </a:effectRef>
+          <a:fontRef idx="minor">
+            <a:schemeClr val="lt1"/>
+          </a:fontRef>
+        </p:style>
+        <p:txBody>
+          <a:bodyPr rtlCol="0" anchor="ctr"/>
+          <a:lstStyle/>
+          <a:p>
+            <a:pPr algn="ctr"/>
+            <a:endParaRPr lang="zh-CN" altLang="en-US"/>
+          </a:p>
+        </p:txBody>
+      </p:sp>
+      <p:pic>
+        <p:nvPicPr>
+          <p:cNvPr id="53" name="Picture 3"/>
+          <p:cNvPicPr>
+            <a:picLocks noChangeAspect="1" noChangeArrowheads="1"/>
+          </p:cNvPicPr>
+          <p:nvPr/>
+        </p:nvPicPr>
+        <p:blipFill>
+          <a:blip r:embed="rId8" cstate="print">
+            <a:extLst>
+              <a:ext uri="{28A0092B-C50C-407E-A947-70E740481C1C}">
+                <a14:useLocalDpi xmlns:a14="http://schemas.microsoft.com/office/drawing/2010/main" val="0"/>
+              </a:ext>
+            </a:extLst>
+          </a:blip>
+          <a:srcRect/>
+          <a:stretch>
+            <a:fillRect/>
+          </a:stretch>
+        </p:blipFill>
         <p:spPr bwMode="auto">
           <a:xfrm>
-            <a:off x="7143943" y="2381586"/>
-            <a:ext cx="633875" cy="700227"/>
+            <a:off x="1844600" y="1433383"/>
+            <a:ext cx="611126" cy="423477"/>
           </a:xfrm>
           <a:prstGeom prst="rect">
             <a:avLst/>
@@ -6544,16 +7237,671 @@
       </p:pic>
       <p:sp>
         <p:nvSpPr>
-          <p:cNvPr id="2053" name="右箭头 2052"/>
+          <p:cNvPr id="54" name="任意多边形 53"/>
           <p:cNvSpPr/>
           <p:nvPr/>
         </p:nvSpPr>
         <p:spPr>
-          <a:xfrm rot="5400000">
-            <a:off x="6769926" y="3233052"/>
-            <a:ext cx="411374" cy="205687"/>
-          </a:xfrm>
-          <a:prstGeom prst="rightArrow">
+          <a:xfrm>
+            <a:off x="1544241" y="1953863"/>
+            <a:ext cx="390734" cy="899478"/>
+          </a:xfrm>
+          <a:custGeom>
+            <a:avLst/>
+            <a:gdLst>
+              <a:gd name="connsiteX0" fmla="*/ 0 w 1266092"/>
+              <a:gd name="connsiteY0" fmla="*/ 729762 h 1139568"/>
+              <a:gd name="connsiteX1" fmla="*/ 1028700 w 1266092"/>
+              <a:gd name="connsiteY1" fmla="*/ 1107831 h 1139568"/>
+              <a:gd name="connsiteX2" fmla="*/ 1266092 w 1266092"/>
+              <a:gd name="connsiteY2" fmla="*/ 0 h 1139568"/>
+            </a:gdLst>
+            <a:ahLst/>
+            <a:cxnLst>
+              <a:cxn ang="0">
+                <a:pos x="connsiteX0" y="connsiteY0"/>
+              </a:cxn>
+              <a:cxn ang="0">
+                <a:pos x="connsiteX1" y="connsiteY1"/>
+              </a:cxn>
+              <a:cxn ang="0">
+                <a:pos x="connsiteX2" y="connsiteY2"/>
+              </a:cxn>
+            </a:cxnLst>
+            <a:rect l="l" t="t" r="r" b="b"/>
+            <a:pathLst>
+              <a:path w="1266092" h="1139568">
+                <a:moveTo>
+                  <a:pt x="0" y="729762"/>
+                </a:moveTo>
+                <a:cubicBezTo>
+                  <a:pt x="408842" y="979610"/>
+                  <a:pt x="817685" y="1229458"/>
+                  <a:pt x="1028700" y="1107831"/>
+                </a:cubicBezTo>
+                <a:cubicBezTo>
+                  <a:pt x="1239715" y="986204"/>
+                  <a:pt x="1219200" y="118696"/>
+                  <a:pt x="1266092" y="0"/>
+                </a:cubicBezTo>
+              </a:path>
+            </a:pathLst>
+          </a:custGeom>
+          <a:noFill/>
+          <a:ln>
+            <a:solidFill>
+              <a:schemeClr val="tx1"/>
+            </a:solidFill>
+          </a:ln>
+        </p:spPr>
+        <p:style>
+          <a:lnRef idx="2">
+            <a:schemeClr val="accent1">
+              <a:shade val="50000"/>
+            </a:schemeClr>
+          </a:lnRef>
+          <a:fillRef idx="1">
+            <a:schemeClr val="accent1"/>
+          </a:fillRef>
+          <a:effectRef idx="0">
+            <a:schemeClr val="accent1"/>
+          </a:effectRef>
+          <a:fontRef idx="minor">
+            <a:schemeClr val="lt1"/>
+          </a:fontRef>
+        </p:style>
+        <p:txBody>
+          <a:bodyPr rtlCol="0" anchor="ctr"/>
+          <a:lstStyle/>
+          <a:p>
+            <a:pPr algn="ctr"/>
+            <a:endParaRPr lang="zh-CN" altLang="en-US"/>
+          </a:p>
+        </p:txBody>
+      </p:sp>
+      <p:sp>
+        <p:nvSpPr>
+          <p:cNvPr id="55" name="圆角矩形 54"/>
+          <p:cNvSpPr/>
+          <p:nvPr/>
+        </p:nvSpPr>
+        <p:spPr>
+          <a:xfrm>
+            <a:off x="1079165" y="2526511"/>
+            <a:ext cx="561372" cy="225128"/>
+          </a:xfrm>
+          <a:prstGeom prst="roundRect">
+            <a:avLst/>
+          </a:prstGeom>
+          <a:solidFill>
+            <a:schemeClr val="bg1"/>
+          </a:solidFill>
+          <a:ln w="28575">
+            <a:solidFill>
+              <a:schemeClr val="tx1"/>
+            </a:solidFill>
+          </a:ln>
+        </p:spPr>
+        <p:style>
+          <a:lnRef idx="2">
+            <a:schemeClr val="accent1">
+              <a:shade val="50000"/>
+            </a:schemeClr>
+          </a:lnRef>
+          <a:fillRef idx="1">
+            <a:schemeClr val="accent1"/>
+          </a:fillRef>
+          <a:effectRef idx="0">
+            <a:schemeClr val="accent1"/>
+          </a:effectRef>
+          <a:fontRef idx="minor">
+            <a:schemeClr val="lt1"/>
+          </a:fontRef>
+        </p:style>
+        <p:txBody>
+          <a:bodyPr rtlCol="0" anchor="ctr"/>
+          <a:lstStyle/>
+          <a:p>
+            <a:pPr algn="ctr"/>
+            <a:endParaRPr lang="zh-CN" altLang="en-US"/>
+          </a:p>
+        </p:txBody>
+      </p:sp>
+      <p:sp>
+        <p:nvSpPr>
+          <p:cNvPr id="68" name="矩形 67"/>
+          <p:cNvSpPr/>
+          <p:nvPr/>
+        </p:nvSpPr>
+        <p:spPr>
+          <a:xfrm>
+            <a:off x="1790959" y="1257342"/>
+            <a:ext cx="1080120" cy="720080"/>
+          </a:xfrm>
+          <a:prstGeom prst="rect">
+            <a:avLst/>
+          </a:prstGeom>
+          <a:noFill/>
+          <a:ln w="76200">
+            <a:solidFill>
+              <a:schemeClr val="tx1"/>
+            </a:solidFill>
+          </a:ln>
+        </p:spPr>
+        <p:style>
+          <a:lnRef idx="2">
+            <a:schemeClr val="accent1">
+              <a:shade val="50000"/>
+            </a:schemeClr>
+          </a:lnRef>
+          <a:fillRef idx="1">
+            <a:schemeClr val="accent1"/>
+          </a:fillRef>
+          <a:effectRef idx="0">
+            <a:schemeClr val="accent1"/>
+          </a:effectRef>
+          <a:fontRef idx="minor">
+            <a:schemeClr val="lt1"/>
+          </a:fontRef>
+        </p:style>
+        <p:txBody>
+          <a:bodyPr rtlCol="0" anchor="ctr"/>
+          <a:lstStyle/>
+          <a:p>
+            <a:pPr algn="ctr"/>
+            <a:endParaRPr lang="zh-CN" altLang="en-US"/>
+          </a:p>
+        </p:txBody>
+      </p:sp>
+      <p:sp>
+        <p:nvSpPr>
+          <p:cNvPr id="69" name="梯形 68"/>
+          <p:cNvSpPr/>
+          <p:nvPr/>
+        </p:nvSpPr>
+        <p:spPr>
+          <a:xfrm>
+            <a:off x="2078991" y="1977422"/>
+            <a:ext cx="504056" cy="216024"/>
+          </a:xfrm>
+          <a:prstGeom prst="trapezoid">
+            <a:avLst/>
+          </a:prstGeom>
+          <a:solidFill>
+            <a:schemeClr val="bg1"/>
+          </a:solidFill>
+          <a:ln w="19050">
+            <a:solidFill>
+              <a:schemeClr val="tx1"/>
+            </a:solidFill>
+          </a:ln>
+        </p:spPr>
+        <p:style>
+          <a:lnRef idx="2">
+            <a:schemeClr val="accent1">
+              <a:shade val="50000"/>
+            </a:schemeClr>
+          </a:lnRef>
+          <a:fillRef idx="1">
+            <a:schemeClr val="accent1"/>
+          </a:fillRef>
+          <a:effectRef idx="0">
+            <a:schemeClr val="accent1"/>
+          </a:effectRef>
+          <a:fontRef idx="minor">
+            <a:schemeClr val="lt1"/>
+          </a:fontRef>
+        </p:style>
+        <p:txBody>
+          <a:bodyPr rtlCol="0" anchor="ctr"/>
+          <a:lstStyle/>
+          <a:p>
+            <a:pPr algn="ctr"/>
+            <a:endParaRPr lang="zh-CN" altLang="en-US"/>
+          </a:p>
+        </p:txBody>
+      </p:sp>
+      <p:cxnSp>
+        <p:nvCxnSpPr>
+          <p:cNvPr id="70" name="直接箭头连接符 69"/>
+          <p:cNvCxnSpPr/>
+          <p:nvPr/>
+        </p:nvCxnSpPr>
+        <p:spPr>
+          <a:xfrm>
+            <a:off x="-250277" y="581709"/>
+            <a:ext cx="1440160" cy="1407352"/>
+          </a:xfrm>
+          <a:prstGeom prst="straightConnector1">
+            <a:avLst/>
+          </a:prstGeom>
+          <a:ln w="19050">
+            <a:solidFill>
+              <a:schemeClr val="tx1"/>
+            </a:solidFill>
+            <a:tailEnd type="arrow"/>
+          </a:ln>
+        </p:spPr>
+        <p:style>
+          <a:lnRef idx="1">
+            <a:schemeClr val="accent1"/>
+          </a:lnRef>
+          <a:fillRef idx="0">
+            <a:schemeClr val="accent1"/>
+          </a:fillRef>
+          <a:effectRef idx="0">
+            <a:schemeClr val="accent1"/>
+          </a:effectRef>
+          <a:fontRef idx="minor">
+            <a:schemeClr val="tx1"/>
+          </a:fontRef>
+        </p:style>
+      </p:cxnSp>
+      <p:cxnSp>
+        <p:nvCxnSpPr>
+          <p:cNvPr id="71" name="直接连接符 70"/>
+          <p:cNvCxnSpPr/>
+          <p:nvPr/>
+        </p:nvCxnSpPr>
+        <p:spPr>
+          <a:xfrm>
+            <a:off x="-161801" y="534481"/>
+            <a:ext cx="0" cy="108012"/>
+          </a:xfrm>
+          <a:prstGeom prst="line">
+            <a:avLst/>
+          </a:prstGeom>
+          <a:ln w="19050">
+            <a:solidFill>
+              <a:schemeClr val="tx1"/>
+            </a:solidFill>
+          </a:ln>
+        </p:spPr>
+        <p:style>
+          <a:lnRef idx="1">
+            <a:schemeClr val="accent1"/>
+          </a:lnRef>
+          <a:fillRef idx="0">
+            <a:schemeClr val="accent1"/>
+          </a:fillRef>
+          <a:effectRef idx="0">
+            <a:schemeClr val="accent1"/>
+          </a:effectRef>
+          <a:fontRef idx="minor">
+            <a:schemeClr val="tx1"/>
+          </a:fontRef>
+        </p:style>
+      </p:cxnSp>
+      <p:cxnSp>
+        <p:nvCxnSpPr>
+          <p:cNvPr id="72" name="直接连接符 71"/>
+          <p:cNvCxnSpPr/>
+          <p:nvPr/>
+        </p:nvCxnSpPr>
+        <p:spPr>
+          <a:xfrm>
+            <a:off x="-9401" y="686881"/>
+            <a:ext cx="0" cy="108012"/>
+          </a:xfrm>
+          <a:prstGeom prst="line">
+            <a:avLst/>
+          </a:prstGeom>
+          <a:ln w="19050">
+            <a:solidFill>
+              <a:schemeClr val="tx1"/>
+            </a:solidFill>
+          </a:ln>
+        </p:spPr>
+        <p:style>
+          <a:lnRef idx="1">
+            <a:schemeClr val="accent1"/>
+          </a:lnRef>
+          <a:fillRef idx="0">
+            <a:schemeClr val="accent1"/>
+          </a:fillRef>
+          <a:effectRef idx="0">
+            <a:schemeClr val="accent1"/>
+          </a:effectRef>
+          <a:fontRef idx="minor">
+            <a:schemeClr val="tx1"/>
+          </a:fontRef>
+        </p:style>
+      </p:cxnSp>
+      <p:cxnSp>
+        <p:nvCxnSpPr>
+          <p:cNvPr id="73" name="直接连接符 72"/>
+          <p:cNvCxnSpPr/>
+          <p:nvPr/>
+        </p:nvCxnSpPr>
+        <p:spPr>
+          <a:xfrm>
+            <a:off x="142999" y="839281"/>
+            <a:ext cx="0" cy="108012"/>
+          </a:xfrm>
+          <a:prstGeom prst="line">
+            <a:avLst/>
+          </a:prstGeom>
+          <a:ln w="19050">
+            <a:solidFill>
+              <a:schemeClr val="tx1"/>
+            </a:solidFill>
+          </a:ln>
+        </p:spPr>
+        <p:style>
+          <a:lnRef idx="1">
+            <a:schemeClr val="accent1"/>
+          </a:lnRef>
+          <a:fillRef idx="0">
+            <a:schemeClr val="accent1"/>
+          </a:fillRef>
+          <a:effectRef idx="0">
+            <a:schemeClr val="accent1"/>
+          </a:effectRef>
+          <a:fontRef idx="minor">
+            <a:schemeClr val="tx1"/>
+          </a:fontRef>
+        </p:style>
+      </p:cxnSp>
+      <p:cxnSp>
+        <p:nvCxnSpPr>
+          <p:cNvPr id="74" name="直接连接符 73"/>
+          <p:cNvCxnSpPr/>
+          <p:nvPr/>
+        </p:nvCxnSpPr>
+        <p:spPr>
+          <a:xfrm>
+            <a:off x="295399" y="991681"/>
+            <a:ext cx="0" cy="108012"/>
+          </a:xfrm>
+          <a:prstGeom prst="line">
+            <a:avLst/>
+          </a:prstGeom>
+          <a:ln w="19050">
+            <a:solidFill>
+              <a:schemeClr val="tx1"/>
+            </a:solidFill>
+          </a:ln>
+        </p:spPr>
+        <p:style>
+          <a:lnRef idx="1">
+            <a:schemeClr val="accent1"/>
+          </a:lnRef>
+          <a:fillRef idx="0">
+            <a:schemeClr val="accent1"/>
+          </a:fillRef>
+          <a:effectRef idx="0">
+            <a:schemeClr val="accent1"/>
+          </a:effectRef>
+          <a:fontRef idx="minor">
+            <a:schemeClr val="tx1"/>
+          </a:fontRef>
+        </p:style>
+      </p:cxnSp>
+      <p:cxnSp>
+        <p:nvCxnSpPr>
+          <p:cNvPr id="75" name="直接连接符 74"/>
+          <p:cNvCxnSpPr/>
+          <p:nvPr/>
+        </p:nvCxnSpPr>
+        <p:spPr>
+          <a:xfrm>
+            <a:off x="447799" y="1144081"/>
+            <a:ext cx="0" cy="108012"/>
+          </a:xfrm>
+          <a:prstGeom prst="line">
+            <a:avLst/>
+          </a:prstGeom>
+          <a:ln w="19050">
+            <a:solidFill>
+              <a:schemeClr val="tx1"/>
+            </a:solidFill>
+          </a:ln>
+        </p:spPr>
+        <p:style>
+          <a:lnRef idx="1">
+            <a:schemeClr val="accent1"/>
+          </a:lnRef>
+          <a:fillRef idx="0">
+            <a:schemeClr val="accent1"/>
+          </a:fillRef>
+          <a:effectRef idx="0">
+            <a:schemeClr val="accent1"/>
+          </a:effectRef>
+          <a:fontRef idx="minor">
+            <a:schemeClr val="tx1"/>
+          </a:fontRef>
+        </p:style>
+      </p:cxnSp>
+      <p:cxnSp>
+        <p:nvCxnSpPr>
+          <p:cNvPr id="76" name="直接连接符 75"/>
+          <p:cNvCxnSpPr/>
+          <p:nvPr/>
+        </p:nvCxnSpPr>
+        <p:spPr>
+          <a:xfrm>
+            <a:off x="600199" y="1296481"/>
+            <a:ext cx="0" cy="108012"/>
+          </a:xfrm>
+          <a:prstGeom prst="line">
+            <a:avLst/>
+          </a:prstGeom>
+          <a:ln w="19050">
+            <a:solidFill>
+              <a:schemeClr val="tx1"/>
+            </a:solidFill>
+          </a:ln>
+        </p:spPr>
+        <p:style>
+          <a:lnRef idx="1">
+            <a:schemeClr val="accent1"/>
+          </a:lnRef>
+          <a:fillRef idx="0">
+            <a:schemeClr val="accent1"/>
+          </a:fillRef>
+          <a:effectRef idx="0">
+            <a:schemeClr val="accent1"/>
+          </a:effectRef>
+          <a:fontRef idx="minor">
+            <a:schemeClr val="tx1"/>
+          </a:fontRef>
+        </p:style>
+      </p:cxnSp>
+      <p:cxnSp>
+        <p:nvCxnSpPr>
+          <p:cNvPr id="77" name="直接连接符 76"/>
+          <p:cNvCxnSpPr/>
+          <p:nvPr/>
+        </p:nvCxnSpPr>
+        <p:spPr>
+          <a:xfrm>
+            <a:off x="752599" y="1448881"/>
+            <a:ext cx="0" cy="108012"/>
+          </a:xfrm>
+          <a:prstGeom prst="line">
+            <a:avLst/>
+          </a:prstGeom>
+          <a:ln w="19050">
+            <a:solidFill>
+              <a:schemeClr val="tx1"/>
+            </a:solidFill>
+          </a:ln>
+        </p:spPr>
+        <p:style>
+          <a:lnRef idx="1">
+            <a:schemeClr val="accent1"/>
+          </a:lnRef>
+          <a:fillRef idx="0">
+            <a:schemeClr val="accent1"/>
+          </a:fillRef>
+          <a:effectRef idx="0">
+            <a:schemeClr val="accent1"/>
+          </a:effectRef>
+          <a:fontRef idx="minor">
+            <a:schemeClr val="tx1"/>
+          </a:fontRef>
+        </p:style>
+      </p:cxnSp>
+      <p:cxnSp>
+        <p:nvCxnSpPr>
+          <p:cNvPr id="78" name="直接连接符 77"/>
+          <p:cNvCxnSpPr/>
+          <p:nvPr/>
+        </p:nvCxnSpPr>
+        <p:spPr>
+          <a:xfrm>
+            <a:off x="904999" y="1601281"/>
+            <a:ext cx="0" cy="108012"/>
+          </a:xfrm>
+          <a:prstGeom prst="line">
+            <a:avLst/>
+          </a:prstGeom>
+          <a:ln w="19050">
+            <a:solidFill>
+              <a:schemeClr val="tx1"/>
+            </a:solidFill>
+          </a:ln>
+        </p:spPr>
+        <p:style>
+          <a:lnRef idx="1">
+            <a:schemeClr val="accent1"/>
+          </a:lnRef>
+          <a:fillRef idx="0">
+            <a:schemeClr val="accent1"/>
+          </a:fillRef>
+          <a:effectRef idx="0">
+            <a:schemeClr val="accent1"/>
+          </a:effectRef>
+          <a:fontRef idx="minor">
+            <a:schemeClr val="tx1"/>
+          </a:fontRef>
+        </p:style>
+      </p:cxnSp>
+      <p:cxnSp>
+        <p:nvCxnSpPr>
+          <p:cNvPr id="79" name="直接连接符 78"/>
+          <p:cNvCxnSpPr/>
+          <p:nvPr/>
+        </p:nvCxnSpPr>
+        <p:spPr>
+          <a:xfrm>
+            <a:off x="1079403" y="1746903"/>
+            <a:ext cx="0" cy="108012"/>
+          </a:xfrm>
+          <a:prstGeom prst="line">
+            <a:avLst/>
+          </a:prstGeom>
+          <a:ln w="19050">
+            <a:solidFill>
+              <a:schemeClr val="tx1"/>
+            </a:solidFill>
+          </a:ln>
+        </p:spPr>
+        <p:style>
+          <a:lnRef idx="1">
+            <a:schemeClr val="accent1"/>
+          </a:lnRef>
+          <a:fillRef idx="0">
+            <a:schemeClr val="accent1"/>
+          </a:fillRef>
+          <a:effectRef idx="0">
+            <a:schemeClr val="accent1"/>
+          </a:effectRef>
+          <a:fontRef idx="minor">
+            <a:schemeClr val="tx1"/>
+          </a:fontRef>
+        </p:style>
+      </p:cxnSp>
+      <p:sp>
+        <p:nvSpPr>
+          <p:cNvPr id="80" name="椭圆 79"/>
+          <p:cNvSpPr/>
+          <p:nvPr/>
+        </p:nvSpPr>
+        <p:spPr>
+          <a:xfrm>
+            <a:off x="1241183" y="2416269"/>
+            <a:ext cx="200490" cy="244387"/>
+          </a:xfrm>
+          <a:prstGeom prst="ellipse">
+            <a:avLst/>
+          </a:prstGeom>
+          <a:solidFill>
+            <a:schemeClr val="bg1"/>
+          </a:solidFill>
+          <a:ln w="38100">
+            <a:solidFill>
+              <a:schemeClr val="tx1"/>
+            </a:solidFill>
+          </a:ln>
+        </p:spPr>
+        <p:style>
+          <a:lnRef idx="2">
+            <a:schemeClr val="accent1">
+              <a:shade val="50000"/>
+            </a:schemeClr>
+          </a:lnRef>
+          <a:fillRef idx="1">
+            <a:schemeClr val="accent1"/>
+          </a:fillRef>
+          <a:effectRef idx="0">
+            <a:schemeClr val="accent1"/>
+          </a:effectRef>
+          <a:fontRef idx="minor">
+            <a:schemeClr val="lt1"/>
+          </a:fontRef>
+        </p:style>
+        <p:txBody>
+          <a:bodyPr rtlCol="0" anchor="ctr"/>
+          <a:lstStyle/>
+          <a:p>
+            <a:pPr algn="ctr"/>
+            <a:endParaRPr lang="zh-CN" altLang="en-US"/>
+          </a:p>
+        </p:txBody>
+      </p:sp>
+      <p:sp>
+        <p:nvSpPr>
+          <p:cNvPr id="81" name="TextBox 80"/>
+          <p:cNvSpPr txBox="1"/>
+          <p:nvPr/>
+        </p:nvSpPr>
+        <p:spPr>
+          <a:xfrm>
+            <a:off x="2460517" y="1365354"/>
+            <a:ext cx="338554" cy="617658"/>
+          </a:xfrm>
+          <a:prstGeom prst="rect">
+            <a:avLst/>
+          </a:prstGeom>
+          <a:noFill/>
+        </p:spPr>
+        <p:txBody>
+          <a:bodyPr vert="eaVert" wrap="square" rtlCol="0">
+            <a:spAutoFit/>
+          </a:bodyPr>
+          <a:lstStyle/>
+          <a:p>
+            <a:r>
+              <a:rPr lang="zh-CN" altLang="en-US" sz="1000" dirty="0" smtClean="0"/>
+              <a:t>系统校准</a:t>
+            </a:r>
+            <a:endParaRPr lang="zh-CN" altLang="en-US" sz="1000" dirty="0"/>
+          </a:p>
+        </p:txBody>
+      </p:sp>
+      <p:sp>
+        <p:nvSpPr>
+          <p:cNvPr id="82" name="圆角矩形 81"/>
+          <p:cNvSpPr/>
+          <p:nvPr/>
+        </p:nvSpPr>
+        <p:spPr>
+          <a:xfrm>
+            <a:off x="1523584" y="659129"/>
+            <a:ext cx="432048" cy="271527"/>
+          </a:xfrm>
+          <a:prstGeom prst="roundRect">
             <a:avLst/>
           </a:prstGeom>
           <a:solidFill>
@@ -6563,7 +7911,6 @@
             <a:solidFill>
               <a:schemeClr val="tx1"/>
             </a:solidFill>
-            <a:prstDash val="sysDot"/>
           </a:ln>
         </p:spPr>
         <p:style>
@@ -6593,16 +7940,16 @@
       </p:sp>
       <p:sp>
         <p:nvSpPr>
-          <p:cNvPr id="2054" name="矩形 2053"/>
+          <p:cNvPr id="83" name="椭圆 82"/>
           <p:cNvSpPr/>
           <p:nvPr/>
         </p:nvSpPr>
         <p:spPr>
           <a:xfrm>
-            <a:off x="5941608" y="1792592"/>
-            <a:ext cx="2232248" cy="3384376"/>
-          </a:xfrm>
-          <a:prstGeom prst="rect">
+            <a:off x="1652574" y="718692"/>
+            <a:ext cx="174068" cy="152400"/>
+          </a:xfrm>
+          <a:prstGeom prst="ellipse">
             <a:avLst/>
           </a:prstGeom>
           <a:noFill/>
@@ -6610,7 +7957,6 @@
             <a:solidFill>
               <a:schemeClr val="tx1"/>
             </a:solidFill>
-            <a:prstDash val="sysDot"/>
           </a:ln>
         </p:spPr>
         <p:style>
@@ -6638,74 +7984,22 @@
           </a:p>
         </p:txBody>
       </p:sp>
-      <p:pic>
-        <p:nvPicPr>
-          <p:cNvPr id="56" name="Picture 2"/>
-          <p:cNvPicPr>
-            <a:picLocks noChangeAspect="1" noChangeArrowheads="1"/>
-          </p:cNvPicPr>
-          <p:nvPr/>
-        </p:nvPicPr>
-        <p:blipFill rotWithShape="1">
-          <a:blip r:embed="rId3" cstate="print">
-            <a:extLst>
-              <a:ext uri="{28A0092B-C50C-407E-A947-70E740481C1C}">
-                <a14:useLocalDpi xmlns:a14="http://schemas.microsoft.com/office/drawing/2010/main" val="0"/>
-              </a:ext>
-            </a:extLst>
-          </a:blip>
-          <a:srcRect l="32338" t="35953" r="32338" b="31832"/>
-          <a:stretch/>
-        </p:blipFill>
-        <p:spPr bwMode="auto">
-          <a:xfrm>
-            <a:off x="2757579" y="5118980"/>
-            <a:ext cx="592390" cy="682842"/>
+      <p:sp>
+        <p:nvSpPr>
+          <p:cNvPr id="84" name="矩形 83"/>
+          <p:cNvSpPr/>
+          <p:nvPr/>
+        </p:nvSpPr>
+        <p:spPr>
+          <a:xfrm>
+            <a:off x="1780922" y="587121"/>
+            <a:ext cx="102702" cy="72008"/>
           </a:xfrm>
           <a:prstGeom prst="rect">
             <a:avLst/>
           </a:prstGeom>
           <a:noFill/>
           <a:ln>
-            <a:noFill/>
-          </a:ln>
-          <a:extLst>
-            <a:ext uri="{909E8E84-426E-40DD-AFC4-6F175D3DCCD1}">
-              <a14:hiddenFill xmlns:a14="http://schemas.microsoft.com/office/drawing/2010/main">
-                <a:solidFill>
-                  <a:schemeClr val="accent1"/>
-                </a:solidFill>
-              </a14:hiddenFill>
-            </a:ext>
-            <a:ext uri="{91240B29-F687-4F45-9708-019B960494DF}">
-              <a14:hiddenLine xmlns:a14="http://schemas.microsoft.com/office/drawing/2010/main" w="9525">
-                <a:solidFill>
-                  <a:schemeClr val="tx1"/>
-                </a:solidFill>
-                <a:miter lim="800000"/>
-                <a:headEnd/>
-                <a:tailEnd/>
-              </a14:hiddenLine>
-            </a:ext>
-          </a:extLst>
-        </p:spPr>
-      </p:pic>
-      <p:sp>
-        <p:nvSpPr>
-          <p:cNvPr id="57" name="矩形 56"/>
-          <p:cNvSpPr/>
-          <p:nvPr/>
-        </p:nvSpPr>
-        <p:spPr>
-          <a:xfrm>
-            <a:off x="2757578" y="5081741"/>
-            <a:ext cx="1080120" cy="720080"/>
-          </a:xfrm>
-          <a:prstGeom prst="rect">
-            <a:avLst/>
-          </a:prstGeom>
-          <a:noFill/>
-          <a:ln w="76200">
             <a:solidFill>
               <a:schemeClr val="tx1"/>
             </a:solidFill>
@@ -6738,22 +8032,22 @@
       </p:sp>
       <p:sp>
         <p:nvSpPr>
-          <p:cNvPr id="58" name="梯形 57"/>
+          <p:cNvPr id="85" name="流程图: 数据 84"/>
           <p:cNvSpPr/>
           <p:nvPr/>
         </p:nvSpPr>
         <p:spPr>
-          <a:xfrm>
-            <a:off x="3045610" y="5801821"/>
-            <a:ext cx="504056" cy="216024"/>
-          </a:xfrm>
-          <a:prstGeom prst="trapezoid">
+          <a:xfrm rot="10800000">
+            <a:off x="-175121" y="714419"/>
+            <a:ext cx="1080120" cy="541815"/>
+          </a:xfrm>
+          <a:prstGeom prst="flowChartInputOutput">
             <a:avLst/>
           </a:prstGeom>
           <a:solidFill>
             <a:schemeClr val="bg1"/>
           </a:solidFill>
-          <a:ln w="19050">
+          <a:ln>
             <a:solidFill>
               <a:schemeClr val="tx1"/>
             </a:solidFill>
@@ -6786,102 +8080,22 @@
       </p:sp>
       <p:sp>
         <p:nvSpPr>
-          <p:cNvPr id="59" name="TextBox 58"/>
-          <p:cNvSpPr txBox="1"/>
-          <p:nvPr/>
-        </p:nvSpPr>
-        <p:spPr>
-          <a:xfrm>
-            <a:off x="3442531" y="5189753"/>
-            <a:ext cx="323165" cy="617658"/>
+          <p:cNvPr id="86" name="矩形 85"/>
+          <p:cNvSpPr/>
+          <p:nvPr/>
+        </p:nvSpPr>
+        <p:spPr>
+          <a:xfrm>
+            <a:off x="-9401" y="839281"/>
+            <a:ext cx="831538" cy="54006"/>
           </a:xfrm>
           <a:prstGeom prst="rect">
             <a:avLst/>
           </a:prstGeom>
-          <a:noFill/>
-        </p:spPr>
-        <p:txBody>
-          <a:bodyPr vert="eaVert" wrap="square" rtlCol="0">
-            <a:spAutoFit/>
-          </a:bodyPr>
-          <a:lstStyle/>
-          <a:p>
-            <a:r>
-              <a:rPr lang="zh-CN" altLang="en-US" sz="900" dirty="0" smtClean="0"/>
-              <a:t>相位提取</a:t>
-            </a:r>
-            <a:endParaRPr lang="zh-CN" altLang="en-US" sz="900" dirty="0"/>
-          </a:p>
-        </p:txBody>
-      </p:sp>
-      <p:pic>
-        <p:nvPicPr>
-          <p:cNvPr id="60" name="Picture 2"/>
-          <p:cNvPicPr>
-            <a:picLocks noChangeAspect="1" noChangeArrowheads="1"/>
-          </p:cNvPicPr>
-          <p:nvPr/>
-        </p:nvPicPr>
-        <p:blipFill rotWithShape="1">
-          <a:blip r:embed="rId3" cstate="print">
-            <a:extLst>
-              <a:ext uri="{28A0092B-C50C-407E-A947-70E740481C1C}">
-                <a14:useLocalDpi xmlns:a14="http://schemas.microsoft.com/office/drawing/2010/main" val="0"/>
-              </a:ext>
-            </a:extLst>
-          </a:blip>
-          <a:srcRect l="32338" t="35953" r="32338" b="31832"/>
-          <a:stretch/>
-        </p:blipFill>
-        <p:spPr bwMode="auto">
-          <a:xfrm>
-            <a:off x="4166614" y="5166758"/>
-            <a:ext cx="592390" cy="682842"/>
-          </a:xfrm>
-          <a:prstGeom prst="rect">
-            <a:avLst/>
-          </a:prstGeom>
-          <a:noFill/>
+          <a:solidFill>
+            <a:schemeClr val="tx1"/>
+          </a:solidFill>
           <a:ln>
-            <a:noFill/>
-          </a:ln>
-          <a:extLst>
-            <a:ext uri="{909E8E84-426E-40DD-AFC4-6F175D3DCCD1}">
-              <a14:hiddenFill xmlns:a14="http://schemas.microsoft.com/office/drawing/2010/main">
-                <a:solidFill>
-                  <a:schemeClr val="accent1"/>
-                </a:solidFill>
-              </a14:hiddenFill>
-            </a:ext>
-            <a:ext uri="{91240B29-F687-4F45-9708-019B960494DF}">
-              <a14:hiddenLine xmlns:a14="http://schemas.microsoft.com/office/drawing/2010/main" w="9525">
-                <a:solidFill>
-                  <a:schemeClr val="tx1"/>
-                </a:solidFill>
-                <a:miter lim="800000"/>
-                <a:headEnd/>
-                <a:tailEnd/>
-              </a14:hiddenLine>
-            </a:ext>
-          </a:extLst>
-        </p:spPr>
-      </p:pic>
-      <p:sp>
-        <p:nvSpPr>
-          <p:cNvPr id="61" name="矩形 60"/>
-          <p:cNvSpPr/>
-          <p:nvPr/>
-        </p:nvSpPr>
-        <p:spPr>
-          <a:xfrm>
-            <a:off x="4166613" y="5129519"/>
-            <a:ext cx="1080120" cy="720080"/>
-          </a:xfrm>
-          <a:prstGeom prst="rect">
-            <a:avLst/>
-          </a:prstGeom>
-          <a:noFill/>
-          <a:ln w="76200">
             <a:solidFill>
               <a:schemeClr val="tx1"/>
             </a:solidFill>
@@ -6914,22 +8128,22 @@
       </p:sp>
       <p:sp>
         <p:nvSpPr>
-          <p:cNvPr id="62" name="梯形 61"/>
+          <p:cNvPr id="87" name="矩形 86"/>
           <p:cNvSpPr/>
           <p:nvPr/>
         </p:nvSpPr>
         <p:spPr>
           <a:xfrm>
-            <a:off x="4454645" y="5849599"/>
-            <a:ext cx="504056" cy="216024"/>
-          </a:xfrm>
-          <a:prstGeom prst="trapezoid">
+            <a:off x="-50831" y="975884"/>
+            <a:ext cx="831538" cy="54006"/>
+          </a:xfrm>
+          <a:prstGeom prst="rect">
             <a:avLst/>
           </a:prstGeom>
           <a:solidFill>
-            <a:schemeClr val="bg1"/>
+            <a:schemeClr val="tx1"/>
           </a:solidFill>
-          <a:ln w="19050">
+          <a:ln>
             <a:solidFill>
               <a:schemeClr val="tx1"/>
             </a:solidFill>
@@ -6962,102 +8176,22 @@
       </p:sp>
       <p:sp>
         <p:nvSpPr>
-          <p:cNvPr id="63" name="TextBox 62"/>
-          <p:cNvSpPr txBox="1"/>
-          <p:nvPr/>
-        </p:nvSpPr>
-        <p:spPr>
-          <a:xfrm>
-            <a:off x="4851570" y="5237531"/>
-            <a:ext cx="323165" cy="617658"/>
+          <p:cNvPr id="88" name="矩形 87"/>
+          <p:cNvSpPr/>
+          <p:nvPr/>
+        </p:nvSpPr>
+        <p:spPr>
+          <a:xfrm>
+            <a:off x="-120370" y="1099693"/>
+            <a:ext cx="831538" cy="54006"/>
           </a:xfrm>
           <a:prstGeom prst="rect">
             <a:avLst/>
           </a:prstGeom>
-          <a:noFill/>
-        </p:spPr>
-        <p:txBody>
-          <a:bodyPr vert="eaVert" wrap="square" rtlCol="0">
-            <a:spAutoFit/>
-          </a:bodyPr>
-          <a:lstStyle/>
-          <a:p>
-            <a:r>
-              <a:rPr lang="zh-CN" altLang="en-US" sz="900" dirty="0" smtClean="0"/>
-              <a:t>相位展开</a:t>
-            </a:r>
-            <a:endParaRPr lang="zh-CN" altLang="en-US" sz="900" dirty="0"/>
-          </a:p>
-        </p:txBody>
-      </p:sp>
-      <p:pic>
-        <p:nvPicPr>
-          <p:cNvPr id="64" name="Picture 2"/>
-          <p:cNvPicPr>
-            <a:picLocks noChangeAspect="1" noChangeArrowheads="1"/>
-          </p:cNvPicPr>
-          <p:nvPr/>
-        </p:nvPicPr>
-        <p:blipFill rotWithShape="1">
-          <a:blip r:embed="rId3" cstate="print">
-            <a:extLst>
-              <a:ext uri="{28A0092B-C50C-407E-A947-70E740481C1C}">
-                <a14:useLocalDpi xmlns:a14="http://schemas.microsoft.com/office/drawing/2010/main" val="0"/>
-              </a:ext>
-            </a:extLst>
-          </a:blip>
-          <a:srcRect l="32338" t="35953" r="32338" b="31832"/>
-          <a:stretch/>
-        </p:blipFill>
-        <p:spPr bwMode="auto">
-          <a:xfrm>
-            <a:off x="6136368" y="5427169"/>
-            <a:ext cx="592390" cy="682842"/>
-          </a:xfrm>
-          <a:prstGeom prst="rect">
-            <a:avLst/>
-          </a:prstGeom>
-          <a:noFill/>
+          <a:solidFill>
+            <a:schemeClr val="tx1"/>
+          </a:solidFill>
           <a:ln>
-            <a:noFill/>
-          </a:ln>
-          <a:extLst>
-            <a:ext uri="{909E8E84-426E-40DD-AFC4-6F175D3DCCD1}">
-              <a14:hiddenFill xmlns:a14="http://schemas.microsoft.com/office/drawing/2010/main">
-                <a:solidFill>
-                  <a:schemeClr val="accent1"/>
-                </a:solidFill>
-              </a14:hiddenFill>
-            </a:ext>
-            <a:ext uri="{91240B29-F687-4F45-9708-019B960494DF}">
-              <a14:hiddenLine xmlns:a14="http://schemas.microsoft.com/office/drawing/2010/main" w="9525">
-                <a:solidFill>
-                  <a:schemeClr val="tx1"/>
-                </a:solidFill>
-                <a:miter lim="800000"/>
-                <a:headEnd/>
-                <a:tailEnd/>
-              </a14:hiddenLine>
-            </a:ext>
-          </a:extLst>
-        </p:spPr>
-      </p:pic>
-      <p:sp>
-        <p:nvSpPr>
-          <p:cNvPr id="65" name="矩形 64"/>
-          <p:cNvSpPr/>
-          <p:nvPr/>
-        </p:nvSpPr>
-        <p:spPr>
-          <a:xfrm>
-            <a:off x="6136367" y="5389930"/>
-            <a:ext cx="1080120" cy="720080"/>
-          </a:xfrm>
-          <a:prstGeom prst="rect">
-            <a:avLst/>
-          </a:prstGeom>
-          <a:noFill/>
-          <a:ln w="76200">
             <a:solidFill>
               <a:schemeClr val="tx1"/>
             </a:solidFill>
@@ -7090,25 +8224,24 @@
       </p:sp>
       <p:sp>
         <p:nvSpPr>
-          <p:cNvPr id="66" name="梯形 65"/>
+          <p:cNvPr id="89" name="矩形 88"/>
           <p:cNvSpPr/>
           <p:nvPr/>
         </p:nvSpPr>
         <p:spPr>
           <a:xfrm>
-            <a:off x="6424399" y="6110010"/>
-            <a:ext cx="504056" cy="216024"/>
-          </a:xfrm>
-          <a:prstGeom prst="trapezoid">
-            <a:avLst/>
-          </a:prstGeom>
-          <a:solidFill>
-            <a:schemeClr val="bg1"/>
-          </a:solidFill>
-          <a:ln w="19050">
+            <a:off x="-324446" y="417610"/>
+            <a:ext cx="3407967" cy="2666674"/>
+          </a:xfrm>
+          <a:prstGeom prst="rect">
+            <a:avLst/>
+          </a:prstGeom>
+          <a:noFill/>
+          <a:ln>
             <a:solidFill>
               <a:schemeClr val="tx1"/>
             </a:solidFill>
+            <a:prstDash val="sysDot"/>
           </a:ln>
         </p:spPr>
         <p:style>
@@ -7138,14 +8271,14 @@
       </p:sp>
       <p:sp>
         <p:nvSpPr>
-          <p:cNvPr id="67" name="TextBox 66"/>
+          <p:cNvPr id="90" name="TextBox 89"/>
           <p:cNvSpPr txBox="1"/>
           <p:nvPr/>
         </p:nvSpPr>
         <p:spPr>
           <a:xfrm>
-            <a:off x="6821340" y="5459761"/>
-            <a:ext cx="323165" cy="617658"/>
+            <a:off x="562763" y="2526511"/>
+            <a:ext cx="797088" cy="246221"/>
           </a:xfrm>
           <a:prstGeom prst="rect">
             <a:avLst/>
@@ -7153,39 +8286,417 @@
           <a:noFill/>
         </p:spPr>
         <p:txBody>
-          <a:bodyPr vert="eaVert" wrap="square" rtlCol="0">
+          <a:bodyPr wrap="square" rtlCol="0">
             <a:spAutoFit/>
           </a:bodyPr>
           <a:lstStyle/>
           <a:p>
             <a:r>
-              <a:rPr lang="zh-CN" altLang="en-US" sz="900" dirty="0" smtClean="0"/>
-              <a:t>高度转换</a:t>
-            </a:r>
-            <a:endParaRPr lang="zh-CN" altLang="en-US" sz="900" dirty="0"/>
-          </a:p>
-        </p:txBody>
-      </p:sp>
-      <p:sp>
-        <p:nvSpPr>
-          <p:cNvPr id="4" name="加号 3"/>
+              <a:rPr lang="zh-CN" altLang="en-US" sz="1000" dirty="0" smtClean="0"/>
+              <a:t>投影仪</a:t>
+            </a:r>
+            <a:endParaRPr lang="zh-CN" altLang="en-US" sz="1000" dirty="0"/>
+          </a:p>
+        </p:txBody>
+      </p:sp>
+      <p:sp>
+        <p:nvSpPr>
+          <p:cNvPr id="91" name="TextBox 90"/>
+          <p:cNvSpPr txBox="1"/>
+          <p:nvPr/>
+        </p:nvSpPr>
+        <p:spPr>
+          <a:xfrm>
+            <a:off x="1189883" y="396272"/>
+            <a:ext cx="797088" cy="246221"/>
+          </a:xfrm>
+          <a:prstGeom prst="rect">
+            <a:avLst/>
+          </a:prstGeom>
+          <a:noFill/>
+        </p:spPr>
+        <p:txBody>
+          <a:bodyPr wrap="square" rtlCol="0">
+            <a:spAutoFit/>
+          </a:bodyPr>
+          <a:lstStyle/>
+          <a:p>
+            <a:r>
+              <a:rPr lang="zh-CN" altLang="en-US" sz="1000" dirty="0" smtClean="0"/>
+              <a:t>相机</a:t>
+            </a:r>
+            <a:endParaRPr lang="zh-CN" altLang="en-US" sz="1000" dirty="0"/>
+          </a:p>
+        </p:txBody>
+      </p:sp>
+      <p:sp>
+        <p:nvSpPr>
+          <p:cNvPr id="92" name="TextBox 91"/>
+          <p:cNvSpPr txBox="1"/>
+          <p:nvPr/>
+        </p:nvSpPr>
+        <p:spPr>
+          <a:xfrm>
+            <a:off x="-328348" y="1357083"/>
+            <a:ext cx="1171512" cy="246221"/>
+          </a:xfrm>
+          <a:prstGeom prst="rect">
+            <a:avLst/>
+          </a:prstGeom>
+          <a:noFill/>
+        </p:spPr>
+        <p:txBody>
+          <a:bodyPr wrap="square" rtlCol="0">
+            <a:spAutoFit/>
+          </a:bodyPr>
+          <a:lstStyle/>
+          <a:p>
+            <a:r>
+              <a:rPr lang="zh-CN" altLang="en-US" sz="1000" dirty="0"/>
+              <a:t>平移台</a:t>
+            </a:r>
+          </a:p>
+        </p:txBody>
+      </p:sp>
+      <p:sp>
+        <p:nvSpPr>
+          <p:cNvPr id="93" name="TextBox 92"/>
+          <p:cNvSpPr txBox="1"/>
+          <p:nvPr/>
+        </p:nvSpPr>
+        <p:spPr>
+          <a:xfrm>
+            <a:off x="103457" y="458598"/>
+            <a:ext cx="923486" cy="246221"/>
+          </a:xfrm>
+          <a:prstGeom prst="rect">
+            <a:avLst/>
+          </a:prstGeom>
+          <a:noFill/>
+        </p:spPr>
+        <p:txBody>
+          <a:bodyPr wrap="square" rtlCol="0">
+            <a:spAutoFit/>
+          </a:bodyPr>
+          <a:lstStyle/>
+          <a:p>
+            <a:r>
+              <a:rPr lang="zh-CN" altLang="en-US" sz="1000" dirty="0" smtClean="0"/>
+              <a:t>校准平面</a:t>
+            </a:r>
+            <a:endParaRPr lang="zh-CN" altLang="en-US" sz="1000" dirty="0"/>
+          </a:p>
+        </p:txBody>
+      </p:sp>
+      <p:sp>
+        <p:nvSpPr>
+          <p:cNvPr id="2068" name="右箭头 2067"/>
           <p:cNvSpPr/>
           <p:nvPr/>
         </p:nvSpPr>
         <p:spPr>
           <a:xfrm>
-            <a:off x="6757072" y="2632346"/>
-            <a:ext cx="342766" cy="212288"/>
-          </a:xfrm>
-          <a:prstGeom prst="mathPlus">
+            <a:off x="6991713" y="1788904"/>
+            <a:ext cx="277115" cy="253634"/>
+          </a:xfrm>
+          <a:prstGeom prst="rightArrow">
             <a:avLst/>
           </a:prstGeom>
           <a:solidFill>
-            <a:schemeClr val="tx1"/>
+            <a:schemeClr val="bg1"/>
           </a:solidFill>
-          <a:ln w="12700">
-            <a:noFill/>
-            <a:prstDash val="sysDot"/>
+          <a:ln>
+            <a:solidFill>
+              <a:schemeClr val="tx1"/>
+            </a:solidFill>
+          </a:ln>
+        </p:spPr>
+        <p:style>
+          <a:lnRef idx="2">
+            <a:schemeClr val="accent1">
+              <a:shade val="50000"/>
+            </a:schemeClr>
+          </a:lnRef>
+          <a:fillRef idx="1">
+            <a:schemeClr val="accent1"/>
+          </a:fillRef>
+          <a:effectRef idx="0">
+            <a:schemeClr val="accent1"/>
+          </a:effectRef>
+          <a:fontRef idx="minor">
+            <a:schemeClr val="lt1"/>
+          </a:fontRef>
+        </p:style>
+        <p:txBody>
+          <a:bodyPr rtlCol="0" anchor="ctr"/>
+          <a:lstStyle/>
+          <a:p>
+            <a:pPr algn="ctr"/>
+            <a:endParaRPr lang="zh-CN" altLang="en-US"/>
+          </a:p>
+        </p:txBody>
+      </p:sp>
+      <p:sp>
+        <p:nvSpPr>
+          <p:cNvPr id="103" name="右箭头 102"/>
+          <p:cNvSpPr/>
+          <p:nvPr/>
+        </p:nvSpPr>
+        <p:spPr>
+          <a:xfrm>
+            <a:off x="3141064" y="1601281"/>
+            <a:ext cx="277115" cy="253634"/>
+          </a:xfrm>
+          <a:prstGeom prst="rightArrow">
+            <a:avLst/>
+          </a:prstGeom>
+          <a:solidFill>
+            <a:schemeClr val="bg1"/>
+          </a:solidFill>
+          <a:ln>
+            <a:solidFill>
+              <a:schemeClr val="tx1"/>
+            </a:solidFill>
+          </a:ln>
+        </p:spPr>
+        <p:style>
+          <a:lnRef idx="2">
+            <a:schemeClr val="accent1">
+              <a:shade val="50000"/>
+            </a:schemeClr>
+          </a:lnRef>
+          <a:fillRef idx="1">
+            <a:schemeClr val="accent1"/>
+          </a:fillRef>
+          <a:effectRef idx="0">
+            <a:schemeClr val="accent1"/>
+          </a:effectRef>
+          <a:fontRef idx="minor">
+            <a:schemeClr val="lt1"/>
+          </a:fontRef>
+        </p:style>
+        <p:txBody>
+          <a:bodyPr rtlCol="0" anchor="ctr"/>
+          <a:lstStyle/>
+          <a:p>
+            <a:pPr algn="ctr"/>
+            <a:endParaRPr lang="zh-CN" altLang="en-US"/>
+          </a:p>
+        </p:txBody>
+      </p:sp>
+      <p:sp>
+        <p:nvSpPr>
+          <p:cNvPr id="104" name="右箭头 103"/>
+          <p:cNvSpPr/>
+          <p:nvPr/>
+        </p:nvSpPr>
+        <p:spPr>
+          <a:xfrm rot="5400000">
+            <a:off x="8158655" y="3891684"/>
+            <a:ext cx="277115" cy="253634"/>
+          </a:xfrm>
+          <a:prstGeom prst="rightArrow">
+            <a:avLst/>
+          </a:prstGeom>
+          <a:solidFill>
+            <a:schemeClr val="bg1"/>
+          </a:solidFill>
+          <a:ln>
+            <a:solidFill>
+              <a:schemeClr val="tx1"/>
+            </a:solidFill>
+          </a:ln>
+        </p:spPr>
+        <p:style>
+          <a:lnRef idx="2">
+            <a:schemeClr val="accent1">
+              <a:shade val="50000"/>
+            </a:schemeClr>
+          </a:lnRef>
+          <a:fillRef idx="1">
+            <a:schemeClr val="accent1"/>
+          </a:fillRef>
+          <a:effectRef idx="0">
+            <a:schemeClr val="accent1"/>
+          </a:effectRef>
+          <a:fontRef idx="minor">
+            <a:schemeClr val="lt1"/>
+          </a:fontRef>
+        </p:style>
+        <p:txBody>
+          <a:bodyPr rtlCol="0" anchor="ctr"/>
+          <a:lstStyle/>
+          <a:p>
+            <a:pPr algn="ctr"/>
+            <a:endParaRPr lang="zh-CN" altLang="en-US"/>
+          </a:p>
+        </p:txBody>
+      </p:sp>
+      <p:sp>
+        <p:nvSpPr>
+          <p:cNvPr id="105" name="右箭头 104"/>
+          <p:cNvSpPr/>
+          <p:nvPr/>
+        </p:nvSpPr>
+        <p:spPr>
+          <a:xfrm rot="10800000">
+            <a:off x="7171808" y="4487297"/>
+            <a:ext cx="277115" cy="253634"/>
+          </a:xfrm>
+          <a:prstGeom prst="rightArrow">
+            <a:avLst/>
+          </a:prstGeom>
+          <a:solidFill>
+            <a:schemeClr val="bg1"/>
+          </a:solidFill>
+          <a:ln>
+            <a:solidFill>
+              <a:schemeClr val="tx1"/>
+            </a:solidFill>
+          </a:ln>
+        </p:spPr>
+        <p:style>
+          <a:lnRef idx="2">
+            <a:schemeClr val="accent1">
+              <a:shade val="50000"/>
+            </a:schemeClr>
+          </a:lnRef>
+          <a:fillRef idx="1">
+            <a:schemeClr val="accent1"/>
+          </a:fillRef>
+          <a:effectRef idx="0">
+            <a:schemeClr val="accent1"/>
+          </a:effectRef>
+          <a:fontRef idx="minor">
+            <a:schemeClr val="lt1"/>
+          </a:fontRef>
+        </p:style>
+        <p:txBody>
+          <a:bodyPr rtlCol="0" anchor="ctr"/>
+          <a:lstStyle/>
+          <a:p>
+            <a:pPr algn="ctr"/>
+            <a:endParaRPr lang="zh-CN" altLang="en-US"/>
+          </a:p>
+        </p:txBody>
+      </p:sp>
+      <p:sp>
+        <p:nvSpPr>
+          <p:cNvPr id="106" name="右箭头 105"/>
+          <p:cNvSpPr/>
+          <p:nvPr/>
+        </p:nvSpPr>
+        <p:spPr>
+          <a:xfrm rot="10800000">
+            <a:off x="5709634" y="4428385"/>
+            <a:ext cx="277115" cy="253634"/>
+          </a:xfrm>
+          <a:prstGeom prst="rightArrow">
+            <a:avLst/>
+          </a:prstGeom>
+          <a:solidFill>
+            <a:schemeClr val="bg1"/>
+          </a:solidFill>
+          <a:ln>
+            <a:solidFill>
+              <a:schemeClr val="tx1"/>
+            </a:solidFill>
+          </a:ln>
+        </p:spPr>
+        <p:style>
+          <a:lnRef idx="2">
+            <a:schemeClr val="accent1">
+              <a:shade val="50000"/>
+            </a:schemeClr>
+          </a:lnRef>
+          <a:fillRef idx="1">
+            <a:schemeClr val="accent1"/>
+          </a:fillRef>
+          <a:effectRef idx="0">
+            <a:schemeClr val="accent1"/>
+          </a:effectRef>
+          <a:fontRef idx="minor">
+            <a:schemeClr val="lt1"/>
+          </a:fontRef>
+        </p:style>
+        <p:txBody>
+          <a:bodyPr rtlCol="0" anchor="ctr"/>
+          <a:lstStyle/>
+          <a:p>
+            <a:pPr algn="ctr"/>
+            <a:endParaRPr lang="zh-CN" altLang="en-US"/>
+          </a:p>
+        </p:txBody>
+      </p:sp>
+      <p:sp>
+        <p:nvSpPr>
+          <p:cNvPr id="107" name="右箭头 106"/>
+          <p:cNvSpPr/>
+          <p:nvPr/>
+        </p:nvSpPr>
+        <p:spPr>
+          <a:xfrm rot="10800000">
+            <a:off x="4167084" y="4484844"/>
+            <a:ext cx="277115" cy="253634"/>
+          </a:xfrm>
+          <a:prstGeom prst="rightArrow">
+            <a:avLst/>
+          </a:prstGeom>
+          <a:solidFill>
+            <a:schemeClr val="bg1"/>
+          </a:solidFill>
+          <a:ln>
+            <a:solidFill>
+              <a:schemeClr val="tx1"/>
+            </a:solidFill>
+          </a:ln>
+        </p:spPr>
+        <p:style>
+          <a:lnRef idx="2">
+            <a:schemeClr val="accent1">
+              <a:shade val="50000"/>
+            </a:schemeClr>
+          </a:lnRef>
+          <a:fillRef idx="1">
+            <a:schemeClr val="accent1"/>
+          </a:fillRef>
+          <a:effectRef idx="0">
+            <a:schemeClr val="accent1"/>
+          </a:effectRef>
+          <a:fontRef idx="minor">
+            <a:schemeClr val="lt1"/>
+          </a:fontRef>
+        </p:style>
+        <p:txBody>
+          <a:bodyPr rtlCol="0" anchor="ctr"/>
+          <a:lstStyle/>
+          <a:p>
+            <a:pPr algn="ctr"/>
+            <a:endParaRPr lang="zh-CN" altLang="en-US"/>
+          </a:p>
+        </p:txBody>
+      </p:sp>
+      <p:sp>
+        <p:nvSpPr>
+          <p:cNvPr id="109" name="右箭头 108"/>
+          <p:cNvSpPr/>
+          <p:nvPr/>
+        </p:nvSpPr>
+        <p:spPr>
+          <a:xfrm rot="5400000">
+            <a:off x="2745867" y="3510068"/>
+            <a:ext cx="504057" cy="253634"/>
+          </a:xfrm>
+          <a:prstGeom prst="rightArrow">
+            <a:avLst/>
+          </a:prstGeom>
+          <a:solidFill>
+            <a:schemeClr val="bg1"/>
+          </a:solidFill>
+          <a:ln>
+            <a:solidFill>
+              <a:schemeClr val="tx1"/>
+            </a:solidFill>
           </a:ln>
         </p:spPr>
         <p:style>

</xml_diff>

<commit_message>
figure out a way to be faster
</commit_message>
<xml_diff>
--- a/Graphic & Tables.pptx
+++ b/Graphic & Tables.pptx
@@ -5,7 +5,7 @@
     <p:sldMasterId id="2147483648" r:id="rId1"/>
   </p:sldMasterIdLst>
   <p:notesMasterIdLst>
-    <p:notesMasterId r:id="rId7"/>
+    <p:notesMasterId r:id="rId9"/>
   </p:notesMasterIdLst>
   <p:sldIdLst>
     <p:sldId id="256" r:id="rId2"/>
@@ -13,6 +13,8 @@
     <p:sldId id="259" r:id="rId4"/>
     <p:sldId id="260" r:id="rId5"/>
     <p:sldId id="261" r:id="rId6"/>
+    <p:sldId id="262" r:id="rId7"/>
+    <p:sldId id="263" r:id="rId8"/>
   </p:sldIdLst>
   <p:sldSz cx="9144000" cy="6858000" type="screen4x3"/>
   <p:notesSz cx="6858000" cy="9144000"/>
@@ -129,6 +131,8 @@
         <p14:section name="第二章图" id="{D6ABDE09-FEE3-4938-8CE5-BB6E0A650E38}">
           <p14:sldIdLst>
             <p14:sldId id="261"/>
+            <p14:sldId id="262"/>
+            <p14:sldId id="263"/>
           </p14:sldIdLst>
         </p14:section>
       </p14:sectionLst>
@@ -3632,7 +3636,7 @@
           <a:graphicData uri="http://schemas.openxmlformats.org/presentationml/2006/ole">
             <mc:AlternateContent xmlns:mc="http://schemas.openxmlformats.org/markup-compatibility/2006">
               <mc:Choice xmlns:v="urn:schemas-microsoft-com:vml" Requires="v">
-                <p:oleObj spid="_x0000_s1044" name="文档" r:id="rId3" imgW="5594453" imgH="3640410" progId="Word.Document.12">
+                <p:oleObj spid="_x0000_s1047" name="文档" r:id="rId3" imgW="5594453" imgH="3640410" progId="Word.Document.12">
                   <p:embed/>
                 </p:oleObj>
               </mc:Choice>
@@ -9939,7 +9943,7 @@
       </p:sp>
       <p:pic>
         <p:nvPicPr>
-          <p:cNvPr id="6" name="图片 5"/>
+          <p:cNvPr id="2" name="图片 1"/>
           <p:cNvPicPr>
             <a:picLocks noChangeAspect="1"/>
           </p:cNvPicPr>
@@ -9971,6 +9975,3495 @@
     <p:extLst>
       <p:ext uri="{BB962C8B-B14F-4D97-AF65-F5344CB8AC3E}">
         <p14:creationId xmlns:p14="http://schemas.microsoft.com/office/powerpoint/2010/main" val="3360288799"/>
+      </p:ext>
+    </p:extLst>
+  </p:cSld>
+  <p:clrMapOvr>
+    <a:masterClrMapping/>
+  </p:clrMapOvr>
+</p:sld>
+</file>
+
+<file path=ppt/slides/slide6.xml><?xml version="1.0" encoding="utf-8"?>
+<p:sld xmlns:a="http://schemas.openxmlformats.org/drawingml/2006/main" xmlns:r="http://schemas.openxmlformats.org/officeDocument/2006/relationships" xmlns:p="http://schemas.openxmlformats.org/presentationml/2006/main">
+  <p:cSld>
+    <p:spTree>
+      <p:nvGrpSpPr>
+        <p:cNvPr id="1" name=""/>
+        <p:cNvGrpSpPr/>
+        <p:nvPr/>
+      </p:nvGrpSpPr>
+      <p:grpSpPr>
+        <a:xfrm>
+          <a:off x="0" y="0"/>
+          <a:ext cx="0" cy="0"/>
+          <a:chOff x="0" y="0"/>
+          <a:chExt cx="0" cy="0"/>
+        </a:xfrm>
+      </p:grpSpPr>
+      <p:sp>
+        <p:nvSpPr>
+          <p:cNvPr id="32" name="矩形 31"/>
+          <p:cNvSpPr/>
+          <p:nvPr/>
+        </p:nvSpPr>
+        <p:spPr>
+          <a:xfrm rot="480000">
+            <a:off x="3323213" y="1037554"/>
+            <a:ext cx="45719" cy="3773742"/>
+          </a:xfrm>
+          <a:prstGeom prst="rect">
+            <a:avLst/>
+          </a:prstGeom>
+          <a:solidFill>
+            <a:schemeClr val="tx1"/>
+          </a:solidFill>
+          <a:ln>
+            <a:solidFill>
+              <a:schemeClr val="tx1"/>
+            </a:solidFill>
+          </a:ln>
+        </p:spPr>
+        <p:style>
+          <a:lnRef idx="2">
+            <a:schemeClr val="accent1">
+              <a:shade val="50000"/>
+            </a:schemeClr>
+          </a:lnRef>
+          <a:fillRef idx="1">
+            <a:schemeClr val="accent1"/>
+          </a:fillRef>
+          <a:effectRef idx="0">
+            <a:schemeClr val="accent1"/>
+          </a:effectRef>
+          <a:fontRef idx="minor">
+            <a:schemeClr val="lt1"/>
+          </a:fontRef>
+        </p:style>
+        <p:txBody>
+          <a:bodyPr rtlCol="0" anchor="ctr"/>
+          <a:lstStyle/>
+          <a:p>
+            <a:pPr algn="ctr"/>
+            <a:endParaRPr lang="zh-CN" altLang="en-US"/>
+          </a:p>
+        </p:txBody>
+      </p:sp>
+      <p:sp>
+        <p:nvSpPr>
+          <p:cNvPr id="93" name="矩形 92"/>
+          <p:cNvSpPr/>
+          <p:nvPr/>
+        </p:nvSpPr>
+        <p:spPr>
+          <a:xfrm rot="480000">
+            <a:off x="3475613" y="1037554"/>
+            <a:ext cx="45719" cy="3773742"/>
+          </a:xfrm>
+          <a:prstGeom prst="rect">
+            <a:avLst/>
+          </a:prstGeom>
+          <a:solidFill>
+            <a:schemeClr val="tx1"/>
+          </a:solidFill>
+          <a:ln>
+            <a:solidFill>
+              <a:schemeClr val="tx1"/>
+            </a:solidFill>
+          </a:ln>
+        </p:spPr>
+        <p:style>
+          <a:lnRef idx="2">
+            <a:schemeClr val="accent1">
+              <a:shade val="50000"/>
+            </a:schemeClr>
+          </a:lnRef>
+          <a:fillRef idx="1">
+            <a:schemeClr val="accent1"/>
+          </a:fillRef>
+          <a:effectRef idx="0">
+            <a:schemeClr val="accent1"/>
+          </a:effectRef>
+          <a:fontRef idx="minor">
+            <a:schemeClr val="lt1"/>
+          </a:fontRef>
+        </p:style>
+        <p:txBody>
+          <a:bodyPr rtlCol="0" anchor="ctr"/>
+          <a:lstStyle/>
+          <a:p>
+            <a:pPr algn="ctr"/>
+            <a:endParaRPr lang="zh-CN" altLang="en-US"/>
+          </a:p>
+        </p:txBody>
+      </p:sp>
+      <p:sp>
+        <p:nvSpPr>
+          <p:cNvPr id="94" name="矩形 93"/>
+          <p:cNvSpPr/>
+          <p:nvPr/>
+        </p:nvSpPr>
+        <p:spPr>
+          <a:xfrm rot="480000">
+            <a:off x="3628013" y="1037554"/>
+            <a:ext cx="45719" cy="3773742"/>
+          </a:xfrm>
+          <a:prstGeom prst="rect">
+            <a:avLst/>
+          </a:prstGeom>
+          <a:solidFill>
+            <a:schemeClr val="tx1"/>
+          </a:solidFill>
+          <a:ln>
+            <a:solidFill>
+              <a:schemeClr val="tx1"/>
+            </a:solidFill>
+          </a:ln>
+        </p:spPr>
+        <p:style>
+          <a:lnRef idx="2">
+            <a:schemeClr val="accent1">
+              <a:shade val="50000"/>
+            </a:schemeClr>
+          </a:lnRef>
+          <a:fillRef idx="1">
+            <a:schemeClr val="accent1"/>
+          </a:fillRef>
+          <a:effectRef idx="0">
+            <a:schemeClr val="accent1"/>
+          </a:effectRef>
+          <a:fontRef idx="minor">
+            <a:schemeClr val="lt1"/>
+          </a:fontRef>
+        </p:style>
+        <p:txBody>
+          <a:bodyPr rtlCol="0" anchor="ctr"/>
+          <a:lstStyle/>
+          <a:p>
+            <a:pPr algn="ctr"/>
+            <a:endParaRPr lang="zh-CN" altLang="en-US"/>
+          </a:p>
+        </p:txBody>
+      </p:sp>
+      <p:sp>
+        <p:nvSpPr>
+          <p:cNvPr id="95" name="矩形 94"/>
+          <p:cNvSpPr/>
+          <p:nvPr/>
+        </p:nvSpPr>
+        <p:spPr>
+          <a:xfrm rot="480000">
+            <a:off x="3780413" y="1037554"/>
+            <a:ext cx="45719" cy="3773742"/>
+          </a:xfrm>
+          <a:prstGeom prst="rect">
+            <a:avLst/>
+          </a:prstGeom>
+          <a:solidFill>
+            <a:schemeClr val="tx1"/>
+          </a:solidFill>
+          <a:ln>
+            <a:solidFill>
+              <a:schemeClr val="tx1"/>
+            </a:solidFill>
+          </a:ln>
+        </p:spPr>
+        <p:style>
+          <a:lnRef idx="2">
+            <a:schemeClr val="accent1">
+              <a:shade val="50000"/>
+            </a:schemeClr>
+          </a:lnRef>
+          <a:fillRef idx="1">
+            <a:schemeClr val="accent1"/>
+          </a:fillRef>
+          <a:effectRef idx="0">
+            <a:schemeClr val="accent1"/>
+          </a:effectRef>
+          <a:fontRef idx="minor">
+            <a:schemeClr val="lt1"/>
+          </a:fontRef>
+        </p:style>
+        <p:txBody>
+          <a:bodyPr rtlCol="0" anchor="ctr"/>
+          <a:lstStyle/>
+          <a:p>
+            <a:pPr algn="ctr"/>
+            <a:endParaRPr lang="zh-CN" altLang="en-US"/>
+          </a:p>
+        </p:txBody>
+      </p:sp>
+      <p:sp>
+        <p:nvSpPr>
+          <p:cNvPr id="96" name="矩形 95"/>
+          <p:cNvSpPr/>
+          <p:nvPr/>
+        </p:nvSpPr>
+        <p:spPr>
+          <a:xfrm rot="480000">
+            <a:off x="3932813" y="1037554"/>
+            <a:ext cx="45719" cy="3773742"/>
+          </a:xfrm>
+          <a:prstGeom prst="rect">
+            <a:avLst/>
+          </a:prstGeom>
+          <a:solidFill>
+            <a:schemeClr val="tx1"/>
+          </a:solidFill>
+          <a:ln>
+            <a:solidFill>
+              <a:schemeClr val="tx1"/>
+            </a:solidFill>
+          </a:ln>
+        </p:spPr>
+        <p:style>
+          <a:lnRef idx="2">
+            <a:schemeClr val="accent1">
+              <a:shade val="50000"/>
+            </a:schemeClr>
+          </a:lnRef>
+          <a:fillRef idx="1">
+            <a:schemeClr val="accent1"/>
+          </a:fillRef>
+          <a:effectRef idx="0">
+            <a:schemeClr val="accent1"/>
+          </a:effectRef>
+          <a:fontRef idx="minor">
+            <a:schemeClr val="lt1"/>
+          </a:fontRef>
+        </p:style>
+        <p:txBody>
+          <a:bodyPr rtlCol="0" anchor="ctr"/>
+          <a:lstStyle/>
+          <a:p>
+            <a:pPr algn="ctr"/>
+            <a:endParaRPr lang="zh-CN" altLang="en-US"/>
+          </a:p>
+        </p:txBody>
+      </p:sp>
+      <p:sp>
+        <p:nvSpPr>
+          <p:cNvPr id="97" name="矩形 96"/>
+          <p:cNvSpPr/>
+          <p:nvPr/>
+        </p:nvSpPr>
+        <p:spPr>
+          <a:xfrm rot="480000">
+            <a:off x="4085213" y="1037554"/>
+            <a:ext cx="45719" cy="3773742"/>
+          </a:xfrm>
+          <a:prstGeom prst="rect">
+            <a:avLst/>
+          </a:prstGeom>
+          <a:solidFill>
+            <a:schemeClr val="tx1"/>
+          </a:solidFill>
+          <a:ln>
+            <a:solidFill>
+              <a:schemeClr val="tx1"/>
+            </a:solidFill>
+          </a:ln>
+        </p:spPr>
+        <p:style>
+          <a:lnRef idx="2">
+            <a:schemeClr val="accent1">
+              <a:shade val="50000"/>
+            </a:schemeClr>
+          </a:lnRef>
+          <a:fillRef idx="1">
+            <a:schemeClr val="accent1"/>
+          </a:fillRef>
+          <a:effectRef idx="0">
+            <a:schemeClr val="accent1"/>
+          </a:effectRef>
+          <a:fontRef idx="minor">
+            <a:schemeClr val="lt1"/>
+          </a:fontRef>
+        </p:style>
+        <p:txBody>
+          <a:bodyPr rtlCol="0" anchor="ctr"/>
+          <a:lstStyle/>
+          <a:p>
+            <a:pPr algn="ctr"/>
+            <a:endParaRPr lang="zh-CN" altLang="en-US"/>
+          </a:p>
+        </p:txBody>
+      </p:sp>
+      <p:sp>
+        <p:nvSpPr>
+          <p:cNvPr id="98" name="矩形 97"/>
+          <p:cNvSpPr/>
+          <p:nvPr/>
+        </p:nvSpPr>
+        <p:spPr>
+          <a:xfrm rot="480000">
+            <a:off x="4237613" y="1037554"/>
+            <a:ext cx="45719" cy="3773742"/>
+          </a:xfrm>
+          <a:prstGeom prst="rect">
+            <a:avLst/>
+          </a:prstGeom>
+          <a:solidFill>
+            <a:schemeClr val="tx1"/>
+          </a:solidFill>
+          <a:ln>
+            <a:solidFill>
+              <a:schemeClr val="tx1"/>
+            </a:solidFill>
+          </a:ln>
+        </p:spPr>
+        <p:style>
+          <a:lnRef idx="2">
+            <a:schemeClr val="accent1">
+              <a:shade val="50000"/>
+            </a:schemeClr>
+          </a:lnRef>
+          <a:fillRef idx="1">
+            <a:schemeClr val="accent1"/>
+          </a:fillRef>
+          <a:effectRef idx="0">
+            <a:schemeClr val="accent1"/>
+          </a:effectRef>
+          <a:fontRef idx="minor">
+            <a:schemeClr val="lt1"/>
+          </a:fontRef>
+        </p:style>
+        <p:txBody>
+          <a:bodyPr rtlCol="0" anchor="ctr"/>
+          <a:lstStyle/>
+          <a:p>
+            <a:pPr algn="ctr"/>
+            <a:endParaRPr lang="zh-CN" altLang="en-US"/>
+          </a:p>
+        </p:txBody>
+      </p:sp>
+      <p:sp>
+        <p:nvSpPr>
+          <p:cNvPr id="99" name="矩形 98"/>
+          <p:cNvSpPr/>
+          <p:nvPr/>
+        </p:nvSpPr>
+        <p:spPr>
+          <a:xfrm rot="480000">
+            <a:off x="4390013" y="1037554"/>
+            <a:ext cx="45719" cy="3773742"/>
+          </a:xfrm>
+          <a:prstGeom prst="rect">
+            <a:avLst/>
+          </a:prstGeom>
+          <a:solidFill>
+            <a:schemeClr val="tx1"/>
+          </a:solidFill>
+          <a:ln>
+            <a:solidFill>
+              <a:schemeClr val="tx1"/>
+            </a:solidFill>
+          </a:ln>
+        </p:spPr>
+        <p:style>
+          <a:lnRef idx="2">
+            <a:schemeClr val="accent1">
+              <a:shade val="50000"/>
+            </a:schemeClr>
+          </a:lnRef>
+          <a:fillRef idx="1">
+            <a:schemeClr val="accent1"/>
+          </a:fillRef>
+          <a:effectRef idx="0">
+            <a:schemeClr val="accent1"/>
+          </a:effectRef>
+          <a:fontRef idx="minor">
+            <a:schemeClr val="lt1"/>
+          </a:fontRef>
+        </p:style>
+        <p:txBody>
+          <a:bodyPr rtlCol="0" anchor="ctr"/>
+          <a:lstStyle/>
+          <a:p>
+            <a:pPr algn="ctr"/>
+            <a:endParaRPr lang="zh-CN" altLang="en-US"/>
+          </a:p>
+        </p:txBody>
+      </p:sp>
+      <p:sp>
+        <p:nvSpPr>
+          <p:cNvPr id="100" name="矩形 99"/>
+          <p:cNvSpPr/>
+          <p:nvPr/>
+        </p:nvSpPr>
+        <p:spPr>
+          <a:xfrm rot="480000">
+            <a:off x="4542413" y="1037554"/>
+            <a:ext cx="45719" cy="3773742"/>
+          </a:xfrm>
+          <a:prstGeom prst="rect">
+            <a:avLst/>
+          </a:prstGeom>
+          <a:solidFill>
+            <a:schemeClr val="tx1"/>
+          </a:solidFill>
+          <a:ln>
+            <a:solidFill>
+              <a:schemeClr val="tx1"/>
+            </a:solidFill>
+          </a:ln>
+        </p:spPr>
+        <p:style>
+          <a:lnRef idx="2">
+            <a:schemeClr val="accent1">
+              <a:shade val="50000"/>
+            </a:schemeClr>
+          </a:lnRef>
+          <a:fillRef idx="1">
+            <a:schemeClr val="accent1"/>
+          </a:fillRef>
+          <a:effectRef idx="0">
+            <a:schemeClr val="accent1"/>
+          </a:effectRef>
+          <a:fontRef idx="minor">
+            <a:schemeClr val="lt1"/>
+          </a:fontRef>
+        </p:style>
+        <p:txBody>
+          <a:bodyPr rtlCol="0" anchor="ctr"/>
+          <a:lstStyle/>
+          <a:p>
+            <a:pPr algn="ctr"/>
+            <a:endParaRPr lang="zh-CN" altLang="en-US"/>
+          </a:p>
+        </p:txBody>
+      </p:sp>
+      <p:sp>
+        <p:nvSpPr>
+          <p:cNvPr id="101" name="矩形 100"/>
+          <p:cNvSpPr/>
+          <p:nvPr/>
+        </p:nvSpPr>
+        <p:spPr>
+          <a:xfrm rot="480000">
+            <a:off x="4694813" y="1037554"/>
+            <a:ext cx="45719" cy="3773742"/>
+          </a:xfrm>
+          <a:prstGeom prst="rect">
+            <a:avLst/>
+          </a:prstGeom>
+          <a:solidFill>
+            <a:schemeClr val="tx1"/>
+          </a:solidFill>
+          <a:ln>
+            <a:solidFill>
+              <a:schemeClr val="tx1"/>
+            </a:solidFill>
+          </a:ln>
+        </p:spPr>
+        <p:style>
+          <a:lnRef idx="2">
+            <a:schemeClr val="accent1">
+              <a:shade val="50000"/>
+            </a:schemeClr>
+          </a:lnRef>
+          <a:fillRef idx="1">
+            <a:schemeClr val="accent1"/>
+          </a:fillRef>
+          <a:effectRef idx="0">
+            <a:schemeClr val="accent1"/>
+          </a:effectRef>
+          <a:fontRef idx="minor">
+            <a:schemeClr val="lt1"/>
+          </a:fontRef>
+        </p:style>
+        <p:txBody>
+          <a:bodyPr rtlCol="0" anchor="ctr"/>
+          <a:lstStyle/>
+          <a:p>
+            <a:pPr algn="ctr"/>
+            <a:endParaRPr lang="zh-CN" altLang="en-US"/>
+          </a:p>
+        </p:txBody>
+      </p:sp>
+      <p:sp>
+        <p:nvSpPr>
+          <p:cNvPr id="102" name="矩形 101"/>
+          <p:cNvSpPr/>
+          <p:nvPr/>
+        </p:nvSpPr>
+        <p:spPr>
+          <a:xfrm rot="480000">
+            <a:off x="4847213" y="1037554"/>
+            <a:ext cx="45719" cy="3773742"/>
+          </a:xfrm>
+          <a:prstGeom prst="rect">
+            <a:avLst/>
+          </a:prstGeom>
+          <a:solidFill>
+            <a:schemeClr val="tx1"/>
+          </a:solidFill>
+          <a:ln>
+            <a:solidFill>
+              <a:schemeClr val="tx1"/>
+            </a:solidFill>
+          </a:ln>
+        </p:spPr>
+        <p:style>
+          <a:lnRef idx="2">
+            <a:schemeClr val="accent1">
+              <a:shade val="50000"/>
+            </a:schemeClr>
+          </a:lnRef>
+          <a:fillRef idx="1">
+            <a:schemeClr val="accent1"/>
+          </a:fillRef>
+          <a:effectRef idx="0">
+            <a:schemeClr val="accent1"/>
+          </a:effectRef>
+          <a:fontRef idx="minor">
+            <a:schemeClr val="lt1"/>
+          </a:fontRef>
+        </p:style>
+        <p:txBody>
+          <a:bodyPr rtlCol="0" anchor="ctr"/>
+          <a:lstStyle/>
+          <a:p>
+            <a:pPr algn="ctr"/>
+            <a:endParaRPr lang="zh-CN" altLang="en-US"/>
+          </a:p>
+        </p:txBody>
+      </p:sp>
+      <p:sp>
+        <p:nvSpPr>
+          <p:cNvPr id="103" name="矩形 102"/>
+          <p:cNvSpPr/>
+          <p:nvPr/>
+        </p:nvSpPr>
+        <p:spPr>
+          <a:xfrm rot="480000">
+            <a:off x="4999613" y="1037554"/>
+            <a:ext cx="45719" cy="3773742"/>
+          </a:xfrm>
+          <a:prstGeom prst="rect">
+            <a:avLst/>
+          </a:prstGeom>
+          <a:solidFill>
+            <a:schemeClr val="tx1"/>
+          </a:solidFill>
+          <a:ln>
+            <a:solidFill>
+              <a:schemeClr val="tx1"/>
+            </a:solidFill>
+          </a:ln>
+        </p:spPr>
+        <p:style>
+          <a:lnRef idx="2">
+            <a:schemeClr val="accent1">
+              <a:shade val="50000"/>
+            </a:schemeClr>
+          </a:lnRef>
+          <a:fillRef idx="1">
+            <a:schemeClr val="accent1"/>
+          </a:fillRef>
+          <a:effectRef idx="0">
+            <a:schemeClr val="accent1"/>
+          </a:effectRef>
+          <a:fontRef idx="minor">
+            <a:schemeClr val="lt1"/>
+          </a:fontRef>
+        </p:style>
+        <p:txBody>
+          <a:bodyPr rtlCol="0" anchor="ctr"/>
+          <a:lstStyle/>
+          <a:p>
+            <a:pPr algn="ctr"/>
+            <a:endParaRPr lang="zh-CN" altLang="en-US"/>
+          </a:p>
+        </p:txBody>
+      </p:sp>
+      <p:sp>
+        <p:nvSpPr>
+          <p:cNvPr id="104" name="矩形 103"/>
+          <p:cNvSpPr/>
+          <p:nvPr/>
+        </p:nvSpPr>
+        <p:spPr>
+          <a:xfrm>
+            <a:off x="3433192" y="1145178"/>
+            <a:ext cx="45719" cy="3773742"/>
+          </a:xfrm>
+          <a:prstGeom prst="rect">
+            <a:avLst/>
+          </a:prstGeom>
+          <a:solidFill>
+            <a:schemeClr val="tx1"/>
+          </a:solidFill>
+          <a:ln>
+            <a:solidFill>
+              <a:schemeClr val="tx1"/>
+            </a:solidFill>
+          </a:ln>
+        </p:spPr>
+        <p:style>
+          <a:lnRef idx="2">
+            <a:schemeClr val="accent1">
+              <a:shade val="50000"/>
+            </a:schemeClr>
+          </a:lnRef>
+          <a:fillRef idx="1">
+            <a:schemeClr val="accent1"/>
+          </a:fillRef>
+          <a:effectRef idx="0">
+            <a:schemeClr val="accent1"/>
+          </a:effectRef>
+          <a:fontRef idx="minor">
+            <a:schemeClr val="lt1"/>
+          </a:fontRef>
+        </p:style>
+        <p:txBody>
+          <a:bodyPr rtlCol="0" anchor="ctr"/>
+          <a:lstStyle/>
+          <a:p>
+            <a:pPr algn="ctr"/>
+            <a:endParaRPr lang="zh-CN" altLang="en-US"/>
+          </a:p>
+        </p:txBody>
+      </p:sp>
+      <p:sp>
+        <p:nvSpPr>
+          <p:cNvPr id="105" name="矩形 104"/>
+          <p:cNvSpPr/>
+          <p:nvPr/>
+        </p:nvSpPr>
+        <p:spPr>
+          <a:xfrm>
+            <a:off x="3585592" y="1145178"/>
+            <a:ext cx="45719" cy="3773742"/>
+          </a:xfrm>
+          <a:prstGeom prst="rect">
+            <a:avLst/>
+          </a:prstGeom>
+          <a:solidFill>
+            <a:schemeClr val="tx1"/>
+          </a:solidFill>
+          <a:ln>
+            <a:solidFill>
+              <a:schemeClr val="tx1"/>
+            </a:solidFill>
+          </a:ln>
+        </p:spPr>
+        <p:style>
+          <a:lnRef idx="2">
+            <a:schemeClr val="accent1">
+              <a:shade val="50000"/>
+            </a:schemeClr>
+          </a:lnRef>
+          <a:fillRef idx="1">
+            <a:schemeClr val="accent1"/>
+          </a:fillRef>
+          <a:effectRef idx="0">
+            <a:schemeClr val="accent1"/>
+          </a:effectRef>
+          <a:fontRef idx="minor">
+            <a:schemeClr val="lt1"/>
+          </a:fontRef>
+        </p:style>
+        <p:txBody>
+          <a:bodyPr rtlCol="0" anchor="ctr"/>
+          <a:lstStyle/>
+          <a:p>
+            <a:pPr algn="ctr"/>
+            <a:endParaRPr lang="zh-CN" altLang="en-US"/>
+          </a:p>
+        </p:txBody>
+      </p:sp>
+      <p:sp>
+        <p:nvSpPr>
+          <p:cNvPr id="106" name="矩形 105"/>
+          <p:cNvSpPr/>
+          <p:nvPr/>
+        </p:nvSpPr>
+        <p:spPr>
+          <a:xfrm>
+            <a:off x="3737992" y="1145178"/>
+            <a:ext cx="45719" cy="3773742"/>
+          </a:xfrm>
+          <a:prstGeom prst="rect">
+            <a:avLst/>
+          </a:prstGeom>
+          <a:solidFill>
+            <a:schemeClr val="tx1"/>
+          </a:solidFill>
+          <a:ln>
+            <a:solidFill>
+              <a:schemeClr val="tx1"/>
+            </a:solidFill>
+          </a:ln>
+        </p:spPr>
+        <p:style>
+          <a:lnRef idx="2">
+            <a:schemeClr val="accent1">
+              <a:shade val="50000"/>
+            </a:schemeClr>
+          </a:lnRef>
+          <a:fillRef idx="1">
+            <a:schemeClr val="accent1"/>
+          </a:fillRef>
+          <a:effectRef idx="0">
+            <a:schemeClr val="accent1"/>
+          </a:effectRef>
+          <a:fontRef idx="minor">
+            <a:schemeClr val="lt1"/>
+          </a:fontRef>
+        </p:style>
+        <p:txBody>
+          <a:bodyPr rtlCol="0" anchor="ctr"/>
+          <a:lstStyle/>
+          <a:p>
+            <a:pPr algn="ctr"/>
+            <a:endParaRPr lang="zh-CN" altLang="en-US"/>
+          </a:p>
+        </p:txBody>
+      </p:sp>
+      <p:sp>
+        <p:nvSpPr>
+          <p:cNvPr id="107" name="矩形 106"/>
+          <p:cNvSpPr/>
+          <p:nvPr/>
+        </p:nvSpPr>
+        <p:spPr>
+          <a:xfrm>
+            <a:off x="3890392" y="1145178"/>
+            <a:ext cx="45719" cy="3773742"/>
+          </a:xfrm>
+          <a:prstGeom prst="rect">
+            <a:avLst/>
+          </a:prstGeom>
+          <a:solidFill>
+            <a:schemeClr val="tx1"/>
+          </a:solidFill>
+          <a:ln>
+            <a:solidFill>
+              <a:schemeClr val="tx1"/>
+            </a:solidFill>
+          </a:ln>
+        </p:spPr>
+        <p:style>
+          <a:lnRef idx="2">
+            <a:schemeClr val="accent1">
+              <a:shade val="50000"/>
+            </a:schemeClr>
+          </a:lnRef>
+          <a:fillRef idx="1">
+            <a:schemeClr val="accent1"/>
+          </a:fillRef>
+          <a:effectRef idx="0">
+            <a:schemeClr val="accent1"/>
+          </a:effectRef>
+          <a:fontRef idx="minor">
+            <a:schemeClr val="lt1"/>
+          </a:fontRef>
+        </p:style>
+        <p:txBody>
+          <a:bodyPr rtlCol="0" anchor="ctr"/>
+          <a:lstStyle/>
+          <a:p>
+            <a:pPr algn="ctr"/>
+            <a:endParaRPr lang="zh-CN" altLang="en-US"/>
+          </a:p>
+        </p:txBody>
+      </p:sp>
+      <p:sp>
+        <p:nvSpPr>
+          <p:cNvPr id="108" name="矩形 107"/>
+          <p:cNvSpPr/>
+          <p:nvPr/>
+        </p:nvSpPr>
+        <p:spPr>
+          <a:xfrm>
+            <a:off x="4042792" y="1145178"/>
+            <a:ext cx="45719" cy="3773742"/>
+          </a:xfrm>
+          <a:prstGeom prst="rect">
+            <a:avLst/>
+          </a:prstGeom>
+          <a:solidFill>
+            <a:schemeClr val="tx1"/>
+          </a:solidFill>
+          <a:ln>
+            <a:solidFill>
+              <a:schemeClr val="tx1"/>
+            </a:solidFill>
+          </a:ln>
+        </p:spPr>
+        <p:style>
+          <a:lnRef idx="2">
+            <a:schemeClr val="accent1">
+              <a:shade val="50000"/>
+            </a:schemeClr>
+          </a:lnRef>
+          <a:fillRef idx="1">
+            <a:schemeClr val="accent1"/>
+          </a:fillRef>
+          <a:effectRef idx="0">
+            <a:schemeClr val="accent1"/>
+          </a:effectRef>
+          <a:fontRef idx="minor">
+            <a:schemeClr val="lt1"/>
+          </a:fontRef>
+        </p:style>
+        <p:txBody>
+          <a:bodyPr rtlCol="0" anchor="ctr"/>
+          <a:lstStyle/>
+          <a:p>
+            <a:pPr algn="ctr"/>
+            <a:endParaRPr lang="zh-CN" altLang="en-US"/>
+          </a:p>
+        </p:txBody>
+      </p:sp>
+      <p:sp>
+        <p:nvSpPr>
+          <p:cNvPr id="109" name="矩形 108"/>
+          <p:cNvSpPr/>
+          <p:nvPr/>
+        </p:nvSpPr>
+        <p:spPr>
+          <a:xfrm>
+            <a:off x="4195192" y="1145178"/>
+            <a:ext cx="45719" cy="3773742"/>
+          </a:xfrm>
+          <a:prstGeom prst="rect">
+            <a:avLst/>
+          </a:prstGeom>
+          <a:solidFill>
+            <a:schemeClr val="tx1"/>
+          </a:solidFill>
+          <a:ln>
+            <a:solidFill>
+              <a:schemeClr val="tx1"/>
+            </a:solidFill>
+          </a:ln>
+        </p:spPr>
+        <p:style>
+          <a:lnRef idx="2">
+            <a:schemeClr val="accent1">
+              <a:shade val="50000"/>
+            </a:schemeClr>
+          </a:lnRef>
+          <a:fillRef idx="1">
+            <a:schemeClr val="accent1"/>
+          </a:fillRef>
+          <a:effectRef idx="0">
+            <a:schemeClr val="accent1"/>
+          </a:effectRef>
+          <a:fontRef idx="minor">
+            <a:schemeClr val="lt1"/>
+          </a:fontRef>
+        </p:style>
+        <p:txBody>
+          <a:bodyPr rtlCol="0" anchor="ctr"/>
+          <a:lstStyle/>
+          <a:p>
+            <a:pPr algn="ctr"/>
+            <a:endParaRPr lang="zh-CN" altLang="en-US"/>
+          </a:p>
+        </p:txBody>
+      </p:sp>
+      <p:sp>
+        <p:nvSpPr>
+          <p:cNvPr id="110" name="矩形 109"/>
+          <p:cNvSpPr/>
+          <p:nvPr/>
+        </p:nvSpPr>
+        <p:spPr>
+          <a:xfrm>
+            <a:off x="4347592" y="1145178"/>
+            <a:ext cx="45719" cy="3773742"/>
+          </a:xfrm>
+          <a:prstGeom prst="rect">
+            <a:avLst/>
+          </a:prstGeom>
+          <a:solidFill>
+            <a:schemeClr val="tx1"/>
+          </a:solidFill>
+          <a:ln>
+            <a:solidFill>
+              <a:schemeClr val="tx1"/>
+            </a:solidFill>
+          </a:ln>
+        </p:spPr>
+        <p:style>
+          <a:lnRef idx="2">
+            <a:schemeClr val="accent1">
+              <a:shade val="50000"/>
+            </a:schemeClr>
+          </a:lnRef>
+          <a:fillRef idx="1">
+            <a:schemeClr val="accent1"/>
+          </a:fillRef>
+          <a:effectRef idx="0">
+            <a:schemeClr val="accent1"/>
+          </a:effectRef>
+          <a:fontRef idx="minor">
+            <a:schemeClr val="lt1"/>
+          </a:fontRef>
+        </p:style>
+        <p:txBody>
+          <a:bodyPr rtlCol="0" anchor="ctr"/>
+          <a:lstStyle/>
+          <a:p>
+            <a:pPr algn="ctr"/>
+            <a:endParaRPr lang="zh-CN" altLang="en-US"/>
+          </a:p>
+        </p:txBody>
+      </p:sp>
+      <p:sp>
+        <p:nvSpPr>
+          <p:cNvPr id="111" name="矩形 110"/>
+          <p:cNvSpPr/>
+          <p:nvPr/>
+        </p:nvSpPr>
+        <p:spPr>
+          <a:xfrm>
+            <a:off x="4499992" y="1145178"/>
+            <a:ext cx="45719" cy="3773742"/>
+          </a:xfrm>
+          <a:prstGeom prst="rect">
+            <a:avLst/>
+          </a:prstGeom>
+          <a:solidFill>
+            <a:schemeClr val="tx1"/>
+          </a:solidFill>
+          <a:ln>
+            <a:solidFill>
+              <a:schemeClr val="tx1"/>
+            </a:solidFill>
+          </a:ln>
+        </p:spPr>
+        <p:style>
+          <a:lnRef idx="2">
+            <a:schemeClr val="accent1">
+              <a:shade val="50000"/>
+            </a:schemeClr>
+          </a:lnRef>
+          <a:fillRef idx="1">
+            <a:schemeClr val="accent1"/>
+          </a:fillRef>
+          <a:effectRef idx="0">
+            <a:schemeClr val="accent1"/>
+          </a:effectRef>
+          <a:fontRef idx="minor">
+            <a:schemeClr val="lt1"/>
+          </a:fontRef>
+        </p:style>
+        <p:txBody>
+          <a:bodyPr rtlCol="0" anchor="ctr"/>
+          <a:lstStyle/>
+          <a:p>
+            <a:pPr algn="ctr"/>
+            <a:endParaRPr lang="zh-CN" altLang="en-US"/>
+          </a:p>
+        </p:txBody>
+      </p:sp>
+      <p:sp>
+        <p:nvSpPr>
+          <p:cNvPr id="112" name="矩形 111"/>
+          <p:cNvSpPr/>
+          <p:nvPr/>
+        </p:nvSpPr>
+        <p:spPr>
+          <a:xfrm>
+            <a:off x="4652392" y="1145178"/>
+            <a:ext cx="45719" cy="3773742"/>
+          </a:xfrm>
+          <a:prstGeom prst="rect">
+            <a:avLst/>
+          </a:prstGeom>
+          <a:solidFill>
+            <a:schemeClr val="tx1"/>
+          </a:solidFill>
+          <a:ln>
+            <a:solidFill>
+              <a:schemeClr val="tx1"/>
+            </a:solidFill>
+          </a:ln>
+        </p:spPr>
+        <p:style>
+          <a:lnRef idx="2">
+            <a:schemeClr val="accent1">
+              <a:shade val="50000"/>
+            </a:schemeClr>
+          </a:lnRef>
+          <a:fillRef idx="1">
+            <a:schemeClr val="accent1"/>
+          </a:fillRef>
+          <a:effectRef idx="0">
+            <a:schemeClr val="accent1"/>
+          </a:effectRef>
+          <a:fontRef idx="minor">
+            <a:schemeClr val="lt1"/>
+          </a:fontRef>
+        </p:style>
+        <p:txBody>
+          <a:bodyPr rtlCol="0" anchor="ctr"/>
+          <a:lstStyle/>
+          <a:p>
+            <a:pPr algn="ctr"/>
+            <a:endParaRPr lang="zh-CN" altLang="en-US"/>
+          </a:p>
+        </p:txBody>
+      </p:sp>
+      <p:sp>
+        <p:nvSpPr>
+          <p:cNvPr id="113" name="矩形 112"/>
+          <p:cNvSpPr/>
+          <p:nvPr/>
+        </p:nvSpPr>
+        <p:spPr>
+          <a:xfrm>
+            <a:off x="4804792" y="1145178"/>
+            <a:ext cx="45719" cy="3773742"/>
+          </a:xfrm>
+          <a:prstGeom prst="rect">
+            <a:avLst/>
+          </a:prstGeom>
+          <a:solidFill>
+            <a:schemeClr val="tx1"/>
+          </a:solidFill>
+          <a:ln>
+            <a:solidFill>
+              <a:schemeClr val="tx1"/>
+            </a:solidFill>
+          </a:ln>
+        </p:spPr>
+        <p:style>
+          <a:lnRef idx="2">
+            <a:schemeClr val="accent1">
+              <a:shade val="50000"/>
+            </a:schemeClr>
+          </a:lnRef>
+          <a:fillRef idx="1">
+            <a:schemeClr val="accent1"/>
+          </a:fillRef>
+          <a:effectRef idx="0">
+            <a:schemeClr val="accent1"/>
+          </a:effectRef>
+          <a:fontRef idx="minor">
+            <a:schemeClr val="lt1"/>
+          </a:fontRef>
+        </p:style>
+        <p:txBody>
+          <a:bodyPr rtlCol="0" anchor="ctr"/>
+          <a:lstStyle/>
+          <a:p>
+            <a:pPr algn="ctr"/>
+            <a:endParaRPr lang="zh-CN" altLang="en-US"/>
+          </a:p>
+        </p:txBody>
+      </p:sp>
+      <p:sp>
+        <p:nvSpPr>
+          <p:cNvPr id="114" name="矩形 113"/>
+          <p:cNvSpPr/>
+          <p:nvPr/>
+        </p:nvSpPr>
+        <p:spPr>
+          <a:xfrm>
+            <a:off x="4957192" y="1145178"/>
+            <a:ext cx="45719" cy="3773742"/>
+          </a:xfrm>
+          <a:prstGeom prst="rect">
+            <a:avLst/>
+          </a:prstGeom>
+          <a:solidFill>
+            <a:schemeClr val="tx1"/>
+          </a:solidFill>
+          <a:ln>
+            <a:solidFill>
+              <a:schemeClr val="tx1"/>
+            </a:solidFill>
+          </a:ln>
+        </p:spPr>
+        <p:style>
+          <a:lnRef idx="2">
+            <a:schemeClr val="accent1">
+              <a:shade val="50000"/>
+            </a:schemeClr>
+          </a:lnRef>
+          <a:fillRef idx="1">
+            <a:schemeClr val="accent1"/>
+          </a:fillRef>
+          <a:effectRef idx="0">
+            <a:schemeClr val="accent1"/>
+          </a:effectRef>
+          <a:fontRef idx="minor">
+            <a:schemeClr val="lt1"/>
+          </a:fontRef>
+        </p:style>
+        <p:txBody>
+          <a:bodyPr rtlCol="0" anchor="ctr"/>
+          <a:lstStyle/>
+          <a:p>
+            <a:pPr algn="ctr"/>
+            <a:endParaRPr lang="zh-CN" altLang="en-US"/>
+          </a:p>
+        </p:txBody>
+      </p:sp>
+      <p:sp>
+        <p:nvSpPr>
+          <p:cNvPr id="115" name="矩形 114"/>
+          <p:cNvSpPr/>
+          <p:nvPr/>
+        </p:nvSpPr>
+        <p:spPr>
+          <a:xfrm>
+            <a:off x="5109592" y="1145178"/>
+            <a:ext cx="45719" cy="3773742"/>
+          </a:xfrm>
+          <a:prstGeom prst="rect">
+            <a:avLst/>
+          </a:prstGeom>
+          <a:solidFill>
+            <a:schemeClr val="tx1"/>
+          </a:solidFill>
+          <a:ln>
+            <a:solidFill>
+              <a:schemeClr val="tx1"/>
+            </a:solidFill>
+          </a:ln>
+        </p:spPr>
+        <p:style>
+          <a:lnRef idx="2">
+            <a:schemeClr val="accent1">
+              <a:shade val="50000"/>
+            </a:schemeClr>
+          </a:lnRef>
+          <a:fillRef idx="1">
+            <a:schemeClr val="accent1"/>
+          </a:fillRef>
+          <a:effectRef idx="0">
+            <a:schemeClr val="accent1"/>
+          </a:effectRef>
+          <a:fontRef idx="minor">
+            <a:schemeClr val="lt1"/>
+          </a:fontRef>
+        </p:style>
+        <p:txBody>
+          <a:bodyPr rtlCol="0" anchor="ctr"/>
+          <a:lstStyle/>
+          <a:p>
+            <a:pPr algn="ctr"/>
+            <a:endParaRPr lang="zh-CN" altLang="en-US"/>
+          </a:p>
+        </p:txBody>
+      </p:sp>
+    </p:spTree>
+    <p:extLst>
+      <p:ext uri="{BB962C8B-B14F-4D97-AF65-F5344CB8AC3E}">
+        <p14:creationId xmlns:p14="http://schemas.microsoft.com/office/powerpoint/2010/main" val="1400595726"/>
+      </p:ext>
+    </p:extLst>
+  </p:cSld>
+  <p:clrMapOvr>
+    <a:masterClrMapping/>
+  </p:clrMapOvr>
+</p:sld>
+</file>
+
+<file path=ppt/slides/slide7.xml><?xml version="1.0" encoding="utf-8"?>
+<p:sld xmlns:a="http://schemas.openxmlformats.org/drawingml/2006/main" xmlns:r="http://schemas.openxmlformats.org/officeDocument/2006/relationships" xmlns:p="http://schemas.openxmlformats.org/presentationml/2006/main">
+  <p:cSld>
+    <p:spTree>
+      <p:nvGrpSpPr>
+        <p:cNvPr id="1" name=""/>
+        <p:cNvGrpSpPr/>
+        <p:nvPr/>
+      </p:nvGrpSpPr>
+      <p:grpSpPr>
+        <a:xfrm>
+          <a:off x="0" y="0"/>
+          <a:ext cx="0" cy="0"/>
+          <a:chOff x="0" y="0"/>
+          <a:chExt cx="0" cy="0"/>
+        </a:xfrm>
+      </p:grpSpPr>
+      <p:graphicFrame>
+        <p:nvGraphicFramePr>
+          <p:cNvPr id="2" name="表格 1"/>
+          <p:cNvGraphicFramePr>
+            <a:graphicFrameLocks noGrp="1"/>
+          </p:cNvGraphicFramePr>
+          <p:nvPr>
+            <p:extLst>
+              <p:ext uri="{D42A27DB-BD31-4B8C-83A1-F6EECF244321}">
+                <p14:modId xmlns:p14="http://schemas.microsoft.com/office/powerpoint/2010/main" val="4290557915"/>
+              </p:ext>
+            </p:extLst>
+          </p:nvPr>
+        </p:nvGraphicFramePr>
+        <p:xfrm>
+          <a:off x="1879600" y="2389188"/>
+          <a:ext cx="5384801" cy="2263948"/>
+        </p:xfrm>
+        <a:graphic>
+          <a:graphicData uri="http://schemas.openxmlformats.org/drawingml/2006/table">
+            <a:tbl>
+              <a:tblPr>
+                <a:tableStyleId>{5C22544A-7EE6-4342-B048-85BDC9FD1C3A}</a:tableStyleId>
+              </a:tblPr>
+              <a:tblGrid>
+                <a:gridCol w="825014"/>
+                <a:gridCol w="2208498"/>
+                <a:gridCol w="2351289"/>
+              </a:tblGrid>
+              <a:tr h="171450">
+                <a:tc>
+                  <a:txBody>
+                    <a:bodyPr/>
+                    <a:lstStyle/>
+                    <a:p>
+                      <a:pPr algn="l" fontAlgn="b"/>
+                      <a:r>
+                        <a:rPr lang="zh-CN" altLang="en-US" sz="1100" u="none" strike="noStrike" dirty="0">
+                          <a:effectLst/>
+                        </a:rPr>
+                        <a:t>函数名称</a:t>
+                      </a:r>
+                      <a:endParaRPr lang="zh-CN" altLang="en-US" sz="1100" b="0" i="0" u="none" strike="noStrike" dirty="0">
+                        <a:solidFill>
+                          <a:srgbClr val="000000"/>
+                        </a:solidFill>
+                        <a:effectLst/>
+                        <a:latin typeface="宋体"/>
+                      </a:endParaRPr>
+                    </a:p>
+                  </a:txBody>
+                  <a:tcPr marL="0" marR="0" marT="0" marB="0" anchor="b">
+                    <a:lnT w="12700" cap="flat" cmpd="sng" algn="ctr">
+                      <a:solidFill>
+                        <a:schemeClr val="tx1"/>
+                      </a:solidFill>
+                      <a:prstDash val="solid"/>
+                      <a:round/>
+                      <a:headEnd type="none" w="med" len="med"/>
+                      <a:tailEnd type="none" w="med" len="med"/>
+                    </a:lnT>
+                    <a:lnB w="12700" cap="flat" cmpd="sng" algn="ctr">
+                      <a:solidFill>
+                        <a:schemeClr val="tx1"/>
+                      </a:solidFill>
+                      <a:prstDash val="solid"/>
+                      <a:round/>
+                      <a:headEnd type="none" w="med" len="med"/>
+                      <a:tailEnd type="none" w="med" len="med"/>
+                    </a:lnB>
+                  </a:tcPr>
+                </a:tc>
+                <a:tc>
+                  <a:txBody>
+                    <a:bodyPr/>
+                    <a:lstStyle/>
+                    <a:p>
+                      <a:pPr algn="l" fontAlgn="b"/>
+                      <a:r>
+                        <a:rPr lang="zh-CN" altLang="en-US" sz="1100" u="none" strike="noStrike">
+                          <a:effectLst/>
+                        </a:rPr>
+                        <a:t>单周期函数表达式</a:t>
+                      </a:r>
+                      <a:endParaRPr lang="zh-CN" altLang="en-US" sz="1100" b="0" i="0" u="none" strike="noStrike">
+                        <a:solidFill>
+                          <a:srgbClr val="000000"/>
+                        </a:solidFill>
+                        <a:effectLst/>
+                        <a:latin typeface="宋体"/>
+                      </a:endParaRPr>
+                    </a:p>
+                  </a:txBody>
+                  <a:tcPr marL="0" marR="0" marT="0" marB="0" anchor="b">
+                    <a:lnT w="12700" cap="flat" cmpd="sng" algn="ctr">
+                      <a:solidFill>
+                        <a:schemeClr val="tx1"/>
+                      </a:solidFill>
+                      <a:prstDash val="solid"/>
+                      <a:round/>
+                      <a:headEnd type="none" w="med" len="med"/>
+                      <a:tailEnd type="none" w="med" len="med"/>
+                    </a:lnT>
+                    <a:lnB w="12700" cap="flat" cmpd="sng" algn="ctr">
+                      <a:solidFill>
+                        <a:schemeClr val="tx1"/>
+                      </a:solidFill>
+                      <a:prstDash val="solid"/>
+                      <a:round/>
+                      <a:headEnd type="none" w="med" len="med"/>
+                      <a:tailEnd type="none" w="med" len="med"/>
+                    </a:lnB>
+                  </a:tcPr>
+                </a:tc>
+                <a:tc>
+                  <a:txBody>
+                    <a:bodyPr/>
+                    <a:lstStyle/>
+                    <a:p>
+                      <a:pPr algn="l" fontAlgn="b"/>
+                      <a:r>
+                        <a:rPr lang="zh-CN" altLang="en-US" sz="1100" u="none" strike="noStrike" dirty="0">
+                          <a:effectLst/>
+                        </a:rPr>
+                        <a:t>单周期傅立叶级数</a:t>
+                      </a:r>
+                      <a:endParaRPr lang="zh-CN" altLang="en-US" sz="1100" b="0" i="0" u="none" strike="noStrike" dirty="0">
+                        <a:solidFill>
+                          <a:srgbClr val="000000"/>
+                        </a:solidFill>
+                        <a:effectLst/>
+                        <a:latin typeface="宋体"/>
+                      </a:endParaRPr>
+                    </a:p>
+                  </a:txBody>
+                  <a:tcPr marL="0" marR="0" marT="0" marB="0" anchor="b">
+                    <a:lnT w="12700" cap="flat" cmpd="sng" algn="ctr">
+                      <a:solidFill>
+                        <a:schemeClr val="tx1"/>
+                      </a:solidFill>
+                      <a:prstDash val="solid"/>
+                      <a:round/>
+                      <a:headEnd type="none" w="med" len="med"/>
+                      <a:tailEnd type="none" w="med" len="med"/>
+                    </a:lnT>
+                    <a:lnB w="12700" cap="flat" cmpd="sng" algn="ctr">
+                      <a:solidFill>
+                        <a:schemeClr val="tx1"/>
+                      </a:solidFill>
+                      <a:prstDash val="solid"/>
+                      <a:round/>
+                      <a:headEnd type="none" w="med" len="med"/>
+                      <a:tailEnd type="none" w="med" len="med"/>
+                    </a:lnB>
+                  </a:tcPr>
+                </a:tc>
+              </a:tr>
+              <a:tr h="636270">
+                <a:tc>
+                  <a:txBody>
+                    <a:bodyPr/>
+                    <a:lstStyle/>
+                    <a:p>
+                      <a:pPr algn="l" fontAlgn="b"/>
+                      <a:r>
+                        <a:rPr lang="zh-CN" altLang="en-US" sz="1100" u="none" strike="noStrike" dirty="0">
+                          <a:effectLst/>
+                        </a:rPr>
+                        <a:t>方波</a:t>
+                      </a:r>
+                      <a:endParaRPr lang="zh-CN" altLang="en-US" sz="1100" b="0" i="0" u="none" strike="noStrike" dirty="0">
+                        <a:solidFill>
+                          <a:srgbClr val="000000"/>
+                        </a:solidFill>
+                        <a:effectLst/>
+                        <a:latin typeface="宋体"/>
+                      </a:endParaRPr>
+                    </a:p>
+                  </a:txBody>
+                  <a:tcPr marL="0" marR="0" marT="0" marB="0" anchor="b">
+                    <a:lnT w="12700" cap="flat" cmpd="sng" algn="ctr">
+                      <a:solidFill>
+                        <a:schemeClr val="tx1"/>
+                      </a:solidFill>
+                      <a:prstDash val="solid"/>
+                      <a:round/>
+                      <a:headEnd type="none" w="med" len="med"/>
+                      <a:tailEnd type="none" w="med" len="med"/>
+                    </a:lnT>
+                  </a:tcPr>
+                </a:tc>
+                <a:tc>
+                  <a:txBody>
+                    <a:bodyPr/>
+                    <a:lstStyle/>
+                    <a:p>
+                      <a:pPr algn="l" fontAlgn="b"/>
+                      <a:endParaRPr lang="zh-CN" altLang="en-US" sz="1100" b="0" i="0" u="none" strike="noStrike" dirty="0">
+                        <a:solidFill>
+                          <a:srgbClr val="000000"/>
+                        </a:solidFill>
+                        <a:effectLst/>
+                        <a:latin typeface="宋体"/>
+                      </a:endParaRPr>
+                    </a:p>
+                  </a:txBody>
+                  <a:tcPr marL="0" marR="0" marT="0" marB="0">
+                    <a:lnT w="12700" cap="flat" cmpd="sng" algn="ctr">
+                      <a:solidFill>
+                        <a:schemeClr val="tx1"/>
+                      </a:solidFill>
+                      <a:prstDash val="solid"/>
+                      <a:round/>
+                      <a:headEnd type="none" w="med" len="med"/>
+                      <a:tailEnd type="none" w="med" len="med"/>
+                    </a:lnT>
+                  </a:tcPr>
+                </a:tc>
+                <a:tc>
+                  <a:txBody>
+                    <a:bodyPr/>
+                    <a:lstStyle/>
+                    <a:p>
+                      <a:pPr algn="l" fontAlgn="b"/>
+                      <a:endParaRPr lang="zh-CN" altLang="en-US" sz="1100" b="0" i="0" u="none" strike="noStrike" dirty="0">
+                        <a:solidFill>
+                          <a:srgbClr val="000000"/>
+                        </a:solidFill>
+                        <a:effectLst/>
+                        <a:latin typeface="宋体"/>
+                      </a:endParaRPr>
+                    </a:p>
+                  </a:txBody>
+                  <a:tcPr marL="0" marR="0" marT="0" marB="0" anchor="b">
+                    <a:lnT w="12700" cap="flat" cmpd="sng" algn="ctr">
+                      <a:solidFill>
+                        <a:schemeClr val="tx1"/>
+                      </a:solidFill>
+                      <a:prstDash val="solid"/>
+                      <a:round/>
+                      <a:headEnd type="none" w="med" len="med"/>
+                      <a:tailEnd type="none" w="med" len="med"/>
+                    </a:lnT>
+                  </a:tcPr>
+                </a:tc>
+              </a:tr>
+              <a:tr h="636270">
+                <a:tc>
+                  <a:txBody>
+                    <a:bodyPr/>
+                    <a:lstStyle/>
+                    <a:p>
+                      <a:pPr algn="l" fontAlgn="b"/>
+                      <a:r>
+                        <a:rPr lang="zh-CN" altLang="en-US" sz="1100" u="none" strike="noStrike" dirty="0">
+                          <a:effectLst/>
+                        </a:rPr>
+                        <a:t>锯齿波</a:t>
+                      </a:r>
+                      <a:endParaRPr lang="zh-CN" altLang="en-US" sz="1100" b="0" i="0" u="none" strike="noStrike" dirty="0">
+                        <a:solidFill>
+                          <a:srgbClr val="000000"/>
+                        </a:solidFill>
+                        <a:effectLst/>
+                        <a:latin typeface="宋体"/>
+                      </a:endParaRPr>
+                    </a:p>
+                  </a:txBody>
+                  <a:tcPr marL="0" marR="0" marT="0" marB="0" anchor="b"/>
+                </a:tc>
+                <a:tc>
+                  <a:txBody>
+                    <a:bodyPr/>
+                    <a:lstStyle/>
+                    <a:p>
+                      <a:pPr algn="l" fontAlgn="b"/>
+                      <a:endParaRPr lang="zh-CN" altLang="en-US" sz="1100" b="0" i="0" u="none" strike="noStrike" dirty="0">
+                        <a:solidFill>
+                          <a:srgbClr val="000000"/>
+                        </a:solidFill>
+                        <a:effectLst/>
+                        <a:latin typeface="宋体"/>
+                      </a:endParaRPr>
+                    </a:p>
+                  </a:txBody>
+                  <a:tcPr marL="0" marR="0" marT="0" marB="0" anchor="b"/>
+                </a:tc>
+                <a:tc>
+                  <a:txBody>
+                    <a:bodyPr/>
+                    <a:lstStyle/>
+                    <a:p>
+                      <a:pPr algn="l" fontAlgn="b"/>
+                      <a:endParaRPr lang="zh-CN" altLang="en-US" sz="1100" b="0" i="0" u="none" strike="noStrike" dirty="0">
+                        <a:solidFill>
+                          <a:srgbClr val="000000"/>
+                        </a:solidFill>
+                        <a:effectLst/>
+                        <a:latin typeface="宋体"/>
+                      </a:endParaRPr>
+                    </a:p>
+                  </a:txBody>
+                  <a:tcPr marL="0" marR="0" marT="0" marB="0" anchor="b"/>
+                </a:tc>
+              </a:tr>
+              <a:tr h="819958">
+                <a:tc>
+                  <a:txBody>
+                    <a:bodyPr/>
+                    <a:lstStyle/>
+                    <a:p>
+                      <a:pPr algn="l" fontAlgn="b"/>
+                      <a:r>
+                        <a:rPr lang="zh-CN" altLang="en-US" sz="1100" u="none" strike="noStrike" dirty="0">
+                          <a:effectLst/>
+                        </a:rPr>
+                        <a:t>三角波</a:t>
+                      </a:r>
+                      <a:endParaRPr lang="zh-CN" altLang="en-US" sz="1100" b="0" i="0" u="none" strike="noStrike" dirty="0">
+                        <a:solidFill>
+                          <a:srgbClr val="000000"/>
+                        </a:solidFill>
+                        <a:effectLst/>
+                        <a:latin typeface="宋体"/>
+                      </a:endParaRPr>
+                    </a:p>
+                  </a:txBody>
+                  <a:tcPr marL="0" marR="0" marT="0" marB="0" anchor="b">
+                    <a:lnB w="12700" cap="flat" cmpd="sng" algn="ctr">
+                      <a:solidFill>
+                        <a:schemeClr val="tx1"/>
+                      </a:solidFill>
+                      <a:prstDash val="solid"/>
+                      <a:round/>
+                      <a:headEnd type="none" w="med" len="med"/>
+                      <a:tailEnd type="none" w="med" len="med"/>
+                    </a:lnB>
+                  </a:tcPr>
+                </a:tc>
+                <a:tc gridSpan="2">
+                  <a:txBody>
+                    <a:bodyPr/>
+                    <a:lstStyle/>
+                    <a:p>
+                      <a:pPr algn="l" fontAlgn="b"/>
+                      <a:endParaRPr lang="zh-CN" altLang="en-US" sz="1100" b="0" i="0" u="none" strike="noStrike" dirty="0">
+                        <a:solidFill>
+                          <a:srgbClr val="000000"/>
+                        </a:solidFill>
+                        <a:effectLst/>
+                        <a:latin typeface="宋体"/>
+                      </a:endParaRPr>
+                    </a:p>
+                  </a:txBody>
+                  <a:tcPr marL="0" marR="0" marT="0" marB="0" anchor="b">
+                    <a:lnB w="12700" cap="flat" cmpd="sng" algn="ctr">
+                      <a:solidFill>
+                        <a:schemeClr val="tx1"/>
+                      </a:solidFill>
+                      <a:prstDash val="solid"/>
+                      <a:round/>
+                      <a:headEnd type="none" w="med" len="med"/>
+                      <a:tailEnd type="none" w="med" len="med"/>
+                    </a:lnB>
+                  </a:tcPr>
+                </a:tc>
+                <a:tc hMerge="1">
+                  <a:txBody>
+                    <a:bodyPr/>
+                    <a:lstStyle/>
+                    <a:p>
+                      <a:endParaRPr lang="zh-CN" altLang="en-US"/>
+                    </a:p>
+                  </a:txBody>
+                  <a:tcPr/>
+                </a:tc>
+              </a:tr>
+            </a:tbl>
+          </a:graphicData>
+        </a:graphic>
+      </p:graphicFrame>
+      <mc:AlternateContent xmlns:mc="http://schemas.openxmlformats.org/markup-compatibility/2006">
+        <mc:Choice xmlns:a14="http://schemas.microsoft.com/office/drawing/2010/main" Requires="a14">
+          <p:sp>
+            <p:nvSpPr>
+              <p:cNvPr id="3" name="TextBox 4"/>
+              <p:cNvSpPr txBox="1"/>
+              <p:nvPr/>
+            </p:nvSpPr>
+            <p:spPr>
+              <a:xfrm>
+                <a:off x="2577144" y="2770448"/>
+                <a:ext cx="2228850" cy="381000"/>
+              </a:xfrm>
+              <a:prstGeom prst="rect">
+                <a:avLst/>
+              </a:prstGeom>
+              <a:noFill/>
+            </p:spPr>
+            <p:style>
+              <a:lnRef idx="0">
+                <a:scrgbClr r="0" g="0" b="0"/>
+              </a:lnRef>
+              <a:fillRef idx="0">
+                <a:scrgbClr r="0" g="0" b="0"/>
+              </a:fillRef>
+              <a:effectRef idx="0">
+                <a:scrgbClr r="0" g="0" b="0"/>
+              </a:effectRef>
+              <a:fontRef idx="minor">
+                <a:schemeClr val="tx1"/>
+              </a:fontRef>
+            </p:style>
+            <p:txBody>
+              <a:bodyPr wrap="square" rtlCol="0" anchor="t">
+                <a:spAutoFit/>
+              </a:bodyPr>
+              <a:lstStyle>
+                <a:lvl1pPr marL="0" indent="0">
+                  <a:defRPr sz="1100">
+                    <a:solidFill>
+                      <a:schemeClr val="tx1"/>
+                    </a:solidFill>
+                    <a:latin typeface="+mn-lt"/>
+                    <a:ea typeface="+mn-ea"/>
+                    <a:cs typeface="+mn-cs"/>
+                  </a:defRPr>
+                </a:lvl1pPr>
+                <a:lvl2pPr marL="457200" indent="0">
+                  <a:defRPr sz="1100">
+                    <a:solidFill>
+                      <a:schemeClr val="tx1"/>
+                    </a:solidFill>
+                    <a:latin typeface="+mn-lt"/>
+                    <a:ea typeface="+mn-ea"/>
+                    <a:cs typeface="+mn-cs"/>
+                  </a:defRPr>
+                </a:lvl2pPr>
+                <a:lvl3pPr marL="914400" indent="0">
+                  <a:defRPr sz="1100">
+                    <a:solidFill>
+                      <a:schemeClr val="tx1"/>
+                    </a:solidFill>
+                    <a:latin typeface="+mn-lt"/>
+                    <a:ea typeface="+mn-ea"/>
+                    <a:cs typeface="+mn-cs"/>
+                  </a:defRPr>
+                </a:lvl3pPr>
+                <a:lvl4pPr marL="1371600" indent="0">
+                  <a:defRPr sz="1100">
+                    <a:solidFill>
+                      <a:schemeClr val="tx1"/>
+                    </a:solidFill>
+                    <a:latin typeface="+mn-lt"/>
+                    <a:ea typeface="+mn-ea"/>
+                    <a:cs typeface="+mn-cs"/>
+                  </a:defRPr>
+                </a:lvl4pPr>
+                <a:lvl5pPr marL="1828800" indent="0">
+                  <a:defRPr sz="1100">
+                    <a:solidFill>
+                      <a:schemeClr val="tx1"/>
+                    </a:solidFill>
+                    <a:latin typeface="+mn-lt"/>
+                    <a:ea typeface="+mn-ea"/>
+                    <a:cs typeface="+mn-cs"/>
+                  </a:defRPr>
+                </a:lvl5pPr>
+                <a:lvl6pPr marL="2286000" indent="0">
+                  <a:defRPr sz="1100">
+                    <a:solidFill>
+                      <a:schemeClr val="tx1"/>
+                    </a:solidFill>
+                    <a:latin typeface="+mn-lt"/>
+                    <a:ea typeface="+mn-ea"/>
+                    <a:cs typeface="+mn-cs"/>
+                  </a:defRPr>
+                </a:lvl6pPr>
+                <a:lvl7pPr marL="2743200" indent="0">
+                  <a:defRPr sz="1100">
+                    <a:solidFill>
+                      <a:schemeClr val="tx1"/>
+                    </a:solidFill>
+                    <a:latin typeface="+mn-lt"/>
+                    <a:ea typeface="+mn-ea"/>
+                    <a:cs typeface="+mn-cs"/>
+                  </a:defRPr>
+                </a:lvl7pPr>
+                <a:lvl8pPr marL="3200400" indent="0">
+                  <a:defRPr sz="1100">
+                    <a:solidFill>
+                      <a:schemeClr val="tx1"/>
+                    </a:solidFill>
+                    <a:latin typeface="+mn-lt"/>
+                    <a:ea typeface="+mn-ea"/>
+                    <a:cs typeface="+mn-cs"/>
+                  </a:defRPr>
+                </a:lvl8pPr>
+                <a:lvl9pPr marL="3657600" indent="0">
+                  <a:defRPr sz="1100">
+                    <a:solidFill>
+                      <a:schemeClr val="tx1"/>
+                    </a:solidFill>
+                    <a:latin typeface="+mn-lt"/>
+                    <a:ea typeface="+mn-ea"/>
+                    <a:cs typeface="+mn-cs"/>
+                  </a:defRPr>
+                </a:lvl9pPr>
+              </a:lstStyle>
+              <a:p>
+                <a:pPr/>
+                <a14:m>
+                  <m:oMathPara xmlns:m="http://schemas.openxmlformats.org/officeDocument/2006/math">
+                    <m:oMathParaPr>
+                      <m:jc m:val="centerGroup"/>
+                    </m:oMathParaPr>
+                    <m:oMath xmlns:m="http://schemas.openxmlformats.org/officeDocument/2006/math">
+                      <m:r>
+                        <a:rPr lang="en-US" altLang="zh-CN" sz="1100" b="0" i="1">
+                          <a:latin typeface="Cambria Math"/>
+                        </a:rPr>
+                        <m:t>2</m:t>
+                      </m:r>
+                      <m:d>
+                        <m:dPr>
+                          <m:begChr m:val="["/>
+                          <m:endChr m:val="]"/>
+                          <m:ctrlPr>
+                            <a:rPr lang="en-US" altLang="zh-CN" sz="1100" b="0" i="1">
+                              <a:solidFill>
+                                <a:schemeClr val="tx1"/>
+                              </a:solidFill>
+                              <a:effectLst/>
+                              <a:latin typeface="Cambria Math"/>
+                              <a:ea typeface="+mn-ea"/>
+                              <a:cs typeface="+mn-cs"/>
+                            </a:rPr>
+                          </m:ctrlPr>
+                        </m:dPr>
+                        <m:e>
+                          <m:r>
+                            <a:rPr lang="en-US" altLang="zh-CN" sz="1100" b="0" i="1">
+                              <a:solidFill>
+                                <a:schemeClr val="tx1"/>
+                              </a:solidFill>
+                              <a:effectLst/>
+                              <a:latin typeface="Cambria Math"/>
+                              <a:ea typeface="+mn-ea"/>
+                              <a:cs typeface="+mn-cs"/>
+                            </a:rPr>
+                            <m:t>𝐻</m:t>
+                          </m:r>
+                          <m:d>
+                            <m:dPr>
+                              <m:ctrlPr>
+                                <a:rPr lang="en-US" altLang="zh-CN" sz="1100" b="0" i="1">
+                                  <a:solidFill>
+                                    <a:schemeClr val="tx1"/>
+                                  </a:solidFill>
+                                  <a:effectLst/>
+                                  <a:latin typeface="Cambria Math"/>
+                                  <a:ea typeface="+mn-ea"/>
+                                  <a:cs typeface="+mn-cs"/>
+                                </a:rPr>
+                              </m:ctrlPr>
+                            </m:dPr>
+                            <m:e>
+                              <m:f>
+                                <m:fPr>
+                                  <m:ctrlPr>
+                                    <a:rPr lang="en-US" altLang="zh-CN" sz="1100" b="0" i="1">
+                                      <a:solidFill>
+                                        <a:schemeClr val="tx1"/>
+                                      </a:solidFill>
+                                      <a:effectLst/>
+                                      <a:latin typeface="Cambria Math"/>
+                                      <a:ea typeface="+mn-ea"/>
+                                      <a:cs typeface="+mn-cs"/>
+                                    </a:rPr>
+                                  </m:ctrlPr>
+                                </m:fPr>
+                                <m:num>
+                                  <m:r>
+                                    <a:rPr lang="en-US" altLang="zh-CN" sz="1100" b="0" i="1">
+                                      <a:solidFill>
+                                        <a:schemeClr val="tx1"/>
+                                      </a:solidFill>
+                                      <a:effectLst/>
+                                      <a:latin typeface="Cambria Math"/>
+                                      <a:ea typeface="+mn-ea"/>
+                                      <a:cs typeface="+mn-cs"/>
+                                    </a:rPr>
+                                    <m:t>𝑥</m:t>
+                                  </m:r>
+                                </m:num>
+                                <m:den>
+                                  <m:r>
+                                    <a:rPr lang="en-US" altLang="zh-CN" sz="1100" b="0" i="1">
+                                      <a:solidFill>
+                                        <a:schemeClr val="tx1"/>
+                                      </a:solidFill>
+                                      <a:effectLst/>
+                                      <a:latin typeface="Cambria Math"/>
+                                      <a:ea typeface="+mn-ea"/>
+                                      <a:cs typeface="+mn-cs"/>
+                                    </a:rPr>
+                                    <m:t>𝐿</m:t>
+                                  </m:r>
+                                </m:den>
+                              </m:f>
+                            </m:e>
+                          </m:d>
+                          <m:r>
+                            <a:rPr lang="en-US" altLang="zh-CN" sz="1100" b="0" i="1">
+                              <a:latin typeface="Cambria Math"/>
+                            </a:rPr>
+                            <m:t>−</m:t>
+                          </m:r>
+                          <m:r>
+                            <a:rPr lang="en-US" altLang="zh-CN" sz="1100" b="0" i="1">
+                              <a:latin typeface="Cambria Math"/>
+                            </a:rPr>
+                            <m:t>𝐻</m:t>
+                          </m:r>
+                          <m:d>
+                            <m:dPr>
+                              <m:ctrlPr>
+                                <a:rPr lang="en-US" altLang="zh-CN" sz="1100" b="0" i="1">
+                                  <a:latin typeface="Cambria Math"/>
+                                </a:rPr>
+                              </m:ctrlPr>
+                            </m:dPr>
+                            <m:e>
+                              <m:f>
+                                <m:fPr>
+                                  <m:ctrlPr>
+                                    <a:rPr lang="en-US" altLang="zh-CN" sz="1100" b="0" i="1">
+                                      <a:latin typeface="Cambria Math"/>
+                                    </a:rPr>
+                                  </m:ctrlPr>
+                                </m:fPr>
+                                <m:num>
+                                  <m:r>
+                                    <a:rPr lang="en-US" altLang="zh-CN" sz="1100" b="0" i="1">
+                                      <a:latin typeface="Cambria Math"/>
+                                    </a:rPr>
+                                    <m:t>𝑥</m:t>
+                                  </m:r>
+                                </m:num>
+                                <m:den>
+                                  <m:r>
+                                    <a:rPr lang="en-US" altLang="zh-CN" sz="1100" b="0" i="1">
+                                      <a:latin typeface="Cambria Math"/>
+                                    </a:rPr>
+                                    <m:t>𝐿</m:t>
+                                  </m:r>
+                                </m:den>
+                              </m:f>
+                              <m:r>
+                                <a:rPr lang="en-US" altLang="zh-CN" sz="1100" b="0" i="1">
+                                  <a:latin typeface="Cambria Math"/>
+                                </a:rPr>
+                                <m:t>−1</m:t>
+                              </m:r>
+                            </m:e>
+                          </m:d>
+                        </m:e>
+                      </m:d>
+                      <m:r>
+                        <a:rPr lang="en-US" altLang="zh-CN" sz="1100" b="0" i="0">
+                          <a:latin typeface="Cambria Math"/>
+                        </a:rPr>
+                        <m:t>−1</m:t>
+                      </m:r>
+                    </m:oMath>
+                  </m:oMathPara>
+                </a14:m>
+                <a:endParaRPr lang="zh-CN" altLang="en-US" sz="1100" dirty="0"/>
+              </a:p>
+            </p:txBody>
+          </p:sp>
+        </mc:Choice>
+        <mc:Fallback>
+          <p:sp>
+            <p:nvSpPr>
+              <p:cNvPr id="3" name="TextBox 4"/>
+              <p:cNvSpPr txBox="1">
+                <a:spLocks noRot="1" noChangeAspect="1" noMove="1" noResize="1" noEditPoints="1" noAdjustHandles="1" noChangeArrowheads="1" noChangeShapeType="1" noTextEdit="1"/>
+              </p:cNvSpPr>
+              <p:nvPr/>
+            </p:nvSpPr>
+            <p:spPr>
+              <a:xfrm>
+                <a:off x="2577144" y="2770448"/>
+                <a:ext cx="2228850" cy="381000"/>
+              </a:xfrm>
+              <a:prstGeom prst="rect">
+                <a:avLst/>
+              </a:prstGeom>
+              <a:blipFill rotWithShape="1">
+                <a:blip r:embed="rId2"/>
+                <a:stretch>
+                  <a:fillRect/>
+                </a:stretch>
+              </a:blipFill>
+            </p:spPr>
+            <p:txBody>
+              <a:bodyPr/>
+              <a:lstStyle/>
+              <a:p>
+                <a:r>
+                  <a:rPr lang="zh-CN" altLang="en-US">
+                    <a:noFill/>
+                  </a:rPr>
+                  <a:t> </a:t>
+                </a:r>
+              </a:p>
+            </p:txBody>
+          </p:sp>
+        </mc:Fallback>
+      </mc:AlternateContent>
+      <mc:AlternateContent xmlns:mc="http://schemas.openxmlformats.org/markup-compatibility/2006">
+        <mc:Choice xmlns:a14="http://schemas.microsoft.com/office/drawing/2010/main" Requires="a14">
+          <p:sp>
+            <p:nvSpPr>
+              <p:cNvPr id="4" name="TextBox 5"/>
+              <p:cNvSpPr txBox="1"/>
+              <p:nvPr/>
+            </p:nvSpPr>
+            <p:spPr>
+              <a:xfrm>
+                <a:off x="4797742" y="2677579"/>
+                <a:ext cx="2281237" cy="566737"/>
+              </a:xfrm>
+              <a:prstGeom prst="rect">
+                <a:avLst/>
+              </a:prstGeom>
+              <a:noFill/>
+            </p:spPr>
+            <p:style>
+              <a:lnRef idx="0">
+                <a:scrgbClr r="0" g="0" b="0"/>
+              </a:lnRef>
+              <a:fillRef idx="0">
+                <a:scrgbClr r="0" g="0" b="0"/>
+              </a:fillRef>
+              <a:effectRef idx="0">
+                <a:scrgbClr r="0" g="0" b="0"/>
+              </a:effectRef>
+              <a:fontRef idx="minor">
+                <a:schemeClr val="tx1"/>
+              </a:fontRef>
+            </p:style>
+            <p:txBody>
+              <a:bodyPr wrap="square" rtlCol="0" anchor="t">
+                <a:spAutoFit/>
+              </a:bodyPr>
+              <a:lstStyle>
+                <a:lvl1pPr marL="0" indent="0">
+                  <a:defRPr sz="1100">
+                    <a:solidFill>
+                      <a:schemeClr val="tx1"/>
+                    </a:solidFill>
+                    <a:latin typeface="+mn-lt"/>
+                    <a:ea typeface="+mn-ea"/>
+                    <a:cs typeface="+mn-cs"/>
+                  </a:defRPr>
+                </a:lvl1pPr>
+                <a:lvl2pPr marL="457200" indent="0">
+                  <a:defRPr sz="1100">
+                    <a:solidFill>
+                      <a:schemeClr val="tx1"/>
+                    </a:solidFill>
+                    <a:latin typeface="+mn-lt"/>
+                    <a:ea typeface="+mn-ea"/>
+                    <a:cs typeface="+mn-cs"/>
+                  </a:defRPr>
+                </a:lvl2pPr>
+                <a:lvl3pPr marL="914400" indent="0">
+                  <a:defRPr sz="1100">
+                    <a:solidFill>
+                      <a:schemeClr val="tx1"/>
+                    </a:solidFill>
+                    <a:latin typeface="+mn-lt"/>
+                    <a:ea typeface="+mn-ea"/>
+                    <a:cs typeface="+mn-cs"/>
+                  </a:defRPr>
+                </a:lvl3pPr>
+                <a:lvl4pPr marL="1371600" indent="0">
+                  <a:defRPr sz="1100">
+                    <a:solidFill>
+                      <a:schemeClr val="tx1"/>
+                    </a:solidFill>
+                    <a:latin typeface="+mn-lt"/>
+                    <a:ea typeface="+mn-ea"/>
+                    <a:cs typeface="+mn-cs"/>
+                  </a:defRPr>
+                </a:lvl4pPr>
+                <a:lvl5pPr marL="1828800" indent="0">
+                  <a:defRPr sz="1100">
+                    <a:solidFill>
+                      <a:schemeClr val="tx1"/>
+                    </a:solidFill>
+                    <a:latin typeface="+mn-lt"/>
+                    <a:ea typeface="+mn-ea"/>
+                    <a:cs typeface="+mn-cs"/>
+                  </a:defRPr>
+                </a:lvl5pPr>
+                <a:lvl6pPr marL="2286000" indent="0">
+                  <a:defRPr sz="1100">
+                    <a:solidFill>
+                      <a:schemeClr val="tx1"/>
+                    </a:solidFill>
+                    <a:latin typeface="+mn-lt"/>
+                    <a:ea typeface="+mn-ea"/>
+                    <a:cs typeface="+mn-cs"/>
+                  </a:defRPr>
+                </a:lvl6pPr>
+                <a:lvl7pPr marL="2743200" indent="0">
+                  <a:defRPr sz="1100">
+                    <a:solidFill>
+                      <a:schemeClr val="tx1"/>
+                    </a:solidFill>
+                    <a:latin typeface="+mn-lt"/>
+                    <a:ea typeface="+mn-ea"/>
+                    <a:cs typeface="+mn-cs"/>
+                  </a:defRPr>
+                </a:lvl7pPr>
+                <a:lvl8pPr marL="3200400" indent="0">
+                  <a:defRPr sz="1100">
+                    <a:solidFill>
+                      <a:schemeClr val="tx1"/>
+                    </a:solidFill>
+                    <a:latin typeface="+mn-lt"/>
+                    <a:ea typeface="+mn-ea"/>
+                    <a:cs typeface="+mn-cs"/>
+                  </a:defRPr>
+                </a:lvl8pPr>
+                <a:lvl9pPr marL="3657600" indent="0">
+                  <a:defRPr sz="1100">
+                    <a:solidFill>
+                      <a:schemeClr val="tx1"/>
+                    </a:solidFill>
+                    <a:latin typeface="+mn-lt"/>
+                    <a:ea typeface="+mn-ea"/>
+                    <a:cs typeface="+mn-cs"/>
+                  </a:defRPr>
+                </a:lvl9pPr>
+              </a:lstStyle>
+              <a:p>
+                <a:pPr/>
+                <a14:m>
+                  <m:oMathPara xmlns:m="http://schemas.openxmlformats.org/officeDocument/2006/math">
+                    <m:oMathParaPr>
+                      <m:jc m:val="centerGroup"/>
+                    </m:oMathParaPr>
+                    <m:oMath xmlns:m="http://schemas.openxmlformats.org/officeDocument/2006/math">
+                      <m:f>
+                        <m:fPr>
+                          <m:ctrlPr>
+                            <a:rPr lang="en-US" altLang="zh-CN" sz="1100" i="1">
+                              <a:latin typeface="Cambria Math"/>
+                            </a:rPr>
+                          </m:ctrlPr>
+                        </m:fPr>
+                        <m:num>
+                          <m:r>
+                            <a:rPr lang="en-US" altLang="zh-CN" sz="1100" b="0" i="1">
+                              <a:latin typeface="Cambria Math"/>
+                            </a:rPr>
+                            <m:t>4</m:t>
+                          </m:r>
+                        </m:num>
+                        <m:den>
+                          <m:r>
+                            <a:rPr lang="zh-CN" altLang="en-US" sz="1100" i="1">
+                              <a:latin typeface="Cambria Math"/>
+                            </a:rPr>
+                            <m:t>𝜋</m:t>
+                          </m:r>
+                        </m:den>
+                      </m:f>
+                      <m:nary>
+                        <m:naryPr>
+                          <m:chr m:val="∑"/>
+                          <m:ctrlPr>
+                            <a:rPr lang="en-US" altLang="zh-CN" sz="1100" i="1">
+                              <a:latin typeface="Cambria Math"/>
+                              <a:ea typeface="Cambria Math"/>
+                            </a:rPr>
+                          </m:ctrlPr>
+                        </m:naryPr>
+                        <m:sub>
+                          <m:r>
+                            <m:rPr>
+                              <m:brk m:alnAt="23"/>
+                            </m:rPr>
+                            <a:rPr lang="en-US" altLang="zh-CN" sz="1100" b="0" i="1">
+                              <a:latin typeface="Cambria Math"/>
+                              <a:ea typeface="Cambria Math"/>
+                            </a:rPr>
+                            <m:t>𝑛</m:t>
+                          </m:r>
+                          <m:r>
+                            <a:rPr lang="en-US" altLang="zh-CN" sz="1100" b="0" i="1">
+                              <a:latin typeface="Cambria Math"/>
+                              <a:ea typeface="Cambria Math"/>
+                            </a:rPr>
+                            <m:t>=1,3,5…</m:t>
+                          </m:r>
+                        </m:sub>
+                        <m:sup>
+                          <m:r>
+                            <a:rPr lang="en-US" altLang="zh-CN" sz="1100" i="1">
+                              <a:latin typeface="Cambria Math"/>
+                              <a:ea typeface="Cambria Math"/>
+                            </a:rPr>
+                            <m:t>∞</m:t>
+                          </m:r>
+                        </m:sup>
+                        <m:e>
+                          <m:f>
+                            <m:fPr>
+                              <m:ctrlPr>
+                                <a:rPr lang="en-US" altLang="zh-CN" sz="1100" i="1">
+                                  <a:latin typeface="Cambria Math"/>
+                                  <a:ea typeface="Cambria Math"/>
+                                </a:rPr>
+                              </m:ctrlPr>
+                            </m:fPr>
+                            <m:num>
+                              <m:r>
+                                <a:rPr lang="en-US" altLang="zh-CN" sz="1100" b="0" i="1">
+                                  <a:latin typeface="Cambria Math"/>
+                                  <a:ea typeface="Cambria Math"/>
+                                </a:rPr>
+                                <m:t>1</m:t>
+                              </m:r>
+                            </m:num>
+                            <m:den>
+                              <m:r>
+                                <a:rPr lang="en-US" altLang="zh-CN" sz="1100" b="0" i="1">
+                                  <a:latin typeface="Cambria Math"/>
+                                  <a:ea typeface="Cambria Math"/>
+                                </a:rPr>
+                                <m:t>𝑛</m:t>
+                              </m:r>
+                            </m:den>
+                          </m:f>
+                          <m:r>
+                            <m:rPr>
+                              <m:sty m:val="p"/>
+                            </m:rPr>
+                            <a:rPr lang="en-US" altLang="zh-CN" sz="1100" b="0" i="0">
+                              <a:latin typeface="Cambria Math"/>
+                              <a:ea typeface="Cambria Math"/>
+                            </a:rPr>
+                            <m:t>sin</m:t>
+                          </m:r>
+                          <m:r>
+                            <a:rPr lang="en-US" altLang="zh-CN" sz="1100" b="0" i="1">
+                              <a:latin typeface="Cambria Math"/>
+                              <a:ea typeface="Cambria Math"/>
+                            </a:rPr>
+                            <m:t>⁡(</m:t>
+                          </m:r>
+                          <m:f>
+                            <m:fPr>
+                              <m:ctrlPr>
+                                <a:rPr lang="en-US" altLang="zh-CN" sz="1100" b="0" i="1">
+                                  <a:latin typeface="Cambria Math"/>
+                                  <a:ea typeface="Cambria Math"/>
+                                </a:rPr>
+                              </m:ctrlPr>
+                            </m:fPr>
+                            <m:num>
+                              <m:r>
+                                <a:rPr lang="en-US" altLang="zh-CN" sz="1100" b="0" i="1">
+                                  <a:latin typeface="Cambria Math"/>
+                                  <a:ea typeface="Cambria Math"/>
+                                </a:rPr>
+                                <m:t>𝑛</m:t>
+                              </m:r>
+                              <m:r>
+                                <a:rPr lang="zh-CN" altLang="en-US" sz="1100" b="0" i="1">
+                                  <a:latin typeface="Cambria Math"/>
+                                  <a:ea typeface="Cambria Math"/>
+                                </a:rPr>
+                                <m:t>𝜋</m:t>
+                              </m:r>
+                              <m:r>
+                                <a:rPr lang="en-US" altLang="zh-CN" sz="1100" b="0" i="1">
+                                  <a:latin typeface="Cambria Math"/>
+                                  <a:ea typeface="Cambria Math"/>
+                                </a:rPr>
+                                <m:t>𝑥</m:t>
+                              </m:r>
+                            </m:num>
+                            <m:den>
+                              <m:r>
+                                <a:rPr lang="en-US" altLang="zh-CN" sz="1100" b="0" i="1">
+                                  <a:latin typeface="Cambria Math"/>
+                                  <a:ea typeface="Cambria Math"/>
+                                </a:rPr>
+                                <m:t>𝐿</m:t>
+                              </m:r>
+                            </m:den>
+                          </m:f>
+                          <m:r>
+                            <a:rPr lang="en-US" altLang="zh-CN" sz="1100" b="0" i="1">
+                              <a:latin typeface="Cambria Math"/>
+                              <a:ea typeface="Cambria Math"/>
+                            </a:rPr>
+                            <m:t>)</m:t>
+                          </m:r>
+                        </m:e>
+                      </m:nary>
+                    </m:oMath>
+                  </m:oMathPara>
+                </a14:m>
+                <a:endParaRPr lang="zh-CN" altLang="en-US" sz="1100" dirty="0"/>
+              </a:p>
+            </p:txBody>
+          </p:sp>
+        </mc:Choice>
+        <mc:Fallback>
+          <p:sp>
+            <p:nvSpPr>
+              <p:cNvPr id="4" name="TextBox 5"/>
+              <p:cNvSpPr txBox="1">
+                <a:spLocks noRot="1" noChangeAspect="1" noMove="1" noResize="1" noEditPoints="1" noAdjustHandles="1" noChangeArrowheads="1" noChangeShapeType="1" noTextEdit="1"/>
+              </p:cNvSpPr>
+              <p:nvPr/>
+            </p:nvSpPr>
+            <p:spPr>
+              <a:xfrm>
+                <a:off x="4797742" y="2677579"/>
+                <a:ext cx="2281237" cy="566737"/>
+              </a:xfrm>
+              <a:prstGeom prst="rect">
+                <a:avLst/>
+              </a:prstGeom>
+              <a:blipFill rotWithShape="1">
+                <a:blip r:embed="rId3"/>
+                <a:stretch>
+                  <a:fillRect t="-92473" b="-139785"/>
+                </a:stretch>
+              </a:blipFill>
+            </p:spPr>
+            <p:txBody>
+              <a:bodyPr/>
+              <a:lstStyle/>
+              <a:p>
+                <a:r>
+                  <a:rPr lang="zh-CN" altLang="en-US">
+                    <a:noFill/>
+                  </a:rPr>
+                  <a:t> </a:t>
+                </a:r>
+              </a:p>
+            </p:txBody>
+          </p:sp>
+        </mc:Fallback>
+      </mc:AlternateContent>
+      <mc:AlternateContent xmlns:mc="http://schemas.openxmlformats.org/markup-compatibility/2006">
+        <mc:Choice xmlns:a14="http://schemas.microsoft.com/office/drawing/2010/main" Requires="a14">
+          <p:sp>
+            <p:nvSpPr>
+              <p:cNvPr id="5" name="TextBox 6"/>
+              <p:cNvSpPr txBox="1"/>
+              <p:nvPr/>
+            </p:nvSpPr>
+            <p:spPr>
+              <a:xfrm>
+                <a:off x="2609864" y="3455286"/>
+                <a:ext cx="2209800" cy="381000"/>
+              </a:xfrm>
+              <a:prstGeom prst="rect">
+                <a:avLst/>
+              </a:prstGeom>
+              <a:noFill/>
+            </p:spPr>
+            <p:style>
+              <a:lnRef idx="0">
+                <a:scrgbClr r="0" g="0" b="0"/>
+              </a:lnRef>
+              <a:fillRef idx="0">
+                <a:scrgbClr r="0" g="0" b="0"/>
+              </a:fillRef>
+              <a:effectRef idx="0">
+                <a:scrgbClr r="0" g="0" b="0"/>
+              </a:effectRef>
+              <a:fontRef idx="minor">
+                <a:schemeClr val="tx1"/>
+              </a:fontRef>
+            </p:style>
+            <p:txBody>
+              <a:bodyPr wrap="square" rtlCol="0" anchor="t">
+                <a:spAutoFit/>
+              </a:bodyPr>
+              <a:lstStyle>
+                <a:lvl1pPr marL="0" indent="0">
+                  <a:defRPr sz="1100">
+                    <a:solidFill>
+                      <a:schemeClr val="tx1"/>
+                    </a:solidFill>
+                    <a:latin typeface="+mn-lt"/>
+                    <a:ea typeface="+mn-ea"/>
+                    <a:cs typeface="+mn-cs"/>
+                  </a:defRPr>
+                </a:lvl1pPr>
+                <a:lvl2pPr marL="457200" indent="0">
+                  <a:defRPr sz="1100">
+                    <a:solidFill>
+                      <a:schemeClr val="tx1"/>
+                    </a:solidFill>
+                    <a:latin typeface="+mn-lt"/>
+                    <a:ea typeface="+mn-ea"/>
+                    <a:cs typeface="+mn-cs"/>
+                  </a:defRPr>
+                </a:lvl2pPr>
+                <a:lvl3pPr marL="914400" indent="0">
+                  <a:defRPr sz="1100">
+                    <a:solidFill>
+                      <a:schemeClr val="tx1"/>
+                    </a:solidFill>
+                    <a:latin typeface="+mn-lt"/>
+                    <a:ea typeface="+mn-ea"/>
+                    <a:cs typeface="+mn-cs"/>
+                  </a:defRPr>
+                </a:lvl3pPr>
+                <a:lvl4pPr marL="1371600" indent="0">
+                  <a:defRPr sz="1100">
+                    <a:solidFill>
+                      <a:schemeClr val="tx1"/>
+                    </a:solidFill>
+                    <a:latin typeface="+mn-lt"/>
+                    <a:ea typeface="+mn-ea"/>
+                    <a:cs typeface="+mn-cs"/>
+                  </a:defRPr>
+                </a:lvl4pPr>
+                <a:lvl5pPr marL="1828800" indent="0">
+                  <a:defRPr sz="1100">
+                    <a:solidFill>
+                      <a:schemeClr val="tx1"/>
+                    </a:solidFill>
+                    <a:latin typeface="+mn-lt"/>
+                    <a:ea typeface="+mn-ea"/>
+                    <a:cs typeface="+mn-cs"/>
+                  </a:defRPr>
+                </a:lvl5pPr>
+                <a:lvl6pPr marL="2286000" indent="0">
+                  <a:defRPr sz="1100">
+                    <a:solidFill>
+                      <a:schemeClr val="tx1"/>
+                    </a:solidFill>
+                    <a:latin typeface="+mn-lt"/>
+                    <a:ea typeface="+mn-ea"/>
+                    <a:cs typeface="+mn-cs"/>
+                  </a:defRPr>
+                </a:lvl6pPr>
+                <a:lvl7pPr marL="2743200" indent="0">
+                  <a:defRPr sz="1100">
+                    <a:solidFill>
+                      <a:schemeClr val="tx1"/>
+                    </a:solidFill>
+                    <a:latin typeface="+mn-lt"/>
+                    <a:ea typeface="+mn-ea"/>
+                    <a:cs typeface="+mn-cs"/>
+                  </a:defRPr>
+                </a:lvl7pPr>
+                <a:lvl8pPr marL="3200400" indent="0">
+                  <a:defRPr sz="1100">
+                    <a:solidFill>
+                      <a:schemeClr val="tx1"/>
+                    </a:solidFill>
+                    <a:latin typeface="+mn-lt"/>
+                    <a:ea typeface="+mn-ea"/>
+                    <a:cs typeface="+mn-cs"/>
+                  </a:defRPr>
+                </a:lvl8pPr>
+                <a:lvl9pPr marL="3657600" indent="0">
+                  <a:defRPr sz="1100">
+                    <a:solidFill>
+                      <a:schemeClr val="tx1"/>
+                    </a:solidFill>
+                    <a:latin typeface="+mn-lt"/>
+                    <a:ea typeface="+mn-ea"/>
+                    <a:cs typeface="+mn-cs"/>
+                  </a:defRPr>
+                </a:lvl9pPr>
+              </a:lstStyle>
+              <a:p>
+                <a:pPr/>
+                <a14:m>
+                  <m:oMathPara xmlns:m="http://schemas.openxmlformats.org/officeDocument/2006/math">
+                    <m:oMathParaPr>
+                      <m:jc m:val="centerGroup"/>
+                    </m:oMathParaPr>
+                    <m:oMath xmlns:m="http://schemas.openxmlformats.org/officeDocument/2006/math">
+                      <m:f>
+                        <m:fPr>
+                          <m:ctrlPr>
+                            <a:rPr lang="en-US" altLang="zh-CN" sz="1100" i="1">
+                              <a:latin typeface="Cambria Math"/>
+                            </a:rPr>
+                          </m:ctrlPr>
+                        </m:fPr>
+                        <m:num>
+                          <m:r>
+                            <a:rPr lang="en-US" altLang="zh-CN" sz="1100" b="0" i="1">
+                              <a:latin typeface="Cambria Math"/>
+                            </a:rPr>
+                            <m:t>𝑥</m:t>
+                          </m:r>
+                        </m:num>
+                        <m:den>
+                          <m:r>
+                            <a:rPr lang="en-US" altLang="zh-CN" sz="1100" b="0" i="1">
+                              <a:latin typeface="Cambria Math"/>
+                            </a:rPr>
+                            <m:t>2</m:t>
+                          </m:r>
+                          <m:r>
+                            <a:rPr lang="en-US" altLang="zh-CN" sz="1100" b="0" i="1">
+                              <a:latin typeface="Cambria Math"/>
+                            </a:rPr>
+                            <m:t>𝐿</m:t>
+                          </m:r>
+                        </m:den>
+                      </m:f>
+                    </m:oMath>
+                  </m:oMathPara>
+                </a14:m>
+                <a:endParaRPr lang="zh-CN" altLang="en-US" sz="1100" dirty="0"/>
+              </a:p>
+            </p:txBody>
+          </p:sp>
+        </mc:Choice>
+        <mc:Fallback>
+          <p:sp>
+            <p:nvSpPr>
+              <p:cNvPr id="5" name="TextBox 6"/>
+              <p:cNvSpPr txBox="1">
+                <a:spLocks noRot="1" noChangeAspect="1" noMove="1" noResize="1" noEditPoints="1" noAdjustHandles="1" noChangeArrowheads="1" noChangeShapeType="1" noTextEdit="1"/>
+              </p:cNvSpPr>
+              <p:nvPr/>
+            </p:nvSpPr>
+            <p:spPr>
+              <a:xfrm>
+                <a:off x="2609864" y="3455286"/>
+                <a:ext cx="2209800" cy="381000"/>
+              </a:xfrm>
+              <a:prstGeom prst="rect">
+                <a:avLst/>
+              </a:prstGeom>
+              <a:blipFill rotWithShape="1">
+                <a:blip r:embed="rId4"/>
+                <a:stretch>
+                  <a:fillRect/>
+                </a:stretch>
+              </a:blipFill>
+            </p:spPr>
+            <p:txBody>
+              <a:bodyPr/>
+              <a:lstStyle/>
+              <a:p>
+                <a:r>
+                  <a:rPr lang="zh-CN" altLang="en-US">
+                    <a:noFill/>
+                  </a:rPr>
+                  <a:t> </a:t>
+                </a:r>
+              </a:p>
+            </p:txBody>
+          </p:sp>
+        </mc:Fallback>
+      </mc:AlternateContent>
+      <mc:AlternateContent xmlns:mc="http://schemas.openxmlformats.org/markup-compatibility/2006">
+        <mc:Choice xmlns:a14="http://schemas.microsoft.com/office/drawing/2010/main" Requires="a14">
+          <p:sp>
+            <p:nvSpPr>
+              <p:cNvPr id="6" name="TextBox 7"/>
+              <p:cNvSpPr txBox="1"/>
+              <p:nvPr/>
+            </p:nvSpPr>
+            <p:spPr>
+              <a:xfrm>
+                <a:off x="4796798" y="3362418"/>
+                <a:ext cx="2281237" cy="566737"/>
+              </a:xfrm>
+              <a:prstGeom prst="rect">
+                <a:avLst/>
+              </a:prstGeom>
+              <a:noFill/>
+            </p:spPr>
+            <p:style>
+              <a:lnRef idx="0">
+                <a:scrgbClr r="0" g="0" b="0"/>
+              </a:lnRef>
+              <a:fillRef idx="0">
+                <a:scrgbClr r="0" g="0" b="0"/>
+              </a:fillRef>
+              <a:effectRef idx="0">
+                <a:scrgbClr r="0" g="0" b="0"/>
+              </a:effectRef>
+              <a:fontRef idx="minor">
+                <a:schemeClr val="tx1"/>
+              </a:fontRef>
+            </p:style>
+            <p:txBody>
+              <a:bodyPr wrap="square" rtlCol="0" anchor="t">
+                <a:spAutoFit/>
+              </a:bodyPr>
+              <a:lstStyle>
+                <a:lvl1pPr marL="0" indent="0">
+                  <a:defRPr sz="1100">
+                    <a:solidFill>
+                      <a:schemeClr val="tx1"/>
+                    </a:solidFill>
+                    <a:latin typeface="+mn-lt"/>
+                    <a:ea typeface="+mn-ea"/>
+                    <a:cs typeface="+mn-cs"/>
+                  </a:defRPr>
+                </a:lvl1pPr>
+                <a:lvl2pPr marL="457200" indent="0">
+                  <a:defRPr sz="1100">
+                    <a:solidFill>
+                      <a:schemeClr val="tx1"/>
+                    </a:solidFill>
+                    <a:latin typeface="+mn-lt"/>
+                    <a:ea typeface="+mn-ea"/>
+                    <a:cs typeface="+mn-cs"/>
+                  </a:defRPr>
+                </a:lvl2pPr>
+                <a:lvl3pPr marL="914400" indent="0">
+                  <a:defRPr sz="1100">
+                    <a:solidFill>
+                      <a:schemeClr val="tx1"/>
+                    </a:solidFill>
+                    <a:latin typeface="+mn-lt"/>
+                    <a:ea typeface="+mn-ea"/>
+                    <a:cs typeface="+mn-cs"/>
+                  </a:defRPr>
+                </a:lvl3pPr>
+                <a:lvl4pPr marL="1371600" indent="0">
+                  <a:defRPr sz="1100">
+                    <a:solidFill>
+                      <a:schemeClr val="tx1"/>
+                    </a:solidFill>
+                    <a:latin typeface="+mn-lt"/>
+                    <a:ea typeface="+mn-ea"/>
+                    <a:cs typeface="+mn-cs"/>
+                  </a:defRPr>
+                </a:lvl4pPr>
+                <a:lvl5pPr marL="1828800" indent="0">
+                  <a:defRPr sz="1100">
+                    <a:solidFill>
+                      <a:schemeClr val="tx1"/>
+                    </a:solidFill>
+                    <a:latin typeface="+mn-lt"/>
+                    <a:ea typeface="+mn-ea"/>
+                    <a:cs typeface="+mn-cs"/>
+                  </a:defRPr>
+                </a:lvl5pPr>
+                <a:lvl6pPr marL="2286000" indent="0">
+                  <a:defRPr sz="1100">
+                    <a:solidFill>
+                      <a:schemeClr val="tx1"/>
+                    </a:solidFill>
+                    <a:latin typeface="+mn-lt"/>
+                    <a:ea typeface="+mn-ea"/>
+                    <a:cs typeface="+mn-cs"/>
+                  </a:defRPr>
+                </a:lvl6pPr>
+                <a:lvl7pPr marL="2743200" indent="0">
+                  <a:defRPr sz="1100">
+                    <a:solidFill>
+                      <a:schemeClr val="tx1"/>
+                    </a:solidFill>
+                    <a:latin typeface="+mn-lt"/>
+                    <a:ea typeface="+mn-ea"/>
+                    <a:cs typeface="+mn-cs"/>
+                  </a:defRPr>
+                </a:lvl7pPr>
+                <a:lvl8pPr marL="3200400" indent="0">
+                  <a:defRPr sz="1100">
+                    <a:solidFill>
+                      <a:schemeClr val="tx1"/>
+                    </a:solidFill>
+                    <a:latin typeface="+mn-lt"/>
+                    <a:ea typeface="+mn-ea"/>
+                    <a:cs typeface="+mn-cs"/>
+                  </a:defRPr>
+                </a:lvl8pPr>
+                <a:lvl9pPr marL="3657600" indent="0">
+                  <a:defRPr sz="1100">
+                    <a:solidFill>
+                      <a:schemeClr val="tx1"/>
+                    </a:solidFill>
+                    <a:latin typeface="+mn-lt"/>
+                    <a:ea typeface="+mn-ea"/>
+                    <a:cs typeface="+mn-cs"/>
+                  </a:defRPr>
+                </a:lvl9pPr>
+              </a:lstStyle>
+              <a:p>
+                <a:pPr/>
+                <a14:m>
+                  <m:oMathPara xmlns:m="http://schemas.openxmlformats.org/officeDocument/2006/math">
+                    <m:oMathParaPr>
+                      <m:jc m:val="centerGroup"/>
+                    </m:oMathParaPr>
+                    <m:oMath xmlns:m="http://schemas.openxmlformats.org/officeDocument/2006/math">
+                      <m:f>
+                        <m:fPr>
+                          <m:ctrlPr>
+                            <a:rPr lang="en-US" altLang="zh-CN" sz="1100" i="1">
+                              <a:latin typeface="Cambria Math"/>
+                            </a:rPr>
+                          </m:ctrlPr>
+                        </m:fPr>
+                        <m:num>
+                          <m:r>
+                            <a:rPr lang="en-US" altLang="zh-CN" sz="1100" b="0" i="1">
+                              <a:latin typeface="Cambria Math"/>
+                            </a:rPr>
+                            <m:t>1</m:t>
+                          </m:r>
+                        </m:num>
+                        <m:den>
+                          <m:r>
+                            <a:rPr lang="en-US" altLang="zh-CN" sz="1100" b="0" i="1">
+                              <a:latin typeface="Cambria Math"/>
+                            </a:rPr>
+                            <m:t>2</m:t>
+                          </m:r>
+                        </m:den>
+                      </m:f>
+                      <m:r>
+                        <a:rPr lang="en-US" altLang="zh-CN" sz="1100" b="0" i="1">
+                          <a:latin typeface="Cambria Math"/>
+                        </a:rPr>
+                        <m:t>−</m:t>
+                      </m:r>
+                      <m:f>
+                        <m:fPr>
+                          <m:ctrlPr>
+                            <a:rPr lang="en-US" altLang="zh-CN" sz="1100" i="1">
+                              <a:latin typeface="Cambria Math"/>
+                            </a:rPr>
+                          </m:ctrlPr>
+                        </m:fPr>
+                        <m:num>
+                          <m:r>
+                            <a:rPr lang="en-US" altLang="zh-CN" sz="1100" b="0" i="1">
+                              <a:latin typeface="Cambria Math"/>
+                            </a:rPr>
+                            <m:t>1</m:t>
+                          </m:r>
+                        </m:num>
+                        <m:den>
+                          <m:r>
+                            <a:rPr lang="zh-CN" altLang="en-US" sz="1100" i="1">
+                              <a:latin typeface="Cambria Math"/>
+                            </a:rPr>
+                            <m:t>𝜋</m:t>
+                          </m:r>
+                        </m:den>
+                      </m:f>
+                      <m:nary>
+                        <m:naryPr>
+                          <m:chr m:val="∑"/>
+                          <m:ctrlPr>
+                            <a:rPr lang="en-US" altLang="zh-CN" sz="1100" i="1">
+                              <a:latin typeface="Cambria Math"/>
+                              <a:ea typeface="Cambria Math"/>
+                            </a:rPr>
+                          </m:ctrlPr>
+                        </m:naryPr>
+                        <m:sub>
+                          <m:r>
+                            <m:rPr>
+                              <m:brk m:alnAt="23"/>
+                            </m:rPr>
+                            <a:rPr lang="en-US" altLang="zh-CN" sz="1100" b="0" i="1">
+                              <a:latin typeface="Cambria Math"/>
+                              <a:ea typeface="Cambria Math"/>
+                            </a:rPr>
+                            <m:t>𝑛</m:t>
+                          </m:r>
+                          <m:r>
+                            <a:rPr lang="en-US" altLang="zh-CN" sz="1100" b="0" i="1">
+                              <a:latin typeface="Cambria Math"/>
+                              <a:ea typeface="Cambria Math"/>
+                            </a:rPr>
+                            <m:t>=1</m:t>
+                          </m:r>
+                        </m:sub>
+                        <m:sup>
+                          <m:r>
+                            <a:rPr lang="en-US" altLang="zh-CN" sz="1100" i="1">
+                              <a:latin typeface="Cambria Math"/>
+                              <a:ea typeface="Cambria Math"/>
+                            </a:rPr>
+                            <m:t>∞</m:t>
+                          </m:r>
+                        </m:sup>
+                        <m:e>
+                          <m:f>
+                            <m:fPr>
+                              <m:ctrlPr>
+                                <a:rPr lang="en-US" altLang="zh-CN" sz="1100" i="1">
+                                  <a:latin typeface="Cambria Math"/>
+                                  <a:ea typeface="Cambria Math"/>
+                                </a:rPr>
+                              </m:ctrlPr>
+                            </m:fPr>
+                            <m:num>
+                              <m:r>
+                                <a:rPr lang="en-US" altLang="zh-CN" sz="1100" b="0" i="1">
+                                  <a:latin typeface="Cambria Math"/>
+                                  <a:ea typeface="Cambria Math"/>
+                                </a:rPr>
+                                <m:t>1</m:t>
+                              </m:r>
+                            </m:num>
+                            <m:den>
+                              <m:r>
+                                <a:rPr lang="en-US" altLang="zh-CN" sz="1100" b="0" i="1">
+                                  <a:latin typeface="Cambria Math"/>
+                                  <a:ea typeface="Cambria Math"/>
+                                </a:rPr>
+                                <m:t>𝑛</m:t>
+                              </m:r>
+                            </m:den>
+                          </m:f>
+                          <m:r>
+                            <m:rPr>
+                              <m:sty m:val="p"/>
+                            </m:rPr>
+                            <a:rPr lang="en-US" altLang="zh-CN" sz="1100" b="0" i="0">
+                              <a:latin typeface="Cambria Math"/>
+                              <a:ea typeface="Cambria Math"/>
+                            </a:rPr>
+                            <m:t>sin</m:t>
+                          </m:r>
+                          <m:r>
+                            <a:rPr lang="en-US" altLang="zh-CN" sz="1100" b="0" i="1">
+                              <a:latin typeface="Cambria Math"/>
+                              <a:ea typeface="Cambria Math"/>
+                            </a:rPr>
+                            <m:t>⁡(</m:t>
+                          </m:r>
+                          <m:f>
+                            <m:fPr>
+                              <m:ctrlPr>
+                                <a:rPr lang="en-US" altLang="zh-CN" sz="1100" b="0" i="1">
+                                  <a:latin typeface="Cambria Math"/>
+                                  <a:ea typeface="Cambria Math"/>
+                                </a:rPr>
+                              </m:ctrlPr>
+                            </m:fPr>
+                            <m:num>
+                              <m:r>
+                                <a:rPr lang="en-US" altLang="zh-CN" sz="1100" b="0" i="1">
+                                  <a:latin typeface="Cambria Math"/>
+                                  <a:ea typeface="Cambria Math"/>
+                                </a:rPr>
+                                <m:t>𝑛</m:t>
+                              </m:r>
+                              <m:r>
+                                <a:rPr lang="zh-CN" altLang="en-US" sz="1100" b="0" i="1">
+                                  <a:latin typeface="Cambria Math"/>
+                                  <a:ea typeface="Cambria Math"/>
+                                </a:rPr>
+                                <m:t>𝜋</m:t>
+                              </m:r>
+                              <m:r>
+                                <a:rPr lang="en-US" altLang="zh-CN" sz="1100" b="0" i="1">
+                                  <a:latin typeface="Cambria Math"/>
+                                  <a:ea typeface="Cambria Math"/>
+                                </a:rPr>
+                                <m:t>𝑥</m:t>
+                              </m:r>
+                            </m:num>
+                            <m:den>
+                              <m:r>
+                                <a:rPr lang="en-US" altLang="zh-CN" sz="1100" b="0" i="1">
+                                  <a:latin typeface="Cambria Math"/>
+                                  <a:ea typeface="Cambria Math"/>
+                                </a:rPr>
+                                <m:t>𝐿</m:t>
+                              </m:r>
+                            </m:den>
+                          </m:f>
+                          <m:r>
+                            <a:rPr lang="en-US" altLang="zh-CN" sz="1100" b="0" i="1">
+                              <a:latin typeface="Cambria Math"/>
+                              <a:ea typeface="Cambria Math"/>
+                            </a:rPr>
+                            <m:t>)</m:t>
+                          </m:r>
+                        </m:e>
+                      </m:nary>
+                    </m:oMath>
+                  </m:oMathPara>
+                </a14:m>
+                <a:endParaRPr lang="zh-CN" altLang="en-US" sz="1100" dirty="0"/>
+              </a:p>
+            </p:txBody>
+          </p:sp>
+        </mc:Choice>
+        <mc:Fallback>
+          <p:sp>
+            <p:nvSpPr>
+              <p:cNvPr id="6" name="TextBox 7"/>
+              <p:cNvSpPr txBox="1">
+                <a:spLocks noRot="1" noChangeAspect="1" noMove="1" noResize="1" noEditPoints="1" noAdjustHandles="1" noChangeArrowheads="1" noChangeShapeType="1" noTextEdit="1"/>
+              </p:cNvSpPr>
+              <p:nvPr/>
+            </p:nvSpPr>
+            <p:spPr>
+              <a:xfrm>
+                <a:off x="4796798" y="3362418"/>
+                <a:ext cx="2281237" cy="566737"/>
+              </a:xfrm>
+              <a:prstGeom prst="rect">
+                <a:avLst/>
+              </a:prstGeom>
+              <a:blipFill rotWithShape="1">
+                <a:blip r:embed="rId5"/>
+                <a:stretch>
+                  <a:fillRect t="-92473" b="-139785"/>
+                </a:stretch>
+              </a:blipFill>
+            </p:spPr>
+            <p:txBody>
+              <a:bodyPr/>
+              <a:lstStyle/>
+              <a:p>
+                <a:r>
+                  <a:rPr lang="zh-CN" altLang="en-US">
+                    <a:noFill/>
+                  </a:rPr>
+                  <a:t> </a:t>
+                </a:r>
+              </a:p>
+            </p:txBody>
+          </p:sp>
+        </mc:Fallback>
+      </mc:AlternateContent>
+      <mc:AlternateContent xmlns:mc="http://schemas.openxmlformats.org/markup-compatibility/2006">
+        <mc:Choice xmlns:a14="http://schemas.microsoft.com/office/drawing/2010/main" Requires="a14">
+          <p:sp>
+            <p:nvSpPr>
+              <p:cNvPr id="7" name="TextBox 9"/>
+              <p:cNvSpPr txBox="1"/>
+              <p:nvPr/>
+            </p:nvSpPr>
+            <p:spPr>
+              <a:xfrm>
+                <a:off x="4654638" y="4082185"/>
+                <a:ext cx="2281238" cy="566738"/>
+              </a:xfrm>
+              <a:prstGeom prst="rect">
+                <a:avLst/>
+              </a:prstGeom>
+              <a:noFill/>
+            </p:spPr>
+            <p:style>
+              <a:lnRef idx="0">
+                <a:scrgbClr r="0" g="0" b="0"/>
+              </a:lnRef>
+              <a:fillRef idx="0">
+                <a:scrgbClr r="0" g="0" b="0"/>
+              </a:fillRef>
+              <a:effectRef idx="0">
+                <a:scrgbClr r="0" g="0" b="0"/>
+              </a:effectRef>
+              <a:fontRef idx="minor">
+                <a:schemeClr val="tx1"/>
+              </a:fontRef>
+            </p:style>
+            <p:txBody>
+              <a:bodyPr wrap="square" rtlCol="0" anchor="t">
+                <a:spAutoFit/>
+              </a:bodyPr>
+              <a:lstStyle>
+                <a:lvl1pPr marL="0" indent="0">
+                  <a:defRPr sz="1100">
+                    <a:solidFill>
+                      <a:schemeClr val="tx1"/>
+                    </a:solidFill>
+                    <a:latin typeface="+mn-lt"/>
+                    <a:ea typeface="+mn-ea"/>
+                    <a:cs typeface="+mn-cs"/>
+                  </a:defRPr>
+                </a:lvl1pPr>
+                <a:lvl2pPr marL="457200" indent="0">
+                  <a:defRPr sz="1100">
+                    <a:solidFill>
+                      <a:schemeClr val="tx1"/>
+                    </a:solidFill>
+                    <a:latin typeface="+mn-lt"/>
+                    <a:ea typeface="+mn-ea"/>
+                    <a:cs typeface="+mn-cs"/>
+                  </a:defRPr>
+                </a:lvl2pPr>
+                <a:lvl3pPr marL="914400" indent="0">
+                  <a:defRPr sz="1100">
+                    <a:solidFill>
+                      <a:schemeClr val="tx1"/>
+                    </a:solidFill>
+                    <a:latin typeface="+mn-lt"/>
+                    <a:ea typeface="+mn-ea"/>
+                    <a:cs typeface="+mn-cs"/>
+                  </a:defRPr>
+                </a:lvl3pPr>
+                <a:lvl4pPr marL="1371600" indent="0">
+                  <a:defRPr sz="1100">
+                    <a:solidFill>
+                      <a:schemeClr val="tx1"/>
+                    </a:solidFill>
+                    <a:latin typeface="+mn-lt"/>
+                    <a:ea typeface="+mn-ea"/>
+                    <a:cs typeface="+mn-cs"/>
+                  </a:defRPr>
+                </a:lvl4pPr>
+                <a:lvl5pPr marL="1828800" indent="0">
+                  <a:defRPr sz="1100">
+                    <a:solidFill>
+                      <a:schemeClr val="tx1"/>
+                    </a:solidFill>
+                    <a:latin typeface="+mn-lt"/>
+                    <a:ea typeface="+mn-ea"/>
+                    <a:cs typeface="+mn-cs"/>
+                  </a:defRPr>
+                </a:lvl5pPr>
+                <a:lvl6pPr marL="2286000" indent="0">
+                  <a:defRPr sz="1100">
+                    <a:solidFill>
+                      <a:schemeClr val="tx1"/>
+                    </a:solidFill>
+                    <a:latin typeface="+mn-lt"/>
+                    <a:ea typeface="+mn-ea"/>
+                    <a:cs typeface="+mn-cs"/>
+                  </a:defRPr>
+                </a:lvl6pPr>
+                <a:lvl7pPr marL="2743200" indent="0">
+                  <a:defRPr sz="1100">
+                    <a:solidFill>
+                      <a:schemeClr val="tx1"/>
+                    </a:solidFill>
+                    <a:latin typeface="+mn-lt"/>
+                    <a:ea typeface="+mn-ea"/>
+                    <a:cs typeface="+mn-cs"/>
+                  </a:defRPr>
+                </a:lvl7pPr>
+                <a:lvl8pPr marL="3200400" indent="0">
+                  <a:defRPr sz="1100">
+                    <a:solidFill>
+                      <a:schemeClr val="tx1"/>
+                    </a:solidFill>
+                    <a:latin typeface="+mn-lt"/>
+                    <a:ea typeface="+mn-ea"/>
+                    <a:cs typeface="+mn-cs"/>
+                  </a:defRPr>
+                </a:lvl8pPr>
+                <a:lvl9pPr marL="3657600" indent="0">
+                  <a:defRPr sz="1100">
+                    <a:solidFill>
+                      <a:schemeClr val="tx1"/>
+                    </a:solidFill>
+                    <a:latin typeface="+mn-lt"/>
+                    <a:ea typeface="+mn-ea"/>
+                    <a:cs typeface="+mn-cs"/>
+                  </a:defRPr>
+                </a:lvl9pPr>
+              </a:lstStyle>
+              <a:p>
+                <a:pPr/>
+                <a14:m>
+                  <m:oMathPara xmlns:m="http://schemas.openxmlformats.org/officeDocument/2006/math">
+                    <m:oMathParaPr>
+                      <m:jc m:val="centerGroup"/>
+                    </m:oMathParaPr>
+                    <m:oMath xmlns:m="http://schemas.openxmlformats.org/officeDocument/2006/math">
+                      <m:f>
+                        <m:fPr>
+                          <m:ctrlPr>
+                            <a:rPr lang="en-US" altLang="zh-CN" sz="1100" i="1">
+                              <a:latin typeface="Cambria Math"/>
+                            </a:rPr>
+                          </m:ctrlPr>
+                        </m:fPr>
+                        <m:num>
+                          <m:r>
+                            <a:rPr lang="en-US" altLang="zh-CN" sz="1100" b="0" i="1">
+                              <a:latin typeface="Cambria Math"/>
+                            </a:rPr>
+                            <m:t>8</m:t>
+                          </m:r>
+                        </m:num>
+                        <m:den>
+                          <m:sSup>
+                            <m:sSupPr>
+                              <m:ctrlPr>
+                                <a:rPr lang="en-US" altLang="zh-CN" sz="1100" i="1">
+                                  <a:latin typeface="Cambria Math"/>
+                                </a:rPr>
+                              </m:ctrlPr>
+                            </m:sSupPr>
+                            <m:e>
+                              <m:r>
+                                <a:rPr lang="zh-CN" altLang="en-US" sz="1100" i="1">
+                                  <a:latin typeface="Cambria Math"/>
+                                </a:rPr>
+                                <m:t>𝜋</m:t>
+                              </m:r>
+                            </m:e>
+                            <m:sup>
+                              <m:r>
+                                <a:rPr lang="en-US" altLang="zh-CN" sz="1100" b="0" i="1">
+                                  <a:latin typeface="Cambria Math"/>
+                                </a:rPr>
+                                <m:t>2</m:t>
+                              </m:r>
+                            </m:sup>
+                          </m:sSup>
+                        </m:den>
+                      </m:f>
+                      <m:nary>
+                        <m:naryPr>
+                          <m:chr m:val="∑"/>
+                          <m:ctrlPr>
+                            <a:rPr lang="en-US" altLang="zh-CN" sz="1100" i="1">
+                              <a:latin typeface="Cambria Math"/>
+                              <a:ea typeface="Cambria Math"/>
+                            </a:rPr>
+                          </m:ctrlPr>
+                        </m:naryPr>
+                        <m:sub>
+                          <m:r>
+                            <m:rPr>
+                              <m:brk m:alnAt="23"/>
+                            </m:rPr>
+                            <a:rPr lang="en-US" altLang="zh-CN" sz="1100" b="0" i="1">
+                              <a:latin typeface="Cambria Math"/>
+                              <a:ea typeface="Cambria Math"/>
+                            </a:rPr>
+                            <m:t>𝑛</m:t>
+                          </m:r>
+                          <m:r>
+                            <a:rPr lang="en-US" altLang="zh-CN" sz="1100" b="0" i="1">
+                              <a:latin typeface="Cambria Math"/>
+                              <a:ea typeface="Cambria Math"/>
+                            </a:rPr>
+                            <m:t>=1,3,5…</m:t>
+                          </m:r>
+                        </m:sub>
+                        <m:sup>
+                          <m:r>
+                            <a:rPr lang="en-US" altLang="zh-CN" sz="1100" i="1">
+                              <a:latin typeface="Cambria Math"/>
+                              <a:ea typeface="Cambria Math"/>
+                            </a:rPr>
+                            <m:t>∞</m:t>
+                          </m:r>
+                        </m:sup>
+                        <m:e>
+                          <m:f>
+                            <m:fPr>
+                              <m:ctrlPr>
+                                <a:rPr lang="en-US" altLang="zh-CN" sz="1100" i="1">
+                                  <a:latin typeface="Cambria Math"/>
+                                  <a:ea typeface="Cambria Math"/>
+                                </a:rPr>
+                              </m:ctrlPr>
+                            </m:fPr>
+                            <m:num>
+                              <m:sSup>
+                                <m:sSupPr>
+                                  <m:ctrlPr>
+                                    <a:rPr lang="en-US" altLang="zh-CN" sz="1100" i="1">
+                                      <a:latin typeface="Cambria Math"/>
+                                      <a:ea typeface="Cambria Math"/>
+                                    </a:rPr>
+                                  </m:ctrlPr>
+                                </m:sSupPr>
+                                <m:e>
+                                  <m:r>
+                                    <a:rPr lang="en-US" altLang="zh-CN" sz="1100" b="0" i="1">
+                                      <a:latin typeface="Cambria Math"/>
+                                      <a:ea typeface="Cambria Math"/>
+                                    </a:rPr>
+                                    <m:t>(−1)</m:t>
+                                  </m:r>
+                                </m:e>
+                                <m:sup>
+                                  <m:r>
+                                    <a:rPr lang="en-US" altLang="zh-CN" sz="1100" b="0" i="1">
+                                      <a:latin typeface="Cambria Math"/>
+                                      <a:ea typeface="Cambria Math"/>
+                                    </a:rPr>
+                                    <m:t>(</m:t>
+                                  </m:r>
+                                  <m:r>
+                                    <a:rPr lang="en-US" altLang="zh-CN" sz="1100" b="0" i="1">
+                                      <a:latin typeface="Cambria Math"/>
+                                      <a:ea typeface="Cambria Math"/>
+                                    </a:rPr>
+                                    <m:t>𝑛</m:t>
+                                  </m:r>
+                                  <m:r>
+                                    <a:rPr lang="en-US" altLang="zh-CN" sz="1100" b="0" i="1">
+                                      <a:latin typeface="Cambria Math"/>
+                                      <a:ea typeface="Cambria Math"/>
+                                    </a:rPr>
+                                    <m:t>−1)/2</m:t>
+                                  </m:r>
+                                </m:sup>
+                              </m:sSup>
+                            </m:num>
+                            <m:den>
+                              <m:sSup>
+                                <m:sSupPr>
+                                  <m:ctrlPr>
+                                    <a:rPr lang="en-US" altLang="zh-CN" sz="1100" b="0" i="1">
+                                      <a:latin typeface="Cambria Math"/>
+                                      <a:ea typeface="Cambria Math"/>
+                                    </a:rPr>
+                                  </m:ctrlPr>
+                                </m:sSupPr>
+                                <m:e>
+                                  <m:r>
+                                    <a:rPr lang="en-US" altLang="zh-CN" sz="1100" b="0" i="1">
+                                      <a:latin typeface="Cambria Math"/>
+                                      <a:ea typeface="Cambria Math"/>
+                                    </a:rPr>
+                                    <m:t>𝑛</m:t>
+                                  </m:r>
+                                </m:e>
+                                <m:sup>
+                                  <m:r>
+                                    <a:rPr lang="en-US" altLang="zh-CN" sz="1100" b="0" i="1">
+                                      <a:latin typeface="Cambria Math"/>
+                                      <a:ea typeface="Cambria Math"/>
+                                    </a:rPr>
+                                    <m:t>2</m:t>
+                                  </m:r>
+                                </m:sup>
+                              </m:sSup>
+                            </m:den>
+                          </m:f>
+                          <m:r>
+                            <m:rPr>
+                              <m:sty m:val="p"/>
+                            </m:rPr>
+                            <a:rPr lang="en-US" altLang="zh-CN" sz="1100" b="0" i="0">
+                              <a:latin typeface="Cambria Math"/>
+                              <a:ea typeface="Cambria Math"/>
+                            </a:rPr>
+                            <m:t>sin</m:t>
+                          </m:r>
+                          <m:r>
+                            <a:rPr lang="en-US" altLang="zh-CN" sz="1100" b="0" i="1">
+                              <a:latin typeface="Cambria Math"/>
+                              <a:ea typeface="Cambria Math"/>
+                            </a:rPr>
+                            <m:t>⁡(</m:t>
+                          </m:r>
+                          <m:f>
+                            <m:fPr>
+                              <m:ctrlPr>
+                                <a:rPr lang="en-US" altLang="zh-CN" sz="1100" b="0" i="1">
+                                  <a:latin typeface="Cambria Math"/>
+                                  <a:ea typeface="Cambria Math"/>
+                                </a:rPr>
+                              </m:ctrlPr>
+                            </m:fPr>
+                            <m:num>
+                              <m:r>
+                                <a:rPr lang="en-US" altLang="zh-CN" sz="1100" b="0" i="1">
+                                  <a:latin typeface="Cambria Math"/>
+                                  <a:ea typeface="Cambria Math"/>
+                                </a:rPr>
+                                <m:t>𝑛</m:t>
+                              </m:r>
+                              <m:r>
+                                <a:rPr lang="zh-CN" altLang="en-US" sz="1100" b="0" i="1">
+                                  <a:latin typeface="Cambria Math"/>
+                                  <a:ea typeface="Cambria Math"/>
+                                </a:rPr>
+                                <m:t>𝜋</m:t>
+                              </m:r>
+                              <m:r>
+                                <a:rPr lang="en-US" altLang="zh-CN" sz="1100" b="0" i="1">
+                                  <a:latin typeface="Cambria Math"/>
+                                  <a:ea typeface="Cambria Math"/>
+                                </a:rPr>
+                                <m:t>𝑥</m:t>
+                              </m:r>
+                            </m:num>
+                            <m:den>
+                              <m:r>
+                                <a:rPr lang="en-US" altLang="zh-CN" sz="1100" b="0" i="1">
+                                  <a:latin typeface="Cambria Math"/>
+                                  <a:ea typeface="Cambria Math"/>
+                                </a:rPr>
+                                <m:t>𝐿</m:t>
+                              </m:r>
+                            </m:den>
+                          </m:f>
+                          <m:r>
+                            <a:rPr lang="en-US" altLang="zh-CN" sz="1100" b="0" i="1">
+                              <a:latin typeface="Cambria Math"/>
+                              <a:ea typeface="Cambria Math"/>
+                            </a:rPr>
+                            <m:t>)</m:t>
+                          </m:r>
+                        </m:e>
+                      </m:nary>
+                    </m:oMath>
+                  </m:oMathPara>
+                </a14:m>
+                <a:endParaRPr lang="zh-CN" altLang="en-US" sz="1100" dirty="0"/>
+              </a:p>
+            </p:txBody>
+          </p:sp>
+        </mc:Choice>
+        <mc:Fallback>
+          <p:sp>
+            <p:nvSpPr>
+              <p:cNvPr id="7" name="TextBox 9"/>
+              <p:cNvSpPr txBox="1">
+                <a:spLocks noRot="1" noChangeAspect="1" noMove="1" noResize="1" noEditPoints="1" noAdjustHandles="1" noChangeArrowheads="1" noChangeShapeType="1" noTextEdit="1"/>
+              </p:cNvSpPr>
+              <p:nvPr/>
+            </p:nvSpPr>
+            <p:spPr>
+              <a:xfrm>
+                <a:off x="4654638" y="4082185"/>
+                <a:ext cx="2281238" cy="566738"/>
+              </a:xfrm>
+              <a:prstGeom prst="rect">
+                <a:avLst/>
+              </a:prstGeom>
+              <a:blipFill rotWithShape="1">
+                <a:blip r:embed="rId6"/>
+                <a:stretch>
+                  <a:fillRect l="-1872" t="-92473" b="-139785"/>
+                </a:stretch>
+              </a:blipFill>
+            </p:spPr>
+            <p:txBody>
+              <a:bodyPr/>
+              <a:lstStyle/>
+              <a:p>
+                <a:r>
+                  <a:rPr lang="zh-CN" altLang="en-US">
+                    <a:noFill/>
+                  </a:rPr>
+                  <a:t> </a:t>
+                </a:r>
+              </a:p>
+            </p:txBody>
+          </p:sp>
+        </mc:Fallback>
+      </mc:AlternateContent>
+      <mc:AlternateContent xmlns:mc="http://schemas.openxmlformats.org/markup-compatibility/2006">
+        <mc:Choice xmlns:a14="http://schemas.microsoft.com/office/drawing/2010/main" Requires="a14">
+          <p:sp>
+            <p:nvSpPr>
+              <p:cNvPr id="8" name="TextBox 10"/>
+              <p:cNvSpPr txBox="1"/>
+              <p:nvPr/>
+            </p:nvSpPr>
+            <p:spPr>
+              <a:xfrm>
+                <a:off x="2609864" y="4232998"/>
+                <a:ext cx="2228850" cy="265112"/>
+              </a:xfrm>
+              <a:prstGeom prst="rect">
+                <a:avLst/>
+              </a:prstGeom>
+              <a:noFill/>
+            </p:spPr>
+            <p:style>
+              <a:lnRef idx="0">
+                <a:scrgbClr r="0" g="0" b="0"/>
+              </a:lnRef>
+              <a:fillRef idx="0">
+                <a:scrgbClr r="0" g="0" b="0"/>
+              </a:fillRef>
+              <a:effectRef idx="0">
+                <a:scrgbClr r="0" g="0" b="0"/>
+              </a:effectRef>
+              <a:fontRef idx="minor">
+                <a:schemeClr val="tx1"/>
+              </a:fontRef>
+            </p:style>
+            <p:txBody>
+              <a:bodyPr wrap="square" rtlCol="0" anchor="t">
+                <a:spAutoFit/>
+              </a:bodyPr>
+              <a:lstStyle>
+                <a:lvl1pPr marL="0" indent="0">
+                  <a:defRPr sz="1100">
+                    <a:solidFill>
+                      <a:schemeClr val="tx1"/>
+                    </a:solidFill>
+                    <a:latin typeface="+mn-lt"/>
+                    <a:ea typeface="+mn-ea"/>
+                    <a:cs typeface="+mn-cs"/>
+                  </a:defRPr>
+                </a:lvl1pPr>
+                <a:lvl2pPr marL="457200" indent="0">
+                  <a:defRPr sz="1100">
+                    <a:solidFill>
+                      <a:schemeClr val="tx1"/>
+                    </a:solidFill>
+                    <a:latin typeface="+mn-lt"/>
+                    <a:ea typeface="+mn-ea"/>
+                    <a:cs typeface="+mn-cs"/>
+                  </a:defRPr>
+                </a:lvl2pPr>
+                <a:lvl3pPr marL="914400" indent="0">
+                  <a:defRPr sz="1100">
+                    <a:solidFill>
+                      <a:schemeClr val="tx1"/>
+                    </a:solidFill>
+                    <a:latin typeface="+mn-lt"/>
+                    <a:ea typeface="+mn-ea"/>
+                    <a:cs typeface="+mn-cs"/>
+                  </a:defRPr>
+                </a:lvl3pPr>
+                <a:lvl4pPr marL="1371600" indent="0">
+                  <a:defRPr sz="1100">
+                    <a:solidFill>
+                      <a:schemeClr val="tx1"/>
+                    </a:solidFill>
+                    <a:latin typeface="+mn-lt"/>
+                    <a:ea typeface="+mn-ea"/>
+                    <a:cs typeface="+mn-cs"/>
+                  </a:defRPr>
+                </a:lvl4pPr>
+                <a:lvl5pPr marL="1828800" indent="0">
+                  <a:defRPr sz="1100">
+                    <a:solidFill>
+                      <a:schemeClr val="tx1"/>
+                    </a:solidFill>
+                    <a:latin typeface="+mn-lt"/>
+                    <a:ea typeface="+mn-ea"/>
+                    <a:cs typeface="+mn-cs"/>
+                  </a:defRPr>
+                </a:lvl5pPr>
+                <a:lvl6pPr marL="2286000" indent="0">
+                  <a:defRPr sz="1100">
+                    <a:solidFill>
+                      <a:schemeClr val="tx1"/>
+                    </a:solidFill>
+                    <a:latin typeface="+mn-lt"/>
+                    <a:ea typeface="+mn-ea"/>
+                    <a:cs typeface="+mn-cs"/>
+                  </a:defRPr>
+                </a:lvl6pPr>
+                <a:lvl7pPr marL="2743200" indent="0">
+                  <a:defRPr sz="1100">
+                    <a:solidFill>
+                      <a:schemeClr val="tx1"/>
+                    </a:solidFill>
+                    <a:latin typeface="+mn-lt"/>
+                    <a:ea typeface="+mn-ea"/>
+                    <a:cs typeface="+mn-cs"/>
+                  </a:defRPr>
+                </a:lvl7pPr>
+                <a:lvl8pPr marL="3200400" indent="0">
+                  <a:defRPr sz="1100">
+                    <a:solidFill>
+                      <a:schemeClr val="tx1"/>
+                    </a:solidFill>
+                    <a:latin typeface="+mn-lt"/>
+                    <a:ea typeface="+mn-ea"/>
+                    <a:cs typeface="+mn-cs"/>
+                  </a:defRPr>
+                </a:lvl8pPr>
+                <a:lvl9pPr marL="3657600" indent="0">
+                  <a:defRPr sz="1100">
+                    <a:solidFill>
+                      <a:schemeClr val="tx1"/>
+                    </a:solidFill>
+                    <a:latin typeface="+mn-lt"/>
+                    <a:ea typeface="+mn-ea"/>
+                    <a:cs typeface="+mn-cs"/>
+                  </a:defRPr>
+                </a:lvl9pPr>
+              </a:lstStyle>
+              <a:p>
+                <a:pPr/>
+                <a14:m>
+                  <m:oMathPara xmlns:m="http://schemas.openxmlformats.org/officeDocument/2006/math">
+                    <m:oMathParaPr>
+                      <m:jc m:val="centerGroup"/>
+                    </m:oMathParaPr>
+                    <m:oMath xmlns:m="http://schemas.openxmlformats.org/officeDocument/2006/math">
+                      <m:r>
+                        <a:rPr lang="en-US" altLang="zh-CN" sz="1100" b="0" i="1">
+                          <a:latin typeface="Cambria Math"/>
+                        </a:rPr>
+                        <m:t>𝑇</m:t>
+                      </m:r>
+                      <m:r>
+                        <a:rPr lang="en-US" altLang="zh-CN" sz="1100" b="0" i="1">
+                          <a:latin typeface="Cambria Math"/>
+                        </a:rPr>
+                        <m:t>(</m:t>
+                      </m:r>
+                      <m:r>
+                        <a:rPr lang="en-US" altLang="zh-CN" sz="1100" b="0" i="1">
+                          <a:latin typeface="Cambria Math"/>
+                        </a:rPr>
+                        <m:t>𝑥</m:t>
+                      </m:r>
+                      <m:r>
+                        <a:rPr lang="en-US" altLang="zh-CN" sz="1100" b="0" i="1">
+                          <a:latin typeface="Cambria Math"/>
+                        </a:rPr>
+                        <m:t>)</m:t>
+                      </m:r>
+                    </m:oMath>
+                  </m:oMathPara>
+                </a14:m>
+                <a:endParaRPr lang="zh-CN" altLang="en-US" sz="1100" dirty="0"/>
+              </a:p>
+            </p:txBody>
+          </p:sp>
+        </mc:Choice>
+        <mc:Fallback>
+          <p:sp>
+            <p:nvSpPr>
+              <p:cNvPr id="8" name="TextBox 10"/>
+              <p:cNvSpPr txBox="1">
+                <a:spLocks noRot="1" noChangeAspect="1" noMove="1" noResize="1" noEditPoints="1" noAdjustHandles="1" noChangeArrowheads="1" noChangeShapeType="1" noTextEdit="1"/>
+              </p:cNvSpPr>
+              <p:nvPr/>
+            </p:nvSpPr>
+            <p:spPr>
+              <a:xfrm>
+                <a:off x="2609864" y="4232998"/>
+                <a:ext cx="2228850" cy="265112"/>
+              </a:xfrm>
+              <a:prstGeom prst="rect">
+                <a:avLst/>
+              </a:prstGeom>
+              <a:blipFill rotWithShape="1">
+                <a:blip r:embed="rId7"/>
+                <a:stretch>
+                  <a:fillRect b="-2273"/>
+                </a:stretch>
+              </a:blipFill>
+            </p:spPr>
+            <p:txBody>
+              <a:bodyPr/>
+              <a:lstStyle/>
+              <a:p>
+                <a:r>
+                  <a:rPr lang="zh-CN" altLang="en-US">
+                    <a:noFill/>
+                  </a:rPr>
+                  <a:t> </a:t>
+                </a:r>
+              </a:p>
+            </p:txBody>
+          </p:sp>
+        </mc:Fallback>
+      </mc:AlternateContent>
+    </p:spTree>
+    <p:extLst>
+      <p:ext uri="{BB962C8B-B14F-4D97-AF65-F5344CB8AC3E}">
+        <p14:creationId xmlns:p14="http://schemas.microsoft.com/office/powerpoint/2010/main" val="3363472582"/>
       </p:ext>
     </p:extLst>
   </p:cSld>

</xml_diff>

<commit_message>
wokring on the third chapter
</commit_message>
<xml_diff>
--- a/Graphic & Tables.pptx
+++ b/Graphic & Tables.pptx
@@ -5,7 +5,7 @@
     <p:sldMasterId id="2147483648" r:id="rId1"/>
   </p:sldMasterIdLst>
   <p:notesMasterIdLst>
-    <p:notesMasterId r:id="rId9"/>
+    <p:notesMasterId r:id="rId12"/>
   </p:notesMasterIdLst>
   <p:sldIdLst>
     <p:sldId id="256" r:id="rId2"/>
@@ -15,6 +15,9 @@
     <p:sldId id="261" r:id="rId6"/>
     <p:sldId id="262" r:id="rId7"/>
     <p:sldId id="263" r:id="rId8"/>
+    <p:sldId id="264" r:id="rId9"/>
+    <p:sldId id="265" r:id="rId10"/>
+    <p:sldId id="267" r:id="rId11"/>
   </p:sldIdLst>
   <p:sldSz cx="9144000" cy="6858000" type="screen4x3"/>
   <p:notesSz cx="6858000" cy="9144000"/>
@@ -133,6 +136,9 @@
             <p14:sldId id="261"/>
             <p14:sldId id="262"/>
             <p14:sldId id="263"/>
+            <p14:sldId id="264"/>
+            <p14:sldId id="265"/>
+            <p14:sldId id="267"/>
           </p14:sldIdLst>
         </p14:section>
       </p14:sectionLst>
@@ -223,7 +229,7 @@
           <a:p>
             <a:fld id="{EDA7B775-790A-4D64-B62E-B7503A0D88A5}" type="datetimeFigureOut">
               <a:rPr lang="zh-CN" altLang="en-US" smtClean="0"/>
-              <a:t>2019/5/19</a:t>
+              <a:t>2019/5/20</a:t>
             </a:fld>
             <a:endParaRPr lang="zh-CN" altLang="en-US"/>
           </a:p>
@@ -672,7 +678,7 @@
           <a:p>
             <a:fld id="{794C1F84-8C4E-4FA9-B7BA-3801BE6D5074}" type="datetimeFigureOut">
               <a:rPr lang="zh-CN" altLang="en-US" smtClean="0"/>
-              <a:t>2019/5/19</a:t>
+              <a:t>2019/5/20</a:t>
             </a:fld>
             <a:endParaRPr lang="zh-CN" altLang="en-US"/>
           </a:p>
@@ -842,7 +848,7 @@
           <a:p>
             <a:fld id="{794C1F84-8C4E-4FA9-B7BA-3801BE6D5074}" type="datetimeFigureOut">
               <a:rPr lang="zh-CN" altLang="en-US" smtClean="0"/>
-              <a:t>2019/5/19</a:t>
+              <a:t>2019/5/20</a:t>
             </a:fld>
             <a:endParaRPr lang="zh-CN" altLang="en-US"/>
           </a:p>
@@ -1022,7 +1028,7 @@
           <a:p>
             <a:fld id="{794C1F84-8C4E-4FA9-B7BA-3801BE6D5074}" type="datetimeFigureOut">
               <a:rPr lang="zh-CN" altLang="en-US" smtClean="0"/>
-              <a:t>2019/5/19</a:t>
+              <a:t>2019/5/20</a:t>
             </a:fld>
             <a:endParaRPr lang="zh-CN" altLang="en-US"/>
           </a:p>
@@ -1192,7 +1198,7 @@
           <a:p>
             <a:fld id="{794C1F84-8C4E-4FA9-B7BA-3801BE6D5074}" type="datetimeFigureOut">
               <a:rPr lang="zh-CN" altLang="en-US" smtClean="0"/>
-              <a:t>2019/5/19</a:t>
+              <a:t>2019/5/20</a:t>
             </a:fld>
             <a:endParaRPr lang="zh-CN" altLang="en-US"/>
           </a:p>
@@ -1438,7 +1444,7 @@
           <a:p>
             <a:fld id="{794C1F84-8C4E-4FA9-B7BA-3801BE6D5074}" type="datetimeFigureOut">
               <a:rPr lang="zh-CN" altLang="en-US" smtClean="0"/>
-              <a:t>2019/5/19</a:t>
+              <a:t>2019/5/20</a:t>
             </a:fld>
             <a:endParaRPr lang="zh-CN" altLang="en-US"/>
           </a:p>
@@ -1726,7 +1732,7 @@
           <a:p>
             <a:fld id="{794C1F84-8C4E-4FA9-B7BA-3801BE6D5074}" type="datetimeFigureOut">
               <a:rPr lang="zh-CN" altLang="en-US" smtClean="0"/>
-              <a:t>2019/5/19</a:t>
+              <a:t>2019/5/20</a:t>
             </a:fld>
             <a:endParaRPr lang="zh-CN" altLang="en-US"/>
           </a:p>
@@ -2148,7 +2154,7 @@
           <a:p>
             <a:fld id="{794C1F84-8C4E-4FA9-B7BA-3801BE6D5074}" type="datetimeFigureOut">
               <a:rPr lang="zh-CN" altLang="en-US" smtClean="0"/>
-              <a:t>2019/5/19</a:t>
+              <a:t>2019/5/20</a:t>
             </a:fld>
             <a:endParaRPr lang="zh-CN" altLang="en-US"/>
           </a:p>
@@ -2266,7 +2272,7 @@
           <a:p>
             <a:fld id="{794C1F84-8C4E-4FA9-B7BA-3801BE6D5074}" type="datetimeFigureOut">
               <a:rPr lang="zh-CN" altLang="en-US" smtClean="0"/>
-              <a:t>2019/5/19</a:t>
+              <a:t>2019/5/20</a:t>
             </a:fld>
             <a:endParaRPr lang="zh-CN" altLang="en-US"/>
           </a:p>
@@ -2361,7 +2367,7 @@
           <a:p>
             <a:fld id="{794C1F84-8C4E-4FA9-B7BA-3801BE6D5074}" type="datetimeFigureOut">
               <a:rPr lang="zh-CN" altLang="en-US" smtClean="0"/>
-              <a:t>2019/5/19</a:t>
+              <a:t>2019/5/20</a:t>
             </a:fld>
             <a:endParaRPr lang="zh-CN" altLang="en-US"/>
           </a:p>
@@ -2638,7 +2644,7 @@
           <a:p>
             <a:fld id="{794C1F84-8C4E-4FA9-B7BA-3801BE6D5074}" type="datetimeFigureOut">
               <a:rPr lang="zh-CN" altLang="en-US" smtClean="0"/>
-              <a:t>2019/5/19</a:t>
+              <a:t>2019/5/20</a:t>
             </a:fld>
             <a:endParaRPr lang="zh-CN" altLang="en-US"/>
           </a:p>
@@ -2891,7 +2897,7 @@
           <a:p>
             <a:fld id="{794C1F84-8C4E-4FA9-B7BA-3801BE6D5074}" type="datetimeFigureOut">
               <a:rPr lang="zh-CN" altLang="en-US" smtClean="0"/>
-              <a:t>2019/5/19</a:t>
+              <a:t>2019/5/20</a:t>
             </a:fld>
             <a:endParaRPr lang="zh-CN" altLang="en-US"/>
           </a:p>
@@ -3104,7 +3110,7 @@
           <a:p>
             <a:fld id="{794C1F84-8C4E-4FA9-B7BA-3801BE6D5074}" type="datetimeFigureOut">
               <a:rPr lang="zh-CN" altLang="en-US" smtClean="0"/>
-              <a:t>2019/5/19</a:t>
+              <a:t>2019/5/20</a:t>
             </a:fld>
             <a:endParaRPr lang="zh-CN" altLang="en-US"/>
           </a:p>
@@ -3636,12 +3642,12 @@
           <a:graphicData uri="http://schemas.openxmlformats.org/presentationml/2006/ole">
             <mc:AlternateContent xmlns:mc="http://schemas.openxmlformats.org/markup-compatibility/2006">
               <mc:Choice xmlns:v="urn:schemas-microsoft-com:vml" Requires="v">
-                <p:oleObj spid="_x0000_s1047" name="文档" r:id="rId3" imgW="5594453" imgH="3640410" progId="Word.Document.12">
+                <p:oleObj spid="_x0000_s1052" name="文档" r:id="rId4" imgW="5594453" imgH="3640410" progId="Word.Document.12">
                   <p:embed/>
                 </p:oleObj>
               </mc:Choice>
               <mc:Fallback>
-                <p:oleObj name="文档" r:id="rId3" imgW="5594453" imgH="3640410" progId="Word.Document.12">
+                <p:oleObj name="文档" r:id="rId4" imgW="5594453" imgH="3640410" progId="Word.Document.12">
                   <p:embed/>
                   <p:pic>
                     <p:nvPicPr>
@@ -3650,7 +3656,7 @@
                       <p:nvPr/>
                     </p:nvPicPr>
                     <p:blipFill>
-                      <a:blip r:embed="rId4"/>
+                      <a:blip r:embed="rId5"/>
                       <a:stretch>
                         <a:fillRect/>
                       </a:stretch>
@@ -3675,6 +3681,1752 @@
     <p:extLst>
       <p:ext uri="{BB962C8B-B14F-4D97-AF65-F5344CB8AC3E}">
         <p14:creationId xmlns:p14="http://schemas.microsoft.com/office/powerpoint/2010/main" val="4180933587"/>
+      </p:ext>
+    </p:extLst>
+  </p:cSld>
+  <p:clrMapOvr>
+    <a:masterClrMapping/>
+  </p:clrMapOvr>
+</p:sld>
+</file>
+
+<file path=ppt/slides/slide10.xml><?xml version="1.0" encoding="utf-8"?>
+<p:sld xmlns:a="http://schemas.openxmlformats.org/drawingml/2006/main" xmlns:r="http://schemas.openxmlformats.org/officeDocument/2006/relationships" xmlns:p="http://schemas.openxmlformats.org/presentationml/2006/main">
+  <p:cSld>
+    <p:spTree>
+      <p:nvGrpSpPr>
+        <p:cNvPr id="1" name=""/>
+        <p:cNvGrpSpPr/>
+        <p:nvPr/>
+      </p:nvGrpSpPr>
+      <p:grpSpPr>
+        <a:xfrm>
+          <a:off x="0" y="0"/>
+          <a:ext cx="0" cy="0"/>
+          <a:chOff x="0" y="0"/>
+          <a:chExt cx="0" cy="0"/>
+        </a:xfrm>
+      </p:grpSpPr>
+      <p:sp>
+        <p:nvSpPr>
+          <p:cNvPr id="25" name="等腰三角形 24"/>
+          <p:cNvSpPr/>
+          <p:nvPr/>
+        </p:nvSpPr>
+        <p:spPr>
+          <a:xfrm>
+            <a:off x="1195008" y="2570004"/>
+            <a:ext cx="144016" cy="109753"/>
+          </a:xfrm>
+          <a:prstGeom prst="triangle">
+            <a:avLst/>
+          </a:prstGeom>
+          <a:solidFill>
+            <a:schemeClr val="tx1"/>
+          </a:solidFill>
+          <a:ln>
+            <a:solidFill>
+              <a:schemeClr val="tx1"/>
+            </a:solidFill>
+          </a:ln>
+        </p:spPr>
+        <p:style>
+          <a:lnRef idx="2">
+            <a:schemeClr val="accent1">
+              <a:shade val="50000"/>
+            </a:schemeClr>
+          </a:lnRef>
+          <a:fillRef idx="1">
+            <a:schemeClr val="accent1"/>
+          </a:fillRef>
+          <a:effectRef idx="0">
+            <a:schemeClr val="accent1"/>
+          </a:effectRef>
+          <a:fontRef idx="minor">
+            <a:schemeClr val="lt1"/>
+          </a:fontRef>
+        </p:style>
+        <p:txBody>
+          <a:bodyPr rtlCol="0" anchor="ctr"/>
+          <a:lstStyle/>
+          <a:p>
+            <a:pPr algn="ctr"/>
+            <a:endParaRPr lang="zh-CN" altLang="en-US"/>
+          </a:p>
+        </p:txBody>
+      </p:sp>
+      <p:sp>
+        <p:nvSpPr>
+          <p:cNvPr id="26" name="等腰三角形 25"/>
+          <p:cNvSpPr/>
+          <p:nvPr/>
+        </p:nvSpPr>
+        <p:spPr>
+          <a:xfrm>
+            <a:off x="6238474" y="2570003"/>
+            <a:ext cx="144016" cy="109753"/>
+          </a:xfrm>
+          <a:prstGeom prst="triangle">
+            <a:avLst/>
+          </a:prstGeom>
+          <a:solidFill>
+            <a:schemeClr val="tx1"/>
+          </a:solidFill>
+          <a:ln>
+            <a:solidFill>
+              <a:schemeClr val="tx1"/>
+            </a:solidFill>
+          </a:ln>
+        </p:spPr>
+        <p:style>
+          <a:lnRef idx="2">
+            <a:schemeClr val="accent1">
+              <a:shade val="50000"/>
+            </a:schemeClr>
+          </a:lnRef>
+          <a:fillRef idx="1">
+            <a:schemeClr val="accent1"/>
+          </a:fillRef>
+          <a:effectRef idx="0">
+            <a:schemeClr val="accent1"/>
+          </a:effectRef>
+          <a:fontRef idx="minor">
+            <a:schemeClr val="lt1"/>
+          </a:fontRef>
+        </p:style>
+        <p:txBody>
+          <a:bodyPr rtlCol="0" anchor="ctr"/>
+          <a:lstStyle/>
+          <a:p>
+            <a:pPr algn="ctr"/>
+            <a:endParaRPr lang="zh-CN" altLang="en-US"/>
+          </a:p>
+        </p:txBody>
+      </p:sp>
+      <p:sp>
+        <p:nvSpPr>
+          <p:cNvPr id="27" name="TextBox 26"/>
+          <p:cNvSpPr txBox="1"/>
+          <p:nvPr/>
+        </p:nvSpPr>
+        <p:spPr>
+          <a:xfrm>
+            <a:off x="1133348" y="2255547"/>
+            <a:ext cx="317716" cy="369332"/>
+          </a:xfrm>
+          <a:prstGeom prst="rect">
+            <a:avLst/>
+          </a:prstGeom>
+          <a:noFill/>
+        </p:spPr>
+        <p:txBody>
+          <a:bodyPr wrap="none" rtlCol="0">
+            <a:spAutoFit/>
+          </a:bodyPr>
+          <a:lstStyle/>
+          <a:p>
+            <a:r>
+              <a:rPr lang="en-US" altLang="zh-CN" dirty="0" smtClean="0"/>
+              <a:t>A</a:t>
+            </a:r>
+            <a:endParaRPr lang="zh-CN" altLang="en-US" dirty="0"/>
+          </a:p>
+        </p:txBody>
+      </p:sp>
+      <p:sp>
+        <p:nvSpPr>
+          <p:cNvPr id="28" name="TextBox 27"/>
+          <p:cNvSpPr txBox="1"/>
+          <p:nvPr/>
+        </p:nvSpPr>
+        <p:spPr>
+          <a:xfrm>
+            <a:off x="6217350" y="2196623"/>
+            <a:ext cx="309700" cy="369332"/>
+          </a:xfrm>
+          <a:prstGeom prst="rect">
+            <a:avLst/>
+          </a:prstGeom>
+          <a:noFill/>
+          <a:ln>
+            <a:noFill/>
+          </a:ln>
+        </p:spPr>
+        <p:txBody>
+          <a:bodyPr wrap="none" rtlCol="0">
+            <a:spAutoFit/>
+          </a:bodyPr>
+          <a:lstStyle/>
+          <a:p>
+            <a:r>
+              <a:rPr lang="en-US" altLang="zh-CN" dirty="0" smtClean="0"/>
+              <a:t>B</a:t>
+            </a:r>
+            <a:endParaRPr lang="zh-CN" altLang="en-US" dirty="0"/>
+          </a:p>
+        </p:txBody>
+      </p:sp>
+      <p:cxnSp>
+        <p:nvCxnSpPr>
+          <p:cNvPr id="31" name="直接箭头连接符 30"/>
+          <p:cNvCxnSpPr/>
+          <p:nvPr/>
+        </p:nvCxnSpPr>
+        <p:spPr>
+          <a:xfrm>
+            <a:off x="251520" y="6456620"/>
+            <a:ext cx="8640960" cy="0"/>
+          </a:xfrm>
+          <a:prstGeom prst="straightConnector1">
+            <a:avLst/>
+          </a:prstGeom>
+          <a:ln>
+            <a:solidFill>
+              <a:schemeClr val="tx1"/>
+            </a:solidFill>
+            <a:tailEnd type="arrow"/>
+          </a:ln>
+        </p:spPr>
+        <p:style>
+          <a:lnRef idx="1">
+            <a:schemeClr val="accent1"/>
+          </a:lnRef>
+          <a:fillRef idx="0">
+            <a:schemeClr val="accent1"/>
+          </a:fillRef>
+          <a:effectRef idx="0">
+            <a:schemeClr val="accent1"/>
+          </a:effectRef>
+          <a:fontRef idx="minor">
+            <a:schemeClr val="tx1"/>
+          </a:fontRef>
+        </p:style>
+      </p:cxnSp>
+      <p:cxnSp>
+        <p:nvCxnSpPr>
+          <p:cNvPr id="32" name="直接箭头连接符 31"/>
+          <p:cNvCxnSpPr/>
+          <p:nvPr/>
+        </p:nvCxnSpPr>
+        <p:spPr>
+          <a:xfrm flipV="1">
+            <a:off x="251520" y="152636"/>
+            <a:ext cx="0" cy="6303984"/>
+          </a:xfrm>
+          <a:prstGeom prst="straightConnector1">
+            <a:avLst/>
+          </a:prstGeom>
+          <a:ln>
+            <a:solidFill>
+              <a:schemeClr val="tx1"/>
+            </a:solidFill>
+            <a:tailEnd type="arrow"/>
+          </a:ln>
+        </p:spPr>
+        <p:style>
+          <a:lnRef idx="1">
+            <a:schemeClr val="accent1"/>
+          </a:lnRef>
+          <a:fillRef idx="0">
+            <a:schemeClr val="accent1"/>
+          </a:fillRef>
+          <a:effectRef idx="0">
+            <a:schemeClr val="accent1"/>
+          </a:effectRef>
+          <a:fontRef idx="minor">
+            <a:schemeClr val="tx1"/>
+          </a:fontRef>
+        </p:style>
+      </p:cxnSp>
+      <mc:AlternateContent xmlns:mc="http://schemas.openxmlformats.org/markup-compatibility/2006" xmlns:a14="http://schemas.microsoft.com/office/drawing/2010/main">
+        <mc:Choice Requires="a14">
+          <p:sp>
+            <p:nvSpPr>
+              <p:cNvPr id="35" name="TextBox 34"/>
+              <p:cNvSpPr txBox="1"/>
+              <p:nvPr/>
+            </p:nvSpPr>
+            <p:spPr>
+              <a:xfrm>
+                <a:off x="7740352" y="6488668"/>
+                <a:ext cx="1260140" cy="369332"/>
+              </a:xfrm>
+              <a:prstGeom prst="rect">
+                <a:avLst/>
+              </a:prstGeom>
+              <a:noFill/>
+            </p:spPr>
+            <p:txBody>
+              <a:bodyPr wrap="square" rtlCol="0">
+                <a:spAutoFit/>
+              </a:bodyPr>
+              <a:lstStyle/>
+              <a:p>
+                <a:r>
+                  <a:rPr lang="zh-CN" altLang="en-US" dirty="0"/>
+                  <a:t>相</a:t>
+                </a:r>
+                <a:r>
+                  <a:rPr lang="zh-CN" altLang="en-US" dirty="0" smtClean="0"/>
+                  <a:t>位</a:t>
+                </a:r>
+                <a14:m>
+                  <m:oMath xmlns:m="http://schemas.openxmlformats.org/officeDocument/2006/math">
+                    <m:r>
+                      <a:rPr lang="zh-CN" altLang="en-US" i="1" smtClean="0">
+                        <a:latin typeface="Cambria Math"/>
+                      </a:rPr>
+                      <m:t>𝜑</m:t>
+                    </m:r>
+                  </m:oMath>
+                </a14:m>
+                <a:endParaRPr lang="zh-CN" altLang="en-US" dirty="0"/>
+              </a:p>
+            </p:txBody>
+          </p:sp>
+        </mc:Choice>
+        <mc:Fallback xmlns="">
+          <p:sp>
+            <p:nvSpPr>
+              <p:cNvPr id="35" name="TextBox 34"/>
+              <p:cNvSpPr txBox="1">
+                <a:spLocks noRot="1" noChangeAspect="1" noMove="1" noResize="1" noEditPoints="1" noAdjustHandles="1" noChangeArrowheads="1" noChangeShapeType="1" noTextEdit="1"/>
+              </p:cNvSpPr>
+              <p:nvPr/>
+            </p:nvSpPr>
+            <p:spPr>
+              <a:xfrm>
+                <a:off x="7740352" y="6488668"/>
+                <a:ext cx="1260140" cy="369332"/>
+              </a:xfrm>
+              <a:prstGeom prst="rect">
+                <a:avLst/>
+              </a:prstGeom>
+              <a:blipFill rotWithShape="1">
+                <a:blip r:embed="rId2"/>
+                <a:stretch>
+                  <a:fillRect l="-4369" t="-13115" b="-19672"/>
+                </a:stretch>
+              </a:blipFill>
+            </p:spPr>
+            <p:txBody>
+              <a:bodyPr/>
+              <a:lstStyle/>
+              <a:p>
+                <a:r>
+                  <a:rPr lang="zh-CN" altLang="en-US">
+                    <a:noFill/>
+                  </a:rPr>
+                  <a:t> </a:t>
+                </a:r>
+              </a:p>
+            </p:txBody>
+          </p:sp>
+        </mc:Fallback>
+      </mc:AlternateContent>
+      <p:sp>
+        <p:nvSpPr>
+          <p:cNvPr id="36" name="TextBox 35"/>
+          <p:cNvSpPr txBox="1"/>
+          <p:nvPr/>
+        </p:nvSpPr>
+        <p:spPr>
+          <a:xfrm>
+            <a:off x="323528" y="204172"/>
+            <a:ext cx="1296144" cy="369332"/>
+          </a:xfrm>
+          <a:prstGeom prst="rect">
+            <a:avLst/>
+          </a:prstGeom>
+          <a:noFill/>
+        </p:spPr>
+        <p:txBody>
+          <a:bodyPr wrap="square" rtlCol="0">
+            <a:spAutoFit/>
+          </a:bodyPr>
+          <a:lstStyle/>
+          <a:p>
+            <a:r>
+              <a:rPr lang="zh-CN" altLang="en-US" dirty="0" smtClean="0"/>
+              <a:t>条文灰度</a:t>
+            </a:r>
+            <a:r>
+              <a:rPr lang="en-US" altLang="zh-CN" dirty="0" smtClean="0"/>
+              <a:t>I</a:t>
+            </a:r>
+            <a:endParaRPr lang="zh-CN" altLang="en-US" dirty="0"/>
+          </a:p>
+        </p:txBody>
+      </p:sp>
+      <p:cxnSp>
+        <p:nvCxnSpPr>
+          <p:cNvPr id="21" name="直接连接符 20"/>
+          <p:cNvCxnSpPr/>
+          <p:nvPr/>
+        </p:nvCxnSpPr>
+        <p:spPr>
+          <a:xfrm>
+            <a:off x="251520" y="1268760"/>
+            <a:ext cx="720080" cy="0"/>
+          </a:xfrm>
+          <a:prstGeom prst="line">
+            <a:avLst/>
+          </a:prstGeom>
+          <a:ln>
+            <a:solidFill>
+              <a:schemeClr val="tx1"/>
+            </a:solidFill>
+          </a:ln>
+        </p:spPr>
+        <p:style>
+          <a:lnRef idx="1">
+            <a:schemeClr val="accent1"/>
+          </a:lnRef>
+          <a:fillRef idx="0">
+            <a:schemeClr val="accent1"/>
+          </a:fillRef>
+          <a:effectRef idx="0">
+            <a:schemeClr val="accent1"/>
+          </a:effectRef>
+          <a:fontRef idx="minor">
+            <a:schemeClr val="tx1"/>
+          </a:fontRef>
+        </p:style>
+      </p:cxnSp>
+      <p:cxnSp>
+        <p:nvCxnSpPr>
+          <p:cNvPr id="24" name="直接连接符 23"/>
+          <p:cNvCxnSpPr/>
+          <p:nvPr/>
+        </p:nvCxnSpPr>
+        <p:spPr>
+          <a:xfrm>
+            <a:off x="971600" y="1268760"/>
+            <a:ext cx="0" cy="5187860"/>
+          </a:xfrm>
+          <a:prstGeom prst="line">
+            <a:avLst/>
+          </a:prstGeom>
+          <a:ln>
+            <a:solidFill>
+              <a:schemeClr val="tx1"/>
+            </a:solidFill>
+          </a:ln>
+        </p:spPr>
+        <p:style>
+          <a:lnRef idx="1">
+            <a:schemeClr val="accent1"/>
+          </a:lnRef>
+          <a:fillRef idx="0">
+            <a:schemeClr val="accent1"/>
+          </a:fillRef>
+          <a:effectRef idx="0">
+            <a:schemeClr val="accent1"/>
+          </a:effectRef>
+          <a:fontRef idx="minor">
+            <a:schemeClr val="tx1"/>
+          </a:fontRef>
+        </p:style>
+      </p:cxnSp>
+      <p:cxnSp>
+        <p:nvCxnSpPr>
+          <p:cNvPr id="38" name="直接连接符 37"/>
+          <p:cNvCxnSpPr/>
+          <p:nvPr/>
+        </p:nvCxnSpPr>
+        <p:spPr>
+          <a:xfrm flipV="1">
+            <a:off x="1673146" y="1263016"/>
+            <a:ext cx="0" cy="5193604"/>
+          </a:xfrm>
+          <a:prstGeom prst="line">
+            <a:avLst/>
+          </a:prstGeom>
+          <a:ln>
+            <a:solidFill>
+              <a:schemeClr val="tx1"/>
+            </a:solidFill>
+          </a:ln>
+        </p:spPr>
+        <p:style>
+          <a:lnRef idx="1">
+            <a:schemeClr val="accent1"/>
+          </a:lnRef>
+          <a:fillRef idx="0">
+            <a:schemeClr val="accent1"/>
+          </a:fillRef>
+          <a:effectRef idx="0">
+            <a:schemeClr val="accent1"/>
+          </a:effectRef>
+          <a:fontRef idx="minor">
+            <a:schemeClr val="tx1"/>
+          </a:fontRef>
+        </p:style>
+      </p:cxnSp>
+      <p:cxnSp>
+        <p:nvCxnSpPr>
+          <p:cNvPr id="44" name="直接连接符 43"/>
+          <p:cNvCxnSpPr/>
+          <p:nvPr/>
+        </p:nvCxnSpPr>
+        <p:spPr>
+          <a:xfrm>
+            <a:off x="2411760" y="1268760"/>
+            <a:ext cx="0" cy="5187860"/>
+          </a:xfrm>
+          <a:prstGeom prst="line">
+            <a:avLst/>
+          </a:prstGeom>
+          <a:ln>
+            <a:solidFill>
+              <a:schemeClr val="tx1"/>
+            </a:solidFill>
+          </a:ln>
+        </p:spPr>
+        <p:style>
+          <a:lnRef idx="1">
+            <a:schemeClr val="accent1"/>
+          </a:lnRef>
+          <a:fillRef idx="0">
+            <a:schemeClr val="accent1"/>
+          </a:fillRef>
+          <a:effectRef idx="0">
+            <a:schemeClr val="accent1"/>
+          </a:effectRef>
+          <a:fontRef idx="minor">
+            <a:schemeClr val="tx1"/>
+          </a:fontRef>
+        </p:style>
+      </p:cxnSp>
+      <p:cxnSp>
+        <p:nvCxnSpPr>
+          <p:cNvPr id="45" name="直接连接符 44"/>
+          <p:cNvCxnSpPr/>
+          <p:nvPr/>
+        </p:nvCxnSpPr>
+        <p:spPr>
+          <a:xfrm>
+            <a:off x="1691680" y="1263016"/>
+            <a:ext cx="720080" cy="0"/>
+          </a:xfrm>
+          <a:prstGeom prst="line">
+            <a:avLst/>
+          </a:prstGeom>
+          <a:ln>
+            <a:solidFill>
+              <a:schemeClr val="tx1"/>
+            </a:solidFill>
+          </a:ln>
+        </p:spPr>
+        <p:style>
+          <a:lnRef idx="1">
+            <a:schemeClr val="accent1"/>
+          </a:lnRef>
+          <a:fillRef idx="0">
+            <a:schemeClr val="accent1"/>
+          </a:fillRef>
+          <a:effectRef idx="0">
+            <a:schemeClr val="accent1"/>
+          </a:effectRef>
+          <a:fontRef idx="minor">
+            <a:schemeClr val="tx1"/>
+          </a:fontRef>
+        </p:style>
+      </p:cxnSp>
+      <p:cxnSp>
+        <p:nvCxnSpPr>
+          <p:cNvPr id="48" name="直接连接符 47"/>
+          <p:cNvCxnSpPr/>
+          <p:nvPr/>
+        </p:nvCxnSpPr>
+        <p:spPr>
+          <a:xfrm flipV="1">
+            <a:off x="3117334" y="1261112"/>
+            <a:ext cx="0" cy="5193604"/>
+          </a:xfrm>
+          <a:prstGeom prst="line">
+            <a:avLst/>
+          </a:prstGeom>
+          <a:ln>
+            <a:solidFill>
+              <a:schemeClr val="tx1"/>
+            </a:solidFill>
+          </a:ln>
+        </p:spPr>
+        <p:style>
+          <a:lnRef idx="1">
+            <a:schemeClr val="accent1"/>
+          </a:lnRef>
+          <a:fillRef idx="0">
+            <a:schemeClr val="accent1"/>
+          </a:fillRef>
+          <a:effectRef idx="0">
+            <a:schemeClr val="accent1"/>
+          </a:effectRef>
+          <a:fontRef idx="minor">
+            <a:schemeClr val="tx1"/>
+          </a:fontRef>
+        </p:style>
+      </p:cxnSp>
+      <p:cxnSp>
+        <p:nvCxnSpPr>
+          <p:cNvPr id="49" name="直接连接符 48"/>
+          <p:cNvCxnSpPr/>
+          <p:nvPr/>
+        </p:nvCxnSpPr>
+        <p:spPr>
+          <a:xfrm>
+            <a:off x="3855948" y="1268760"/>
+            <a:ext cx="0" cy="5185956"/>
+          </a:xfrm>
+          <a:prstGeom prst="line">
+            <a:avLst/>
+          </a:prstGeom>
+          <a:ln>
+            <a:solidFill>
+              <a:schemeClr val="tx1"/>
+            </a:solidFill>
+          </a:ln>
+        </p:spPr>
+        <p:style>
+          <a:lnRef idx="1">
+            <a:schemeClr val="accent1"/>
+          </a:lnRef>
+          <a:fillRef idx="0">
+            <a:schemeClr val="accent1"/>
+          </a:fillRef>
+          <a:effectRef idx="0">
+            <a:schemeClr val="accent1"/>
+          </a:effectRef>
+          <a:fontRef idx="minor">
+            <a:schemeClr val="tx1"/>
+          </a:fontRef>
+        </p:style>
+      </p:cxnSp>
+      <p:cxnSp>
+        <p:nvCxnSpPr>
+          <p:cNvPr id="50" name="直接连接符 49"/>
+          <p:cNvCxnSpPr/>
+          <p:nvPr/>
+        </p:nvCxnSpPr>
+        <p:spPr>
+          <a:xfrm>
+            <a:off x="3135868" y="1261112"/>
+            <a:ext cx="720080" cy="0"/>
+          </a:xfrm>
+          <a:prstGeom prst="line">
+            <a:avLst/>
+          </a:prstGeom>
+          <a:ln>
+            <a:solidFill>
+              <a:schemeClr val="tx1"/>
+            </a:solidFill>
+          </a:ln>
+        </p:spPr>
+        <p:style>
+          <a:lnRef idx="1">
+            <a:schemeClr val="accent1"/>
+          </a:lnRef>
+          <a:fillRef idx="0">
+            <a:schemeClr val="accent1"/>
+          </a:fillRef>
+          <a:effectRef idx="0">
+            <a:schemeClr val="accent1"/>
+          </a:effectRef>
+          <a:fontRef idx="minor">
+            <a:schemeClr val="tx1"/>
+          </a:fontRef>
+        </p:style>
+      </p:cxnSp>
+      <p:cxnSp>
+        <p:nvCxnSpPr>
+          <p:cNvPr id="51" name="直接连接符 50"/>
+          <p:cNvCxnSpPr/>
+          <p:nvPr/>
+        </p:nvCxnSpPr>
+        <p:spPr>
+          <a:xfrm flipV="1">
+            <a:off x="4553466" y="1256952"/>
+            <a:ext cx="0" cy="5193604"/>
+          </a:xfrm>
+          <a:prstGeom prst="line">
+            <a:avLst/>
+          </a:prstGeom>
+          <a:ln>
+            <a:solidFill>
+              <a:schemeClr val="tx1"/>
+            </a:solidFill>
+          </a:ln>
+        </p:spPr>
+        <p:style>
+          <a:lnRef idx="1">
+            <a:schemeClr val="accent1"/>
+          </a:lnRef>
+          <a:fillRef idx="0">
+            <a:schemeClr val="accent1"/>
+          </a:fillRef>
+          <a:effectRef idx="0">
+            <a:schemeClr val="accent1"/>
+          </a:effectRef>
+          <a:fontRef idx="minor">
+            <a:schemeClr val="tx1"/>
+          </a:fontRef>
+        </p:style>
+      </p:cxnSp>
+      <p:cxnSp>
+        <p:nvCxnSpPr>
+          <p:cNvPr id="52" name="直接连接符 51"/>
+          <p:cNvCxnSpPr/>
+          <p:nvPr/>
+        </p:nvCxnSpPr>
+        <p:spPr>
+          <a:xfrm>
+            <a:off x="5292080" y="1256952"/>
+            <a:ext cx="0" cy="5193604"/>
+          </a:xfrm>
+          <a:prstGeom prst="line">
+            <a:avLst/>
+          </a:prstGeom>
+          <a:ln>
+            <a:solidFill>
+              <a:schemeClr val="tx1"/>
+            </a:solidFill>
+          </a:ln>
+        </p:spPr>
+        <p:style>
+          <a:lnRef idx="1">
+            <a:schemeClr val="accent1"/>
+          </a:lnRef>
+          <a:fillRef idx="0">
+            <a:schemeClr val="accent1"/>
+          </a:fillRef>
+          <a:effectRef idx="0">
+            <a:schemeClr val="accent1"/>
+          </a:effectRef>
+          <a:fontRef idx="minor">
+            <a:schemeClr val="tx1"/>
+          </a:fontRef>
+        </p:style>
+      </p:cxnSp>
+      <p:cxnSp>
+        <p:nvCxnSpPr>
+          <p:cNvPr id="53" name="直接连接符 52"/>
+          <p:cNvCxnSpPr/>
+          <p:nvPr/>
+        </p:nvCxnSpPr>
+        <p:spPr>
+          <a:xfrm>
+            <a:off x="4572000" y="1256952"/>
+            <a:ext cx="720080" cy="0"/>
+          </a:xfrm>
+          <a:prstGeom prst="line">
+            <a:avLst/>
+          </a:prstGeom>
+          <a:ln>
+            <a:solidFill>
+              <a:schemeClr val="tx1"/>
+            </a:solidFill>
+          </a:ln>
+        </p:spPr>
+        <p:style>
+          <a:lnRef idx="1">
+            <a:schemeClr val="accent1"/>
+          </a:lnRef>
+          <a:fillRef idx="0">
+            <a:schemeClr val="accent1"/>
+          </a:fillRef>
+          <a:effectRef idx="0">
+            <a:schemeClr val="accent1"/>
+          </a:effectRef>
+          <a:fontRef idx="minor">
+            <a:schemeClr val="tx1"/>
+          </a:fontRef>
+        </p:style>
+      </p:cxnSp>
+      <p:cxnSp>
+        <p:nvCxnSpPr>
+          <p:cNvPr id="57" name="直接连接符 56"/>
+          <p:cNvCxnSpPr/>
+          <p:nvPr/>
+        </p:nvCxnSpPr>
+        <p:spPr>
+          <a:xfrm flipV="1">
+            <a:off x="5993626" y="1263016"/>
+            <a:ext cx="0" cy="5193604"/>
+          </a:xfrm>
+          <a:prstGeom prst="line">
+            <a:avLst/>
+          </a:prstGeom>
+          <a:ln>
+            <a:solidFill>
+              <a:schemeClr val="tx1"/>
+            </a:solidFill>
+          </a:ln>
+        </p:spPr>
+        <p:style>
+          <a:lnRef idx="1">
+            <a:schemeClr val="accent1"/>
+          </a:lnRef>
+          <a:fillRef idx="0">
+            <a:schemeClr val="accent1"/>
+          </a:fillRef>
+          <a:effectRef idx="0">
+            <a:schemeClr val="accent1"/>
+          </a:effectRef>
+          <a:fontRef idx="minor">
+            <a:schemeClr val="tx1"/>
+          </a:fontRef>
+        </p:style>
+      </p:cxnSp>
+      <p:cxnSp>
+        <p:nvCxnSpPr>
+          <p:cNvPr id="58" name="直接连接符 57"/>
+          <p:cNvCxnSpPr/>
+          <p:nvPr/>
+        </p:nvCxnSpPr>
+        <p:spPr>
+          <a:xfrm>
+            <a:off x="6732240" y="1263016"/>
+            <a:ext cx="0" cy="5193604"/>
+          </a:xfrm>
+          <a:prstGeom prst="line">
+            <a:avLst/>
+          </a:prstGeom>
+          <a:ln>
+            <a:solidFill>
+              <a:schemeClr val="tx1"/>
+            </a:solidFill>
+          </a:ln>
+        </p:spPr>
+        <p:style>
+          <a:lnRef idx="1">
+            <a:schemeClr val="accent1"/>
+          </a:lnRef>
+          <a:fillRef idx="0">
+            <a:schemeClr val="accent1"/>
+          </a:fillRef>
+          <a:effectRef idx="0">
+            <a:schemeClr val="accent1"/>
+          </a:effectRef>
+          <a:fontRef idx="minor">
+            <a:schemeClr val="tx1"/>
+          </a:fontRef>
+        </p:style>
+      </p:cxnSp>
+      <p:cxnSp>
+        <p:nvCxnSpPr>
+          <p:cNvPr id="59" name="直接连接符 58"/>
+          <p:cNvCxnSpPr/>
+          <p:nvPr/>
+        </p:nvCxnSpPr>
+        <p:spPr>
+          <a:xfrm>
+            <a:off x="6012160" y="1263016"/>
+            <a:ext cx="720080" cy="0"/>
+          </a:xfrm>
+          <a:prstGeom prst="line">
+            <a:avLst/>
+          </a:prstGeom>
+          <a:ln>
+            <a:solidFill>
+              <a:schemeClr val="tx1"/>
+            </a:solidFill>
+          </a:ln>
+        </p:spPr>
+        <p:style>
+          <a:lnRef idx="1">
+            <a:schemeClr val="accent1"/>
+          </a:lnRef>
+          <a:fillRef idx="0">
+            <a:schemeClr val="accent1"/>
+          </a:fillRef>
+          <a:effectRef idx="0">
+            <a:schemeClr val="accent1"/>
+          </a:effectRef>
+          <a:fontRef idx="minor">
+            <a:schemeClr val="tx1"/>
+          </a:fontRef>
+        </p:style>
+      </p:cxnSp>
+      <p:cxnSp>
+        <p:nvCxnSpPr>
+          <p:cNvPr id="60" name="直接连接符 59"/>
+          <p:cNvCxnSpPr/>
+          <p:nvPr/>
+        </p:nvCxnSpPr>
+        <p:spPr>
+          <a:xfrm flipV="1">
+            <a:off x="7433786" y="1254288"/>
+            <a:ext cx="0" cy="5193604"/>
+          </a:xfrm>
+          <a:prstGeom prst="line">
+            <a:avLst/>
+          </a:prstGeom>
+          <a:ln>
+            <a:solidFill>
+              <a:schemeClr val="tx1"/>
+            </a:solidFill>
+          </a:ln>
+        </p:spPr>
+        <p:style>
+          <a:lnRef idx="1">
+            <a:schemeClr val="accent1"/>
+          </a:lnRef>
+          <a:fillRef idx="0">
+            <a:schemeClr val="accent1"/>
+          </a:fillRef>
+          <a:effectRef idx="0">
+            <a:schemeClr val="accent1"/>
+          </a:effectRef>
+          <a:fontRef idx="minor">
+            <a:schemeClr val="tx1"/>
+          </a:fontRef>
+        </p:style>
+      </p:cxnSp>
+      <p:cxnSp>
+        <p:nvCxnSpPr>
+          <p:cNvPr id="61" name="直接连接符 60"/>
+          <p:cNvCxnSpPr/>
+          <p:nvPr/>
+        </p:nvCxnSpPr>
+        <p:spPr>
+          <a:xfrm>
+            <a:off x="8172400" y="1254288"/>
+            <a:ext cx="0" cy="5193604"/>
+          </a:xfrm>
+          <a:prstGeom prst="line">
+            <a:avLst/>
+          </a:prstGeom>
+          <a:ln>
+            <a:solidFill>
+              <a:schemeClr val="tx1"/>
+            </a:solidFill>
+          </a:ln>
+        </p:spPr>
+        <p:style>
+          <a:lnRef idx="1">
+            <a:schemeClr val="accent1"/>
+          </a:lnRef>
+          <a:fillRef idx="0">
+            <a:schemeClr val="accent1"/>
+          </a:fillRef>
+          <a:effectRef idx="0">
+            <a:schemeClr val="accent1"/>
+          </a:effectRef>
+          <a:fontRef idx="minor">
+            <a:schemeClr val="tx1"/>
+          </a:fontRef>
+        </p:style>
+      </p:cxnSp>
+      <p:cxnSp>
+        <p:nvCxnSpPr>
+          <p:cNvPr id="62" name="直接连接符 61"/>
+          <p:cNvCxnSpPr/>
+          <p:nvPr/>
+        </p:nvCxnSpPr>
+        <p:spPr>
+          <a:xfrm>
+            <a:off x="7452320" y="1254288"/>
+            <a:ext cx="720080" cy="0"/>
+          </a:xfrm>
+          <a:prstGeom prst="line">
+            <a:avLst/>
+          </a:prstGeom>
+          <a:ln>
+            <a:solidFill>
+              <a:schemeClr val="tx1"/>
+            </a:solidFill>
+          </a:ln>
+        </p:spPr>
+        <p:style>
+          <a:lnRef idx="1">
+            <a:schemeClr val="accent1"/>
+          </a:lnRef>
+          <a:fillRef idx="0">
+            <a:schemeClr val="accent1"/>
+          </a:fillRef>
+          <a:effectRef idx="0">
+            <a:schemeClr val="accent1"/>
+          </a:effectRef>
+          <a:fontRef idx="minor">
+            <a:schemeClr val="tx1"/>
+          </a:fontRef>
+        </p:style>
+      </p:cxnSp>
+      <mc:AlternateContent xmlns:mc="http://schemas.openxmlformats.org/markup-compatibility/2006" xmlns:a14="http://schemas.microsoft.com/office/drawing/2010/main">
+        <mc:Choice Requires="a14">
+          <p:sp>
+            <p:nvSpPr>
+              <p:cNvPr id="63" name="TextBox 62"/>
+              <p:cNvSpPr txBox="1"/>
+              <p:nvPr/>
+            </p:nvSpPr>
+            <p:spPr>
+              <a:xfrm>
+                <a:off x="1127112" y="6462712"/>
+                <a:ext cx="1176636" cy="369332"/>
+              </a:xfrm>
+              <a:prstGeom prst="rect">
+                <a:avLst/>
+              </a:prstGeom>
+              <a:noFill/>
+            </p:spPr>
+            <p:txBody>
+              <a:bodyPr wrap="square" rtlCol="0">
+                <a:spAutoFit/>
+              </a:bodyPr>
+              <a:lstStyle/>
+              <a:p>
+                <a:pPr/>
+                <a14:m>
+                  <m:oMathPara xmlns:m="http://schemas.openxmlformats.org/officeDocument/2006/math">
+                    <m:oMathParaPr>
+                      <m:jc m:val="centerGroup"/>
+                    </m:oMathParaPr>
+                    <m:oMath xmlns:m="http://schemas.openxmlformats.org/officeDocument/2006/math">
+                      <m:r>
+                        <a:rPr lang="en-US" altLang="zh-CN" b="0" i="1" smtClean="0">
+                          <a:latin typeface="Cambria Math"/>
+                        </a:rPr>
+                        <m:t>(</m:t>
+                      </m:r>
+                      <m:r>
+                        <a:rPr lang="en-US" altLang="zh-CN" b="0" i="1" smtClean="0">
+                          <a:latin typeface="Cambria Math"/>
+                        </a:rPr>
+                        <m:t>𝑚</m:t>
+                      </m:r>
+                      <m:r>
+                        <a:rPr lang="en-US" altLang="zh-CN" b="0" i="1" smtClean="0">
+                          <a:latin typeface="Cambria Math"/>
+                        </a:rPr>
+                        <m:t>+2)</m:t>
+                      </m:r>
+                      <m:r>
+                        <a:rPr lang="zh-CN" altLang="en-US" b="0" i="1" smtClean="0">
+                          <a:latin typeface="Cambria Math"/>
+                        </a:rPr>
+                        <m:t>𝜋</m:t>
+                      </m:r>
+                    </m:oMath>
+                  </m:oMathPara>
+                </a14:m>
+                <a:endParaRPr lang="zh-CN" altLang="en-US" dirty="0"/>
+              </a:p>
+            </p:txBody>
+          </p:sp>
+        </mc:Choice>
+        <mc:Fallback xmlns="">
+          <p:sp>
+            <p:nvSpPr>
+              <p:cNvPr id="63" name="TextBox 62"/>
+              <p:cNvSpPr txBox="1">
+                <a:spLocks noRot="1" noChangeAspect="1" noMove="1" noResize="1" noEditPoints="1" noAdjustHandles="1" noChangeArrowheads="1" noChangeShapeType="1" noTextEdit="1"/>
+              </p:cNvSpPr>
+              <p:nvPr/>
+            </p:nvSpPr>
+            <p:spPr>
+              <a:xfrm>
+                <a:off x="1127112" y="6462712"/>
+                <a:ext cx="1176636" cy="369332"/>
+              </a:xfrm>
+              <a:prstGeom prst="rect">
+                <a:avLst/>
+              </a:prstGeom>
+              <a:blipFill rotWithShape="1">
+                <a:blip r:embed="rId3"/>
+                <a:stretch>
+                  <a:fillRect b="-11475"/>
+                </a:stretch>
+              </a:blipFill>
+            </p:spPr>
+            <p:txBody>
+              <a:bodyPr/>
+              <a:lstStyle/>
+              <a:p>
+                <a:r>
+                  <a:rPr lang="zh-CN" altLang="en-US">
+                    <a:noFill/>
+                  </a:rPr>
+                  <a:t> </a:t>
+                </a:r>
+              </a:p>
+            </p:txBody>
+          </p:sp>
+        </mc:Fallback>
+      </mc:AlternateContent>
+      <mc:AlternateContent xmlns:mc="http://schemas.openxmlformats.org/markup-compatibility/2006" xmlns:a14="http://schemas.microsoft.com/office/drawing/2010/main">
+        <mc:Choice Requires="a14">
+          <p:sp>
+            <p:nvSpPr>
+              <p:cNvPr id="66" name="TextBox 65"/>
+              <p:cNvSpPr txBox="1"/>
+              <p:nvPr/>
+            </p:nvSpPr>
+            <p:spPr>
+              <a:xfrm>
+                <a:off x="179512" y="6486882"/>
+                <a:ext cx="576064" cy="369332"/>
+              </a:xfrm>
+              <a:prstGeom prst="rect">
+                <a:avLst/>
+              </a:prstGeom>
+              <a:noFill/>
+            </p:spPr>
+            <p:txBody>
+              <a:bodyPr wrap="square" rtlCol="0">
+                <a:spAutoFit/>
+              </a:bodyPr>
+              <a:lstStyle/>
+              <a:p>
+                <a:r>
+                  <a:rPr lang="en-US" altLang="zh-CN" b="0" dirty="0" smtClean="0"/>
+                  <a:t>m</a:t>
+                </a:r>
+                <a14:m>
+                  <m:oMath xmlns:m="http://schemas.openxmlformats.org/officeDocument/2006/math">
+                    <m:r>
+                      <a:rPr lang="zh-CN" altLang="en-US" b="0" i="1" smtClean="0">
+                        <a:latin typeface="Cambria Math"/>
+                      </a:rPr>
+                      <m:t>𝜋</m:t>
+                    </m:r>
+                  </m:oMath>
+                </a14:m>
+                <a:endParaRPr lang="zh-CN" altLang="en-US" dirty="0"/>
+              </a:p>
+            </p:txBody>
+          </p:sp>
+        </mc:Choice>
+        <mc:Fallback xmlns="">
+          <p:sp>
+            <p:nvSpPr>
+              <p:cNvPr id="66" name="TextBox 65"/>
+              <p:cNvSpPr txBox="1">
+                <a:spLocks noRot="1" noChangeAspect="1" noMove="1" noResize="1" noEditPoints="1" noAdjustHandles="1" noChangeArrowheads="1" noChangeShapeType="1" noTextEdit="1"/>
+              </p:cNvSpPr>
+              <p:nvPr/>
+            </p:nvSpPr>
+            <p:spPr>
+              <a:xfrm>
+                <a:off x="179512" y="6486882"/>
+                <a:ext cx="576064" cy="369332"/>
+              </a:xfrm>
+              <a:prstGeom prst="rect">
+                <a:avLst/>
+              </a:prstGeom>
+              <a:blipFill rotWithShape="1">
+                <a:blip r:embed="rId4"/>
+                <a:stretch>
+                  <a:fillRect l="-8421" t="-8197" b="-24590"/>
+                </a:stretch>
+              </a:blipFill>
+            </p:spPr>
+            <p:txBody>
+              <a:bodyPr/>
+              <a:lstStyle/>
+              <a:p>
+                <a:r>
+                  <a:rPr lang="zh-CN" altLang="en-US">
+                    <a:noFill/>
+                  </a:rPr>
+                  <a:t> </a:t>
+                </a:r>
+              </a:p>
+            </p:txBody>
+          </p:sp>
+        </mc:Fallback>
+      </mc:AlternateContent>
+      <mc:AlternateContent xmlns:mc="http://schemas.openxmlformats.org/markup-compatibility/2006" xmlns:a14="http://schemas.microsoft.com/office/drawing/2010/main">
+        <mc:Choice Requires="a14">
+          <p:sp>
+            <p:nvSpPr>
+              <p:cNvPr id="67" name="TextBox 66"/>
+              <p:cNvSpPr txBox="1"/>
+              <p:nvPr/>
+            </p:nvSpPr>
+            <p:spPr>
+              <a:xfrm>
+                <a:off x="2669628" y="6495716"/>
+                <a:ext cx="1176636" cy="369332"/>
+              </a:xfrm>
+              <a:prstGeom prst="rect">
+                <a:avLst/>
+              </a:prstGeom>
+              <a:noFill/>
+            </p:spPr>
+            <p:txBody>
+              <a:bodyPr wrap="square" rtlCol="0">
+                <a:spAutoFit/>
+              </a:bodyPr>
+              <a:lstStyle/>
+              <a:p>
+                <a:pPr/>
+                <a14:m>
+                  <m:oMathPara xmlns:m="http://schemas.openxmlformats.org/officeDocument/2006/math">
+                    <m:oMathParaPr>
+                      <m:jc m:val="centerGroup"/>
+                    </m:oMathParaPr>
+                    <m:oMath xmlns:m="http://schemas.openxmlformats.org/officeDocument/2006/math">
+                      <m:r>
+                        <a:rPr lang="en-US" altLang="zh-CN" b="0" i="1" smtClean="0">
+                          <a:latin typeface="Cambria Math"/>
+                        </a:rPr>
+                        <m:t>(</m:t>
+                      </m:r>
+                      <m:r>
+                        <a:rPr lang="en-US" altLang="zh-CN" b="0" i="1" smtClean="0">
+                          <a:latin typeface="Cambria Math"/>
+                        </a:rPr>
+                        <m:t>𝑚</m:t>
+                      </m:r>
+                      <m:r>
+                        <a:rPr lang="en-US" altLang="zh-CN" b="0" i="1" smtClean="0">
+                          <a:latin typeface="Cambria Math"/>
+                        </a:rPr>
+                        <m:t>+4)</m:t>
+                      </m:r>
+                      <m:r>
+                        <a:rPr lang="zh-CN" altLang="en-US" b="0" i="1" smtClean="0">
+                          <a:latin typeface="Cambria Math"/>
+                        </a:rPr>
+                        <m:t>𝜋</m:t>
+                      </m:r>
+                    </m:oMath>
+                  </m:oMathPara>
+                </a14:m>
+                <a:endParaRPr lang="zh-CN" altLang="en-US" dirty="0"/>
+              </a:p>
+            </p:txBody>
+          </p:sp>
+        </mc:Choice>
+        <mc:Fallback xmlns="">
+          <p:sp>
+            <p:nvSpPr>
+              <p:cNvPr id="67" name="TextBox 66"/>
+              <p:cNvSpPr txBox="1">
+                <a:spLocks noRot="1" noChangeAspect="1" noMove="1" noResize="1" noEditPoints="1" noAdjustHandles="1" noChangeArrowheads="1" noChangeShapeType="1" noTextEdit="1"/>
+              </p:cNvSpPr>
+              <p:nvPr/>
+            </p:nvSpPr>
+            <p:spPr>
+              <a:xfrm>
+                <a:off x="2669628" y="6495716"/>
+                <a:ext cx="1176636" cy="369332"/>
+              </a:xfrm>
+              <a:prstGeom prst="rect">
+                <a:avLst/>
+              </a:prstGeom>
+              <a:blipFill rotWithShape="1">
+                <a:blip r:embed="rId5"/>
+                <a:stretch>
+                  <a:fillRect b="-13333"/>
+                </a:stretch>
+              </a:blipFill>
+            </p:spPr>
+            <p:txBody>
+              <a:bodyPr/>
+              <a:lstStyle/>
+              <a:p>
+                <a:r>
+                  <a:rPr lang="zh-CN" altLang="en-US">
+                    <a:noFill/>
+                  </a:rPr>
+                  <a:t> </a:t>
+                </a:r>
+              </a:p>
+            </p:txBody>
+          </p:sp>
+        </mc:Fallback>
+      </mc:AlternateContent>
+      <mc:AlternateContent xmlns:mc="http://schemas.openxmlformats.org/markup-compatibility/2006" xmlns:a14="http://schemas.microsoft.com/office/drawing/2010/main">
+        <mc:Choice Requires="a14">
+          <p:sp>
+            <p:nvSpPr>
+              <p:cNvPr id="68" name="TextBox 67"/>
+              <p:cNvSpPr txBox="1"/>
+              <p:nvPr/>
+            </p:nvSpPr>
+            <p:spPr>
+              <a:xfrm>
+                <a:off x="4703762" y="6504550"/>
+                <a:ext cx="1176636" cy="369332"/>
+              </a:xfrm>
+              <a:prstGeom prst="rect">
+                <a:avLst/>
+              </a:prstGeom>
+              <a:noFill/>
+            </p:spPr>
+            <p:txBody>
+              <a:bodyPr wrap="square" rtlCol="0">
+                <a:spAutoFit/>
+              </a:bodyPr>
+              <a:lstStyle/>
+              <a:p>
+                <a:pPr/>
+                <a14:m>
+                  <m:oMathPara xmlns:m="http://schemas.openxmlformats.org/officeDocument/2006/math">
+                    <m:oMathParaPr>
+                      <m:jc m:val="centerGroup"/>
+                    </m:oMathParaPr>
+                    <m:oMath xmlns:m="http://schemas.openxmlformats.org/officeDocument/2006/math">
+                      <m:r>
+                        <a:rPr lang="en-US" altLang="zh-CN" b="0" i="1" smtClean="0">
+                          <a:latin typeface="Cambria Math"/>
+                        </a:rPr>
+                        <m:t>(</m:t>
+                      </m:r>
+                      <m:r>
+                        <a:rPr lang="en-US" altLang="zh-CN" b="0" i="1" smtClean="0">
+                          <a:latin typeface="Cambria Math"/>
+                        </a:rPr>
+                        <m:t>𝑚</m:t>
+                      </m:r>
+                      <m:r>
+                        <a:rPr lang="en-US" altLang="zh-CN" b="0" i="1" smtClean="0">
+                          <a:latin typeface="Cambria Math"/>
+                        </a:rPr>
+                        <m:t>+6)</m:t>
+                      </m:r>
+                      <m:r>
+                        <a:rPr lang="zh-CN" altLang="en-US" b="0" i="1" smtClean="0">
+                          <a:latin typeface="Cambria Math"/>
+                        </a:rPr>
+                        <m:t>𝜋</m:t>
+                      </m:r>
+                    </m:oMath>
+                  </m:oMathPara>
+                </a14:m>
+                <a:endParaRPr lang="zh-CN" altLang="en-US" dirty="0"/>
+              </a:p>
+            </p:txBody>
+          </p:sp>
+        </mc:Choice>
+        <mc:Fallback xmlns="">
+          <p:sp>
+            <p:nvSpPr>
+              <p:cNvPr id="68" name="TextBox 67"/>
+              <p:cNvSpPr txBox="1">
+                <a:spLocks noRot="1" noChangeAspect="1" noMove="1" noResize="1" noEditPoints="1" noAdjustHandles="1" noChangeArrowheads="1" noChangeShapeType="1" noTextEdit="1"/>
+              </p:cNvSpPr>
+              <p:nvPr/>
+            </p:nvSpPr>
+            <p:spPr>
+              <a:xfrm>
+                <a:off x="4703762" y="6504550"/>
+                <a:ext cx="1176636" cy="369332"/>
+              </a:xfrm>
+              <a:prstGeom prst="rect">
+                <a:avLst/>
+              </a:prstGeom>
+              <a:blipFill rotWithShape="1">
+                <a:blip r:embed="rId6"/>
+                <a:stretch>
+                  <a:fillRect b="-11475"/>
+                </a:stretch>
+              </a:blipFill>
+            </p:spPr>
+            <p:txBody>
+              <a:bodyPr/>
+              <a:lstStyle/>
+              <a:p>
+                <a:r>
+                  <a:rPr lang="zh-CN" altLang="en-US">
+                    <a:noFill/>
+                  </a:rPr>
+                  <a:t> </a:t>
+                </a:r>
+              </a:p>
+            </p:txBody>
+          </p:sp>
+        </mc:Fallback>
+      </mc:AlternateContent>
+      <mc:AlternateContent xmlns:mc="http://schemas.openxmlformats.org/markup-compatibility/2006" xmlns:a14="http://schemas.microsoft.com/office/drawing/2010/main">
+        <mc:Choice Requires="a14">
+          <p:sp>
+            <p:nvSpPr>
+              <p:cNvPr id="69" name="TextBox 68"/>
+              <p:cNvSpPr txBox="1"/>
+              <p:nvPr/>
+            </p:nvSpPr>
+            <p:spPr>
+              <a:xfrm>
+                <a:off x="6209012" y="6510122"/>
+                <a:ext cx="1176636" cy="369332"/>
+              </a:xfrm>
+              <a:prstGeom prst="rect">
+                <a:avLst/>
+              </a:prstGeom>
+              <a:noFill/>
+            </p:spPr>
+            <p:txBody>
+              <a:bodyPr wrap="square" rtlCol="0">
+                <a:spAutoFit/>
+              </a:bodyPr>
+              <a:lstStyle/>
+              <a:p>
+                <a:pPr/>
+                <a14:m>
+                  <m:oMathPara xmlns:m="http://schemas.openxmlformats.org/officeDocument/2006/math">
+                    <m:oMathParaPr>
+                      <m:jc m:val="centerGroup"/>
+                    </m:oMathParaPr>
+                    <m:oMath xmlns:m="http://schemas.openxmlformats.org/officeDocument/2006/math">
+                      <m:r>
+                        <a:rPr lang="en-US" altLang="zh-CN" b="0" i="1" smtClean="0">
+                          <a:latin typeface="Cambria Math"/>
+                        </a:rPr>
+                        <m:t>(</m:t>
+                      </m:r>
+                      <m:r>
+                        <a:rPr lang="en-US" altLang="zh-CN" b="0" i="1" smtClean="0">
+                          <a:latin typeface="Cambria Math"/>
+                        </a:rPr>
+                        <m:t>𝑚</m:t>
+                      </m:r>
+                      <m:r>
+                        <a:rPr lang="en-US" altLang="zh-CN" b="0" i="1" smtClean="0">
+                          <a:latin typeface="Cambria Math"/>
+                        </a:rPr>
+                        <m:t>+8)</m:t>
+                      </m:r>
+                      <m:r>
+                        <a:rPr lang="zh-CN" altLang="en-US" b="0" i="1" smtClean="0">
+                          <a:latin typeface="Cambria Math"/>
+                        </a:rPr>
+                        <m:t>𝜋</m:t>
+                      </m:r>
+                    </m:oMath>
+                  </m:oMathPara>
+                </a14:m>
+                <a:endParaRPr lang="zh-CN" altLang="en-US" dirty="0"/>
+              </a:p>
+            </p:txBody>
+          </p:sp>
+        </mc:Choice>
+        <mc:Fallback xmlns="">
+          <p:sp>
+            <p:nvSpPr>
+              <p:cNvPr id="69" name="TextBox 68"/>
+              <p:cNvSpPr txBox="1">
+                <a:spLocks noRot="1" noChangeAspect="1" noMove="1" noResize="1" noEditPoints="1" noAdjustHandles="1" noChangeArrowheads="1" noChangeShapeType="1" noTextEdit="1"/>
+              </p:cNvSpPr>
+              <p:nvPr/>
+            </p:nvSpPr>
+            <p:spPr>
+              <a:xfrm>
+                <a:off x="6209012" y="6510122"/>
+                <a:ext cx="1176636" cy="369332"/>
+              </a:xfrm>
+              <a:prstGeom prst="rect">
+                <a:avLst/>
+              </a:prstGeom>
+              <a:blipFill rotWithShape="1">
+                <a:blip r:embed="rId7"/>
+                <a:stretch>
+                  <a:fillRect b="-11475"/>
+                </a:stretch>
+              </a:blipFill>
+            </p:spPr>
+            <p:txBody>
+              <a:bodyPr/>
+              <a:lstStyle/>
+              <a:p>
+                <a:r>
+                  <a:rPr lang="zh-CN" altLang="en-US">
+                    <a:noFill/>
+                  </a:rPr>
+                  <a:t> </a:t>
+                </a:r>
+              </a:p>
+            </p:txBody>
+          </p:sp>
+        </mc:Fallback>
+      </mc:AlternateContent>
+      <p:cxnSp>
+        <p:nvCxnSpPr>
+          <p:cNvPr id="71" name="直接连接符 70"/>
+          <p:cNvCxnSpPr>
+            <a:stCxn id="25" idx="3"/>
+          </p:cNvCxnSpPr>
+          <p:nvPr/>
+        </p:nvCxnSpPr>
+        <p:spPr>
+          <a:xfrm>
+            <a:off x="1267016" y="2679757"/>
+            <a:ext cx="0" cy="3782955"/>
+          </a:xfrm>
+          <a:prstGeom prst="line">
+            <a:avLst/>
+          </a:prstGeom>
+          <a:ln>
+            <a:solidFill>
+              <a:schemeClr val="tx1"/>
+            </a:solidFill>
+            <a:prstDash val="dash"/>
+          </a:ln>
+        </p:spPr>
+        <p:style>
+          <a:lnRef idx="1">
+            <a:schemeClr val="accent1"/>
+          </a:lnRef>
+          <a:fillRef idx="0">
+            <a:schemeClr val="accent1"/>
+          </a:fillRef>
+          <a:effectRef idx="0">
+            <a:schemeClr val="accent1"/>
+          </a:effectRef>
+          <a:fontRef idx="minor">
+            <a:schemeClr val="tx1"/>
+          </a:fontRef>
+        </p:style>
+      </p:cxnSp>
+      <p:cxnSp>
+        <p:nvCxnSpPr>
+          <p:cNvPr id="75" name="直接连接符 74"/>
+          <p:cNvCxnSpPr/>
+          <p:nvPr/>
+        </p:nvCxnSpPr>
+        <p:spPr>
+          <a:xfrm>
+            <a:off x="6330866" y="2679757"/>
+            <a:ext cx="0" cy="3782955"/>
+          </a:xfrm>
+          <a:prstGeom prst="line">
+            <a:avLst/>
+          </a:prstGeom>
+          <a:ln>
+            <a:solidFill>
+              <a:schemeClr val="tx1"/>
+            </a:solidFill>
+            <a:prstDash val="dash"/>
+          </a:ln>
+        </p:spPr>
+        <p:style>
+          <a:lnRef idx="1">
+            <a:schemeClr val="accent1"/>
+          </a:lnRef>
+          <a:fillRef idx="0">
+            <a:schemeClr val="accent1"/>
+          </a:fillRef>
+          <a:effectRef idx="0">
+            <a:schemeClr val="accent1"/>
+          </a:effectRef>
+          <a:fontRef idx="minor">
+            <a:schemeClr val="tx1"/>
+          </a:fontRef>
+        </p:style>
+      </p:cxnSp>
+      <mc:AlternateContent xmlns:mc="http://schemas.openxmlformats.org/markup-compatibility/2006" xmlns:a14="http://schemas.microsoft.com/office/drawing/2010/main">
+        <mc:Choice Requires="a14">
+          <p:sp>
+            <p:nvSpPr>
+              <p:cNvPr id="77" name="TextBox 76"/>
+              <p:cNvSpPr txBox="1"/>
+              <p:nvPr/>
+            </p:nvSpPr>
+            <p:spPr>
+              <a:xfrm>
+                <a:off x="1267016" y="6078560"/>
+                <a:ext cx="509049" cy="369332"/>
+              </a:xfrm>
+              <a:prstGeom prst="rect">
+                <a:avLst/>
+              </a:prstGeom>
+              <a:noFill/>
+            </p:spPr>
+            <p:txBody>
+              <a:bodyPr wrap="none" rtlCol="0">
+                <a:spAutoFit/>
+              </a:bodyPr>
+              <a:lstStyle/>
+              <a:p>
+                <a:pPr/>
+                <a14:m>
+                  <m:oMathPara xmlns:m="http://schemas.openxmlformats.org/officeDocument/2006/math">
+                    <m:oMathParaPr>
+                      <m:jc m:val="centerGroup"/>
+                    </m:oMathParaPr>
+                    <m:oMath xmlns:m="http://schemas.openxmlformats.org/officeDocument/2006/math">
+                      <m:sSub>
+                        <m:sSubPr>
+                          <m:ctrlPr>
+                            <a:rPr lang="en-US" altLang="zh-CN" i="1" smtClean="0">
+                              <a:latin typeface="Cambria Math"/>
+                            </a:rPr>
+                          </m:ctrlPr>
+                        </m:sSubPr>
+                        <m:e>
+                          <m:r>
+                            <a:rPr lang="zh-CN" altLang="en-US" i="1" smtClean="0">
+                              <a:latin typeface="Cambria Math"/>
+                            </a:rPr>
+                            <m:t>𝜑</m:t>
+                          </m:r>
+                        </m:e>
+                        <m:sub>
+                          <m:r>
+                            <a:rPr lang="en-US" altLang="zh-CN" b="0" i="1" smtClean="0">
+                              <a:latin typeface="Cambria Math"/>
+                            </a:rPr>
+                            <m:t>𝐴</m:t>
+                          </m:r>
+                        </m:sub>
+                      </m:sSub>
+                    </m:oMath>
+                  </m:oMathPara>
+                </a14:m>
+                <a:endParaRPr lang="zh-CN" altLang="en-US" dirty="0"/>
+              </a:p>
+            </p:txBody>
+          </p:sp>
+        </mc:Choice>
+        <mc:Fallback xmlns="">
+          <p:sp>
+            <p:nvSpPr>
+              <p:cNvPr id="77" name="TextBox 76"/>
+              <p:cNvSpPr txBox="1">
+                <a:spLocks noRot="1" noChangeAspect="1" noMove="1" noResize="1" noEditPoints="1" noAdjustHandles="1" noChangeArrowheads="1" noChangeShapeType="1" noTextEdit="1"/>
+              </p:cNvSpPr>
+              <p:nvPr/>
+            </p:nvSpPr>
+            <p:spPr>
+              <a:xfrm>
+                <a:off x="1267016" y="6078560"/>
+                <a:ext cx="509049" cy="369332"/>
+              </a:xfrm>
+              <a:prstGeom prst="rect">
+                <a:avLst/>
+              </a:prstGeom>
+              <a:blipFill rotWithShape="1">
+                <a:blip r:embed="rId8"/>
+                <a:stretch>
+                  <a:fillRect b="-4918"/>
+                </a:stretch>
+              </a:blipFill>
+            </p:spPr>
+            <p:txBody>
+              <a:bodyPr/>
+              <a:lstStyle/>
+              <a:p>
+                <a:r>
+                  <a:rPr lang="zh-CN" altLang="en-US">
+                    <a:noFill/>
+                  </a:rPr>
+                  <a:t> </a:t>
+                </a:r>
+              </a:p>
+            </p:txBody>
+          </p:sp>
+        </mc:Fallback>
+      </mc:AlternateContent>
+      <mc:AlternateContent xmlns:mc="http://schemas.openxmlformats.org/markup-compatibility/2006" xmlns:a14="http://schemas.microsoft.com/office/drawing/2010/main">
+        <mc:Choice Requires="a14">
+          <p:sp>
+            <p:nvSpPr>
+              <p:cNvPr id="78" name="TextBox 77"/>
+              <p:cNvSpPr txBox="1"/>
+              <p:nvPr/>
+            </p:nvSpPr>
+            <p:spPr>
+              <a:xfrm>
+                <a:off x="6274815" y="6076360"/>
+                <a:ext cx="522515" cy="369332"/>
+              </a:xfrm>
+              <a:prstGeom prst="rect">
+                <a:avLst/>
+              </a:prstGeom>
+              <a:noFill/>
+            </p:spPr>
+            <p:txBody>
+              <a:bodyPr wrap="none" rtlCol="0">
+                <a:spAutoFit/>
+              </a:bodyPr>
+              <a:lstStyle/>
+              <a:p>
+                <a:pPr/>
+                <a14:m>
+                  <m:oMathPara xmlns:m="http://schemas.openxmlformats.org/officeDocument/2006/math">
+                    <m:oMathParaPr>
+                      <m:jc m:val="centerGroup"/>
+                    </m:oMathParaPr>
+                    <m:oMath xmlns:m="http://schemas.openxmlformats.org/officeDocument/2006/math">
+                      <m:sSub>
+                        <m:sSubPr>
+                          <m:ctrlPr>
+                            <a:rPr lang="en-US" altLang="zh-CN" i="1" smtClean="0">
+                              <a:latin typeface="Cambria Math"/>
+                            </a:rPr>
+                          </m:ctrlPr>
+                        </m:sSubPr>
+                        <m:e>
+                          <m:r>
+                            <a:rPr lang="zh-CN" altLang="en-US" i="1" smtClean="0">
+                              <a:latin typeface="Cambria Math"/>
+                            </a:rPr>
+                            <m:t>𝜑</m:t>
+                          </m:r>
+                        </m:e>
+                        <m:sub>
+                          <m:r>
+                            <a:rPr lang="en-US" altLang="zh-CN" b="0" i="1" smtClean="0">
+                              <a:latin typeface="Cambria Math"/>
+                            </a:rPr>
+                            <m:t>𝐵</m:t>
+                          </m:r>
+                        </m:sub>
+                      </m:sSub>
+                    </m:oMath>
+                  </m:oMathPara>
+                </a14:m>
+                <a:endParaRPr lang="zh-CN" altLang="en-US" dirty="0"/>
+              </a:p>
+            </p:txBody>
+          </p:sp>
+        </mc:Choice>
+        <mc:Fallback xmlns="">
+          <p:sp>
+            <p:nvSpPr>
+              <p:cNvPr id="78" name="TextBox 77"/>
+              <p:cNvSpPr txBox="1">
+                <a:spLocks noRot="1" noChangeAspect="1" noMove="1" noResize="1" noEditPoints="1" noAdjustHandles="1" noChangeArrowheads="1" noChangeShapeType="1" noTextEdit="1"/>
+              </p:cNvSpPr>
+              <p:nvPr/>
+            </p:nvSpPr>
+            <p:spPr>
+              <a:xfrm>
+                <a:off x="6274815" y="6076360"/>
+                <a:ext cx="522515" cy="369332"/>
+              </a:xfrm>
+              <a:prstGeom prst="rect">
+                <a:avLst/>
+              </a:prstGeom>
+              <a:blipFill rotWithShape="1">
+                <a:blip r:embed="rId9"/>
+                <a:stretch>
+                  <a:fillRect b="-6667"/>
+                </a:stretch>
+              </a:blipFill>
+            </p:spPr>
+            <p:txBody>
+              <a:bodyPr/>
+              <a:lstStyle/>
+              <a:p>
+                <a:r>
+                  <a:rPr lang="zh-CN" altLang="en-US">
+                    <a:noFill/>
+                  </a:rPr>
+                  <a:t> </a:t>
+                </a:r>
+              </a:p>
+            </p:txBody>
+          </p:sp>
+        </mc:Fallback>
+      </mc:AlternateContent>
+    </p:spTree>
+    <p:extLst>
+      <p:ext uri="{BB962C8B-B14F-4D97-AF65-F5344CB8AC3E}">
+        <p14:creationId xmlns:p14="http://schemas.microsoft.com/office/powerpoint/2010/main" val="3924914866"/>
       </p:ext>
     </p:extLst>
   </p:cSld>
@@ -11564,8 +13316,8 @@
           </a:graphicData>
         </a:graphic>
       </p:graphicFrame>
-      <mc:AlternateContent xmlns:mc="http://schemas.openxmlformats.org/markup-compatibility/2006">
-        <mc:Choice xmlns:a14="http://schemas.microsoft.com/office/drawing/2010/main" Requires="a14">
+      <mc:AlternateContent xmlns:mc="http://schemas.openxmlformats.org/markup-compatibility/2006" xmlns:a14="http://schemas.microsoft.com/office/drawing/2010/main">
+        <mc:Choice Requires="a14">
           <p:sp>
             <p:nvSpPr>
               <p:cNvPr id="3" name="TextBox 4"/>
@@ -11865,7 +13617,7 @@
             </p:txBody>
           </p:sp>
         </mc:Choice>
-        <mc:Fallback>
+        <mc:Fallback xmlns="">
           <p:sp>
             <p:nvSpPr>
               <p:cNvPr id="3" name="TextBox 4"/>
@@ -11904,8 +13656,8 @@
           </p:sp>
         </mc:Fallback>
       </mc:AlternateContent>
-      <mc:AlternateContent xmlns:mc="http://schemas.openxmlformats.org/markup-compatibility/2006">
-        <mc:Choice xmlns:a14="http://schemas.microsoft.com/office/drawing/2010/main" Requires="a14">
+      <mc:AlternateContent xmlns:mc="http://schemas.openxmlformats.org/markup-compatibility/2006" xmlns:a14="http://schemas.microsoft.com/office/drawing/2010/main">
+        <mc:Choice Requires="a14">
           <p:sp>
             <p:nvSpPr>
               <p:cNvPr id="4" name="TextBox 5"/>
@@ -12208,7 +13960,7 @@
             </p:txBody>
           </p:sp>
         </mc:Choice>
-        <mc:Fallback>
+        <mc:Fallback xmlns="">
           <p:sp>
             <p:nvSpPr>
               <p:cNvPr id="4" name="TextBox 5"/>
@@ -12247,8 +13999,8 @@
           </p:sp>
         </mc:Fallback>
       </mc:AlternateContent>
-      <mc:AlternateContent xmlns:mc="http://schemas.openxmlformats.org/markup-compatibility/2006">
-        <mc:Choice xmlns:a14="http://schemas.microsoft.com/office/drawing/2010/main" Requires="a14">
+      <mc:AlternateContent xmlns:mc="http://schemas.openxmlformats.org/markup-compatibility/2006" xmlns:a14="http://schemas.microsoft.com/office/drawing/2010/main">
+        <mc:Choice Requires="a14">
           <p:sp>
             <p:nvSpPr>
               <p:cNvPr id="5" name="TextBox 6"/>
@@ -12422,7 +14174,7 @@
             </p:txBody>
           </p:sp>
         </mc:Choice>
-        <mc:Fallback>
+        <mc:Fallback xmlns="">
           <p:sp>
             <p:nvSpPr>
               <p:cNvPr id="5" name="TextBox 6"/>
@@ -12461,8 +14213,8 @@
           </p:sp>
         </mc:Fallback>
       </mc:AlternateContent>
-      <mc:AlternateContent xmlns:mc="http://schemas.openxmlformats.org/markup-compatibility/2006">
-        <mc:Choice xmlns:a14="http://schemas.microsoft.com/office/drawing/2010/main" Requires="a14">
+      <mc:AlternateContent xmlns:mc="http://schemas.openxmlformats.org/markup-compatibility/2006" xmlns:a14="http://schemas.microsoft.com/office/drawing/2010/main">
+        <mc:Choice Requires="a14">
           <p:sp>
             <p:nvSpPr>
               <p:cNvPr id="6" name="TextBox 7"/>
@@ -12796,7 +14548,7 @@
             </p:txBody>
           </p:sp>
         </mc:Choice>
-        <mc:Fallback>
+        <mc:Fallback xmlns="">
           <p:sp>
             <p:nvSpPr>
               <p:cNvPr id="6" name="TextBox 7"/>
@@ -12835,8 +14587,8 @@
           </p:sp>
         </mc:Fallback>
       </mc:AlternateContent>
-      <mc:AlternateContent xmlns:mc="http://schemas.openxmlformats.org/markup-compatibility/2006">
-        <mc:Choice xmlns:a14="http://schemas.microsoft.com/office/drawing/2010/main" Requires="a14">
+      <mc:AlternateContent xmlns:mc="http://schemas.openxmlformats.org/markup-compatibility/2006" xmlns:a14="http://schemas.microsoft.com/office/drawing/2010/main">
+        <mc:Choice Requires="a14">
           <p:sp>
             <p:nvSpPr>
               <p:cNvPr id="7" name="TextBox 9"/>
@@ -13214,7 +14966,7 @@
             </p:txBody>
           </p:sp>
         </mc:Choice>
-        <mc:Fallback>
+        <mc:Fallback xmlns="">
           <p:sp>
             <p:nvSpPr>
               <p:cNvPr id="7" name="TextBox 9"/>
@@ -13253,8 +15005,8 @@
           </p:sp>
         </mc:Fallback>
       </mc:AlternateContent>
-      <mc:AlternateContent xmlns:mc="http://schemas.openxmlformats.org/markup-compatibility/2006">
-        <mc:Choice xmlns:a14="http://schemas.microsoft.com/office/drawing/2010/main" Requires="a14">
+      <mc:AlternateContent xmlns:mc="http://schemas.openxmlformats.org/markup-compatibility/2006" xmlns:a14="http://schemas.microsoft.com/office/drawing/2010/main">
+        <mc:Choice Requires="a14">
           <p:sp>
             <p:nvSpPr>
               <p:cNvPr id="8" name="TextBox 10"/>
@@ -13421,7 +15173,7 @@
             </p:txBody>
           </p:sp>
         </mc:Choice>
-        <mc:Fallback>
+        <mc:Fallback xmlns="">
           <p:sp>
             <p:nvSpPr>
               <p:cNvPr id="8" name="TextBox 10"/>
@@ -13464,6 +15216,2095 @@
     <p:extLst>
       <p:ext uri="{BB962C8B-B14F-4D97-AF65-F5344CB8AC3E}">
         <p14:creationId xmlns:p14="http://schemas.microsoft.com/office/powerpoint/2010/main" val="3363472582"/>
+      </p:ext>
+    </p:extLst>
+  </p:cSld>
+  <p:clrMapOvr>
+    <a:masterClrMapping/>
+  </p:clrMapOvr>
+</p:sld>
+</file>
+
+<file path=ppt/slides/slide8.xml><?xml version="1.0" encoding="utf-8"?>
+<p:sld xmlns:a="http://schemas.openxmlformats.org/drawingml/2006/main" xmlns:r="http://schemas.openxmlformats.org/officeDocument/2006/relationships" xmlns:p="http://schemas.openxmlformats.org/presentationml/2006/main">
+  <p:cSld>
+    <p:spTree>
+      <p:nvGrpSpPr>
+        <p:cNvPr id="1" name=""/>
+        <p:cNvGrpSpPr/>
+        <p:nvPr/>
+      </p:nvGrpSpPr>
+      <p:grpSpPr>
+        <a:xfrm>
+          <a:off x="0" y="0"/>
+          <a:ext cx="0" cy="0"/>
+          <a:chOff x="0" y="0"/>
+          <a:chExt cx="0" cy="0"/>
+        </a:xfrm>
+      </p:grpSpPr>
+      <p:cxnSp>
+        <p:nvCxnSpPr>
+          <p:cNvPr id="5" name="直接箭头连接符 4"/>
+          <p:cNvCxnSpPr/>
+          <p:nvPr/>
+        </p:nvCxnSpPr>
+        <p:spPr>
+          <a:xfrm flipV="1">
+            <a:off x="251520" y="512676"/>
+            <a:ext cx="0" cy="5796644"/>
+          </a:xfrm>
+          <a:prstGeom prst="straightConnector1">
+            <a:avLst/>
+          </a:prstGeom>
+          <a:ln>
+            <a:solidFill>
+              <a:schemeClr val="tx1"/>
+            </a:solidFill>
+            <a:tailEnd type="arrow"/>
+          </a:ln>
+        </p:spPr>
+        <p:style>
+          <a:lnRef idx="1">
+            <a:schemeClr val="accent1"/>
+          </a:lnRef>
+          <a:fillRef idx="0">
+            <a:schemeClr val="accent1"/>
+          </a:fillRef>
+          <a:effectRef idx="0">
+            <a:schemeClr val="accent1"/>
+          </a:effectRef>
+          <a:fontRef idx="minor">
+            <a:schemeClr val="tx1"/>
+          </a:fontRef>
+        </p:style>
+      </p:cxnSp>
+      <p:cxnSp>
+        <p:nvCxnSpPr>
+          <p:cNvPr id="6" name="直接箭头连接符 5"/>
+          <p:cNvCxnSpPr/>
+          <p:nvPr/>
+        </p:nvCxnSpPr>
+        <p:spPr>
+          <a:xfrm>
+            <a:off x="251520" y="6293937"/>
+            <a:ext cx="8640960" cy="0"/>
+          </a:xfrm>
+          <a:prstGeom prst="straightConnector1">
+            <a:avLst/>
+          </a:prstGeom>
+          <a:ln>
+            <a:solidFill>
+              <a:schemeClr val="tx1"/>
+            </a:solidFill>
+            <a:tailEnd type="arrow"/>
+          </a:ln>
+        </p:spPr>
+        <p:style>
+          <a:lnRef idx="1">
+            <a:schemeClr val="accent1"/>
+          </a:lnRef>
+          <a:fillRef idx="0">
+            <a:schemeClr val="accent1"/>
+          </a:fillRef>
+          <a:effectRef idx="0">
+            <a:schemeClr val="accent1"/>
+          </a:effectRef>
+          <a:fontRef idx="minor">
+            <a:schemeClr val="tx1"/>
+          </a:fontRef>
+        </p:style>
+      </p:cxnSp>
+      <p:sp>
+        <p:nvSpPr>
+          <p:cNvPr id="9" name="任意多边形 8"/>
+          <p:cNvSpPr/>
+          <p:nvPr/>
+        </p:nvSpPr>
+        <p:spPr>
+          <a:xfrm>
+            <a:off x="740664" y="4437112"/>
+            <a:ext cx="7159752" cy="1872248"/>
+          </a:xfrm>
+          <a:custGeom>
+            <a:avLst/>
+            <a:gdLst>
+              <a:gd name="connsiteX0" fmla="*/ 0 w 7159752"/>
+              <a:gd name="connsiteY0" fmla="*/ 2822902 h 2832046"/>
+              <a:gd name="connsiteX1" fmla="*/ 1014984 w 7159752"/>
+              <a:gd name="connsiteY1" fmla="*/ 15694 h 2832046"/>
+              <a:gd name="connsiteX2" fmla="*/ 2157984 w 7159752"/>
+              <a:gd name="connsiteY2" fmla="*/ 1679902 h 2832046"/>
+              <a:gd name="connsiteX3" fmla="*/ 3465576 w 7159752"/>
+              <a:gd name="connsiteY3" fmla="*/ 1533598 h 2832046"/>
+              <a:gd name="connsiteX4" fmla="*/ 4873752 w 7159752"/>
+              <a:gd name="connsiteY4" fmla="*/ 856942 h 2832046"/>
+              <a:gd name="connsiteX5" fmla="*/ 5806440 w 7159752"/>
+              <a:gd name="connsiteY5" fmla="*/ 2658310 h 2832046"/>
+              <a:gd name="connsiteX6" fmla="*/ 6620256 w 7159752"/>
+              <a:gd name="connsiteY6" fmla="*/ 1643326 h 2832046"/>
+              <a:gd name="connsiteX7" fmla="*/ 7159752 w 7159752"/>
+              <a:gd name="connsiteY7" fmla="*/ 2832046 h 2832046"/>
+            </a:gdLst>
+            <a:ahLst/>
+            <a:cxnLst>
+              <a:cxn ang="0">
+                <a:pos x="connsiteX0" y="connsiteY0"/>
+              </a:cxn>
+              <a:cxn ang="0">
+                <a:pos x="connsiteX1" y="connsiteY1"/>
+              </a:cxn>
+              <a:cxn ang="0">
+                <a:pos x="connsiteX2" y="connsiteY2"/>
+              </a:cxn>
+              <a:cxn ang="0">
+                <a:pos x="connsiteX3" y="connsiteY3"/>
+              </a:cxn>
+              <a:cxn ang="0">
+                <a:pos x="connsiteX4" y="connsiteY4"/>
+              </a:cxn>
+              <a:cxn ang="0">
+                <a:pos x="connsiteX5" y="connsiteY5"/>
+              </a:cxn>
+              <a:cxn ang="0">
+                <a:pos x="connsiteX6" y="connsiteY6"/>
+              </a:cxn>
+              <a:cxn ang="0">
+                <a:pos x="connsiteX7" y="connsiteY7"/>
+              </a:cxn>
+            </a:cxnLst>
+            <a:rect l="l" t="t" r="r" b="b"/>
+            <a:pathLst>
+              <a:path w="7159752" h="2832046">
+                <a:moveTo>
+                  <a:pt x="0" y="2822902"/>
+                </a:moveTo>
+                <a:cubicBezTo>
+                  <a:pt x="327660" y="1514548"/>
+                  <a:pt x="655320" y="206194"/>
+                  <a:pt x="1014984" y="15694"/>
+                </a:cubicBezTo>
+                <a:cubicBezTo>
+                  <a:pt x="1374648" y="-174806"/>
+                  <a:pt x="1749552" y="1426918"/>
+                  <a:pt x="2157984" y="1679902"/>
+                </a:cubicBezTo>
+                <a:cubicBezTo>
+                  <a:pt x="2566416" y="1932886"/>
+                  <a:pt x="3012948" y="1670758"/>
+                  <a:pt x="3465576" y="1533598"/>
+                </a:cubicBezTo>
+                <a:cubicBezTo>
+                  <a:pt x="3918204" y="1396438"/>
+                  <a:pt x="4483608" y="669490"/>
+                  <a:pt x="4873752" y="856942"/>
+                </a:cubicBezTo>
+                <a:cubicBezTo>
+                  <a:pt x="5263896" y="1044394"/>
+                  <a:pt x="5515356" y="2527246"/>
+                  <a:pt x="5806440" y="2658310"/>
+                </a:cubicBezTo>
+                <a:cubicBezTo>
+                  <a:pt x="6097524" y="2789374"/>
+                  <a:pt x="6394704" y="1614370"/>
+                  <a:pt x="6620256" y="1643326"/>
+                </a:cubicBezTo>
+                <a:cubicBezTo>
+                  <a:pt x="6845808" y="1672282"/>
+                  <a:pt x="7065264" y="2620210"/>
+                  <a:pt x="7159752" y="2832046"/>
+                </a:cubicBezTo>
+              </a:path>
+            </a:pathLst>
+          </a:custGeom>
+          <a:noFill/>
+          <a:ln>
+            <a:solidFill>
+              <a:schemeClr val="tx1"/>
+            </a:solidFill>
+          </a:ln>
+        </p:spPr>
+        <p:style>
+          <a:lnRef idx="2">
+            <a:schemeClr val="accent1">
+              <a:shade val="50000"/>
+            </a:schemeClr>
+          </a:lnRef>
+          <a:fillRef idx="1">
+            <a:schemeClr val="accent1"/>
+          </a:fillRef>
+          <a:effectRef idx="0">
+            <a:schemeClr val="accent1"/>
+          </a:effectRef>
+          <a:fontRef idx="minor">
+            <a:schemeClr val="lt1"/>
+          </a:fontRef>
+        </p:style>
+        <p:txBody>
+          <a:bodyPr rtlCol="0" anchor="ctr"/>
+          <a:lstStyle/>
+          <a:p>
+            <a:pPr algn="ctr"/>
+            <a:endParaRPr lang="zh-CN" altLang="en-US"/>
+          </a:p>
+        </p:txBody>
+      </p:sp>
+      <p:sp>
+        <p:nvSpPr>
+          <p:cNvPr id="10" name="TextBox 9"/>
+          <p:cNvSpPr txBox="1"/>
+          <p:nvPr/>
+        </p:nvSpPr>
+        <p:spPr>
+          <a:xfrm>
+            <a:off x="1475656" y="5805264"/>
+            <a:ext cx="2484276" cy="369332"/>
+          </a:xfrm>
+          <a:prstGeom prst="rect">
+            <a:avLst/>
+          </a:prstGeom>
+          <a:noFill/>
+        </p:spPr>
+        <p:txBody>
+          <a:bodyPr wrap="square" rtlCol="0">
+            <a:spAutoFit/>
+          </a:bodyPr>
+          <a:lstStyle/>
+          <a:p>
+            <a:r>
+              <a:rPr lang="zh-CN" altLang="en-US" dirty="0"/>
+              <a:t>待测物</a:t>
+            </a:r>
+            <a:r>
+              <a:rPr lang="zh-CN" altLang="en-US" dirty="0" smtClean="0"/>
+              <a:t>体 </a:t>
+            </a:r>
+            <a:endParaRPr lang="zh-CN" altLang="en-US" dirty="0"/>
+          </a:p>
+        </p:txBody>
+      </p:sp>
+      <p:sp>
+        <p:nvSpPr>
+          <p:cNvPr id="11" name="TextBox 10"/>
+          <p:cNvSpPr txBox="1"/>
+          <p:nvPr/>
+        </p:nvSpPr>
+        <p:spPr>
+          <a:xfrm>
+            <a:off x="0" y="656692"/>
+            <a:ext cx="252028" cy="369332"/>
+          </a:xfrm>
+          <a:prstGeom prst="rect">
+            <a:avLst/>
+          </a:prstGeom>
+          <a:noFill/>
+        </p:spPr>
+        <p:txBody>
+          <a:bodyPr wrap="square" rtlCol="0">
+            <a:spAutoFit/>
+          </a:bodyPr>
+          <a:lstStyle/>
+          <a:p>
+            <a:r>
+              <a:rPr lang="en-US" altLang="zh-CN" dirty="0" smtClean="0"/>
+              <a:t>Z</a:t>
+            </a:r>
+            <a:endParaRPr lang="zh-CN" altLang="en-US" dirty="0"/>
+          </a:p>
+        </p:txBody>
+      </p:sp>
+      <p:sp>
+        <p:nvSpPr>
+          <p:cNvPr id="13" name="TextBox 12"/>
+          <p:cNvSpPr txBox="1"/>
+          <p:nvPr/>
+        </p:nvSpPr>
+        <p:spPr>
+          <a:xfrm>
+            <a:off x="7992380" y="6381328"/>
+            <a:ext cx="468052" cy="369332"/>
+          </a:xfrm>
+          <a:prstGeom prst="rect">
+            <a:avLst/>
+          </a:prstGeom>
+          <a:noFill/>
+        </p:spPr>
+        <p:txBody>
+          <a:bodyPr wrap="square" rtlCol="0">
+            <a:spAutoFit/>
+          </a:bodyPr>
+          <a:lstStyle/>
+          <a:p>
+            <a:r>
+              <a:rPr lang="en-US" altLang="zh-CN" dirty="0" smtClean="0"/>
+              <a:t>X</a:t>
+            </a:r>
+            <a:endParaRPr lang="zh-CN" altLang="en-US" dirty="0"/>
+          </a:p>
+        </p:txBody>
+      </p:sp>
+      <p:sp>
+        <p:nvSpPr>
+          <p:cNvPr id="15" name="TextBox 14"/>
+          <p:cNvSpPr txBox="1"/>
+          <p:nvPr/>
+        </p:nvSpPr>
+        <p:spPr>
+          <a:xfrm>
+            <a:off x="1619672" y="512676"/>
+            <a:ext cx="936104" cy="646331"/>
+          </a:xfrm>
+          <a:prstGeom prst="rect">
+            <a:avLst/>
+          </a:prstGeom>
+          <a:noFill/>
+        </p:spPr>
+        <p:txBody>
+          <a:bodyPr wrap="square" rtlCol="0">
+            <a:spAutoFit/>
+          </a:bodyPr>
+          <a:lstStyle/>
+          <a:p>
+            <a:r>
+              <a:rPr lang="zh-CN" altLang="en-US" dirty="0"/>
+              <a:t>投影</a:t>
+            </a:r>
+            <a:r>
+              <a:rPr lang="zh-CN" altLang="en-US" dirty="0" smtClean="0"/>
+              <a:t>仪 </a:t>
+            </a:r>
+            <a:r>
+              <a:rPr lang="en-US" altLang="zh-CN" dirty="0" smtClean="0"/>
+              <a:t>P</a:t>
+            </a:r>
+            <a:endParaRPr lang="zh-CN" altLang="en-US" dirty="0"/>
+          </a:p>
+        </p:txBody>
+      </p:sp>
+      <p:sp>
+        <p:nvSpPr>
+          <p:cNvPr id="16" name="TextBox 15"/>
+          <p:cNvSpPr txBox="1"/>
+          <p:nvPr/>
+        </p:nvSpPr>
+        <p:spPr>
+          <a:xfrm>
+            <a:off x="6768244" y="473664"/>
+            <a:ext cx="936104" cy="646331"/>
+          </a:xfrm>
+          <a:prstGeom prst="rect">
+            <a:avLst/>
+          </a:prstGeom>
+          <a:noFill/>
+        </p:spPr>
+        <p:txBody>
+          <a:bodyPr wrap="square" rtlCol="0">
+            <a:spAutoFit/>
+          </a:bodyPr>
+          <a:lstStyle/>
+          <a:p>
+            <a:r>
+              <a:rPr lang="zh-CN" altLang="en-US" dirty="0" smtClean="0"/>
+              <a:t>相机</a:t>
+            </a:r>
+            <a:endParaRPr lang="en-US" altLang="zh-CN" dirty="0" smtClean="0"/>
+          </a:p>
+          <a:p>
+            <a:r>
+              <a:rPr lang="en-US" altLang="zh-CN" dirty="0"/>
+              <a:t>C</a:t>
+            </a:r>
+            <a:endParaRPr lang="zh-CN" altLang="en-US" dirty="0"/>
+          </a:p>
+        </p:txBody>
+      </p:sp>
+      <p:sp>
+        <p:nvSpPr>
+          <p:cNvPr id="17" name="等腰三角形 16"/>
+          <p:cNvSpPr/>
+          <p:nvPr/>
+        </p:nvSpPr>
+        <p:spPr>
+          <a:xfrm>
+            <a:off x="1619672" y="1159007"/>
+            <a:ext cx="144016" cy="109753"/>
+          </a:xfrm>
+          <a:prstGeom prst="triangle">
+            <a:avLst/>
+          </a:prstGeom>
+          <a:solidFill>
+            <a:schemeClr val="tx1"/>
+          </a:solidFill>
+          <a:ln>
+            <a:solidFill>
+              <a:schemeClr val="tx1"/>
+            </a:solidFill>
+          </a:ln>
+        </p:spPr>
+        <p:style>
+          <a:lnRef idx="2">
+            <a:schemeClr val="accent1">
+              <a:shade val="50000"/>
+            </a:schemeClr>
+          </a:lnRef>
+          <a:fillRef idx="1">
+            <a:schemeClr val="accent1"/>
+          </a:fillRef>
+          <a:effectRef idx="0">
+            <a:schemeClr val="accent1"/>
+          </a:effectRef>
+          <a:fontRef idx="minor">
+            <a:schemeClr val="lt1"/>
+          </a:fontRef>
+        </p:style>
+        <p:txBody>
+          <a:bodyPr rtlCol="0" anchor="ctr"/>
+          <a:lstStyle/>
+          <a:p>
+            <a:pPr algn="ctr"/>
+            <a:endParaRPr lang="zh-CN" altLang="en-US"/>
+          </a:p>
+        </p:txBody>
+      </p:sp>
+      <p:sp>
+        <p:nvSpPr>
+          <p:cNvPr id="18" name="等腰三角形 17"/>
+          <p:cNvSpPr/>
+          <p:nvPr/>
+        </p:nvSpPr>
+        <p:spPr>
+          <a:xfrm>
+            <a:off x="6630364" y="1159006"/>
+            <a:ext cx="144016" cy="109753"/>
+          </a:xfrm>
+          <a:prstGeom prst="triangle">
+            <a:avLst/>
+          </a:prstGeom>
+          <a:solidFill>
+            <a:schemeClr val="tx1"/>
+          </a:solidFill>
+          <a:ln>
+            <a:solidFill>
+              <a:schemeClr val="tx1"/>
+            </a:solidFill>
+          </a:ln>
+        </p:spPr>
+        <p:style>
+          <a:lnRef idx="2">
+            <a:schemeClr val="accent1">
+              <a:shade val="50000"/>
+            </a:schemeClr>
+          </a:lnRef>
+          <a:fillRef idx="1">
+            <a:schemeClr val="accent1"/>
+          </a:fillRef>
+          <a:effectRef idx="0">
+            <a:schemeClr val="accent1"/>
+          </a:effectRef>
+          <a:fontRef idx="minor">
+            <a:schemeClr val="lt1"/>
+          </a:fontRef>
+        </p:style>
+        <p:txBody>
+          <a:bodyPr rtlCol="0" anchor="ctr"/>
+          <a:lstStyle/>
+          <a:p>
+            <a:pPr algn="ctr"/>
+            <a:endParaRPr lang="zh-CN" altLang="en-US"/>
+          </a:p>
+        </p:txBody>
+      </p:sp>
+      <p:cxnSp>
+        <p:nvCxnSpPr>
+          <p:cNvPr id="20" name="直接箭头连接符 19"/>
+          <p:cNvCxnSpPr>
+            <a:endCxn id="18" idx="2"/>
+          </p:cNvCxnSpPr>
+          <p:nvPr/>
+        </p:nvCxnSpPr>
+        <p:spPr>
+          <a:xfrm flipV="1">
+            <a:off x="4208226" y="1268759"/>
+            <a:ext cx="2422138" cy="1"/>
+          </a:xfrm>
+          <a:prstGeom prst="straightConnector1">
+            <a:avLst/>
+          </a:prstGeom>
+          <a:ln>
+            <a:solidFill>
+              <a:schemeClr val="tx1"/>
+            </a:solidFill>
+            <a:tailEnd type="arrow"/>
+          </a:ln>
+        </p:spPr>
+        <p:style>
+          <a:lnRef idx="1">
+            <a:schemeClr val="accent1"/>
+          </a:lnRef>
+          <a:fillRef idx="0">
+            <a:schemeClr val="accent1"/>
+          </a:fillRef>
+          <a:effectRef idx="0">
+            <a:schemeClr val="accent1"/>
+          </a:effectRef>
+          <a:fontRef idx="minor">
+            <a:schemeClr val="tx1"/>
+          </a:fontRef>
+        </p:style>
+      </p:cxnSp>
+      <p:cxnSp>
+        <p:nvCxnSpPr>
+          <p:cNvPr id="28" name="直接箭头连接符 27"/>
+          <p:cNvCxnSpPr>
+            <a:endCxn id="17" idx="4"/>
+          </p:cNvCxnSpPr>
+          <p:nvPr/>
+        </p:nvCxnSpPr>
+        <p:spPr>
+          <a:xfrm flipH="1">
+            <a:off x="1763688" y="1268760"/>
+            <a:ext cx="2052228" cy="0"/>
+          </a:xfrm>
+          <a:prstGeom prst="straightConnector1">
+            <a:avLst/>
+          </a:prstGeom>
+          <a:ln>
+            <a:solidFill>
+              <a:schemeClr val="tx1"/>
+            </a:solidFill>
+            <a:tailEnd type="arrow"/>
+          </a:ln>
+        </p:spPr>
+        <p:style>
+          <a:lnRef idx="1">
+            <a:schemeClr val="accent1"/>
+          </a:lnRef>
+          <a:fillRef idx="0">
+            <a:schemeClr val="accent1"/>
+          </a:fillRef>
+          <a:effectRef idx="0">
+            <a:schemeClr val="accent1"/>
+          </a:effectRef>
+          <a:fontRef idx="minor">
+            <a:schemeClr val="tx1"/>
+          </a:fontRef>
+        </p:style>
+      </p:cxnSp>
+      <p:sp>
+        <p:nvSpPr>
+          <p:cNvPr id="31" name="TextBox 30"/>
+          <p:cNvSpPr txBox="1"/>
+          <p:nvPr/>
+        </p:nvSpPr>
+        <p:spPr>
+          <a:xfrm>
+            <a:off x="3815916" y="1119995"/>
+            <a:ext cx="392310" cy="369332"/>
+          </a:xfrm>
+          <a:prstGeom prst="rect">
+            <a:avLst/>
+          </a:prstGeom>
+          <a:noFill/>
+        </p:spPr>
+        <p:txBody>
+          <a:bodyPr wrap="square" rtlCol="0">
+            <a:spAutoFit/>
+          </a:bodyPr>
+          <a:lstStyle/>
+          <a:p>
+            <a:r>
+              <a:rPr lang="en-US" altLang="zh-CN" dirty="0" smtClean="0"/>
+              <a:t>d</a:t>
+            </a:r>
+            <a:endParaRPr lang="zh-CN" altLang="en-US" dirty="0"/>
+          </a:p>
+        </p:txBody>
+      </p:sp>
+      <p:cxnSp>
+        <p:nvCxnSpPr>
+          <p:cNvPr id="33" name="直接箭头连接符 32"/>
+          <p:cNvCxnSpPr>
+            <a:stCxn id="17" idx="3"/>
+            <a:endCxn id="56" idx="0"/>
+          </p:cNvCxnSpPr>
+          <p:nvPr/>
+        </p:nvCxnSpPr>
+        <p:spPr>
+          <a:xfrm>
+            <a:off x="1691680" y="1268760"/>
+            <a:ext cx="3303367" cy="5080302"/>
+          </a:xfrm>
+          <a:prstGeom prst="straightConnector1">
+            <a:avLst/>
+          </a:prstGeom>
+          <a:ln w="28575">
+            <a:solidFill>
+              <a:schemeClr val="tx1"/>
+            </a:solidFill>
+            <a:prstDash val="lgDash"/>
+            <a:tailEnd type="arrow"/>
+          </a:ln>
+        </p:spPr>
+        <p:style>
+          <a:lnRef idx="1">
+            <a:schemeClr val="accent1"/>
+          </a:lnRef>
+          <a:fillRef idx="0">
+            <a:schemeClr val="accent1"/>
+          </a:fillRef>
+          <a:effectRef idx="0">
+            <a:schemeClr val="accent1"/>
+          </a:effectRef>
+          <a:fontRef idx="minor">
+            <a:schemeClr val="tx1"/>
+          </a:fontRef>
+        </p:style>
+      </p:cxnSp>
+      <p:cxnSp>
+        <p:nvCxnSpPr>
+          <p:cNvPr id="45" name="直接箭头连接符 44"/>
+          <p:cNvCxnSpPr>
+            <a:stCxn id="18" idx="2"/>
+          </p:cNvCxnSpPr>
+          <p:nvPr/>
+        </p:nvCxnSpPr>
+        <p:spPr>
+          <a:xfrm flipH="1">
+            <a:off x="3943797" y="1268759"/>
+            <a:ext cx="2686567" cy="5000594"/>
+          </a:xfrm>
+          <a:prstGeom prst="straightConnector1">
+            <a:avLst/>
+          </a:prstGeom>
+          <a:ln w="28575">
+            <a:solidFill>
+              <a:schemeClr val="tx1"/>
+            </a:solidFill>
+            <a:prstDash val="lgDash"/>
+            <a:tailEnd type="arrow"/>
+          </a:ln>
+        </p:spPr>
+        <p:style>
+          <a:lnRef idx="1">
+            <a:schemeClr val="accent1"/>
+          </a:lnRef>
+          <a:fillRef idx="0">
+            <a:schemeClr val="accent1"/>
+          </a:fillRef>
+          <a:effectRef idx="0">
+            <a:schemeClr val="accent1"/>
+          </a:effectRef>
+          <a:fontRef idx="minor">
+            <a:schemeClr val="tx1"/>
+          </a:fontRef>
+        </p:style>
+      </p:cxnSp>
+      <p:sp>
+        <p:nvSpPr>
+          <p:cNvPr id="54" name="TextBox 53"/>
+          <p:cNvSpPr txBox="1"/>
+          <p:nvPr/>
+        </p:nvSpPr>
+        <p:spPr>
+          <a:xfrm>
+            <a:off x="3943797" y="5118954"/>
+            <a:ext cx="628203" cy="369332"/>
+          </a:xfrm>
+          <a:prstGeom prst="rect">
+            <a:avLst/>
+          </a:prstGeom>
+          <a:noFill/>
+        </p:spPr>
+        <p:txBody>
+          <a:bodyPr wrap="square" rtlCol="0">
+            <a:spAutoFit/>
+          </a:bodyPr>
+          <a:lstStyle/>
+          <a:p>
+            <a:r>
+              <a:rPr lang="en-US" altLang="zh-CN" dirty="0" smtClean="0"/>
+              <a:t>O</a:t>
+            </a:r>
+          </a:p>
+        </p:txBody>
+      </p:sp>
+      <p:sp>
+        <p:nvSpPr>
+          <p:cNvPr id="55" name="TextBox 54"/>
+          <p:cNvSpPr txBox="1"/>
+          <p:nvPr/>
+        </p:nvSpPr>
+        <p:spPr>
+          <a:xfrm>
+            <a:off x="3746234" y="6343044"/>
+            <a:ext cx="630070" cy="369332"/>
+          </a:xfrm>
+          <a:prstGeom prst="rect">
+            <a:avLst/>
+          </a:prstGeom>
+          <a:noFill/>
+        </p:spPr>
+        <p:txBody>
+          <a:bodyPr wrap="square" rtlCol="0">
+            <a:spAutoFit/>
+          </a:bodyPr>
+          <a:lstStyle/>
+          <a:p>
+            <a:r>
+              <a:rPr lang="en-US" altLang="zh-CN" dirty="0" smtClean="0"/>
+              <a:t>A</a:t>
+            </a:r>
+            <a:endParaRPr lang="zh-CN" altLang="en-US" dirty="0"/>
+          </a:p>
+        </p:txBody>
+      </p:sp>
+      <p:sp>
+        <p:nvSpPr>
+          <p:cNvPr id="56" name="TextBox 55"/>
+          <p:cNvSpPr txBox="1"/>
+          <p:nvPr/>
+        </p:nvSpPr>
+        <p:spPr>
+          <a:xfrm>
+            <a:off x="4680012" y="6349062"/>
+            <a:ext cx="630070" cy="369332"/>
+          </a:xfrm>
+          <a:prstGeom prst="rect">
+            <a:avLst/>
+          </a:prstGeom>
+          <a:noFill/>
+        </p:spPr>
+        <p:txBody>
+          <a:bodyPr wrap="square" rtlCol="0">
+            <a:spAutoFit/>
+          </a:bodyPr>
+          <a:lstStyle/>
+          <a:p>
+            <a:r>
+              <a:rPr lang="en-US" altLang="zh-CN" dirty="0"/>
+              <a:t>B</a:t>
+            </a:r>
+            <a:endParaRPr lang="zh-CN" altLang="en-US" dirty="0"/>
+          </a:p>
+        </p:txBody>
+      </p:sp>
+      <p:cxnSp>
+        <p:nvCxnSpPr>
+          <p:cNvPr id="61" name="直接箭头连接符 60"/>
+          <p:cNvCxnSpPr/>
+          <p:nvPr/>
+        </p:nvCxnSpPr>
+        <p:spPr>
+          <a:xfrm flipV="1">
+            <a:off x="4376303" y="5397820"/>
+            <a:ext cx="1" cy="263428"/>
+          </a:xfrm>
+          <a:prstGeom prst="straightConnector1">
+            <a:avLst/>
+          </a:prstGeom>
+          <a:ln>
+            <a:solidFill>
+              <a:schemeClr val="tx1"/>
+            </a:solidFill>
+            <a:tailEnd type="arrow"/>
+          </a:ln>
+        </p:spPr>
+        <p:style>
+          <a:lnRef idx="1">
+            <a:schemeClr val="accent1"/>
+          </a:lnRef>
+          <a:fillRef idx="0">
+            <a:schemeClr val="accent1"/>
+          </a:fillRef>
+          <a:effectRef idx="0">
+            <a:schemeClr val="accent1"/>
+          </a:effectRef>
+          <a:fontRef idx="minor">
+            <a:schemeClr val="tx1"/>
+          </a:fontRef>
+        </p:style>
+      </p:cxnSp>
+      <p:cxnSp>
+        <p:nvCxnSpPr>
+          <p:cNvPr id="62" name="直接箭头连接符 61"/>
+          <p:cNvCxnSpPr/>
+          <p:nvPr/>
+        </p:nvCxnSpPr>
+        <p:spPr>
+          <a:xfrm>
+            <a:off x="4391980" y="5979280"/>
+            <a:ext cx="0" cy="324952"/>
+          </a:xfrm>
+          <a:prstGeom prst="straightConnector1">
+            <a:avLst/>
+          </a:prstGeom>
+          <a:ln>
+            <a:solidFill>
+              <a:schemeClr val="tx1"/>
+            </a:solidFill>
+            <a:tailEnd type="arrow"/>
+          </a:ln>
+        </p:spPr>
+        <p:style>
+          <a:lnRef idx="1">
+            <a:schemeClr val="accent1"/>
+          </a:lnRef>
+          <a:fillRef idx="0">
+            <a:schemeClr val="accent1"/>
+          </a:fillRef>
+          <a:effectRef idx="0">
+            <a:schemeClr val="accent1"/>
+          </a:effectRef>
+          <a:fontRef idx="minor">
+            <a:schemeClr val="tx1"/>
+          </a:fontRef>
+        </p:style>
+      </p:cxnSp>
+      <p:cxnSp>
+        <p:nvCxnSpPr>
+          <p:cNvPr id="75" name="直接连接符 74"/>
+          <p:cNvCxnSpPr>
+            <a:stCxn id="17" idx="3"/>
+          </p:cNvCxnSpPr>
+          <p:nvPr/>
+        </p:nvCxnSpPr>
+        <p:spPr>
+          <a:xfrm>
+            <a:off x="1691680" y="1268760"/>
+            <a:ext cx="2252117" cy="5035472"/>
+          </a:xfrm>
+          <a:prstGeom prst="line">
+            <a:avLst/>
+          </a:prstGeom>
+          <a:ln w="28575">
+            <a:solidFill>
+              <a:schemeClr val="tx1"/>
+            </a:solidFill>
+            <a:prstDash val="dash"/>
+          </a:ln>
+        </p:spPr>
+        <p:style>
+          <a:lnRef idx="1">
+            <a:schemeClr val="accent1"/>
+          </a:lnRef>
+          <a:fillRef idx="0">
+            <a:schemeClr val="accent1"/>
+          </a:fillRef>
+          <a:effectRef idx="0">
+            <a:schemeClr val="accent1"/>
+          </a:effectRef>
+          <a:fontRef idx="minor">
+            <a:schemeClr val="tx1"/>
+          </a:fontRef>
+        </p:style>
+      </p:cxnSp>
+      <mc:AlternateContent xmlns:mc="http://schemas.openxmlformats.org/markup-compatibility/2006" xmlns:a14="http://schemas.microsoft.com/office/drawing/2010/main">
+        <mc:Choice Requires="a14">
+          <p:sp>
+            <p:nvSpPr>
+              <p:cNvPr id="78" name="TextBox 77"/>
+              <p:cNvSpPr txBox="1"/>
+              <p:nvPr/>
+            </p:nvSpPr>
+            <p:spPr>
+              <a:xfrm>
+                <a:off x="30691" y="6084687"/>
+                <a:ext cx="466794" cy="369332"/>
+              </a:xfrm>
+              <a:prstGeom prst="rect">
+                <a:avLst/>
+              </a:prstGeom>
+              <a:noFill/>
+            </p:spPr>
+            <p:txBody>
+              <a:bodyPr wrap="none" rtlCol="0">
+                <a:spAutoFit/>
+              </a:bodyPr>
+              <a:lstStyle/>
+              <a:p>
+                <a:pPr/>
+                <a14:m>
+                  <m:oMathPara xmlns:m="http://schemas.openxmlformats.org/officeDocument/2006/math">
+                    <m:oMathParaPr>
+                      <m:jc m:val="centerGroup"/>
+                    </m:oMathParaPr>
+                    <m:oMath xmlns:m="http://schemas.openxmlformats.org/officeDocument/2006/math">
+                      <m:r>
+                        <a:rPr lang="zh-CN" altLang="en-US" i="1" smtClean="0">
+                          <a:latin typeface="Cambria Math"/>
+                        </a:rPr>
+                        <m:t>⊙</m:t>
+                      </m:r>
+                    </m:oMath>
+                  </m:oMathPara>
+                </a14:m>
+                <a:endParaRPr lang="zh-CN" altLang="en-US" dirty="0"/>
+              </a:p>
+            </p:txBody>
+          </p:sp>
+        </mc:Choice>
+        <mc:Fallback xmlns="">
+          <p:sp>
+            <p:nvSpPr>
+              <p:cNvPr id="78" name="TextBox 77"/>
+              <p:cNvSpPr txBox="1">
+                <a:spLocks noRot="1" noChangeAspect="1" noMove="1" noResize="1" noEditPoints="1" noAdjustHandles="1" noChangeArrowheads="1" noChangeShapeType="1" noTextEdit="1"/>
+              </p:cNvSpPr>
+              <p:nvPr/>
+            </p:nvSpPr>
+            <p:spPr>
+              <a:xfrm>
+                <a:off x="30691" y="6084687"/>
+                <a:ext cx="466794" cy="369332"/>
+              </a:xfrm>
+              <a:prstGeom prst="rect">
+                <a:avLst/>
+              </a:prstGeom>
+              <a:blipFill rotWithShape="1">
+                <a:blip r:embed="rId2"/>
+                <a:stretch>
+                  <a:fillRect b="-4918"/>
+                </a:stretch>
+              </a:blipFill>
+            </p:spPr>
+            <p:txBody>
+              <a:bodyPr/>
+              <a:lstStyle/>
+              <a:p>
+                <a:r>
+                  <a:rPr lang="zh-CN" altLang="en-US">
+                    <a:noFill/>
+                  </a:rPr>
+                  <a:t> </a:t>
+                </a:r>
+              </a:p>
+            </p:txBody>
+          </p:sp>
+        </mc:Fallback>
+      </mc:AlternateContent>
+      <p:sp>
+        <p:nvSpPr>
+          <p:cNvPr id="79" name="TextBox 78"/>
+          <p:cNvSpPr txBox="1"/>
+          <p:nvPr/>
+        </p:nvSpPr>
+        <p:spPr>
+          <a:xfrm>
+            <a:off x="203789" y="6415798"/>
+            <a:ext cx="347472" cy="369332"/>
+          </a:xfrm>
+          <a:prstGeom prst="rect">
+            <a:avLst/>
+          </a:prstGeom>
+          <a:noFill/>
+        </p:spPr>
+        <p:txBody>
+          <a:bodyPr wrap="square" rtlCol="0">
+            <a:spAutoFit/>
+          </a:bodyPr>
+          <a:lstStyle/>
+          <a:p>
+            <a:r>
+              <a:rPr lang="en-US" altLang="zh-CN" dirty="0"/>
+              <a:t>Y</a:t>
+            </a:r>
+            <a:endParaRPr lang="zh-CN" altLang="en-US" dirty="0"/>
+          </a:p>
+        </p:txBody>
+      </p:sp>
+      <p:cxnSp>
+        <p:nvCxnSpPr>
+          <p:cNvPr id="4" name="直接箭头连接符 3"/>
+          <p:cNvCxnSpPr/>
+          <p:nvPr/>
+        </p:nvCxnSpPr>
+        <p:spPr>
+          <a:xfrm flipV="1">
+            <a:off x="497485" y="1268759"/>
+            <a:ext cx="0" cy="1440161"/>
+          </a:xfrm>
+          <a:prstGeom prst="straightConnector1">
+            <a:avLst/>
+          </a:prstGeom>
+          <a:ln>
+            <a:solidFill>
+              <a:schemeClr val="tx1"/>
+            </a:solidFill>
+            <a:tailEnd type="arrow"/>
+          </a:ln>
+        </p:spPr>
+        <p:style>
+          <a:lnRef idx="1">
+            <a:schemeClr val="accent1"/>
+          </a:lnRef>
+          <a:fillRef idx="0">
+            <a:schemeClr val="accent1"/>
+          </a:fillRef>
+          <a:effectRef idx="0">
+            <a:schemeClr val="accent1"/>
+          </a:effectRef>
+          <a:fontRef idx="minor">
+            <a:schemeClr val="tx1"/>
+          </a:fontRef>
+        </p:style>
+      </p:cxnSp>
+      <p:cxnSp>
+        <p:nvCxnSpPr>
+          <p:cNvPr id="32" name="直接箭头连接符 31"/>
+          <p:cNvCxnSpPr>
+            <a:endCxn id="78" idx="3"/>
+          </p:cNvCxnSpPr>
+          <p:nvPr/>
+        </p:nvCxnSpPr>
+        <p:spPr>
+          <a:xfrm>
+            <a:off x="497485" y="3429000"/>
+            <a:ext cx="0" cy="2840353"/>
+          </a:xfrm>
+          <a:prstGeom prst="straightConnector1">
+            <a:avLst/>
+          </a:prstGeom>
+          <a:ln>
+            <a:solidFill>
+              <a:schemeClr val="tx1"/>
+            </a:solidFill>
+            <a:tailEnd type="arrow"/>
+          </a:ln>
+        </p:spPr>
+        <p:style>
+          <a:lnRef idx="1">
+            <a:schemeClr val="accent1"/>
+          </a:lnRef>
+          <a:fillRef idx="0">
+            <a:schemeClr val="accent1"/>
+          </a:fillRef>
+          <a:effectRef idx="0">
+            <a:schemeClr val="accent1"/>
+          </a:effectRef>
+          <a:fontRef idx="minor">
+            <a:schemeClr val="tx1"/>
+          </a:fontRef>
+        </p:style>
+      </p:cxnSp>
+      <p:sp>
+        <p:nvSpPr>
+          <p:cNvPr id="19" name="TextBox 18"/>
+          <p:cNvSpPr txBox="1"/>
+          <p:nvPr/>
+        </p:nvSpPr>
+        <p:spPr>
+          <a:xfrm>
+            <a:off x="377525" y="2938950"/>
+            <a:ext cx="328936" cy="369332"/>
+          </a:xfrm>
+          <a:prstGeom prst="rect">
+            <a:avLst/>
+          </a:prstGeom>
+          <a:noFill/>
+        </p:spPr>
+        <p:txBody>
+          <a:bodyPr wrap="none" rtlCol="0">
+            <a:spAutoFit/>
+          </a:bodyPr>
+          <a:lstStyle/>
+          <a:p>
+            <a:r>
+              <a:rPr lang="en-US" altLang="zh-CN" dirty="0" smtClean="0"/>
+              <a:t>H</a:t>
+            </a:r>
+            <a:endParaRPr lang="zh-CN" altLang="en-US" dirty="0"/>
+          </a:p>
+        </p:txBody>
+      </p:sp>
+      <p:sp>
+        <p:nvSpPr>
+          <p:cNvPr id="36" name="TextBox 35"/>
+          <p:cNvSpPr txBox="1"/>
+          <p:nvPr/>
+        </p:nvSpPr>
+        <p:spPr>
+          <a:xfrm>
+            <a:off x="4267222" y="5661248"/>
+            <a:ext cx="306494" cy="369332"/>
+          </a:xfrm>
+          <a:prstGeom prst="rect">
+            <a:avLst/>
+          </a:prstGeom>
+          <a:noFill/>
+        </p:spPr>
+        <p:txBody>
+          <a:bodyPr wrap="none" rtlCol="0">
+            <a:spAutoFit/>
+          </a:bodyPr>
+          <a:lstStyle/>
+          <a:p>
+            <a:r>
+              <a:rPr lang="en-US" altLang="zh-CN" dirty="0" smtClean="0"/>
+              <a:t>h</a:t>
+            </a:r>
+            <a:endParaRPr lang="zh-CN" altLang="en-US" dirty="0"/>
+          </a:p>
+        </p:txBody>
+      </p:sp>
+    </p:spTree>
+    <p:extLst>
+      <p:ext uri="{BB962C8B-B14F-4D97-AF65-F5344CB8AC3E}">
+        <p14:creationId xmlns:p14="http://schemas.microsoft.com/office/powerpoint/2010/main" val="564615162"/>
+      </p:ext>
+    </p:extLst>
+  </p:cSld>
+  <p:clrMapOvr>
+    <a:masterClrMapping/>
+  </p:clrMapOvr>
+</p:sld>
+</file>
+
+<file path=ppt/slides/slide9.xml><?xml version="1.0" encoding="utf-8"?>
+<p:sld xmlns:a="http://schemas.openxmlformats.org/drawingml/2006/main" xmlns:r="http://schemas.openxmlformats.org/officeDocument/2006/relationships" xmlns:p="http://schemas.openxmlformats.org/presentationml/2006/main">
+  <p:cSld>
+    <p:spTree>
+      <p:nvGrpSpPr>
+        <p:cNvPr id="1" name=""/>
+        <p:cNvGrpSpPr/>
+        <p:nvPr/>
+      </p:nvGrpSpPr>
+      <p:grpSpPr>
+        <a:xfrm>
+          <a:off x="0" y="0"/>
+          <a:ext cx="0" cy="0"/>
+          <a:chOff x="0" y="0"/>
+          <a:chExt cx="0" cy="0"/>
+        </a:xfrm>
+      </p:grpSpPr>
+      <p:sp>
+        <p:nvSpPr>
+          <p:cNvPr id="2" name="矩形 1"/>
+          <p:cNvSpPr/>
+          <p:nvPr/>
+        </p:nvSpPr>
+        <p:spPr>
+          <a:xfrm>
+            <a:off x="971600" y="548680"/>
+            <a:ext cx="324036" cy="5796644"/>
+          </a:xfrm>
+          <a:prstGeom prst="rect">
+            <a:avLst/>
+          </a:prstGeom>
+          <a:solidFill>
+            <a:schemeClr val="tx1"/>
+          </a:solidFill>
+          <a:ln>
+            <a:solidFill>
+              <a:schemeClr val="tx1"/>
+            </a:solidFill>
+          </a:ln>
+        </p:spPr>
+        <p:style>
+          <a:lnRef idx="2">
+            <a:schemeClr val="accent1">
+              <a:shade val="50000"/>
+            </a:schemeClr>
+          </a:lnRef>
+          <a:fillRef idx="1">
+            <a:schemeClr val="accent1"/>
+          </a:fillRef>
+          <a:effectRef idx="0">
+            <a:schemeClr val="accent1"/>
+          </a:effectRef>
+          <a:fontRef idx="minor">
+            <a:schemeClr val="lt1"/>
+          </a:fontRef>
+        </p:style>
+        <p:txBody>
+          <a:bodyPr rtlCol="0" anchor="ctr"/>
+          <a:lstStyle/>
+          <a:p>
+            <a:pPr algn="ctr"/>
+            <a:endParaRPr lang="zh-CN" altLang="en-US"/>
+          </a:p>
+        </p:txBody>
+      </p:sp>
+      <p:sp>
+        <p:nvSpPr>
+          <p:cNvPr id="3" name="矩形 2"/>
+          <p:cNvSpPr/>
+          <p:nvPr/>
+        </p:nvSpPr>
+        <p:spPr>
+          <a:xfrm>
+            <a:off x="1691680" y="530678"/>
+            <a:ext cx="324036" cy="5796644"/>
+          </a:xfrm>
+          <a:prstGeom prst="rect">
+            <a:avLst/>
+          </a:prstGeom>
+          <a:solidFill>
+            <a:schemeClr val="tx1"/>
+          </a:solidFill>
+          <a:ln>
+            <a:solidFill>
+              <a:schemeClr val="tx1"/>
+            </a:solidFill>
+          </a:ln>
+        </p:spPr>
+        <p:style>
+          <a:lnRef idx="2">
+            <a:schemeClr val="accent1">
+              <a:shade val="50000"/>
+            </a:schemeClr>
+          </a:lnRef>
+          <a:fillRef idx="1">
+            <a:schemeClr val="accent1"/>
+          </a:fillRef>
+          <a:effectRef idx="0">
+            <a:schemeClr val="accent1"/>
+          </a:effectRef>
+          <a:fontRef idx="minor">
+            <a:schemeClr val="lt1"/>
+          </a:fontRef>
+        </p:style>
+        <p:txBody>
+          <a:bodyPr rtlCol="0" anchor="ctr"/>
+          <a:lstStyle/>
+          <a:p>
+            <a:pPr algn="ctr"/>
+            <a:endParaRPr lang="zh-CN" altLang="en-US" b="1" dirty="0"/>
+          </a:p>
+        </p:txBody>
+      </p:sp>
+      <p:sp>
+        <p:nvSpPr>
+          <p:cNvPr id="4" name="矩形 3"/>
+          <p:cNvSpPr/>
+          <p:nvPr/>
+        </p:nvSpPr>
+        <p:spPr>
+          <a:xfrm>
+            <a:off x="2411760" y="530678"/>
+            <a:ext cx="324036" cy="5796644"/>
+          </a:xfrm>
+          <a:prstGeom prst="rect">
+            <a:avLst/>
+          </a:prstGeom>
+          <a:solidFill>
+            <a:schemeClr val="tx1"/>
+          </a:solidFill>
+          <a:ln>
+            <a:solidFill>
+              <a:schemeClr val="tx1"/>
+            </a:solidFill>
+          </a:ln>
+        </p:spPr>
+        <p:style>
+          <a:lnRef idx="2">
+            <a:schemeClr val="accent1">
+              <a:shade val="50000"/>
+            </a:schemeClr>
+          </a:lnRef>
+          <a:fillRef idx="1">
+            <a:schemeClr val="accent1"/>
+          </a:fillRef>
+          <a:effectRef idx="0">
+            <a:schemeClr val="accent1"/>
+          </a:effectRef>
+          <a:fontRef idx="minor">
+            <a:schemeClr val="lt1"/>
+          </a:fontRef>
+        </p:style>
+        <p:txBody>
+          <a:bodyPr rtlCol="0" anchor="ctr"/>
+          <a:lstStyle/>
+          <a:p>
+            <a:pPr algn="ctr"/>
+            <a:endParaRPr lang="zh-CN" altLang="en-US"/>
+          </a:p>
+        </p:txBody>
+      </p:sp>
+      <p:sp>
+        <p:nvSpPr>
+          <p:cNvPr id="5" name="矩形 4"/>
+          <p:cNvSpPr/>
+          <p:nvPr/>
+        </p:nvSpPr>
+        <p:spPr>
+          <a:xfrm>
+            <a:off x="3167844" y="532974"/>
+            <a:ext cx="324036" cy="5796644"/>
+          </a:xfrm>
+          <a:prstGeom prst="rect">
+            <a:avLst/>
+          </a:prstGeom>
+          <a:solidFill>
+            <a:schemeClr val="tx1"/>
+          </a:solidFill>
+          <a:ln>
+            <a:solidFill>
+              <a:schemeClr val="tx1"/>
+            </a:solidFill>
+          </a:ln>
+        </p:spPr>
+        <p:style>
+          <a:lnRef idx="2">
+            <a:schemeClr val="accent1">
+              <a:shade val="50000"/>
+            </a:schemeClr>
+          </a:lnRef>
+          <a:fillRef idx="1">
+            <a:schemeClr val="accent1"/>
+          </a:fillRef>
+          <a:effectRef idx="0">
+            <a:schemeClr val="accent1"/>
+          </a:effectRef>
+          <a:fontRef idx="minor">
+            <a:schemeClr val="lt1"/>
+          </a:fontRef>
+        </p:style>
+        <p:txBody>
+          <a:bodyPr rtlCol="0" anchor="ctr"/>
+          <a:lstStyle/>
+          <a:p>
+            <a:pPr algn="ctr"/>
+            <a:endParaRPr lang="zh-CN" altLang="en-US"/>
+          </a:p>
+        </p:txBody>
+      </p:sp>
+      <p:sp>
+        <p:nvSpPr>
+          <p:cNvPr id="6" name="矩形 5"/>
+          <p:cNvSpPr/>
+          <p:nvPr/>
+        </p:nvSpPr>
+        <p:spPr>
+          <a:xfrm>
+            <a:off x="3855948" y="507544"/>
+            <a:ext cx="324036" cy="5796644"/>
+          </a:xfrm>
+          <a:prstGeom prst="rect">
+            <a:avLst/>
+          </a:prstGeom>
+          <a:solidFill>
+            <a:schemeClr val="tx1"/>
+          </a:solidFill>
+          <a:ln>
+            <a:solidFill>
+              <a:schemeClr val="tx1"/>
+            </a:solidFill>
+          </a:ln>
+        </p:spPr>
+        <p:style>
+          <a:lnRef idx="2">
+            <a:schemeClr val="accent1">
+              <a:shade val="50000"/>
+            </a:schemeClr>
+          </a:lnRef>
+          <a:fillRef idx="1">
+            <a:schemeClr val="accent1"/>
+          </a:fillRef>
+          <a:effectRef idx="0">
+            <a:schemeClr val="accent1"/>
+          </a:effectRef>
+          <a:fontRef idx="minor">
+            <a:schemeClr val="lt1"/>
+          </a:fontRef>
+        </p:style>
+        <p:txBody>
+          <a:bodyPr rtlCol="0" anchor="ctr"/>
+          <a:lstStyle/>
+          <a:p>
+            <a:pPr algn="ctr"/>
+            <a:endParaRPr lang="zh-CN" altLang="en-US" b="1" dirty="0"/>
+          </a:p>
+        </p:txBody>
+      </p:sp>
+      <p:sp>
+        <p:nvSpPr>
+          <p:cNvPr id="7" name="矩形 6"/>
+          <p:cNvSpPr/>
+          <p:nvPr/>
+        </p:nvSpPr>
+        <p:spPr>
+          <a:xfrm>
+            <a:off x="4576028" y="507544"/>
+            <a:ext cx="324036" cy="5796644"/>
+          </a:xfrm>
+          <a:prstGeom prst="rect">
+            <a:avLst/>
+          </a:prstGeom>
+          <a:solidFill>
+            <a:schemeClr val="tx1"/>
+          </a:solidFill>
+          <a:ln>
+            <a:solidFill>
+              <a:schemeClr val="tx1"/>
+            </a:solidFill>
+          </a:ln>
+        </p:spPr>
+        <p:style>
+          <a:lnRef idx="2">
+            <a:schemeClr val="accent1">
+              <a:shade val="50000"/>
+            </a:schemeClr>
+          </a:lnRef>
+          <a:fillRef idx="1">
+            <a:schemeClr val="accent1"/>
+          </a:fillRef>
+          <a:effectRef idx="0">
+            <a:schemeClr val="accent1"/>
+          </a:effectRef>
+          <a:fontRef idx="minor">
+            <a:schemeClr val="lt1"/>
+          </a:fontRef>
+        </p:style>
+        <p:txBody>
+          <a:bodyPr rtlCol="0" anchor="ctr"/>
+          <a:lstStyle/>
+          <a:p>
+            <a:pPr algn="ctr"/>
+            <a:endParaRPr lang="zh-CN" altLang="en-US"/>
+          </a:p>
+        </p:txBody>
+      </p:sp>
+      <p:sp>
+        <p:nvSpPr>
+          <p:cNvPr id="8" name="矩形 7"/>
+          <p:cNvSpPr/>
+          <p:nvPr/>
+        </p:nvSpPr>
+        <p:spPr>
+          <a:xfrm>
+            <a:off x="5292080" y="507544"/>
+            <a:ext cx="324036" cy="5796644"/>
+          </a:xfrm>
+          <a:prstGeom prst="rect">
+            <a:avLst/>
+          </a:prstGeom>
+          <a:solidFill>
+            <a:schemeClr val="tx1"/>
+          </a:solidFill>
+          <a:ln>
+            <a:solidFill>
+              <a:schemeClr val="tx1"/>
+            </a:solidFill>
+          </a:ln>
+        </p:spPr>
+        <p:style>
+          <a:lnRef idx="2">
+            <a:schemeClr val="accent1">
+              <a:shade val="50000"/>
+            </a:schemeClr>
+          </a:lnRef>
+          <a:fillRef idx="1">
+            <a:schemeClr val="accent1"/>
+          </a:fillRef>
+          <a:effectRef idx="0">
+            <a:schemeClr val="accent1"/>
+          </a:effectRef>
+          <a:fontRef idx="minor">
+            <a:schemeClr val="lt1"/>
+          </a:fontRef>
+        </p:style>
+        <p:txBody>
+          <a:bodyPr rtlCol="0" anchor="ctr"/>
+          <a:lstStyle/>
+          <a:p>
+            <a:pPr algn="ctr"/>
+            <a:endParaRPr lang="zh-CN" altLang="en-US"/>
+          </a:p>
+        </p:txBody>
+      </p:sp>
+      <p:sp>
+        <p:nvSpPr>
+          <p:cNvPr id="9" name="矩形 8"/>
+          <p:cNvSpPr/>
+          <p:nvPr/>
+        </p:nvSpPr>
+        <p:spPr>
+          <a:xfrm>
+            <a:off x="6012160" y="552692"/>
+            <a:ext cx="324036" cy="5796644"/>
+          </a:xfrm>
+          <a:prstGeom prst="rect">
+            <a:avLst/>
+          </a:prstGeom>
+          <a:solidFill>
+            <a:schemeClr val="tx1"/>
+          </a:solidFill>
+          <a:ln>
+            <a:solidFill>
+              <a:schemeClr val="tx1"/>
+            </a:solidFill>
+          </a:ln>
+        </p:spPr>
+        <p:style>
+          <a:lnRef idx="2">
+            <a:schemeClr val="accent1">
+              <a:shade val="50000"/>
+            </a:schemeClr>
+          </a:lnRef>
+          <a:fillRef idx="1">
+            <a:schemeClr val="accent1"/>
+          </a:fillRef>
+          <a:effectRef idx="0">
+            <a:schemeClr val="accent1"/>
+          </a:effectRef>
+          <a:fontRef idx="minor">
+            <a:schemeClr val="lt1"/>
+          </a:fontRef>
+        </p:style>
+        <p:txBody>
+          <a:bodyPr rtlCol="0" anchor="ctr"/>
+          <a:lstStyle/>
+          <a:p>
+            <a:pPr algn="ctr"/>
+            <a:endParaRPr lang="zh-CN" altLang="en-US" b="1" dirty="0"/>
+          </a:p>
+        </p:txBody>
+      </p:sp>
+      <p:sp>
+        <p:nvSpPr>
+          <p:cNvPr id="10" name="矩形 9"/>
+          <p:cNvSpPr/>
+          <p:nvPr/>
+        </p:nvSpPr>
+        <p:spPr>
+          <a:xfrm>
+            <a:off x="6732240" y="532974"/>
+            <a:ext cx="324036" cy="5796644"/>
+          </a:xfrm>
+          <a:prstGeom prst="rect">
+            <a:avLst/>
+          </a:prstGeom>
+          <a:solidFill>
+            <a:schemeClr val="tx1"/>
+          </a:solidFill>
+          <a:ln>
+            <a:solidFill>
+              <a:schemeClr val="tx1"/>
+            </a:solidFill>
+          </a:ln>
+        </p:spPr>
+        <p:style>
+          <a:lnRef idx="2">
+            <a:schemeClr val="accent1">
+              <a:shade val="50000"/>
+            </a:schemeClr>
+          </a:lnRef>
+          <a:fillRef idx="1">
+            <a:schemeClr val="accent1"/>
+          </a:fillRef>
+          <a:effectRef idx="0">
+            <a:schemeClr val="accent1"/>
+          </a:effectRef>
+          <a:fontRef idx="minor">
+            <a:schemeClr val="lt1"/>
+          </a:fontRef>
+        </p:style>
+        <p:txBody>
+          <a:bodyPr rtlCol="0" anchor="ctr"/>
+          <a:lstStyle/>
+          <a:p>
+            <a:pPr algn="ctr"/>
+            <a:endParaRPr lang="zh-CN" altLang="en-US"/>
+          </a:p>
+        </p:txBody>
+      </p:sp>
+      <p:sp>
+        <p:nvSpPr>
+          <p:cNvPr id="11" name="矩形 10"/>
+          <p:cNvSpPr/>
+          <p:nvPr/>
+        </p:nvSpPr>
+        <p:spPr>
+          <a:xfrm>
+            <a:off x="7452320" y="550698"/>
+            <a:ext cx="324036" cy="5796644"/>
+          </a:xfrm>
+          <a:prstGeom prst="rect">
+            <a:avLst/>
+          </a:prstGeom>
+          <a:solidFill>
+            <a:schemeClr val="tx1"/>
+          </a:solidFill>
+          <a:ln>
+            <a:solidFill>
+              <a:schemeClr val="tx1"/>
+            </a:solidFill>
+          </a:ln>
+        </p:spPr>
+        <p:style>
+          <a:lnRef idx="2">
+            <a:schemeClr val="accent1">
+              <a:shade val="50000"/>
+            </a:schemeClr>
+          </a:lnRef>
+          <a:fillRef idx="1">
+            <a:schemeClr val="accent1"/>
+          </a:fillRef>
+          <a:effectRef idx="0">
+            <a:schemeClr val="accent1"/>
+          </a:effectRef>
+          <a:fontRef idx="minor">
+            <a:schemeClr val="lt1"/>
+          </a:fontRef>
+        </p:style>
+        <p:txBody>
+          <a:bodyPr rtlCol="0" anchor="ctr"/>
+          <a:lstStyle/>
+          <a:p>
+            <a:pPr algn="ctr"/>
+            <a:endParaRPr lang="zh-CN" altLang="en-US"/>
+          </a:p>
+        </p:txBody>
+      </p:sp>
+      <p:sp>
+        <p:nvSpPr>
+          <p:cNvPr id="12" name="矩形 11"/>
+          <p:cNvSpPr/>
+          <p:nvPr/>
+        </p:nvSpPr>
+        <p:spPr>
+          <a:xfrm>
+            <a:off x="8208404" y="552692"/>
+            <a:ext cx="324036" cy="5796644"/>
+          </a:xfrm>
+          <a:prstGeom prst="rect">
+            <a:avLst/>
+          </a:prstGeom>
+          <a:solidFill>
+            <a:schemeClr val="tx1"/>
+          </a:solidFill>
+          <a:ln>
+            <a:solidFill>
+              <a:schemeClr val="tx1"/>
+            </a:solidFill>
+          </a:ln>
+        </p:spPr>
+        <p:style>
+          <a:lnRef idx="2">
+            <a:schemeClr val="accent1">
+              <a:shade val="50000"/>
+            </a:schemeClr>
+          </a:lnRef>
+          <a:fillRef idx="1">
+            <a:schemeClr val="accent1"/>
+          </a:fillRef>
+          <a:effectRef idx="0">
+            <a:schemeClr val="accent1"/>
+          </a:effectRef>
+          <a:fontRef idx="minor">
+            <a:schemeClr val="lt1"/>
+          </a:fontRef>
+        </p:style>
+        <p:txBody>
+          <a:bodyPr rtlCol="0" anchor="ctr"/>
+          <a:lstStyle/>
+          <a:p>
+            <a:pPr algn="ctr"/>
+            <a:endParaRPr lang="zh-CN" altLang="en-US"/>
+          </a:p>
+        </p:txBody>
+      </p:sp>
+      <p:cxnSp>
+        <p:nvCxnSpPr>
+          <p:cNvPr id="16" name="直接箭头连接符 15"/>
+          <p:cNvCxnSpPr/>
+          <p:nvPr/>
+        </p:nvCxnSpPr>
+        <p:spPr>
+          <a:xfrm flipH="1">
+            <a:off x="971600" y="6597352"/>
+            <a:ext cx="162018" cy="0"/>
+          </a:xfrm>
+          <a:prstGeom prst="straightConnector1">
+            <a:avLst/>
+          </a:prstGeom>
+          <a:ln>
+            <a:solidFill>
+              <a:schemeClr val="tx1"/>
+            </a:solidFill>
+            <a:tailEnd type="arrow"/>
+          </a:ln>
+        </p:spPr>
+        <p:style>
+          <a:lnRef idx="1">
+            <a:schemeClr val="accent1"/>
+          </a:lnRef>
+          <a:fillRef idx="0">
+            <a:schemeClr val="accent1"/>
+          </a:fillRef>
+          <a:effectRef idx="0">
+            <a:schemeClr val="accent1"/>
+          </a:effectRef>
+          <a:fontRef idx="minor">
+            <a:schemeClr val="tx1"/>
+          </a:fontRef>
+        </p:style>
+      </p:cxnSp>
+      <p:cxnSp>
+        <p:nvCxnSpPr>
+          <p:cNvPr id="17" name="直接箭头连接符 16"/>
+          <p:cNvCxnSpPr/>
+          <p:nvPr/>
+        </p:nvCxnSpPr>
+        <p:spPr>
+          <a:xfrm>
+            <a:off x="1439652" y="6597352"/>
+            <a:ext cx="252028" cy="0"/>
+          </a:xfrm>
+          <a:prstGeom prst="straightConnector1">
+            <a:avLst/>
+          </a:prstGeom>
+          <a:ln>
+            <a:solidFill>
+              <a:schemeClr val="tx1"/>
+            </a:solidFill>
+            <a:tailEnd type="arrow"/>
+          </a:ln>
+        </p:spPr>
+        <p:style>
+          <a:lnRef idx="1">
+            <a:schemeClr val="accent1"/>
+          </a:lnRef>
+          <a:fillRef idx="0">
+            <a:schemeClr val="accent1"/>
+          </a:fillRef>
+          <a:effectRef idx="0">
+            <a:schemeClr val="accent1"/>
+          </a:effectRef>
+          <a:fontRef idx="minor">
+            <a:schemeClr val="tx1"/>
+          </a:fontRef>
+        </p:style>
+      </p:cxnSp>
+      <p:sp>
+        <p:nvSpPr>
+          <p:cNvPr id="22" name="TextBox 21"/>
+          <p:cNvSpPr txBox="1"/>
+          <p:nvPr/>
+        </p:nvSpPr>
+        <p:spPr>
+          <a:xfrm>
+            <a:off x="1203270" y="6456620"/>
+            <a:ext cx="282450" cy="369332"/>
+          </a:xfrm>
+          <a:prstGeom prst="rect">
+            <a:avLst/>
+          </a:prstGeom>
+          <a:noFill/>
+        </p:spPr>
+        <p:txBody>
+          <a:bodyPr wrap="none" rtlCol="0">
+            <a:spAutoFit/>
+          </a:bodyPr>
+          <a:lstStyle/>
+          <a:p>
+            <a:r>
+              <a:rPr lang="en-US" altLang="zh-CN" dirty="0" smtClean="0"/>
+              <a:t>L</a:t>
+            </a:r>
+            <a:endParaRPr lang="zh-CN" altLang="en-US" dirty="0"/>
+          </a:p>
+        </p:txBody>
+      </p:sp>
+      <p:sp>
+        <p:nvSpPr>
+          <p:cNvPr id="25" name="等腰三角形 24"/>
+          <p:cNvSpPr/>
+          <p:nvPr/>
+        </p:nvSpPr>
+        <p:spPr>
+          <a:xfrm>
+            <a:off x="3599892" y="2420888"/>
+            <a:ext cx="144016" cy="109753"/>
+          </a:xfrm>
+          <a:prstGeom prst="triangle">
+            <a:avLst/>
+          </a:prstGeom>
+          <a:solidFill>
+            <a:schemeClr val="tx1"/>
+          </a:solidFill>
+          <a:ln>
+            <a:solidFill>
+              <a:schemeClr val="tx1"/>
+            </a:solidFill>
+          </a:ln>
+        </p:spPr>
+        <p:style>
+          <a:lnRef idx="2">
+            <a:schemeClr val="accent1">
+              <a:shade val="50000"/>
+            </a:schemeClr>
+          </a:lnRef>
+          <a:fillRef idx="1">
+            <a:schemeClr val="accent1"/>
+          </a:fillRef>
+          <a:effectRef idx="0">
+            <a:schemeClr val="accent1"/>
+          </a:effectRef>
+          <a:fontRef idx="minor">
+            <a:schemeClr val="lt1"/>
+          </a:fontRef>
+        </p:style>
+        <p:txBody>
+          <a:bodyPr rtlCol="0" anchor="ctr"/>
+          <a:lstStyle/>
+          <a:p>
+            <a:pPr algn="ctr"/>
+            <a:endParaRPr lang="zh-CN" altLang="en-US"/>
+          </a:p>
+        </p:txBody>
+      </p:sp>
+      <p:sp>
+        <p:nvSpPr>
+          <p:cNvPr id="26" name="等腰三角形 25"/>
+          <p:cNvSpPr/>
+          <p:nvPr/>
+        </p:nvSpPr>
+        <p:spPr>
+          <a:xfrm>
+            <a:off x="6030162" y="2420887"/>
+            <a:ext cx="144016" cy="109753"/>
+          </a:xfrm>
+          <a:prstGeom prst="triangle">
+            <a:avLst/>
+          </a:prstGeom>
+          <a:solidFill>
+            <a:schemeClr val="bg1"/>
+          </a:solidFill>
+          <a:ln>
+            <a:solidFill>
+              <a:schemeClr val="bg1"/>
+            </a:solidFill>
+          </a:ln>
+        </p:spPr>
+        <p:style>
+          <a:lnRef idx="2">
+            <a:schemeClr val="accent1">
+              <a:shade val="50000"/>
+            </a:schemeClr>
+          </a:lnRef>
+          <a:fillRef idx="1">
+            <a:schemeClr val="accent1"/>
+          </a:fillRef>
+          <a:effectRef idx="0">
+            <a:schemeClr val="accent1"/>
+          </a:effectRef>
+          <a:fontRef idx="minor">
+            <a:schemeClr val="lt1"/>
+          </a:fontRef>
+        </p:style>
+        <p:txBody>
+          <a:bodyPr rtlCol="0" anchor="ctr"/>
+          <a:lstStyle/>
+          <a:p>
+            <a:pPr algn="ctr"/>
+            <a:endParaRPr lang="zh-CN" altLang="en-US"/>
+          </a:p>
+        </p:txBody>
+      </p:sp>
+      <p:sp>
+        <p:nvSpPr>
+          <p:cNvPr id="27" name="TextBox 26"/>
+          <p:cNvSpPr txBox="1"/>
+          <p:nvPr/>
+        </p:nvSpPr>
+        <p:spPr>
+          <a:xfrm>
+            <a:off x="3538232" y="2106431"/>
+            <a:ext cx="317716" cy="369332"/>
+          </a:xfrm>
+          <a:prstGeom prst="rect">
+            <a:avLst/>
+          </a:prstGeom>
+          <a:noFill/>
+        </p:spPr>
+        <p:txBody>
+          <a:bodyPr wrap="none" rtlCol="0">
+            <a:spAutoFit/>
+          </a:bodyPr>
+          <a:lstStyle/>
+          <a:p>
+            <a:r>
+              <a:rPr lang="en-US" altLang="zh-CN" dirty="0" smtClean="0"/>
+              <a:t>A</a:t>
+            </a:r>
+            <a:endParaRPr lang="zh-CN" altLang="en-US" dirty="0"/>
+          </a:p>
+        </p:txBody>
+      </p:sp>
+      <p:sp>
+        <p:nvSpPr>
+          <p:cNvPr id="28" name="TextBox 27"/>
+          <p:cNvSpPr txBox="1"/>
+          <p:nvPr/>
+        </p:nvSpPr>
+        <p:spPr>
+          <a:xfrm>
+            <a:off x="6012160" y="2047508"/>
+            <a:ext cx="309700" cy="369332"/>
+          </a:xfrm>
+          <a:prstGeom prst="rect">
+            <a:avLst/>
+          </a:prstGeom>
+          <a:noFill/>
+        </p:spPr>
+        <p:txBody>
+          <a:bodyPr wrap="none" rtlCol="0">
+            <a:spAutoFit/>
+          </a:bodyPr>
+          <a:lstStyle/>
+          <a:p>
+            <a:r>
+              <a:rPr lang="en-US" altLang="zh-CN" dirty="0" smtClean="0">
+                <a:solidFill>
+                  <a:schemeClr val="bg1"/>
+                </a:solidFill>
+              </a:rPr>
+              <a:t>B</a:t>
+            </a:r>
+            <a:endParaRPr lang="zh-CN" altLang="en-US" dirty="0">
+              <a:solidFill>
+                <a:schemeClr val="bg1"/>
+              </a:solidFill>
+            </a:endParaRPr>
+          </a:p>
+        </p:txBody>
+      </p:sp>
+      <p:cxnSp>
+        <p:nvCxnSpPr>
+          <p:cNvPr id="31" name="直接箭头连接符 30"/>
+          <p:cNvCxnSpPr/>
+          <p:nvPr/>
+        </p:nvCxnSpPr>
+        <p:spPr>
+          <a:xfrm>
+            <a:off x="251520" y="6456620"/>
+            <a:ext cx="8640960" cy="0"/>
+          </a:xfrm>
+          <a:prstGeom prst="straightConnector1">
+            <a:avLst/>
+          </a:prstGeom>
+          <a:ln>
+            <a:solidFill>
+              <a:schemeClr val="tx1"/>
+            </a:solidFill>
+            <a:tailEnd type="arrow"/>
+          </a:ln>
+        </p:spPr>
+        <p:style>
+          <a:lnRef idx="1">
+            <a:schemeClr val="accent1"/>
+          </a:lnRef>
+          <a:fillRef idx="0">
+            <a:schemeClr val="accent1"/>
+          </a:fillRef>
+          <a:effectRef idx="0">
+            <a:schemeClr val="accent1"/>
+          </a:effectRef>
+          <a:fontRef idx="minor">
+            <a:schemeClr val="tx1"/>
+          </a:fontRef>
+        </p:style>
+      </p:cxnSp>
+      <p:cxnSp>
+        <p:nvCxnSpPr>
+          <p:cNvPr id="32" name="直接箭头连接符 31"/>
+          <p:cNvCxnSpPr/>
+          <p:nvPr/>
+        </p:nvCxnSpPr>
+        <p:spPr>
+          <a:xfrm flipV="1">
+            <a:off x="251520" y="152636"/>
+            <a:ext cx="0" cy="6303984"/>
+          </a:xfrm>
+          <a:prstGeom prst="straightConnector1">
+            <a:avLst/>
+          </a:prstGeom>
+          <a:ln>
+            <a:solidFill>
+              <a:schemeClr val="tx1"/>
+            </a:solidFill>
+            <a:tailEnd type="arrow"/>
+          </a:ln>
+        </p:spPr>
+        <p:style>
+          <a:lnRef idx="1">
+            <a:schemeClr val="accent1"/>
+          </a:lnRef>
+          <a:fillRef idx="0">
+            <a:schemeClr val="accent1"/>
+          </a:fillRef>
+          <a:effectRef idx="0">
+            <a:schemeClr val="accent1"/>
+          </a:effectRef>
+          <a:fontRef idx="minor">
+            <a:schemeClr val="tx1"/>
+          </a:fontRef>
+        </p:style>
+      </p:cxnSp>
+      <p:sp>
+        <p:nvSpPr>
+          <p:cNvPr id="35" name="TextBox 34"/>
+          <p:cNvSpPr txBox="1"/>
+          <p:nvPr/>
+        </p:nvSpPr>
+        <p:spPr>
+          <a:xfrm>
+            <a:off x="8498660" y="6488668"/>
+            <a:ext cx="468052" cy="369332"/>
+          </a:xfrm>
+          <a:prstGeom prst="rect">
+            <a:avLst/>
+          </a:prstGeom>
+          <a:noFill/>
+        </p:spPr>
+        <p:txBody>
+          <a:bodyPr wrap="square" rtlCol="0">
+            <a:spAutoFit/>
+          </a:bodyPr>
+          <a:lstStyle/>
+          <a:p>
+            <a:r>
+              <a:rPr lang="en-US" altLang="zh-CN" dirty="0" smtClean="0"/>
+              <a:t>X</a:t>
+            </a:r>
+            <a:endParaRPr lang="zh-CN" altLang="en-US" dirty="0"/>
+          </a:p>
+        </p:txBody>
+      </p:sp>
+      <p:sp>
+        <p:nvSpPr>
+          <p:cNvPr id="36" name="TextBox 35"/>
+          <p:cNvSpPr txBox="1"/>
+          <p:nvPr/>
+        </p:nvSpPr>
+        <p:spPr>
+          <a:xfrm>
+            <a:off x="323528" y="204172"/>
+            <a:ext cx="468052" cy="369332"/>
+          </a:xfrm>
+          <a:prstGeom prst="rect">
+            <a:avLst/>
+          </a:prstGeom>
+          <a:noFill/>
+        </p:spPr>
+        <p:txBody>
+          <a:bodyPr wrap="square" rtlCol="0">
+            <a:spAutoFit/>
+          </a:bodyPr>
+          <a:lstStyle/>
+          <a:p>
+            <a:r>
+              <a:rPr lang="en-US" altLang="zh-CN" dirty="0"/>
+              <a:t>Y</a:t>
+            </a:r>
+            <a:endParaRPr lang="zh-CN" altLang="en-US" dirty="0"/>
+          </a:p>
+        </p:txBody>
+      </p:sp>
+    </p:spTree>
+    <p:extLst>
+      <p:ext uri="{BB962C8B-B14F-4D97-AF65-F5344CB8AC3E}">
+        <p14:creationId xmlns:p14="http://schemas.microsoft.com/office/powerpoint/2010/main" val="276485664"/>
       </p:ext>
     </p:extLst>
   </p:cSld>

</xml_diff>